<commit_message>
summary modifs, not done
</commit_message>
<xml_diff>
--- a/mcmc_method.pptx
+++ b/mcmc_method.pptx
@@ -3995,367 +3995,44 @@
           <a:chExt cx="0" cy="0"/>
         </a:xfrm>
       </p:grpSpPr>
-      <mc:AlternateContent xmlns:mc="http://schemas.openxmlformats.org/markup-compatibility/2006">
-        <mc:Choice xmlns:a14="http://schemas.microsoft.com/office/drawing/2010/main" Requires="a14">
-          <p:sp>
-            <p:nvSpPr>
-              <p:cNvPr id="2" name="TextBox 1">
-                <a:extLst>
-                  <a:ext uri="{FF2B5EF4-FFF2-40B4-BE49-F238E27FC236}">
-                    <a16:creationId xmlns:a16="http://schemas.microsoft.com/office/drawing/2014/main" id="{6C2B10C5-9FBB-B160-EF82-2177DA7A747F}"/>
-                  </a:ext>
-                </a:extLst>
-              </p:cNvPr>
-              <p:cNvSpPr txBox="1"/>
-              <p:nvPr/>
-            </p:nvSpPr>
-            <p:spPr>
-              <a:xfrm>
-                <a:off x="188890" y="876951"/>
-                <a:ext cx="11638349" cy="2309543"/>
-              </a:xfrm>
-              <a:prstGeom prst="rect">
-                <a:avLst/>
-              </a:prstGeom>
-              <a:noFill/>
-            </p:spPr>
-            <p:txBody>
-              <a:bodyPr wrap="square" rtlCol="0">
-                <a:spAutoFit/>
-              </a:bodyPr>
-              <a:lstStyle/>
-              <a:p>
-                <a:r>
-                  <a:rPr lang="en-FR" dirty="0"/>
-                  <a:t>Entropy is defined as the randomness or uncertainty of a state. High entropy = high uncertainty. </a:t>
-                </a:r>
-              </a:p>
-              <a:p>
-                <a:endParaRPr lang="en-FR" dirty="0"/>
-              </a:p>
-              <a:p>
-                <a:r>
-                  <a:rPr lang="en-FR" dirty="0">
-                    <a:solidFill>
-                      <a:srgbClr val="0070C0"/>
-                    </a:solidFill>
-                  </a:rPr>
-                  <a:t>Entropy in our method will be directly linked to the possible number of transitions in a state:</a:t>
-                </a:r>
-              </a:p>
-              <a:p>
-                <a:r>
-                  <a:rPr lang="en-GB" dirty="0">
-                    <a:solidFill>
-                      <a:srgbClr val="0070C0"/>
-                    </a:solidFill>
-                  </a:rPr>
-                  <a:t>the higher the number of transitions, the higher the entropy, since you’re less sure of what will happen next.</a:t>
-                </a:r>
-              </a:p>
-              <a:p>
-                <a:r>
-                  <a:rPr lang="en-GB" dirty="0">
-                    <a:solidFill>
-                      <a:srgbClr val="0070C0"/>
-                    </a:solidFill>
-                  </a:rPr>
-                  <a:t>Entropy can also be modified if you modify the probability of the transitions: uniform distribution = highest entropy</a:t>
-                </a:r>
-              </a:p>
-              <a:p>
-                <a:endParaRPr lang="en-GB" dirty="0">
-                  <a:solidFill>
-                    <a:srgbClr val="0070C0"/>
-                  </a:solidFill>
-                </a:endParaRPr>
-              </a:p>
-              <a:p>
-                <a:r>
-                  <a:rPr lang="en-GB" dirty="0">
-                    <a:solidFill>
-                      <a:srgbClr val="0070C0"/>
-                    </a:solidFill>
-                  </a:rPr>
-                  <a:t>Entropy of a state: </a:t>
-                </a:r>
-                <a14:m>
-                  <m:oMath xmlns:m="http://schemas.openxmlformats.org/officeDocument/2006/math">
-                    <m:r>
-                      <m:rPr>
-                        <m:sty m:val="p"/>
-                      </m:rPr>
-                      <a:rPr lang="en-US" b="0" i="0" smtClean="0">
-                        <a:solidFill>
-                          <a:srgbClr val="0070C0"/>
-                        </a:solidFill>
-                        <a:latin typeface="Cambria Math" panose="02040503050406030204" pitchFamily="18" charset="0"/>
-                      </a:rPr>
-                      <m:t>S</m:t>
-                    </m:r>
-                    <m:r>
-                      <a:rPr lang="en-US" b="0" i="0" smtClean="0">
-                        <a:solidFill>
-                          <a:srgbClr val="0070C0"/>
-                        </a:solidFill>
-                        <a:latin typeface="Cambria Math" panose="02040503050406030204" pitchFamily="18" charset="0"/>
-                      </a:rPr>
-                      <m:t>=</m:t>
-                    </m:r>
-                    <m:r>
-                      <a:rPr lang="en-US" b="0" i="1" smtClean="0">
-                        <a:solidFill>
-                          <a:srgbClr val="0070C0"/>
-                        </a:solidFill>
-                        <a:latin typeface="Cambria Math" panose="02040503050406030204" pitchFamily="18" charset="0"/>
-                      </a:rPr>
-                      <m:t>−</m:t>
-                    </m:r>
-                    <m:nary>
-                      <m:naryPr>
-                        <m:chr m:val="∑"/>
-                        <m:ctrlPr>
-                          <a:rPr lang="en-GB" i="1" smtClean="0">
-                            <a:solidFill>
-                              <a:srgbClr val="0070C0"/>
-                            </a:solidFill>
-                            <a:latin typeface="Cambria Math" panose="02040503050406030204" pitchFamily="18" charset="0"/>
-                          </a:rPr>
-                        </m:ctrlPr>
-                      </m:naryPr>
-                      <m:sub>
-                        <m:r>
-                          <m:rPr>
-                            <m:brk m:alnAt="23"/>
-                          </m:rPr>
-                          <a:rPr lang="en-US" b="0" i="1" smtClean="0">
-                            <a:solidFill>
-                              <a:srgbClr val="0070C0"/>
-                            </a:solidFill>
-                            <a:latin typeface="Cambria Math" panose="02040503050406030204" pitchFamily="18" charset="0"/>
-                          </a:rPr>
-                          <m:t>𝑖</m:t>
-                        </m:r>
-                        <m:r>
-                          <a:rPr lang="en-GB" i="1" smtClean="0">
-                            <a:solidFill>
-                              <a:srgbClr val="0070C0"/>
-                            </a:solidFill>
-                            <a:latin typeface="Cambria Math" panose="02040503050406030204" pitchFamily="18" charset="0"/>
-                          </a:rPr>
-                          <m:t>=0</m:t>
-                        </m:r>
-                      </m:sub>
-                      <m:sup>
-                        <m:r>
-                          <a:rPr lang="en-GB" i="1" smtClean="0">
-                            <a:solidFill>
-                              <a:srgbClr val="0070C0"/>
-                            </a:solidFill>
-                            <a:latin typeface="Cambria Math" panose="02040503050406030204" pitchFamily="18" charset="0"/>
-                          </a:rPr>
-                          <m:t>𝑛</m:t>
-                        </m:r>
-                      </m:sup>
-                      <m:e>
-                        <m:sSub>
-                          <m:sSubPr>
-                            <m:ctrlPr>
-                              <a:rPr lang="en-GB" i="1" smtClean="0">
-                                <a:solidFill>
-                                  <a:srgbClr val="0070C0"/>
-                                </a:solidFill>
-                                <a:latin typeface="Cambria Math" panose="02040503050406030204" pitchFamily="18" charset="0"/>
-                              </a:rPr>
-                            </m:ctrlPr>
-                          </m:sSubPr>
-                          <m:e>
-                            <m:r>
-                              <a:rPr lang="en-US" b="0" i="1" smtClean="0">
-                                <a:solidFill>
-                                  <a:srgbClr val="0070C0"/>
-                                </a:solidFill>
-                                <a:latin typeface="Cambria Math" panose="02040503050406030204" pitchFamily="18" charset="0"/>
-                              </a:rPr>
-                              <m:t>𝑃</m:t>
-                            </m:r>
-                          </m:e>
-                          <m:sub>
-                            <m:r>
-                              <a:rPr lang="en-US" b="0" i="1" smtClean="0">
-                                <a:solidFill>
-                                  <a:srgbClr val="0070C0"/>
-                                </a:solidFill>
-                                <a:latin typeface="Cambria Math" panose="02040503050406030204" pitchFamily="18" charset="0"/>
-                              </a:rPr>
-                              <m:t>𝑖</m:t>
-                            </m:r>
-                          </m:sub>
-                        </m:sSub>
-                        <m:r>
-                          <a:rPr lang="en-US" b="0" i="1" smtClean="0">
-                            <a:solidFill>
-                              <a:srgbClr val="0070C0"/>
-                            </a:solidFill>
-                            <a:latin typeface="Cambria Math" panose="02040503050406030204" pitchFamily="18" charset="0"/>
-                          </a:rPr>
-                          <m:t> ∗ </m:t>
-                        </m:r>
-                        <m:func>
-                          <m:funcPr>
-                            <m:ctrlPr>
-                              <a:rPr lang="en-US" b="0" i="1" smtClean="0">
-                                <a:solidFill>
-                                  <a:srgbClr val="0070C0"/>
-                                </a:solidFill>
-                                <a:latin typeface="Cambria Math" panose="02040503050406030204" pitchFamily="18" charset="0"/>
-                              </a:rPr>
-                            </m:ctrlPr>
-                          </m:funcPr>
-                          <m:fName>
-                            <m:sSub>
-                              <m:sSubPr>
-                                <m:ctrlPr>
-                                  <a:rPr lang="en-US" b="0" i="1" smtClean="0">
-                                    <a:solidFill>
-                                      <a:srgbClr val="0070C0"/>
-                                    </a:solidFill>
-                                    <a:latin typeface="Cambria Math" panose="02040503050406030204" pitchFamily="18" charset="0"/>
-                                  </a:rPr>
-                                </m:ctrlPr>
-                              </m:sSubPr>
-                              <m:e>
-                                <m:r>
-                                  <m:rPr>
-                                    <m:sty m:val="p"/>
-                                  </m:rPr>
-                                  <a:rPr lang="en-US" b="0" i="0" smtClean="0">
-                                    <a:solidFill>
-                                      <a:srgbClr val="0070C0"/>
-                                    </a:solidFill>
-                                    <a:latin typeface="Cambria Math" panose="02040503050406030204" pitchFamily="18" charset="0"/>
-                                  </a:rPr>
-                                  <m:t>log</m:t>
-                                </m:r>
-                              </m:e>
-                              <m:sub>
-                                <m:r>
-                                  <a:rPr lang="en-US" b="0" i="1" smtClean="0">
-                                    <a:solidFill>
-                                      <a:srgbClr val="0070C0"/>
-                                    </a:solidFill>
-                                    <a:latin typeface="Cambria Math" panose="02040503050406030204" pitchFamily="18" charset="0"/>
-                                  </a:rPr>
-                                  <m:t>2</m:t>
-                                </m:r>
-                              </m:sub>
-                            </m:sSub>
-                          </m:fName>
-                          <m:e>
-                            <m:sSub>
-                              <m:sSubPr>
-                                <m:ctrlPr>
-                                  <a:rPr lang="en-US" b="0" i="1" smtClean="0">
-                                    <a:solidFill>
-                                      <a:srgbClr val="0070C0"/>
-                                    </a:solidFill>
-                                    <a:latin typeface="Cambria Math" panose="02040503050406030204" pitchFamily="18" charset="0"/>
-                                  </a:rPr>
-                                </m:ctrlPr>
-                              </m:sSubPr>
-                              <m:e>
-                                <m:r>
-                                  <a:rPr lang="en-US" b="0" i="1" smtClean="0">
-                                    <a:solidFill>
-                                      <a:srgbClr val="0070C0"/>
-                                    </a:solidFill>
-                                    <a:latin typeface="Cambria Math" panose="02040503050406030204" pitchFamily="18" charset="0"/>
-                                  </a:rPr>
-                                  <m:t>𝑃</m:t>
-                                </m:r>
-                              </m:e>
-                              <m:sub>
-                                <m:r>
-                                  <a:rPr lang="en-US" b="0" i="1" smtClean="0">
-                                    <a:solidFill>
-                                      <a:srgbClr val="0070C0"/>
-                                    </a:solidFill>
-                                    <a:latin typeface="Cambria Math" panose="02040503050406030204" pitchFamily="18" charset="0"/>
-                                  </a:rPr>
-                                  <m:t>𝑖</m:t>
-                                </m:r>
-                              </m:sub>
-                            </m:sSub>
-                          </m:e>
-                        </m:func>
-                      </m:e>
-                    </m:nary>
-                  </m:oMath>
-                </a14:m>
-                <a:endParaRPr lang="en-FR" dirty="0">
-                  <a:solidFill>
-                    <a:srgbClr val="0070C0"/>
-                  </a:solidFill>
-                </a:endParaRPr>
-              </a:p>
-              <a:p>
-                <a:r>
-                  <a:rPr lang="en-FR" dirty="0">
-                    <a:solidFill>
-                      <a:srgbClr val="0070C0"/>
-                    </a:solidFill>
-                  </a:rPr>
-                  <a:t>Examples</a:t>
-                </a:r>
-              </a:p>
-            </p:txBody>
-          </p:sp>
-        </mc:Choice>
-        <mc:Fallback>
-          <p:sp>
-            <p:nvSpPr>
-              <p:cNvPr id="2" name="TextBox 1">
-                <a:extLst>
-                  <a:ext uri="{FF2B5EF4-FFF2-40B4-BE49-F238E27FC236}">
-                    <a16:creationId xmlns:a16="http://schemas.microsoft.com/office/drawing/2014/main" id="{6C2B10C5-9FBB-B160-EF82-2177DA7A747F}"/>
-                  </a:ext>
-                </a:extLst>
-              </p:cNvPr>
-              <p:cNvSpPr txBox="1">
-                <a:spLocks noRot="1" noChangeAspect="1" noMove="1" noResize="1" noEditPoints="1" noAdjustHandles="1" noChangeArrowheads="1" noChangeShapeType="1" noTextEdit="1"/>
-              </p:cNvSpPr>
-              <p:nvPr/>
-            </p:nvSpPr>
-            <p:spPr>
-              <a:xfrm>
-                <a:off x="188890" y="876951"/>
-                <a:ext cx="11638349" cy="2309543"/>
-              </a:xfrm>
-              <a:prstGeom prst="rect">
-                <a:avLst/>
-              </a:prstGeom>
-              <a:blipFill>
-                <a:blip r:embed="rId2"/>
-                <a:stretch>
-                  <a:fillRect l="-327" t="-1639" b="-14208"/>
-                </a:stretch>
-              </a:blipFill>
-            </p:spPr>
-            <p:txBody>
-              <a:bodyPr/>
-              <a:lstStyle/>
-              <a:p>
-                <a:r>
-                  <a:rPr lang="en-FR">
-                    <a:noFill/>
-                  </a:rPr>
-                  <a:t> </a:t>
-                </a:r>
-              </a:p>
-            </p:txBody>
-          </p:sp>
-        </mc:Fallback>
-      </mc:AlternateContent>
+      <p:sp>
+        <p:nvSpPr>
+          <p:cNvPr id="2" name="TextBox 1">
+            <a:extLst>
+              <a:ext uri="{FF2B5EF4-FFF2-40B4-BE49-F238E27FC236}">
+                <a16:creationId xmlns:a16="http://schemas.microsoft.com/office/drawing/2014/main" id="{6C2B10C5-9FBB-B160-EF82-2177DA7A747F}"/>
+              </a:ext>
+            </a:extLst>
+          </p:cNvPr>
+          <p:cNvSpPr txBox="1"/>
+          <p:nvPr/>
+        </p:nvSpPr>
+        <p:spPr>
+          <a:xfrm>
+            <a:off x="188890" y="876951"/>
+            <a:ext cx="11638349" cy="646331"/>
+          </a:xfrm>
+          <a:prstGeom prst="rect">
+            <a:avLst/>
+          </a:prstGeom>
+          <a:noFill/>
+        </p:spPr>
+        <p:txBody>
+          <a:bodyPr wrap="square" rtlCol="0">
+            <a:spAutoFit/>
+          </a:bodyPr>
+          <a:lstStyle/>
+          <a:p>
+            <a:r>
+              <a:rPr lang="en-FR" dirty="0"/>
+              <a:t>Entropy is defined as the randomness or uncertainty of a state. High entropy = high uncertainty. </a:t>
+            </a:r>
+          </a:p>
+          <a:p>
+            <a:endParaRPr lang="en-FR" dirty="0"/>
+          </a:p>
+        </p:txBody>
+      </p:sp>
       <p:sp>
         <p:nvSpPr>
           <p:cNvPr id="7" name="TextBox 6">
@@ -4392,2118 +4069,6 @@
           </a:p>
         </p:txBody>
       </p:sp>
-      <p:grpSp>
-        <p:nvGrpSpPr>
-          <p:cNvPr id="3" name="Group 2">
-            <a:extLst>
-              <a:ext uri="{FF2B5EF4-FFF2-40B4-BE49-F238E27FC236}">
-                <a16:creationId xmlns:a16="http://schemas.microsoft.com/office/drawing/2014/main" id="{23050132-3456-4844-1009-BC27EBE1D0BA}"/>
-              </a:ext>
-            </a:extLst>
-          </p:cNvPr>
-          <p:cNvGrpSpPr/>
-          <p:nvPr/>
-        </p:nvGrpSpPr>
-        <p:grpSpPr>
-          <a:xfrm>
-            <a:off x="1053514" y="3415958"/>
-            <a:ext cx="583561" cy="583561"/>
-            <a:chOff x="5123645" y="775255"/>
-            <a:chExt cx="834604" cy="834604"/>
-          </a:xfrm>
-        </p:grpSpPr>
-        <p:sp>
-          <p:nvSpPr>
-            <p:cNvPr id="4" name="Oval 3">
-              <a:extLst>
-                <a:ext uri="{FF2B5EF4-FFF2-40B4-BE49-F238E27FC236}">
-                  <a16:creationId xmlns:a16="http://schemas.microsoft.com/office/drawing/2014/main" id="{8DDC9700-FD19-2BBD-5D66-7EAAEFA34940}"/>
-                </a:ext>
-              </a:extLst>
-            </p:cNvPr>
-            <p:cNvSpPr/>
-            <p:nvPr/>
-          </p:nvSpPr>
-          <p:spPr>
-            <a:xfrm>
-              <a:off x="5123645" y="775255"/>
-              <a:ext cx="834604" cy="834604"/>
-            </a:xfrm>
-            <a:prstGeom prst="ellipse">
-              <a:avLst/>
-            </a:prstGeom>
-            <a:ln>
-              <a:solidFill>
-                <a:schemeClr val="tx1">
-                  <a:lumMod val="95000"/>
-                  <a:lumOff val="5000"/>
-                </a:schemeClr>
-              </a:solidFill>
-            </a:ln>
-          </p:spPr>
-          <p:style>
-            <a:lnRef idx="2">
-              <a:schemeClr val="accent3"/>
-            </a:lnRef>
-            <a:fillRef idx="1">
-              <a:schemeClr val="lt1"/>
-            </a:fillRef>
-            <a:effectRef idx="0">
-              <a:schemeClr val="accent3"/>
-            </a:effectRef>
-            <a:fontRef idx="minor">
-              <a:schemeClr val="dk1"/>
-            </a:fontRef>
-          </p:style>
-          <p:txBody>
-            <a:bodyPr rtlCol="0" anchor="ctr"/>
-            <a:lstStyle/>
-            <a:p>
-              <a:pPr algn="ctr"/>
-              <a:endParaRPr lang="en-FR"/>
-            </a:p>
-          </p:txBody>
-        </p:sp>
-        <p:sp>
-          <p:nvSpPr>
-            <p:cNvPr id="5" name="TextBox 4">
-              <a:extLst>
-                <a:ext uri="{FF2B5EF4-FFF2-40B4-BE49-F238E27FC236}">
-                  <a16:creationId xmlns:a16="http://schemas.microsoft.com/office/drawing/2014/main" id="{44F5FD34-2598-E63A-6913-A1350FE4D13F}"/>
-                </a:ext>
-              </a:extLst>
-            </p:cNvPr>
-            <p:cNvSpPr txBox="1"/>
-            <p:nvPr/>
-          </p:nvSpPr>
-          <p:spPr>
-            <a:xfrm>
-              <a:off x="5188925" y="1038668"/>
-              <a:ext cx="704045" cy="374152"/>
-            </a:xfrm>
-            <a:prstGeom prst="rect">
-              <a:avLst/>
-            </a:prstGeom>
-            <a:noFill/>
-            <a:ln>
-              <a:noFill/>
-            </a:ln>
-          </p:spPr>
-          <p:style>
-            <a:lnRef idx="2">
-              <a:schemeClr val="dk1"/>
-            </a:lnRef>
-            <a:fillRef idx="1">
-              <a:schemeClr val="lt1"/>
-            </a:fillRef>
-            <a:effectRef idx="0">
-              <a:schemeClr val="dk1"/>
-            </a:effectRef>
-            <a:fontRef idx="minor">
-              <a:schemeClr val="dk1"/>
-            </a:fontRef>
-          </p:style>
-          <p:txBody>
-            <a:bodyPr wrap="square">
-              <a:spAutoFit/>
-            </a:bodyPr>
-            <a:lstStyle/>
-            <a:p>
-              <a:pPr algn="ctr"/>
-              <a:r>
-                <a:rPr lang="en-GB" sz="1100" dirty="0">
-                  <a:latin typeface="Cambria Math" panose="02040503050406030204" pitchFamily="18" charset="0"/>
-                  <a:ea typeface="Cambria Math" panose="02040503050406030204" pitchFamily="18" charset="0"/>
-                  <a:cs typeface="CMU Serif Roman" panose="02000603000000000000" pitchFamily="2" charset="0"/>
-                </a:rPr>
-                <a:t>S1</a:t>
-              </a:r>
-              <a:endParaRPr lang="en-GB" sz="1400" dirty="0">
-                <a:latin typeface="Cambria Math" panose="02040503050406030204" pitchFamily="18" charset="0"/>
-                <a:ea typeface="Cambria Math" panose="02040503050406030204" pitchFamily="18" charset="0"/>
-                <a:cs typeface="CMU Serif Roman" panose="02000603000000000000" pitchFamily="2" charset="0"/>
-              </a:endParaRPr>
-            </a:p>
-          </p:txBody>
-        </p:sp>
-      </p:grpSp>
-      <p:cxnSp>
-        <p:nvCxnSpPr>
-          <p:cNvPr id="14" name="Straight Arrow Connector 13">
-            <a:extLst>
-              <a:ext uri="{FF2B5EF4-FFF2-40B4-BE49-F238E27FC236}">
-                <a16:creationId xmlns:a16="http://schemas.microsoft.com/office/drawing/2014/main" id="{2A69B09D-7C52-C971-597C-D23DDB5891A1}"/>
-              </a:ext>
-            </a:extLst>
-          </p:cNvPr>
-          <p:cNvCxnSpPr>
-            <a:cxnSpLocks/>
-            <a:stCxn id="4" idx="3"/>
-          </p:cNvCxnSpPr>
-          <p:nvPr/>
-        </p:nvCxnSpPr>
-        <p:spPr>
-          <a:xfrm flipH="1">
-            <a:off x="613545" y="3914058"/>
-            <a:ext cx="525430" cy="387870"/>
-          </a:xfrm>
-          <a:prstGeom prst="straightConnector1">
-            <a:avLst/>
-          </a:prstGeom>
-          <a:ln>
-            <a:tailEnd type="triangle"/>
-          </a:ln>
-        </p:spPr>
-        <p:style>
-          <a:lnRef idx="1">
-            <a:schemeClr val="dk1"/>
-          </a:lnRef>
-          <a:fillRef idx="0">
-            <a:schemeClr val="dk1"/>
-          </a:fillRef>
-          <a:effectRef idx="0">
-            <a:schemeClr val="dk1"/>
-          </a:effectRef>
-          <a:fontRef idx="minor">
-            <a:schemeClr val="tx1"/>
-          </a:fontRef>
-        </p:style>
-      </p:cxnSp>
-      <p:cxnSp>
-        <p:nvCxnSpPr>
-          <p:cNvPr id="15" name="Straight Arrow Connector 14">
-            <a:extLst>
-              <a:ext uri="{FF2B5EF4-FFF2-40B4-BE49-F238E27FC236}">
-                <a16:creationId xmlns:a16="http://schemas.microsoft.com/office/drawing/2014/main" id="{CD42829E-EE36-9544-64A4-ECA1105FDC24}"/>
-              </a:ext>
-            </a:extLst>
-          </p:cNvPr>
-          <p:cNvCxnSpPr>
-            <a:cxnSpLocks/>
-            <a:stCxn id="4" idx="4"/>
-          </p:cNvCxnSpPr>
-          <p:nvPr/>
-        </p:nvCxnSpPr>
-        <p:spPr>
-          <a:xfrm>
-            <a:off x="1345295" y="3999519"/>
-            <a:ext cx="0" cy="709545"/>
-          </a:xfrm>
-          <a:prstGeom prst="straightConnector1">
-            <a:avLst/>
-          </a:prstGeom>
-          <a:ln>
-            <a:tailEnd type="triangle"/>
-          </a:ln>
-        </p:spPr>
-        <p:style>
-          <a:lnRef idx="1">
-            <a:schemeClr val="dk1"/>
-          </a:lnRef>
-          <a:fillRef idx="0">
-            <a:schemeClr val="dk1"/>
-          </a:fillRef>
-          <a:effectRef idx="0">
-            <a:schemeClr val="dk1"/>
-          </a:effectRef>
-          <a:fontRef idx="minor">
-            <a:schemeClr val="tx1"/>
-          </a:fontRef>
-        </p:style>
-      </p:cxnSp>
-      <p:cxnSp>
-        <p:nvCxnSpPr>
-          <p:cNvPr id="18" name="Straight Arrow Connector 17">
-            <a:extLst>
-              <a:ext uri="{FF2B5EF4-FFF2-40B4-BE49-F238E27FC236}">
-                <a16:creationId xmlns:a16="http://schemas.microsoft.com/office/drawing/2014/main" id="{6F83757A-225D-5B7E-17A5-4BA911941D08}"/>
-              </a:ext>
-            </a:extLst>
-          </p:cNvPr>
-          <p:cNvCxnSpPr>
-            <a:cxnSpLocks/>
-            <a:stCxn id="4" idx="5"/>
-          </p:cNvCxnSpPr>
-          <p:nvPr/>
-        </p:nvCxnSpPr>
-        <p:spPr>
-          <a:xfrm>
-            <a:off x="1551614" y="3914058"/>
-            <a:ext cx="287801" cy="831684"/>
-          </a:xfrm>
-          <a:prstGeom prst="straightConnector1">
-            <a:avLst/>
-          </a:prstGeom>
-          <a:ln>
-            <a:tailEnd type="triangle"/>
-          </a:ln>
-        </p:spPr>
-        <p:style>
-          <a:lnRef idx="1">
-            <a:schemeClr val="dk1"/>
-          </a:lnRef>
-          <a:fillRef idx="0">
-            <a:schemeClr val="dk1"/>
-          </a:fillRef>
-          <a:effectRef idx="0">
-            <a:schemeClr val="dk1"/>
-          </a:effectRef>
-          <a:fontRef idx="minor">
-            <a:schemeClr val="tx1"/>
-          </a:fontRef>
-        </p:style>
-      </p:cxnSp>
-      <p:grpSp>
-        <p:nvGrpSpPr>
-          <p:cNvPr id="34" name="Group 33">
-            <a:extLst>
-              <a:ext uri="{FF2B5EF4-FFF2-40B4-BE49-F238E27FC236}">
-                <a16:creationId xmlns:a16="http://schemas.microsoft.com/office/drawing/2014/main" id="{C025F379-C2C7-B9D5-0286-87C5CCB312DF}"/>
-              </a:ext>
-            </a:extLst>
-          </p:cNvPr>
-          <p:cNvGrpSpPr/>
-          <p:nvPr/>
-        </p:nvGrpSpPr>
-        <p:grpSpPr>
-          <a:xfrm>
-            <a:off x="1053515" y="5220206"/>
-            <a:ext cx="583561" cy="583561"/>
-            <a:chOff x="5123645" y="775255"/>
-            <a:chExt cx="834604" cy="834604"/>
-          </a:xfrm>
-        </p:grpSpPr>
-        <p:sp>
-          <p:nvSpPr>
-            <p:cNvPr id="35" name="Oval 34">
-              <a:extLst>
-                <a:ext uri="{FF2B5EF4-FFF2-40B4-BE49-F238E27FC236}">
-                  <a16:creationId xmlns:a16="http://schemas.microsoft.com/office/drawing/2014/main" id="{3DE61D5F-8376-89CF-2200-FE28A81EF8E4}"/>
-                </a:ext>
-              </a:extLst>
-            </p:cNvPr>
-            <p:cNvSpPr/>
-            <p:nvPr/>
-          </p:nvSpPr>
-          <p:spPr>
-            <a:xfrm>
-              <a:off x="5123645" y="775255"/>
-              <a:ext cx="834604" cy="834604"/>
-            </a:xfrm>
-            <a:prstGeom prst="ellipse">
-              <a:avLst/>
-            </a:prstGeom>
-            <a:ln>
-              <a:solidFill>
-                <a:schemeClr val="tx1">
-                  <a:lumMod val="95000"/>
-                  <a:lumOff val="5000"/>
-                </a:schemeClr>
-              </a:solidFill>
-            </a:ln>
-          </p:spPr>
-          <p:style>
-            <a:lnRef idx="2">
-              <a:schemeClr val="accent3"/>
-            </a:lnRef>
-            <a:fillRef idx="1">
-              <a:schemeClr val="lt1"/>
-            </a:fillRef>
-            <a:effectRef idx="0">
-              <a:schemeClr val="accent3"/>
-            </a:effectRef>
-            <a:fontRef idx="minor">
-              <a:schemeClr val="dk1"/>
-            </a:fontRef>
-          </p:style>
-          <p:txBody>
-            <a:bodyPr rtlCol="0" anchor="ctr"/>
-            <a:lstStyle/>
-            <a:p>
-              <a:pPr algn="ctr"/>
-              <a:endParaRPr lang="en-FR"/>
-            </a:p>
-          </p:txBody>
-        </p:sp>
-        <p:sp>
-          <p:nvSpPr>
-            <p:cNvPr id="36" name="TextBox 35">
-              <a:extLst>
-                <a:ext uri="{FF2B5EF4-FFF2-40B4-BE49-F238E27FC236}">
-                  <a16:creationId xmlns:a16="http://schemas.microsoft.com/office/drawing/2014/main" id="{436F1480-5A8F-6512-83D1-EE61BA772D8F}"/>
-                </a:ext>
-              </a:extLst>
-            </p:cNvPr>
-            <p:cNvSpPr txBox="1"/>
-            <p:nvPr/>
-          </p:nvSpPr>
-          <p:spPr>
-            <a:xfrm>
-              <a:off x="5188925" y="1038668"/>
-              <a:ext cx="704045" cy="374152"/>
-            </a:xfrm>
-            <a:prstGeom prst="rect">
-              <a:avLst/>
-            </a:prstGeom>
-            <a:noFill/>
-            <a:ln>
-              <a:noFill/>
-            </a:ln>
-          </p:spPr>
-          <p:style>
-            <a:lnRef idx="2">
-              <a:schemeClr val="dk1"/>
-            </a:lnRef>
-            <a:fillRef idx="1">
-              <a:schemeClr val="lt1"/>
-            </a:fillRef>
-            <a:effectRef idx="0">
-              <a:schemeClr val="dk1"/>
-            </a:effectRef>
-            <a:fontRef idx="minor">
-              <a:schemeClr val="dk1"/>
-            </a:fontRef>
-          </p:style>
-          <p:txBody>
-            <a:bodyPr wrap="square">
-              <a:spAutoFit/>
-            </a:bodyPr>
-            <a:lstStyle/>
-            <a:p>
-              <a:pPr algn="ctr"/>
-              <a:r>
-                <a:rPr lang="en-GB" sz="1100" dirty="0">
-                  <a:latin typeface="Cambria Math" panose="02040503050406030204" pitchFamily="18" charset="0"/>
-                  <a:ea typeface="Cambria Math" panose="02040503050406030204" pitchFamily="18" charset="0"/>
-                  <a:cs typeface="CMU Serif Roman" panose="02000603000000000000" pitchFamily="2" charset="0"/>
-                </a:rPr>
-                <a:t>S2</a:t>
-              </a:r>
-              <a:endParaRPr lang="en-GB" sz="1400" dirty="0">
-                <a:latin typeface="Cambria Math" panose="02040503050406030204" pitchFamily="18" charset="0"/>
-                <a:ea typeface="Cambria Math" panose="02040503050406030204" pitchFamily="18" charset="0"/>
-                <a:cs typeface="CMU Serif Roman" panose="02000603000000000000" pitchFamily="2" charset="0"/>
-              </a:endParaRPr>
-            </a:p>
-          </p:txBody>
-        </p:sp>
-      </p:grpSp>
-      <p:cxnSp>
-        <p:nvCxnSpPr>
-          <p:cNvPr id="37" name="Straight Arrow Connector 36">
-            <a:extLst>
-              <a:ext uri="{FF2B5EF4-FFF2-40B4-BE49-F238E27FC236}">
-                <a16:creationId xmlns:a16="http://schemas.microsoft.com/office/drawing/2014/main" id="{320EA9E9-75FF-5A9D-46C1-022F47265C01}"/>
-              </a:ext>
-            </a:extLst>
-          </p:cNvPr>
-          <p:cNvCxnSpPr>
-            <a:cxnSpLocks/>
-            <a:stCxn id="35" idx="3"/>
-          </p:cNvCxnSpPr>
-          <p:nvPr/>
-        </p:nvCxnSpPr>
-        <p:spPr>
-          <a:xfrm flipH="1">
-            <a:off x="341136" y="5718306"/>
-            <a:ext cx="797840" cy="441902"/>
-          </a:xfrm>
-          <a:prstGeom prst="straightConnector1">
-            <a:avLst/>
-          </a:prstGeom>
-          <a:ln>
-            <a:tailEnd type="triangle"/>
-          </a:ln>
-        </p:spPr>
-        <p:style>
-          <a:lnRef idx="1">
-            <a:schemeClr val="dk1"/>
-          </a:lnRef>
-          <a:fillRef idx="0">
-            <a:schemeClr val="dk1"/>
-          </a:fillRef>
-          <a:effectRef idx="0">
-            <a:schemeClr val="dk1"/>
-          </a:effectRef>
-          <a:fontRef idx="minor">
-            <a:schemeClr val="tx1"/>
-          </a:fontRef>
-        </p:style>
-      </p:cxnSp>
-      <p:cxnSp>
-        <p:nvCxnSpPr>
-          <p:cNvPr id="38" name="Straight Arrow Connector 37">
-            <a:extLst>
-              <a:ext uri="{FF2B5EF4-FFF2-40B4-BE49-F238E27FC236}">
-                <a16:creationId xmlns:a16="http://schemas.microsoft.com/office/drawing/2014/main" id="{D88B558F-26C8-A555-1D46-BE77DD7EC3B7}"/>
-              </a:ext>
-            </a:extLst>
-          </p:cNvPr>
-          <p:cNvCxnSpPr>
-            <a:cxnSpLocks/>
-            <a:stCxn id="35" idx="4"/>
-          </p:cNvCxnSpPr>
-          <p:nvPr/>
-        </p:nvCxnSpPr>
-        <p:spPr>
-          <a:xfrm>
-            <a:off x="1345296" y="5803767"/>
-            <a:ext cx="0" cy="709545"/>
-          </a:xfrm>
-          <a:prstGeom prst="straightConnector1">
-            <a:avLst/>
-          </a:prstGeom>
-          <a:ln>
-            <a:tailEnd type="triangle"/>
-          </a:ln>
-        </p:spPr>
-        <p:style>
-          <a:lnRef idx="1">
-            <a:schemeClr val="dk1"/>
-          </a:lnRef>
-          <a:fillRef idx="0">
-            <a:schemeClr val="dk1"/>
-          </a:fillRef>
-          <a:effectRef idx="0">
-            <a:schemeClr val="dk1"/>
-          </a:effectRef>
-          <a:fontRef idx="minor">
-            <a:schemeClr val="tx1"/>
-          </a:fontRef>
-        </p:style>
-      </p:cxnSp>
-      <mc:AlternateContent xmlns:mc="http://schemas.openxmlformats.org/markup-compatibility/2006">
-        <mc:Choice xmlns:a14="http://schemas.microsoft.com/office/drawing/2010/main" Requires="a14">
-          <p:sp>
-            <p:nvSpPr>
-              <p:cNvPr id="44" name="TextBox 43">
-                <a:extLst>
-                  <a:ext uri="{FF2B5EF4-FFF2-40B4-BE49-F238E27FC236}">
-                    <a16:creationId xmlns:a16="http://schemas.microsoft.com/office/drawing/2014/main" id="{E042F218-7AAC-A837-480F-5C677E5106CB}"/>
-                  </a:ext>
-                </a:extLst>
-              </p:cNvPr>
-              <p:cNvSpPr txBox="1"/>
-              <p:nvPr/>
-            </p:nvSpPr>
-            <p:spPr>
-              <a:xfrm>
-                <a:off x="1947044" y="3421434"/>
-                <a:ext cx="3165791" cy="932499"/>
-              </a:xfrm>
-              <a:prstGeom prst="rect">
-                <a:avLst/>
-              </a:prstGeom>
-              <a:noFill/>
-            </p:spPr>
-            <p:txBody>
-              <a:bodyPr wrap="square" rtlCol="0">
-                <a:spAutoFit/>
-              </a:bodyPr>
-              <a:lstStyle/>
-              <a:p>
-                <a:r>
-                  <a:rPr lang="en-FR" sz="1400" dirty="0"/>
-                  <a:t>There are 3 transitions, each has the same chance of being picked, </a:t>
-                </a:r>
-                <a:r>
-                  <a:rPr lang="en-GB" sz="1400" dirty="0"/>
-                  <a:t>i.e. </a:t>
-                </a:r>
-              </a:p>
-              <a:p>
-                <a:pPr/>
-                <a14:m>
-                  <m:oMathPara xmlns:m="http://schemas.openxmlformats.org/officeDocument/2006/math">
-                    <m:oMathParaPr>
-                      <m:jc m:val="centerGroup"/>
-                    </m:oMathParaPr>
-                    <m:oMath xmlns:m="http://schemas.openxmlformats.org/officeDocument/2006/math">
-                      <m:func>
-                        <m:funcPr>
-                          <m:ctrlPr>
-                            <a:rPr lang="en-GB" sz="1400" i="1" smtClean="0">
-                              <a:latin typeface="Cambria Math" panose="02040503050406030204" pitchFamily="18" charset="0"/>
-                            </a:rPr>
-                          </m:ctrlPr>
-                        </m:funcPr>
-                        <m:fName>
-                          <m:r>
-                            <a:rPr lang="en-US" sz="1400" b="0" i="1" smtClean="0">
-                              <a:latin typeface="Cambria Math" panose="02040503050406030204" pitchFamily="18" charset="0"/>
-                            </a:rPr>
-                            <m:t>−</m:t>
-                          </m:r>
-                        </m:fName>
-                        <m:e>
-                          <m:d>
-                            <m:dPr>
-                              <m:ctrlPr>
-                                <a:rPr lang="en-US" sz="1400" b="0" i="1" smtClean="0">
-                                  <a:latin typeface="Cambria Math" panose="02040503050406030204" pitchFamily="18" charset="0"/>
-                                </a:rPr>
-                              </m:ctrlPr>
-                            </m:dPr>
-                            <m:e>
-                              <m:f>
-                                <m:fPr>
-                                  <m:ctrlPr>
-                                    <a:rPr lang="en-US" sz="1400" b="0" i="1" smtClean="0">
-                                      <a:latin typeface="Cambria Math" panose="02040503050406030204" pitchFamily="18" charset="0"/>
-                                    </a:rPr>
-                                  </m:ctrlPr>
-                                </m:fPr>
-                                <m:num>
-                                  <m:r>
-                                    <a:rPr lang="en-US" sz="1400" b="0" i="1" smtClean="0">
-                                      <a:latin typeface="Cambria Math" panose="02040503050406030204" pitchFamily="18" charset="0"/>
-                                    </a:rPr>
-                                    <m:t>1</m:t>
-                                  </m:r>
-                                </m:num>
-                                <m:den>
-                                  <m:r>
-                                    <a:rPr lang="en-US" sz="1400" b="0" i="1" smtClean="0">
-                                      <a:latin typeface="Cambria Math" panose="02040503050406030204" pitchFamily="18" charset="0"/>
-                                    </a:rPr>
-                                    <m:t>3</m:t>
-                                  </m:r>
-                                </m:den>
-                              </m:f>
-                              <m:func>
-                                <m:funcPr>
-                                  <m:ctrlPr>
-                                    <a:rPr lang="en-US" sz="1400" b="0" i="1" smtClean="0">
-                                      <a:latin typeface="Cambria Math" panose="02040503050406030204" pitchFamily="18" charset="0"/>
-                                    </a:rPr>
-                                  </m:ctrlPr>
-                                </m:funcPr>
-                                <m:fName>
-                                  <m:sSub>
-                                    <m:sSubPr>
-                                      <m:ctrlPr>
-                                        <a:rPr lang="en-US" sz="1400" b="0" i="1" smtClean="0">
-                                          <a:latin typeface="Cambria Math" panose="02040503050406030204" pitchFamily="18" charset="0"/>
-                                        </a:rPr>
-                                      </m:ctrlPr>
-                                    </m:sSubPr>
-                                    <m:e>
-                                      <m:r>
-                                        <m:rPr>
-                                          <m:sty m:val="p"/>
-                                        </m:rPr>
-                                        <a:rPr lang="en-US" sz="1400" b="0" i="0" smtClean="0">
-                                          <a:latin typeface="Cambria Math" panose="02040503050406030204" pitchFamily="18" charset="0"/>
-                                        </a:rPr>
-                                        <m:t>log</m:t>
-                                      </m:r>
-                                    </m:e>
-                                    <m:sub>
-                                      <m:r>
-                                        <a:rPr lang="en-US" sz="1400" b="0" i="1" smtClean="0">
-                                          <a:latin typeface="Cambria Math" panose="02040503050406030204" pitchFamily="18" charset="0"/>
-                                        </a:rPr>
-                                        <m:t>2</m:t>
-                                      </m:r>
-                                    </m:sub>
-                                  </m:sSub>
-                                </m:fName>
-                                <m:e>
-                                  <m:f>
-                                    <m:fPr>
-                                      <m:ctrlPr>
-                                        <a:rPr lang="en-US" sz="1400" b="0" i="1" smtClean="0">
-                                          <a:latin typeface="Cambria Math" panose="02040503050406030204" pitchFamily="18" charset="0"/>
-                                        </a:rPr>
-                                      </m:ctrlPr>
-                                    </m:fPr>
-                                    <m:num>
-                                      <m:r>
-                                        <a:rPr lang="en-US" sz="1400" b="0" i="1" smtClean="0">
-                                          <a:latin typeface="Cambria Math" panose="02040503050406030204" pitchFamily="18" charset="0"/>
-                                        </a:rPr>
-                                        <m:t>1</m:t>
-                                      </m:r>
-                                    </m:num>
-                                    <m:den>
-                                      <m:r>
-                                        <a:rPr lang="en-US" sz="1400" b="0" i="1" smtClean="0">
-                                          <a:latin typeface="Cambria Math" panose="02040503050406030204" pitchFamily="18" charset="0"/>
-                                        </a:rPr>
-                                        <m:t>3</m:t>
-                                      </m:r>
-                                    </m:den>
-                                  </m:f>
-                                  <m:r>
-                                    <a:rPr lang="en-US" sz="1400" b="0" i="1" smtClean="0">
-                                      <a:latin typeface="Cambria Math" panose="02040503050406030204" pitchFamily="18" charset="0"/>
-                                    </a:rPr>
-                                    <m:t> ∗3</m:t>
-                                  </m:r>
-                                </m:e>
-                              </m:func>
-                            </m:e>
-                          </m:d>
-                          <m:r>
-                            <a:rPr lang="en-US" sz="1400" b="0" i="1" smtClean="0">
-                              <a:latin typeface="Cambria Math" panose="02040503050406030204" pitchFamily="18" charset="0"/>
-                            </a:rPr>
-                            <m:t>= </m:t>
-                          </m:r>
-                          <m:func>
-                            <m:funcPr>
-                              <m:ctrlPr>
-                                <a:rPr lang="en-US" sz="1400" b="0" i="1" smtClean="0">
-                                  <a:latin typeface="Cambria Math" panose="02040503050406030204" pitchFamily="18" charset="0"/>
-                                </a:rPr>
-                              </m:ctrlPr>
-                            </m:funcPr>
-                            <m:fName>
-                              <m:sSub>
-                                <m:sSubPr>
-                                  <m:ctrlPr>
-                                    <a:rPr lang="en-US" sz="1400" b="0" i="1" smtClean="0">
-                                      <a:latin typeface="Cambria Math" panose="02040503050406030204" pitchFamily="18" charset="0"/>
-                                    </a:rPr>
-                                  </m:ctrlPr>
-                                </m:sSubPr>
-                                <m:e>
-                                  <m:r>
-                                    <m:rPr>
-                                      <m:sty m:val="p"/>
-                                    </m:rPr>
-                                    <a:rPr lang="en-US" sz="1400" b="0" i="0" smtClean="0">
-                                      <a:latin typeface="Cambria Math" panose="02040503050406030204" pitchFamily="18" charset="0"/>
-                                    </a:rPr>
-                                    <m:t>log</m:t>
-                                  </m:r>
-                                </m:e>
-                                <m:sub>
-                                  <m:r>
-                                    <a:rPr lang="en-US" sz="1400" b="0" i="1" smtClean="0">
-                                      <a:latin typeface="Cambria Math" panose="02040503050406030204" pitchFamily="18" charset="0"/>
-                                    </a:rPr>
-                                    <m:t>2</m:t>
-                                  </m:r>
-                                </m:sub>
-                              </m:sSub>
-                            </m:fName>
-                            <m:e>
-                              <m:r>
-                                <a:rPr lang="en-US" sz="1400" b="0" i="1" smtClean="0">
-                                  <a:latin typeface="Cambria Math" panose="02040503050406030204" pitchFamily="18" charset="0"/>
-                                </a:rPr>
-                                <m:t>3</m:t>
-                              </m:r>
-                            </m:e>
-                          </m:func>
-                        </m:e>
-                      </m:func>
-                      <m:r>
-                        <a:rPr lang="en-US" sz="1400" b="0" i="0" smtClean="0">
-                          <a:latin typeface="Cambria Math" panose="02040503050406030204" pitchFamily="18" charset="0"/>
-                        </a:rPr>
-                        <m:t>=</m:t>
-                      </m:r>
-                      <m:r>
-                        <a:rPr lang="en-US" sz="1400" b="1" i="0" smtClean="0">
-                          <a:latin typeface="Cambria Math" panose="02040503050406030204" pitchFamily="18" charset="0"/>
-                        </a:rPr>
-                        <m:t>𝟏</m:t>
-                      </m:r>
-                      <m:r>
-                        <a:rPr lang="en-US" sz="1400" b="1" i="0" smtClean="0">
-                          <a:latin typeface="Cambria Math" panose="02040503050406030204" pitchFamily="18" charset="0"/>
-                        </a:rPr>
-                        <m:t>.</m:t>
-                      </m:r>
-                      <m:r>
-                        <a:rPr lang="en-US" sz="1400" b="1" i="0" smtClean="0">
-                          <a:latin typeface="Cambria Math" panose="02040503050406030204" pitchFamily="18" charset="0"/>
-                        </a:rPr>
-                        <m:t>𝟓𝟖𝟒𝟗𝟔</m:t>
-                      </m:r>
-                    </m:oMath>
-                  </m:oMathPara>
-                </a14:m>
-                <a:endParaRPr lang="en-FR" sz="1400" b="1" dirty="0"/>
-              </a:p>
-            </p:txBody>
-          </p:sp>
-        </mc:Choice>
-        <mc:Fallback>
-          <p:sp>
-            <p:nvSpPr>
-              <p:cNvPr id="44" name="TextBox 43">
-                <a:extLst>
-                  <a:ext uri="{FF2B5EF4-FFF2-40B4-BE49-F238E27FC236}">
-                    <a16:creationId xmlns:a16="http://schemas.microsoft.com/office/drawing/2014/main" id="{E042F218-7AAC-A837-480F-5C677E5106CB}"/>
-                  </a:ext>
-                </a:extLst>
-              </p:cNvPr>
-              <p:cNvSpPr txBox="1">
-                <a:spLocks noRot="1" noChangeAspect="1" noMove="1" noResize="1" noEditPoints="1" noAdjustHandles="1" noChangeArrowheads="1" noChangeShapeType="1" noTextEdit="1"/>
-              </p:cNvSpPr>
-              <p:nvPr/>
-            </p:nvSpPr>
-            <p:spPr>
-              <a:xfrm>
-                <a:off x="1947044" y="3421434"/>
-                <a:ext cx="3165791" cy="932499"/>
-              </a:xfrm>
-              <a:prstGeom prst="rect">
-                <a:avLst/>
-              </a:prstGeom>
-              <a:blipFill>
-                <a:blip r:embed="rId3"/>
-                <a:stretch>
-                  <a:fillRect l="-800" t="-1351" b="-1351"/>
-                </a:stretch>
-              </a:blipFill>
-            </p:spPr>
-            <p:txBody>
-              <a:bodyPr/>
-              <a:lstStyle/>
-              <a:p>
-                <a:r>
-                  <a:rPr lang="en-FR">
-                    <a:noFill/>
-                  </a:rPr>
-                  <a:t> </a:t>
-                </a:r>
-              </a:p>
-            </p:txBody>
-          </p:sp>
-        </mc:Fallback>
-      </mc:AlternateContent>
-      <mc:AlternateContent xmlns:mc="http://schemas.openxmlformats.org/markup-compatibility/2006">
-        <mc:Choice xmlns:a14="http://schemas.microsoft.com/office/drawing/2010/main" Requires="a14">
-          <p:sp>
-            <p:nvSpPr>
-              <p:cNvPr id="45" name="TextBox 44">
-                <a:extLst>
-                  <a:ext uri="{FF2B5EF4-FFF2-40B4-BE49-F238E27FC236}">
-                    <a16:creationId xmlns:a16="http://schemas.microsoft.com/office/drawing/2014/main" id="{A2AC369A-2AEE-829D-76A1-CCDA0309DA34}"/>
-                  </a:ext>
-                </a:extLst>
-              </p:cNvPr>
-              <p:cNvSpPr txBox="1"/>
-              <p:nvPr/>
-            </p:nvSpPr>
-            <p:spPr>
-              <a:xfrm>
-                <a:off x="2048006" y="5255187"/>
-                <a:ext cx="3165791" cy="932499"/>
-              </a:xfrm>
-              <a:prstGeom prst="rect">
-                <a:avLst/>
-              </a:prstGeom>
-              <a:noFill/>
-            </p:spPr>
-            <p:txBody>
-              <a:bodyPr wrap="square" rtlCol="0">
-                <a:spAutoFit/>
-              </a:bodyPr>
-              <a:lstStyle/>
-              <a:p>
-                <a:r>
-                  <a:rPr lang="en-FR" sz="1400" dirty="0"/>
-                  <a:t>There are 2 transitions, each has the same chance of being picked, </a:t>
-                </a:r>
-                <a:r>
-                  <a:rPr lang="en-GB" sz="1400" dirty="0"/>
-                  <a:t>i.e. 1/2 </a:t>
-                </a:r>
-              </a:p>
-              <a:p>
-                <a:pPr/>
-                <a14:m>
-                  <m:oMathPara xmlns:m="http://schemas.openxmlformats.org/officeDocument/2006/math">
-                    <m:oMathParaPr>
-                      <m:jc m:val="centerGroup"/>
-                    </m:oMathParaPr>
-                    <m:oMath xmlns:m="http://schemas.openxmlformats.org/officeDocument/2006/math">
-                      <m:func>
-                        <m:funcPr>
-                          <m:ctrlPr>
-                            <a:rPr lang="en-GB" sz="1400" i="1" smtClean="0">
-                              <a:latin typeface="Cambria Math" panose="02040503050406030204" pitchFamily="18" charset="0"/>
-                            </a:rPr>
-                          </m:ctrlPr>
-                        </m:funcPr>
-                        <m:fName>
-                          <m:r>
-                            <a:rPr lang="en-US" sz="1400" b="0" i="1" smtClean="0">
-                              <a:latin typeface="Cambria Math" panose="02040503050406030204" pitchFamily="18" charset="0"/>
-                            </a:rPr>
-                            <m:t>−</m:t>
-                          </m:r>
-                        </m:fName>
-                        <m:e>
-                          <m:d>
-                            <m:dPr>
-                              <m:ctrlPr>
-                                <a:rPr lang="en-US" sz="1400" b="0" i="1" smtClean="0">
-                                  <a:latin typeface="Cambria Math" panose="02040503050406030204" pitchFamily="18" charset="0"/>
-                                </a:rPr>
-                              </m:ctrlPr>
-                            </m:dPr>
-                            <m:e>
-                              <m:f>
-                                <m:fPr>
-                                  <m:ctrlPr>
-                                    <a:rPr lang="en-US" sz="1400" b="0" i="1" smtClean="0">
-                                      <a:latin typeface="Cambria Math" panose="02040503050406030204" pitchFamily="18" charset="0"/>
-                                    </a:rPr>
-                                  </m:ctrlPr>
-                                </m:fPr>
-                                <m:num>
-                                  <m:r>
-                                    <a:rPr lang="en-US" sz="1400" b="0" i="1" smtClean="0">
-                                      <a:latin typeface="Cambria Math" panose="02040503050406030204" pitchFamily="18" charset="0"/>
-                                    </a:rPr>
-                                    <m:t>1</m:t>
-                                  </m:r>
-                                </m:num>
-                                <m:den>
-                                  <m:r>
-                                    <a:rPr lang="en-US" sz="1400" b="0" i="1" smtClean="0">
-                                      <a:latin typeface="Cambria Math" panose="02040503050406030204" pitchFamily="18" charset="0"/>
-                                    </a:rPr>
-                                    <m:t>2</m:t>
-                                  </m:r>
-                                </m:den>
-                              </m:f>
-                              <m:func>
-                                <m:funcPr>
-                                  <m:ctrlPr>
-                                    <a:rPr lang="en-US" sz="1400" b="0" i="1" smtClean="0">
-                                      <a:latin typeface="Cambria Math" panose="02040503050406030204" pitchFamily="18" charset="0"/>
-                                    </a:rPr>
-                                  </m:ctrlPr>
-                                </m:funcPr>
-                                <m:fName>
-                                  <m:sSub>
-                                    <m:sSubPr>
-                                      <m:ctrlPr>
-                                        <a:rPr lang="en-US" sz="1400" b="0" i="1" smtClean="0">
-                                          <a:latin typeface="Cambria Math" panose="02040503050406030204" pitchFamily="18" charset="0"/>
-                                        </a:rPr>
-                                      </m:ctrlPr>
-                                    </m:sSubPr>
-                                    <m:e>
-                                      <m:r>
-                                        <m:rPr>
-                                          <m:sty m:val="p"/>
-                                        </m:rPr>
-                                        <a:rPr lang="en-US" sz="1400" b="0" i="0" smtClean="0">
-                                          <a:latin typeface="Cambria Math" panose="02040503050406030204" pitchFamily="18" charset="0"/>
-                                        </a:rPr>
-                                        <m:t>log</m:t>
-                                      </m:r>
-                                    </m:e>
-                                    <m:sub>
-                                      <m:r>
-                                        <a:rPr lang="en-US" sz="1400" b="0" i="1" smtClean="0">
-                                          <a:latin typeface="Cambria Math" panose="02040503050406030204" pitchFamily="18" charset="0"/>
-                                        </a:rPr>
-                                        <m:t>2</m:t>
-                                      </m:r>
-                                    </m:sub>
-                                  </m:sSub>
-                                </m:fName>
-                                <m:e>
-                                  <m:f>
-                                    <m:fPr>
-                                      <m:ctrlPr>
-                                        <a:rPr lang="en-US" sz="1400" b="0" i="1" smtClean="0">
-                                          <a:latin typeface="Cambria Math" panose="02040503050406030204" pitchFamily="18" charset="0"/>
-                                        </a:rPr>
-                                      </m:ctrlPr>
-                                    </m:fPr>
-                                    <m:num>
-                                      <m:r>
-                                        <a:rPr lang="en-US" sz="1400" b="0" i="1" smtClean="0">
-                                          <a:latin typeface="Cambria Math" panose="02040503050406030204" pitchFamily="18" charset="0"/>
-                                        </a:rPr>
-                                        <m:t>1</m:t>
-                                      </m:r>
-                                    </m:num>
-                                    <m:den>
-                                      <m:r>
-                                        <a:rPr lang="en-US" sz="1400" b="0" i="1" smtClean="0">
-                                          <a:latin typeface="Cambria Math" panose="02040503050406030204" pitchFamily="18" charset="0"/>
-                                        </a:rPr>
-                                        <m:t>2</m:t>
-                                      </m:r>
-                                    </m:den>
-                                  </m:f>
-                                  <m:r>
-                                    <a:rPr lang="en-US" sz="1400" b="0" i="1" smtClean="0">
-                                      <a:latin typeface="Cambria Math" panose="02040503050406030204" pitchFamily="18" charset="0"/>
-                                    </a:rPr>
-                                    <m:t> ∗2</m:t>
-                                  </m:r>
-                                </m:e>
-                              </m:func>
-                            </m:e>
-                          </m:d>
-                          <m:r>
-                            <a:rPr lang="en-US" sz="1400" b="0" i="1" smtClean="0">
-                              <a:latin typeface="Cambria Math" panose="02040503050406030204" pitchFamily="18" charset="0"/>
-                            </a:rPr>
-                            <m:t>= </m:t>
-                          </m:r>
-                          <m:func>
-                            <m:funcPr>
-                              <m:ctrlPr>
-                                <a:rPr lang="en-US" sz="1400" b="0" i="1" smtClean="0">
-                                  <a:latin typeface="Cambria Math" panose="02040503050406030204" pitchFamily="18" charset="0"/>
-                                </a:rPr>
-                              </m:ctrlPr>
-                            </m:funcPr>
-                            <m:fName>
-                              <m:sSub>
-                                <m:sSubPr>
-                                  <m:ctrlPr>
-                                    <a:rPr lang="en-US" sz="1400" b="0" i="1" smtClean="0">
-                                      <a:latin typeface="Cambria Math" panose="02040503050406030204" pitchFamily="18" charset="0"/>
-                                    </a:rPr>
-                                  </m:ctrlPr>
-                                </m:sSubPr>
-                                <m:e>
-                                  <m:r>
-                                    <m:rPr>
-                                      <m:sty m:val="p"/>
-                                    </m:rPr>
-                                    <a:rPr lang="en-US" sz="1400" b="0" i="0" smtClean="0">
-                                      <a:latin typeface="Cambria Math" panose="02040503050406030204" pitchFamily="18" charset="0"/>
-                                    </a:rPr>
-                                    <m:t>log</m:t>
-                                  </m:r>
-                                </m:e>
-                                <m:sub>
-                                  <m:r>
-                                    <a:rPr lang="en-US" sz="1400" b="0" i="1" smtClean="0">
-                                      <a:latin typeface="Cambria Math" panose="02040503050406030204" pitchFamily="18" charset="0"/>
-                                    </a:rPr>
-                                    <m:t>2</m:t>
-                                  </m:r>
-                                </m:sub>
-                              </m:sSub>
-                            </m:fName>
-                            <m:e>
-                              <m:r>
-                                <a:rPr lang="en-US" sz="1400" b="0" i="1" smtClean="0">
-                                  <a:latin typeface="Cambria Math" panose="02040503050406030204" pitchFamily="18" charset="0"/>
-                                </a:rPr>
-                                <m:t>2</m:t>
-                              </m:r>
-                            </m:e>
-                          </m:func>
-                        </m:e>
-                      </m:func>
-                      <m:r>
-                        <a:rPr lang="en-US" sz="1400" b="0" i="0" smtClean="0">
-                          <a:latin typeface="Cambria Math" panose="02040503050406030204" pitchFamily="18" charset="0"/>
-                        </a:rPr>
-                        <m:t>=</m:t>
-                      </m:r>
-                      <m:r>
-                        <a:rPr lang="en-US" sz="1400" b="1" i="0" smtClean="0">
-                          <a:latin typeface="Cambria Math" panose="02040503050406030204" pitchFamily="18" charset="0"/>
-                        </a:rPr>
-                        <m:t>𝟏</m:t>
-                      </m:r>
-                      <m:r>
-                        <a:rPr lang="en-US" sz="1400" b="1" i="0" smtClean="0">
-                          <a:latin typeface="Cambria Math" panose="02040503050406030204" pitchFamily="18" charset="0"/>
-                        </a:rPr>
-                        <m:t>.</m:t>
-                      </m:r>
-                      <m:r>
-                        <a:rPr lang="en-US" sz="1400" b="1" i="0" smtClean="0">
-                          <a:latin typeface="Cambria Math" panose="02040503050406030204" pitchFamily="18" charset="0"/>
-                        </a:rPr>
-                        <m:t>𝟎</m:t>
-                      </m:r>
-                    </m:oMath>
-                  </m:oMathPara>
-                </a14:m>
-                <a:endParaRPr lang="en-FR" sz="1400" b="1" dirty="0"/>
-              </a:p>
-            </p:txBody>
-          </p:sp>
-        </mc:Choice>
-        <mc:Fallback>
-          <p:sp>
-            <p:nvSpPr>
-              <p:cNvPr id="45" name="TextBox 44">
-                <a:extLst>
-                  <a:ext uri="{FF2B5EF4-FFF2-40B4-BE49-F238E27FC236}">
-                    <a16:creationId xmlns:a16="http://schemas.microsoft.com/office/drawing/2014/main" id="{A2AC369A-2AEE-829D-76A1-CCDA0309DA34}"/>
-                  </a:ext>
-                </a:extLst>
-              </p:cNvPr>
-              <p:cNvSpPr txBox="1">
-                <a:spLocks noRot="1" noChangeAspect="1" noMove="1" noResize="1" noEditPoints="1" noAdjustHandles="1" noChangeArrowheads="1" noChangeShapeType="1" noTextEdit="1"/>
-              </p:cNvSpPr>
-              <p:nvPr/>
-            </p:nvSpPr>
-            <p:spPr>
-              <a:xfrm>
-                <a:off x="2048006" y="5255187"/>
-                <a:ext cx="3165791" cy="932499"/>
-              </a:xfrm>
-              <a:prstGeom prst="rect">
-                <a:avLst/>
-              </a:prstGeom>
-              <a:blipFill>
-                <a:blip r:embed="rId4"/>
-                <a:stretch>
-                  <a:fillRect l="-800" t="-1333" b="-1333"/>
-                </a:stretch>
-              </a:blipFill>
-            </p:spPr>
-            <p:txBody>
-              <a:bodyPr/>
-              <a:lstStyle/>
-              <a:p>
-                <a:r>
-                  <a:rPr lang="en-FR">
-                    <a:noFill/>
-                  </a:rPr>
-                  <a:t> </a:t>
-                </a:r>
-              </a:p>
-            </p:txBody>
-          </p:sp>
-        </mc:Fallback>
-      </mc:AlternateContent>
-      <p:cxnSp>
-        <p:nvCxnSpPr>
-          <p:cNvPr id="49" name="Straight Connector 48">
-            <a:extLst>
-              <a:ext uri="{FF2B5EF4-FFF2-40B4-BE49-F238E27FC236}">
-                <a16:creationId xmlns:a16="http://schemas.microsoft.com/office/drawing/2014/main" id="{686397EB-B881-F4DF-B387-90D1D1ECD95D}"/>
-              </a:ext>
-            </a:extLst>
-          </p:cNvPr>
-          <p:cNvCxnSpPr/>
-          <p:nvPr/>
-        </p:nvCxnSpPr>
-        <p:spPr>
-          <a:xfrm>
-            <a:off x="5496393" y="3268035"/>
-            <a:ext cx="0" cy="3084312"/>
-          </a:xfrm>
-          <a:prstGeom prst="line">
-            <a:avLst/>
-          </a:prstGeom>
-        </p:spPr>
-        <p:style>
-          <a:lnRef idx="1">
-            <a:schemeClr val="dk1"/>
-          </a:lnRef>
-          <a:fillRef idx="0">
-            <a:schemeClr val="dk1"/>
-          </a:fillRef>
-          <a:effectRef idx="0">
-            <a:schemeClr val="dk1"/>
-          </a:effectRef>
-          <a:fontRef idx="minor">
-            <a:schemeClr val="tx1"/>
-          </a:fontRef>
-        </p:style>
-      </p:cxnSp>
-      <p:grpSp>
-        <p:nvGrpSpPr>
-          <p:cNvPr id="53" name="Group 52">
-            <a:extLst>
-              <a:ext uri="{FF2B5EF4-FFF2-40B4-BE49-F238E27FC236}">
-                <a16:creationId xmlns:a16="http://schemas.microsoft.com/office/drawing/2014/main" id="{070606FB-01D7-96B9-E892-07BA1FEAAC8E}"/>
-              </a:ext>
-            </a:extLst>
-          </p:cNvPr>
-          <p:cNvGrpSpPr/>
-          <p:nvPr/>
-        </p:nvGrpSpPr>
-        <p:grpSpPr>
-          <a:xfrm>
-            <a:off x="6695608" y="3335672"/>
-            <a:ext cx="583561" cy="583561"/>
-            <a:chOff x="5123645" y="775255"/>
-            <a:chExt cx="834604" cy="834604"/>
-          </a:xfrm>
-        </p:grpSpPr>
-        <p:sp>
-          <p:nvSpPr>
-            <p:cNvPr id="54" name="Oval 53">
-              <a:extLst>
-                <a:ext uri="{FF2B5EF4-FFF2-40B4-BE49-F238E27FC236}">
-                  <a16:creationId xmlns:a16="http://schemas.microsoft.com/office/drawing/2014/main" id="{3E4C5AA4-48E0-B6E4-86F0-4D48456D8E65}"/>
-                </a:ext>
-              </a:extLst>
-            </p:cNvPr>
-            <p:cNvSpPr/>
-            <p:nvPr/>
-          </p:nvSpPr>
-          <p:spPr>
-            <a:xfrm>
-              <a:off x="5123645" y="775255"/>
-              <a:ext cx="834604" cy="834604"/>
-            </a:xfrm>
-            <a:prstGeom prst="ellipse">
-              <a:avLst/>
-            </a:prstGeom>
-            <a:ln>
-              <a:solidFill>
-                <a:schemeClr val="tx1">
-                  <a:lumMod val="95000"/>
-                  <a:lumOff val="5000"/>
-                </a:schemeClr>
-              </a:solidFill>
-            </a:ln>
-          </p:spPr>
-          <p:style>
-            <a:lnRef idx="2">
-              <a:schemeClr val="accent3"/>
-            </a:lnRef>
-            <a:fillRef idx="1">
-              <a:schemeClr val="lt1"/>
-            </a:fillRef>
-            <a:effectRef idx="0">
-              <a:schemeClr val="accent3"/>
-            </a:effectRef>
-            <a:fontRef idx="minor">
-              <a:schemeClr val="dk1"/>
-            </a:fontRef>
-          </p:style>
-          <p:txBody>
-            <a:bodyPr rtlCol="0" anchor="ctr"/>
-            <a:lstStyle/>
-            <a:p>
-              <a:pPr algn="ctr"/>
-              <a:endParaRPr lang="en-FR"/>
-            </a:p>
-          </p:txBody>
-        </p:sp>
-        <p:sp>
-          <p:nvSpPr>
-            <p:cNvPr id="55" name="TextBox 54">
-              <a:extLst>
-                <a:ext uri="{FF2B5EF4-FFF2-40B4-BE49-F238E27FC236}">
-                  <a16:creationId xmlns:a16="http://schemas.microsoft.com/office/drawing/2014/main" id="{AA1C9640-888A-6F1E-59D5-5C8129164E05}"/>
-                </a:ext>
-              </a:extLst>
-            </p:cNvPr>
-            <p:cNvSpPr txBox="1"/>
-            <p:nvPr/>
-          </p:nvSpPr>
-          <p:spPr>
-            <a:xfrm>
-              <a:off x="5188925" y="1038668"/>
-              <a:ext cx="704045" cy="374152"/>
-            </a:xfrm>
-            <a:prstGeom prst="rect">
-              <a:avLst/>
-            </a:prstGeom>
-            <a:noFill/>
-            <a:ln>
-              <a:noFill/>
-            </a:ln>
-          </p:spPr>
-          <p:style>
-            <a:lnRef idx="2">
-              <a:schemeClr val="dk1"/>
-            </a:lnRef>
-            <a:fillRef idx="1">
-              <a:schemeClr val="lt1"/>
-            </a:fillRef>
-            <a:effectRef idx="0">
-              <a:schemeClr val="dk1"/>
-            </a:effectRef>
-            <a:fontRef idx="minor">
-              <a:schemeClr val="dk1"/>
-            </a:fontRef>
-          </p:style>
-          <p:txBody>
-            <a:bodyPr wrap="square">
-              <a:spAutoFit/>
-            </a:bodyPr>
-            <a:lstStyle/>
-            <a:p>
-              <a:pPr algn="ctr"/>
-              <a:r>
-                <a:rPr lang="en-GB" sz="1100" dirty="0">
-                  <a:latin typeface="Cambria Math" panose="02040503050406030204" pitchFamily="18" charset="0"/>
-                  <a:ea typeface="Cambria Math" panose="02040503050406030204" pitchFamily="18" charset="0"/>
-                  <a:cs typeface="CMU Serif Roman" panose="02000603000000000000" pitchFamily="2" charset="0"/>
-                </a:rPr>
-                <a:t>S1</a:t>
-              </a:r>
-              <a:endParaRPr lang="en-GB" sz="1400" dirty="0">
-                <a:latin typeface="Cambria Math" panose="02040503050406030204" pitchFamily="18" charset="0"/>
-                <a:ea typeface="Cambria Math" panose="02040503050406030204" pitchFamily="18" charset="0"/>
-                <a:cs typeface="CMU Serif Roman" panose="02000603000000000000" pitchFamily="2" charset="0"/>
-              </a:endParaRPr>
-            </a:p>
-          </p:txBody>
-        </p:sp>
-      </p:grpSp>
-      <p:cxnSp>
-        <p:nvCxnSpPr>
-          <p:cNvPr id="56" name="Straight Arrow Connector 55">
-            <a:extLst>
-              <a:ext uri="{FF2B5EF4-FFF2-40B4-BE49-F238E27FC236}">
-                <a16:creationId xmlns:a16="http://schemas.microsoft.com/office/drawing/2014/main" id="{377181C5-02DC-3341-877B-3DB02EB657B5}"/>
-              </a:ext>
-            </a:extLst>
-          </p:cNvPr>
-          <p:cNvCxnSpPr>
-            <a:cxnSpLocks/>
-            <a:stCxn id="54" idx="3"/>
-          </p:cNvCxnSpPr>
-          <p:nvPr/>
-        </p:nvCxnSpPr>
-        <p:spPr>
-          <a:xfrm flipH="1">
-            <a:off x="5983229" y="3833772"/>
-            <a:ext cx="797840" cy="441902"/>
-          </a:xfrm>
-          <a:prstGeom prst="straightConnector1">
-            <a:avLst/>
-          </a:prstGeom>
-          <a:ln>
-            <a:tailEnd type="triangle"/>
-          </a:ln>
-        </p:spPr>
-        <p:style>
-          <a:lnRef idx="1">
-            <a:schemeClr val="dk1"/>
-          </a:lnRef>
-          <a:fillRef idx="0">
-            <a:schemeClr val="dk1"/>
-          </a:fillRef>
-          <a:effectRef idx="0">
-            <a:schemeClr val="dk1"/>
-          </a:effectRef>
-          <a:fontRef idx="minor">
-            <a:schemeClr val="tx1"/>
-          </a:fontRef>
-        </p:style>
-      </p:cxnSp>
-      <p:cxnSp>
-        <p:nvCxnSpPr>
-          <p:cNvPr id="57" name="Straight Arrow Connector 56">
-            <a:extLst>
-              <a:ext uri="{FF2B5EF4-FFF2-40B4-BE49-F238E27FC236}">
-                <a16:creationId xmlns:a16="http://schemas.microsoft.com/office/drawing/2014/main" id="{22116852-EE2F-6952-670D-A4E4852840F7}"/>
-              </a:ext>
-            </a:extLst>
-          </p:cNvPr>
-          <p:cNvCxnSpPr>
-            <a:cxnSpLocks/>
-            <a:stCxn id="54" idx="4"/>
-          </p:cNvCxnSpPr>
-          <p:nvPr/>
-        </p:nvCxnSpPr>
-        <p:spPr>
-          <a:xfrm>
-            <a:off x="6987389" y="3919233"/>
-            <a:ext cx="0" cy="709545"/>
-          </a:xfrm>
-          <a:prstGeom prst="straightConnector1">
-            <a:avLst/>
-          </a:prstGeom>
-          <a:ln>
-            <a:tailEnd type="triangle"/>
-          </a:ln>
-        </p:spPr>
-        <p:style>
-          <a:lnRef idx="1">
-            <a:schemeClr val="dk1"/>
-          </a:lnRef>
-          <a:fillRef idx="0">
-            <a:schemeClr val="dk1"/>
-          </a:fillRef>
-          <a:effectRef idx="0">
-            <a:schemeClr val="dk1"/>
-          </a:effectRef>
-          <a:fontRef idx="minor">
-            <a:schemeClr val="tx1"/>
-          </a:fontRef>
-        </p:style>
-      </p:cxnSp>
-      <p:grpSp>
-        <p:nvGrpSpPr>
-          <p:cNvPr id="58" name="Group 57">
-            <a:extLst>
-              <a:ext uri="{FF2B5EF4-FFF2-40B4-BE49-F238E27FC236}">
-                <a16:creationId xmlns:a16="http://schemas.microsoft.com/office/drawing/2014/main" id="{EB2076BB-3DF6-8773-3AC9-CBFC62BD7891}"/>
-              </a:ext>
-            </a:extLst>
-          </p:cNvPr>
-          <p:cNvGrpSpPr/>
-          <p:nvPr/>
-        </p:nvGrpSpPr>
-        <p:grpSpPr>
-          <a:xfrm>
-            <a:off x="6695608" y="5082435"/>
-            <a:ext cx="583561" cy="583561"/>
-            <a:chOff x="5123645" y="775255"/>
-            <a:chExt cx="834604" cy="834604"/>
-          </a:xfrm>
-        </p:grpSpPr>
-        <p:sp>
-          <p:nvSpPr>
-            <p:cNvPr id="59" name="Oval 58">
-              <a:extLst>
-                <a:ext uri="{FF2B5EF4-FFF2-40B4-BE49-F238E27FC236}">
-                  <a16:creationId xmlns:a16="http://schemas.microsoft.com/office/drawing/2014/main" id="{C44F8A49-ECB0-6638-6379-C5CCBE69E1A3}"/>
-                </a:ext>
-              </a:extLst>
-            </p:cNvPr>
-            <p:cNvSpPr/>
-            <p:nvPr/>
-          </p:nvSpPr>
-          <p:spPr>
-            <a:xfrm>
-              <a:off x="5123645" y="775255"/>
-              <a:ext cx="834604" cy="834604"/>
-            </a:xfrm>
-            <a:prstGeom prst="ellipse">
-              <a:avLst/>
-            </a:prstGeom>
-            <a:ln>
-              <a:solidFill>
-                <a:schemeClr val="tx1">
-                  <a:lumMod val="95000"/>
-                  <a:lumOff val="5000"/>
-                </a:schemeClr>
-              </a:solidFill>
-            </a:ln>
-          </p:spPr>
-          <p:style>
-            <a:lnRef idx="2">
-              <a:schemeClr val="accent3"/>
-            </a:lnRef>
-            <a:fillRef idx="1">
-              <a:schemeClr val="lt1"/>
-            </a:fillRef>
-            <a:effectRef idx="0">
-              <a:schemeClr val="accent3"/>
-            </a:effectRef>
-            <a:fontRef idx="minor">
-              <a:schemeClr val="dk1"/>
-            </a:fontRef>
-          </p:style>
-          <p:txBody>
-            <a:bodyPr rtlCol="0" anchor="ctr"/>
-            <a:lstStyle/>
-            <a:p>
-              <a:pPr algn="ctr"/>
-              <a:endParaRPr lang="en-FR"/>
-            </a:p>
-          </p:txBody>
-        </p:sp>
-        <p:sp>
-          <p:nvSpPr>
-            <p:cNvPr id="60" name="TextBox 59">
-              <a:extLst>
-                <a:ext uri="{FF2B5EF4-FFF2-40B4-BE49-F238E27FC236}">
-                  <a16:creationId xmlns:a16="http://schemas.microsoft.com/office/drawing/2014/main" id="{9F8A1C3C-5783-8BDF-0169-D8A6C47CC840}"/>
-                </a:ext>
-              </a:extLst>
-            </p:cNvPr>
-            <p:cNvSpPr txBox="1"/>
-            <p:nvPr/>
-          </p:nvSpPr>
-          <p:spPr>
-            <a:xfrm>
-              <a:off x="5188925" y="1038668"/>
-              <a:ext cx="704045" cy="374152"/>
-            </a:xfrm>
-            <a:prstGeom prst="rect">
-              <a:avLst/>
-            </a:prstGeom>
-            <a:noFill/>
-            <a:ln>
-              <a:noFill/>
-            </a:ln>
-          </p:spPr>
-          <p:style>
-            <a:lnRef idx="2">
-              <a:schemeClr val="dk1"/>
-            </a:lnRef>
-            <a:fillRef idx="1">
-              <a:schemeClr val="lt1"/>
-            </a:fillRef>
-            <a:effectRef idx="0">
-              <a:schemeClr val="dk1"/>
-            </a:effectRef>
-            <a:fontRef idx="minor">
-              <a:schemeClr val="dk1"/>
-            </a:fontRef>
-          </p:style>
-          <p:txBody>
-            <a:bodyPr wrap="square">
-              <a:spAutoFit/>
-            </a:bodyPr>
-            <a:lstStyle/>
-            <a:p>
-              <a:pPr algn="ctr"/>
-              <a:r>
-                <a:rPr lang="en-GB" sz="1100" dirty="0">
-                  <a:latin typeface="Cambria Math" panose="02040503050406030204" pitchFamily="18" charset="0"/>
-                  <a:ea typeface="Cambria Math" panose="02040503050406030204" pitchFamily="18" charset="0"/>
-                  <a:cs typeface="CMU Serif Roman" panose="02000603000000000000" pitchFamily="2" charset="0"/>
-                </a:rPr>
-                <a:t>S1</a:t>
-              </a:r>
-              <a:endParaRPr lang="en-GB" sz="1400" dirty="0">
-                <a:latin typeface="Cambria Math" panose="02040503050406030204" pitchFamily="18" charset="0"/>
-                <a:ea typeface="Cambria Math" panose="02040503050406030204" pitchFamily="18" charset="0"/>
-                <a:cs typeface="CMU Serif Roman" panose="02000603000000000000" pitchFamily="2" charset="0"/>
-              </a:endParaRPr>
-            </a:p>
-          </p:txBody>
-        </p:sp>
-      </p:grpSp>
-      <p:cxnSp>
-        <p:nvCxnSpPr>
-          <p:cNvPr id="61" name="Straight Arrow Connector 60">
-            <a:extLst>
-              <a:ext uri="{FF2B5EF4-FFF2-40B4-BE49-F238E27FC236}">
-                <a16:creationId xmlns:a16="http://schemas.microsoft.com/office/drawing/2014/main" id="{AB5AD065-392D-0FD9-3A2C-D834C3AE77FA}"/>
-              </a:ext>
-            </a:extLst>
-          </p:cNvPr>
-          <p:cNvCxnSpPr>
-            <a:cxnSpLocks/>
-            <a:stCxn id="59" idx="3"/>
-          </p:cNvCxnSpPr>
-          <p:nvPr/>
-        </p:nvCxnSpPr>
-        <p:spPr>
-          <a:xfrm flipH="1">
-            <a:off x="5983229" y="5580535"/>
-            <a:ext cx="797840" cy="441902"/>
-          </a:xfrm>
-          <a:prstGeom prst="straightConnector1">
-            <a:avLst/>
-          </a:prstGeom>
-          <a:ln>
-            <a:tailEnd type="triangle"/>
-          </a:ln>
-        </p:spPr>
-        <p:style>
-          <a:lnRef idx="1">
-            <a:schemeClr val="dk1"/>
-          </a:lnRef>
-          <a:fillRef idx="0">
-            <a:schemeClr val="dk1"/>
-          </a:fillRef>
-          <a:effectRef idx="0">
-            <a:schemeClr val="dk1"/>
-          </a:effectRef>
-          <a:fontRef idx="minor">
-            <a:schemeClr val="tx1"/>
-          </a:fontRef>
-        </p:style>
-      </p:cxnSp>
-      <p:cxnSp>
-        <p:nvCxnSpPr>
-          <p:cNvPr id="62" name="Straight Arrow Connector 61">
-            <a:extLst>
-              <a:ext uri="{FF2B5EF4-FFF2-40B4-BE49-F238E27FC236}">
-                <a16:creationId xmlns:a16="http://schemas.microsoft.com/office/drawing/2014/main" id="{47BB579E-7BF8-D803-B001-6D3FCD039C86}"/>
-              </a:ext>
-            </a:extLst>
-          </p:cNvPr>
-          <p:cNvCxnSpPr>
-            <a:cxnSpLocks/>
-            <a:stCxn id="59" idx="4"/>
-          </p:cNvCxnSpPr>
-          <p:nvPr/>
-        </p:nvCxnSpPr>
-        <p:spPr>
-          <a:xfrm>
-            <a:off x="6987389" y="5665996"/>
-            <a:ext cx="0" cy="709545"/>
-          </a:xfrm>
-          <a:prstGeom prst="straightConnector1">
-            <a:avLst/>
-          </a:prstGeom>
-          <a:ln>
-            <a:tailEnd type="triangle"/>
-          </a:ln>
-        </p:spPr>
-        <p:style>
-          <a:lnRef idx="1">
-            <a:schemeClr val="dk1"/>
-          </a:lnRef>
-          <a:fillRef idx="0">
-            <a:schemeClr val="dk1"/>
-          </a:fillRef>
-          <a:effectRef idx="0">
-            <a:schemeClr val="dk1"/>
-          </a:effectRef>
-          <a:fontRef idx="minor">
-            <a:schemeClr val="tx1"/>
-          </a:fontRef>
-        </p:style>
-      </p:cxnSp>
-      <mc:AlternateContent xmlns:mc="http://schemas.openxmlformats.org/markup-compatibility/2006">
-        <mc:Choice xmlns:a14="http://schemas.microsoft.com/office/drawing/2010/main" Requires="a14">
-          <p:sp>
-            <p:nvSpPr>
-              <p:cNvPr id="64" name="TextBox 63">
-                <a:extLst>
-                  <a:ext uri="{FF2B5EF4-FFF2-40B4-BE49-F238E27FC236}">
-                    <a16:creationId xmlns:a16="http://schemas.microsoft.com/office/drawing/2014/main" id="{A9C5D653-CE0C-CF45-A3BB-3FDCF743E12A}"/>
-                  </a:ext>
-                </a:extLst>
-              </p:cNvPr>
-              <p:cNvSpPr txBox="1"/>
-              <p:nvPr/>
-            </p:nvSpPr>
-            <p:spPr>
-              <a:xfrm>
-                <a:off x="7313150" y="3260972"/>
-                <a:ext cx="3165791" cy="932499"/>
-              </a:xfrm>
-              <a:prstGeom prst="rect">
-                <a:avLst/>
-              </a:prstGeom>
-              <a:noFill/>
-            </p:spPr>
-            <p:txBody>
-              <a:bodyPr wrap="square" rtlCol="0">
-                <a:spAutoFit/>
-              </a:bodyPr>
-              <a:lstStyle/>
-              <a:p>
-                <a:r>
-                  <a:rPr lang="en-GB" sz="1400" dirty="0"/>
-                  <a:t>If the distribution is uniform (i.e. each one has a probability of  1/2): </a:t>
-                </a:r>
-              </a:p>
-              <a:p>
-                <a:pPr/>
-                <a14:m>
-                  <m:oMathPara xmlns:m="http://schemas.openxmlformats.org/officeDocument/2006/math">
-                    <m:oMathParaPr>
-                      <m:jc m:val="centerGroup"/>
-                    </m:oMathParaPr>
-                    <m:oMath xmlns:m="http://schemas.openxmlformats.org/officeDocument/2006/math">
-                      <m:func>
-                        <m:funcPr>
-                          <m:ctrlPr>
-                            <a:rPr lang="en-GB" sz="1400" i="1" smtClean="0">
-                              <a:latin typeface="Cambria Math" panose="02040503050406030204" pitchFamily="18" charset="0"/>
-                            </a:rPr>
-                          </m:ctrlPr>
-                        </m:funcPr>
-                        <m:fName>
-                          <m:r>
-                            <a:rPr lang="en-US" sz="1400" b="0" i="1" smtClean="0">
-                              <a:latin typeface="Cambria Math" panose="02040503050406030204" pitchFamily="18" charset="0"/>
-                            </a:rPr>
-                            <m:t>−</m:t>
-                          </m:r>
-                        </m:fName>
-                        <m:e>
-                          <m:d>
-                            <m:dPr>
-                              <m:ctrlPr>
-                                <a:rPr lang="en-US" sz="1400" b="0" i="1" smtClean="0">
-                                  <a:latin typeface="Cambria Math" panose="02040503050406030204" pitchFamily="18" charset="0"/>
-                                </a:rPr>
-                              </m:ctrlPr>
-                            </m:dPr>
-                            <m:e>
-                              <m:f>
-                                <m:fPr>
-                                  <m:ctrlPr>
-                                    <a:rPr lang="en-US" sz="1400" b="0" i="1" smtClean="0">
-                                      <a:latin typeface="Cambria Math" panose="02040503050406030204" pitchFamily="18" charset="0"/>
-                                    </a:rPr>
-                                  </m:ctrlPr>
-                                </m:fPr>
-                                <m:num>
-                                  <m:r>
-                                    <a:rPr lang="en-US" sz="1400" b="0" i="1" smtClean="0">
-                                      <a:latin typeface="Cambria Math" panose="02040503050406030204" pitchFamily="18" charset="0"/>
-                                    </a:rPr>
-                                    <m:t>1</m:t>
-                                  </m:r>
-                                </m:num>
-                                <m:den>
-                                  <m:r>
-                                    <a:rPr lang="en-US" sz="1400" b="0" i="1" smtClean="0">
-                                      <a:latin typeface="Cambria Math" panose="02040503050406030204" pitchFamily="18" charset="0"/>
-                                    </a:rPr>
-                                    <m:t>2</m:t>
-                                  </m:r>
-                                </m:den>
-                              </m:f>
-                              <m:func>
-                                <m:funcPr>
-                                  <m:ctrlPr>
-                                    <a:rPr lang="en-US" sz="1400" b="0" i="1" smtClean="0">
-                                      <a:latin typeface="Cambria Math" panose="02040503050406030204" pitchFamily="18" charset="0"/>
-                                    </a:rPr>
-                                  </m:ctrlPr>
-                                </m:funcPr>
-                                <m:fName>
-                                  <m:sSub>
-                                    <m:sSubPr>
-                                      <m:ctrlPr>
-                                        <a:rPr lang="en-US" sz="1400" b="0" i="1" smtClean="0">
-                                          <a:latin typeface="Cambria Math" panose="02040503050406030204" pitchFamily="18" charset="0"/>
-                                        </a:rPr>
-                                      </m:ctrlPr>
-                                    </m:sSubPr>
-                                    <m:e>
-                                      <m:r>
-                                        <m:rPr>
-                                          <m:sty m:val="p"/>
-                                        </m:rPr>
-                                        <a:rPr lang="en-US" sz="1400" b="0" i="0" smtClean="0">
-                                          <a:latin typeface="Cambria Math" panose="02040503050406030204" pitchFamily="18" charset="0"/>
-                                        </a:rPr>
-                                        <m:t>log</m:t>
-                                      </m:r>
-                                    </m:e>
-                                    <m:sub>
-                                      <m:r>
-                                        <a:rPr lang="en-US" sz="1400" b="0" i="1" smtClean="0">
-                                          <a:latin typeface="Cambria Math" panose="02040503050406030204" pitchFamily="18" charset="0"/>
-                                        </a:rPr>
-                                        <m:t>2</m:t>
-                                      </m:r>
-                                    </m:sub>
-                                  </m:sSub>
-                                </m:fName>
-                                <m:e>
-                                  <m:f>
-                                    <m:fPr>
-                                      <m:ctrlPr>
-                                        <a:rPr lang="en-US" sz="1400" b="0" i="1" smtClean="0">
-                                          <a:latin typeface="Cambria Math" panose="02040503050406030204" pitchFamily="18" charset="0"/>
-                                        </a:rPr>
-                                      </m:ctrlPr>
-                                    </m:fPr>
-                                    <m:num>
-                                      <m:r>
-                                        <a:rPr lang="en-US" sz="1400" b="0" i="1" smtClean="0">
-                                          <a:latin typeface="Cambria Math" panose="02040503050406030204" pitchFamily="18" charset="0"/>
-                                        </a:rPr>
-                                        <m:t>1</m:t>
-                                      </m:r>
-                                    </m:num>
-                                    <m:den>
-                                      <m:r>
-                                        <a:rPr lang="en-US" sz="1400" b="0" i="1" smtClean="0">
-                                          <a:latin typeface="Cambria Math" panose="02040503050406030204" pitchFamily="18" charset="0"/>
-                                        </a:rPr>
-                                        <m:t>2</m:t>
-                                      </m:r>
-                                    </m:den>
-                                  </m:f>
-                                  <m:r>
-                                    <a:rPr lang="en-US" sz="1400" b="0" i="1" smtClean="0">
-                                      <a:latin typeface="Cambria Math" panose="02040503050406030204" pitchFamily="18" charset="0"/>
-                                    </a:rPr>
-                                    <m:t> ∗2</m:t>
-                                  </m:r>
-                                </m:e>
-                              </m:func>
-                            </m:e>
-                          </m:d>
-                          <m:r>
-                            <a:rPr lang="en-US" sz="1400" b="0" i="1" smtClean="0">
-                              <a:latin typeface="Cambria Math" panose="02040503050406030204" pitchFamily="18" charset="0"/>
-                            </a:rPr>
-                            <m:t>= </m:t>
-                          </m:r>
-                          <m:func>
-                            <m:funcPr>
-                              <m:ctrlPr>
-                                <a:rPr lang="en-US" sz="1400" b="0" i="1" smtClean="0">
-                                  <a:latin typeface="Cambria Math" panose="02040503050406030204" pitchFamily="18" charset="0"/>
-                                </a:rPr>
-                              </m:ctrlPr>
-                            </m:funcPr>
-                            <m:fName>
-                              <m:sSub>
-                                <m:sSubPr>
-                                  <m:ctrlPr>
-                                    <a:rPr lang="en-US" sz="1400" b="0" i="1" smtClean="0">
-                                      <a:latin typeface="Cambria Math" panose="02040503050406030204" pitchFamily="18" charset="0"/>
-                                    </a:rPr>
-                                  </m:ctrlPr>
-                                </m:sSubPr>
-                                <m:e>
-                                  <m:r>
-                                    <m:rPr>
-                                      <m:sty m:val="p"/>
-                                    </m:rPr>
-                                    <a:rPr lang="en-US" sz="1400" b="0" i="0" smtClean="0">
-                                      <a:latin typeface="Cambria Math" panose="02040503050406030204" pitchFamily="18" charset="0"/>
-                                    </a:rPr>
-                                    <m:t>log</m:t>
-                                  </m:r>
-                                </m:e>
-                                <m:sub>
-                                  <m:r>
-                                    <a:rPr lang="en-US" sz="1400" b="0" i="1" smtClean="0">
-                                      <a:latin typeface="Cambria Math" panose="02040503050406030204" pitchFamily="18" charset="0"/>
-                                    </a:rPr>
-                                    <m:t>2</m:t>
-                                  </m:r>
-                                </m:sub>
-                              </m:sSub>
-                            </m:fName>
-                            <m:e>
-                              <m:r>
-                                <a:rPr lang="en-US" sz="1400" b="0" i="1" smtClean="0">
-                                  <a:latin typeface="Cambria Math" panose="02040503050406030204" pitchFamily="18" charset="0"/>
-                                </a:rPr>
-                                <m:t>2</m:t>
-                              </m:r>
-                            </m:e>
-                          </m:func>
-                        </m:e>
-                      </m:func>
-                      <m:r>
-                        <a:rPr lang="en-US" sz="1400" b="0" i="0" smtClean="0">
-                          <a:latin typeface="Cambria Math" panose="02040503050406030204" pitchFamily="18" charset="0"/>
-                        </a:rPr>
-                        <m:t>=</m:t>
-                      </m:r>
-                      <m:r>
-                        <a:rPr lang="en-US" sz="1400" b="1" i="0" smtClean="0">
-                          <a:latin typeface="Cambria Math" panose="02040503050406030204" pitchFamily="18" charset="0"/>
-                        </a:rPr>
-                        <m:t>𝟏</m:t>
-                      </m:r>
-                      <m:r>
-                        <a:rPr lang="en-US" sz="1400" b="1" i="0" smtClean="0">
-                          <a:latin typeface="Cambria Math" panose="02040503050406030204" pitchFamily="18" charset="0"/>
-                        </a:rPr>
-                        <m:t>.</m:t>
-                      </m:r>
-                      <m:r>
-                        <a:rPr lang="en-US" sz="1400" b="1" i="0" smtClean="0">
-                          <a:latin typeface="Cambria Math" panose="02040503050406030204" pitchFamily="18" charset="0"/>
-                        </a:rPr>
-                        <m:t>𝟎</m:t>
-                      </m:r>
-                    </m:oMath>
-                  </m:oMathPara>
-                </a14:m>
-                <a:endParaRPr lang="en-FR" sz="1400" b="1" dirty="0"/>
-              </a:p>
-            </p:txBody>
-          </p:sp>
-        </mc:Choice>
-        <mc:Fallback>
-          <p:sp>
-            <p:nvSpPr>
-              <p:cNvPr id="64" name="TextBox 63">
-                <a:extLst>
-                  <a:ext uri="{FF2B5EF4-FFF2-40B4-BE49-F238E27FC236}">
-                    <a16:creationId xmlns:a16="http://schemas.microsoft.com/office/drawing/2014/main" id="{A9C5D653-CE0C-CF45-A3BB-3FDCF743E12A}"/>
-                  </a:ext>
-                </a:extLst>
-              </p:cNvPr>
-              <p:cNvSpPr txBox="1">
-                <a:spLocks noRot="1" noChangeAspect="1" noMove="1" noResize="1" noEditPoints="1" noAdjustHandles="1" noChangeArrowheads="1" noChangeShapeType="1" noTextEdit="1"/>
-              </p:cNvSpPr>
-              <p:nvPr/>
-            </p:nvSpPr>
-            <p:spPr>
-              <a:xfrm>
-                <a:off x="7313150" y="3260972"/>
-                <a:ext cx="3165791" cy="932499"/>
-              </a:xfrm>
-              <a:prstGeom prst="rect">
-                <a:avLst/>
-              </a:prstGeom>
-              <a:blipFill>
-                <a:blip r:embed="rId5"/>
-                <a:stretch>
-                  <a:fillRect l="-800" t="-1333" b="-1333"/>
-                </a:stretch>
-              </a:blipFill>
-            </p:spPr>
-            <p:txBody>
-              <a:bodyPr/>
-              <a:lstStyle/>
-              <a:p>
-                <a:r>
-                  <a:rPr lang="en-FR">
-                    <a:noFill/>
-                  </a:rPr>
-                  <a:t> </a:t>
-                </a:r>
-              </a:p>
-            </p:txBody>
-          </p:sp>
-        </mc:Fallback>
-      </mc:AlternateContent>
-      <mc:AlternateContent xmlns:mc="http://schemas.openxmlformats.org/markup-compatibility/2006">
-        <mc:Choice xmlns:a14="http://schemas.microsoft.com/office/drawing/2010/main" Requires="a14">
-          <p:sp>
-            <p:nvSpPr>
-              <p:cNvPr id="65" name="TextBox 64">
-                <a:extLst>
-                  <a:ext uri="{FF2B5EF4-FFF2-40B4-BE49-F238E27FC236}">
-                    <a16:creationId xmlns:a16="http://schemas.microsoft.com/office/drawing/2014/main" id="{E1B8B9FD-0D69-8DCD-485A-343E8A149027}"/>
-                  </a:ext>
-                </a:extLst>
-              </p:cNvPr>
-              <p:cNvSpPr txBox="1"/>
-              <p:nvPr/>
-            </p:nvSpPr>
-            <p:spPr>
-              <a:xfrm>
-                <a:off x="7328981" y="5061379"/>
-                <a:ext cx="4363341" cy="523220"/>
-              </a:xfrm>
-              <a:prstGeom prst="rect">
-                <a:avLst/>
-              </a:prstGeom>
-              <a:noFill/>
-            </p:spPr>
-            <p:txBody>
-              <a:bodyPr wrap="square" rtlCol="0">
-                <a:spAutoFit/>
-              </a:bodyPr>
-              <a:lstStyle/>
-              <a:p>
-                <a:r>
-                  <a:rPr lang="en-GB" sz="1400" dirty="0"/>
-                  <a:t>If the distribution is not uniform, for example: [0.55, 0.45]</a:t>
-                </a:r>
-              </a:p>
-              <a:p>
-                <a:pPr/>
-                <a14:m>
-                  <m:oMathPara xmlns:m="http://schemas.openxmlformats.org/officeDocument/2006/math">
-                    <m:oMathParaPr>
-                      <m:jc m:val="centerGroup"/>
-                    </m:oMathParaPr>
-                    <m:oMath xmlns:m="http://schemas.openxmlformats.org/officeDocument/2006/math">
-                      <m:func>
-                        <m:funcPr>
-                          <m:ctrlPr>
-                            <a:rPr lang="en-GB" sz="1400" i="1" smtClean="0">
-                              <a:latin typeface="Cambria Math" panose="02040503050406030204" pitchFamily="18" charset="0"/>
-                            </a:rPr>
-                          </m:ctrlPr>
-                        </m:funcPr>
-                        <m:fName>
-                          <m:r>
-                            <a:rPr lang="en-US" sz="1400" b="0" i="1" smtClean="0">
-                              <a:latin typeface="Cambria Math" panose="02040503050406030204" pitchFamily="18" charset="0"/>
-                            </a:rPr>
-                            <m:t>−</m:t>
-                          </m:r>
-                        </m:fName>
-                        <m:e>
-                          <m:d>
-                            <m:dPr>
-                              <m:ctrlPr>
-                                <a:rPr lang="en-US" sz="1400" b="0" i="1" smtClean="0">
-                                  <a:latin typeface="Cambria Math" panose="02040503050406030204" pitchFamily="18" charset="0"/>
-                                </a:rPr>
-                              </m:ctrlPr>
-                            </m:dPr>
-                            <m:e>
-                              <m:r>
-                                <a:rPr lang="en-US" sz="1400" b="0" i="1" smtClean="0">
-                                  <a:latin typeface="Cambria Math" panose="02040503050406030204" pitchFamily="18" charset="0"/>
-                                </a:rPr>
-                                <m:t>0.55∗</m:t>
-                              </m:r>
-                              <m:func>
-                                <m:funcPr>
-                                  <m:ctrlPr>
-                                    <a:rPr lang="en-US" sz="1400" b="0" i="1" smtClean="0">
-                                      <a:latin typeface="Cambria Math" panose="02040503050406030204" pitchFamily="18" charset="0"/>
-                                    </a:rPr>
-                                  </m:ctrlPr>
-                                </m:funcPr>
-                                <m:fName>
-                                  <m:sSub>
-                                    <m:sSubPr>
-                                      <m:ctrlPr>
-                                        <a:rPr lang="en-US" sz="1400" b="0" i="1" smtClean="0">
-                                          <a:latin typeface="Cambria Math" panose="02040503050406030204" pitchFamily="18" charset="0"/>
-                                        </a:rPr>
-                                      </m:ctrlPr>
-                                    </m:sSubPr>
-                                    <m:e>
-                                      <m:r>
-                                        <m:rPr>
-                                          <m:sty m:val="p"/>
-                                        </m:rPr>
-                                        <a:rPr lang="en-US" sz="1400" b="0" i="0" smtClean="0">
-                                          <a:latin typeface="Cambria Math" panose="02040503050406030204" pitchFamily="18" charset="0"/>
-                                        </a:rPr>
-                                        <m:t>log</m:t>
-                                      </m:r>
-                                    </m:e>
-                                    <m:sub>
-                                      <m:r>
-                                        <a:rPr lang="en-US" sz="1400" b="0" i="1" smtClean="0">
-                                          <a:latin typeface="Cambria Math" panose="02040503050406030204" pitchFamily="18" charset="0"/>
-                                        </a:rPr>
-                                        <m:t>2</m:t>
-                                      </m:r>
-                                    </m:sub>
-                                  </m:sSub>
-                                </m:fName>
-                                <m:e>
-                                  <m:r>
-                                    <a:rPr lang="en-US" sz="1400" b="0" i="1" smtClean="0">
-                                      <a:latin typeface="Cambria Math" panose="02040503050406030204" pitchFamily="18" charset="0"/>
-                                    </a:rPr>
-                                    <m:t>0.55+0.45 ∗ </m:t>
-                                  </m:r>
-                                  <m:func>
-                                    <m:funcPr>
-                                      <m:ctrlPr>
-                                        <a:rPr lang="en-US" sz="1400" b="0" i="1" smtClean="0">
-                                          <a:latin typeface="Cambria Math" panose="02040503050406030204" pitchFamily="18" charset="0"/>
-                                        </a:rPr>
-                                      </m:ctrlPr>
-                                    </m:funcPr>
-                                    <m:fName>
-                                      <m:sSub>
-                                        <m:sSubPr>
-                                          <m:ctrlPr>
-                                            <a:rPr lang="en-US" sz="1400" b="0" i="1" smtClean="0">
-                                              <a:latin typeface="Cambria Math" panose="02040503050406030204" pitchFamily="18" charset="0"/>
-                                            </a:rPr>
-                                          </m:ctrlPr>
-                                        </m:sSubPr>
-                                        <m:e>
-                                          <m:r>
-                                            <m:rPr>
-                                              <m:sty m:val="p"/>
-                                            </m:rPr>
-                                            <a:rPr lang="en-US" sz="1400" b="0" i="0" smtClean="0">
-                                              <a:latin typeface="Cambria Math" panose="02040503050406030204" pitchFamily="18" charset="0"/>
-                                            </a:rPr>
-                                            <m:t>log</m:t>
-                                          </m:r>
-                                        </m:e>
-                                        <m:sub>
-                                          <m:r>
-                                            <a:rPr lang="en-US" sz="1400" b="0" i="1" smtClean="0">
-                                              <a:latin typeface="Cambria Math" panose="02040503050406030204" pitchFamily="18" charset="0"/>
-                                            </a:rPr>
-                                            <m:t>2</m:t>
-                                          </m:r>
-                                        </m:sub>
-                                      </m:sSub>
-                                    </m:fName>
-                                    <m:e>
-                                      <m:r>
-                                        <a:rPr lang="en-US" sz="1400" b="0" i="1" smtClean="0">
-                                          <a:latin typeface="Cambria Math" panose="02040503050406030204" pitchFamily="18" charset="0"/>
-                                        </a:rPr>
-                                        <m:t>0.45</m:t>
-                                      </m:r>
-                                    </m:e>
-                                  </m:func>
-                                </m:e>
-                              </m:func>
-                            </m:e>
-                          </m:d>
-                          <m:r>
-                            <a:rPr lang="en-US" sz="1400" b="0" i="1" smtClean="0">
-                              <a:latin typeface="Cambria Math" panose="02040503050406030204" pitchFamily="18" charset="0"/>
-                            </a:rPr>
-                            <m:t>= </m:t>
-                          </m:r>
-                        </m:e>
-                      </m:func>
-                      <m:r>
-                        <a:rPr lang="en-US" sz="1400" b="1" i="0" smtClean="0">
-                          <a:latin typeface="Cambria Math" panose="02040503050406030204" pitchFamily="18" charset="0"/>
-                        </a:rPr>
-                        <m:t>𝟎</m:t>
-                      </m:r>
-                      <m:r>
-                        <a:rPr lang="en-US" sz="1400" b="1" i="0" smtClean="0">
-                          <a:latin typeface="Cambria Math" panose="02040503050406030204" pitchFamily="18" charset="0"/>
-                        </a:rPr>
-                        <m:t>.</m:t>
-                      </m:r>
-                      <m:r>
-                        <a:rPr lang="en-US" sz="1400" b="1" i="0" smtClean="0">
-                          <a:latin typeface="Cambria Math" panose="02040503050406030204" pitchFamily="18" charset="0"/>
-                        </a:rPr>
-                        <m:t>𝟗𝟗𝟐𝟕𝟕</m:t>
-                      </m:r>
-                    </m:oMath>
-                  </m:oMathPara>
-                </a14:m>
-                <a:endParaRPr lang="en-FR" sz="1400" b="1" dirty="0"/>
-              </a:p>
-            </p:txBody>
-          </p:sp>
-        </mc:Choice>
-        <mc:Fallback>
-          <p:sp>
-            <p:nvSpPr>
-              <p:cNvPr id="65" name="TextBox 64">
-                <a:extLst>
-                  <a:ext uri="{FF2B5EF4-FFF2-40B4-BE49-F238E27FC236}">
-                    <a16:creationId xmlns:a16="http://schemas.microsoft.com/office/drawing/2014/main" id="{E1B8B9FD-0D69-8DCD-485A-343E8A149027}"/>
-                  </a:ext>
-                </a:extLst>
-              </p:cNvPr>
-              <p:cNvSpPr txBox="1">
-                <a:spLocks noRot="1" noChangeAspect="1" noMove="1" noResize="1" noEditPoints="1" noAdjustHandles="1" noChangeArrowheads="1" noChangeShapeType="1" noTextEdit="1"/>
-              </p:cNvSpPr>
-              <p:nvPr/>
-            </p:nvSpPr>
-            <p:spPr>
-              <a:xfrm>
-                <a:off x="7328981" y="5061379"/>
-                <a:ext cx="4363341" cy="523220"/>
-              </a:xfrm>
-              <a:prstGeom prst="rect">
-                <a:avLst/>
-              </a:prstGeom>
-              <a:blipFill>
-                <a:blip r:embed="rId6"/>
-                <a:stretch>
-                  <a:fillRect l="-290" t="-2381" r="-290" b="-7143"/>
-                </a:stretch>
-              </a:blipFill>
-            </p:spPr>
-            <p:txBody>
-              <a:bodyPr/>
-              <a:lstStyle/>
-              <a:p>
-                <a:r>
-                  <a:rPr lang="en-FR">
-                    <a:noFill/>
-                  </a:rPr>
-                  <a:t> </a:t>
-                </a:r>
-              </a:p>
-            </p:txBody>
-          </p:sp>
-        </mc:Fallback>
-      </mc:AlternateContent>
     </p:spTree>
     <p:extLst>
       <p:ext uri="{BB962C8B-B14F-4D97-AF65-F5344CB8AC3E}">
@@ -10420,7 +7985,7 @@
         <p:spPr>
           <a:xfrm>
             <a:off x="188890" y="876951"/>
-            <a:ext cx="11638349" cy="2031325"/>
+            <a:ext cx="11638349" cy="2154436"/>
           </a:xfrm>
           <a:prstGeom prst="rect">
             <a:avLst/>
@@ -10441,7 +8006,13 @@
           <a:p>
             <a:r>
               <a:rPr lang="en-FR" dirty="0"/>
-              <a:t>During a run, Cubicle will always cycle through the same N states - the transition guards. At any point in time, Cubicle is in a state that satisfies at least 1 transition guard, otherwise Cubicle is deadlocked.</a:t>
+              <a:t>During a run, Cubicle will always cycle through the same N states - the transition guards (with other stuff around that). </a:t>
+            </a:r>
+          </a:p>
+          <a:p>
+            <a:r>
+              <a:rPr lang="en-FR" dirty="0"/>
+              <a:t>At any point in time, Cubicle is in a state that satisfies at least 1 transition guard, otherwise Cubicle is deadlocked.</a:t>
             </a:r>
           </a:p>
           <a:p>
@@ -10455,20 +8026,27 @@
               <a:buAutoNum type="arabicParenBoth"/>
             </a:pPr>
             <a:r>
+              <a:rPr lang="en-GB" dirty="0"/>
+              <a:t>A</a:t>
+            </a:r>
+            <a:r>
               <a:rPr lang="en-FR" dirty="0"/>
-              <a:t>an automaton [pre and post run] and (2) a transition matrix [post run]</a:t>
+              <a:t> sort of automaton [pre and post run] and (2) a transition matrix [post run]</a:t>
             </a:r>
           </a:p>
           <a:p>
             <a:r>
               <a:rPr lang="en-FR" dirty="0"/>
-              <a:t> For example the running example would, </a:t>
-            </a:r>
+              <a:t>For example the running example would look like this: </a:t>
+            </a:r>
+          </a:p>
+          <a:p>
+            <a:endParaRPr lang="en-FR" sz="800" dirty="0"/>
           </a:p>
           <a:p>
             <a:r>
               <a:rPr lang="en-FR" dirty="0"/>
-              <a:t>theoretically, look like this: </a:t>
+              <a:t>In theory:                                                                      In reality:</a:t>
             </a:r>
           </a:p>
         </p:txBody>
@@ -10523,10 +8101,10 @@
         </p:nvGrpSpPr>
         <p:grpSpPr>
           <a:xfrm>
-            <a:off x="4686677" y="3285165"/>
-            <a:ext cx="2958307" cy="2695884"/>
+            <a:off x="770285" y="3429000"/>
+            <a:ext cx="2958307" cy="2695885"/>
             <a:chOff x="804806" y="2857809"/>
-            <a:chExt cx="2958307" cy="2695884"/>
+            <a:chExt cx="2958307" cy="2695885"/>
           </a:xfrm>
         </p:grpSpPr>
         <p:grpSp>
@@ -10569,12 +8147,9 @@
               <a:prstGeom prst="ellipse">
                 <a:avLst/>
               </a:prstGeom>
-              <a:ln>
+              <a:ln w="28575">
                 <a:solidFill>
-                  <a:schemeClr val="tx1">
-                    <a:lumMod val="95000"/>
-                    <a:lumOff val="5000"/>
-                  </a:schemeClr>
+                  <a:srgbClr val="7030A0"/>
                 </a:solidFill>
               </a:ln>
             </p:spPr>
@@ -10699,12 +8274,9 @@
               <a:prstGeom prst="ellipse">
                 <a:avLst/>
               </a:prstGeom>
-              <a:ln>
+              <a:ln w="28575">
                 <a:solidFill>
-                  <a:schemeClr val="tx1">
-                    <a:lumMod val="95000"/>
-                    <a:lumOff val="5000"/>
-                  </a:schemeClr>
+                  <a:srgbClr val="7030A0"/>
                 </a:solidFill>
               </a:ln>
             </p:spPr>
@@ -10917,12 +8489,9 @@
               <a:prstGeom prst="ellipse">
                 <a:avLst/>
               </a:prstGeom>
-              <a:ln>
+              <a:ln w="28575">
                 <a:solidFill>
-                  <a:schemeClr val="tx1">
-                    <a:lumMod val="95000"/>
-                    <a:lumOff val="5000"/>
-                  </a:schemeClr>
+                  <a:srgbClr val="7030A0"/>
                 </a:solidFill>
               </a:ln>
             </p:spPr>
@@ -11047,12 +8616,9 @@
               <a:prstGeom prst="ellipse">
                 <a:avLst/>
               </a:prstGeom>
-              <a:ln>
+              <a:ln w="28575">
                 <a:solidFill>
-                  <a:schemeClr val="tx1">
-                    <a:lumMod val="95000"/>
-                    <a:lumOff val="5000"/>
-                  </a:schemeClr>
+                  <a:srgbClr val="7030A0"/>
                 </a:solidFill>
               </a:ln>
             </p:spPr>
@@ -11489,13 +9055,1117 @@
             </a:fontRef>
           </p:style>
         </p:cxnSp>
+        <p:cxnSp>
+          <p:nvCxnSpPr>
+            <p:cNvPr id="110" name="Curved Connector 109">
+              <a:extLst>
+                <a:ext uri="{FF2B5EF4-FFF2-40B4-BE49-F238E27FC236}">
+                  <a16:creationId xmlns:a16="http://schemas.microsoft.com/office/drawing/2014/main" id="{14F03EF8-73B6-C5FE-E068-198F0FB17A1F}"/>
+                </a:ext>
+              </a:extLst>
+            </p:cNvPr>
+            <p:cNvCxnSpPr>
+              <a:cxnSpLocks/>
+              <a:stCxn id="16" idx="0"/>
+              <a:endCxn id="16" idx="7"/>
+            </p:cNvCxnSpPr>
+            <p:nvPr/>
+          </p:nvCxnSpPr>
+          <p:spPr>
+            <a:xfrm rot="16200000" flipH="1">
+              <a:off x="3419536" y="2771383"/>
+              <a:ext cx="122225" cy="295077"/>
+            </a:xfrm>
+            <a:prstGeom prst="curvedConnector3">
+              <a:avLst>
+                <a:gd name="adj1" fmla="val -356420"/>
+              </a:avLst>
+            </a:prstGeom>
+            <a:ln>
+              <a:tailEnd type="triangle"/>
+            </a:ln>
+          </p:spPr>
+          <p:style>
+            <a:lnRef idx="1">
+              <a:schemeClr val="accent1"/>
+            </a:lnRef>
+            <a:fillRef idx="0">
+              <a:schemeClr val="accent1"/>
+            </a:fillRef>
+            <a:effectRef idx="0">
+              <a:schemeClr val="accent1"/>
+            </a:effectRef>
+            <a:fontRef idx="minor">
+              <a:schemeClr val="tx1"/>
+            </a:fontRef>
+          </p:style>
+        </p:cxnSp>
+        <p:cxnSp>
+          <p:nvCxnSpPr>
+            <p:cNvPr id="115" name="Curved Connector 114">
+              <a:extLst>
+                <a:ext uri="{FF2B5EF4-FFF2-40B4-BE49-F238E27FC236}">
+                  <a16:creationId xmlns:a16="http://schemas.microsoft.com/office/drawing/2014/main" id="{267F8CB8-B093-1E82-07AC-5091F88BBAC3}"/>
+                </a:ext>
+              </a:extLst>
+            </p:cNvPr>
+            <p:cNvCxnSpPr>
+              <a:cxnSpLocks/>
+              <a:stCxn id="47" idx="5"/>
+              <a:endCxn id="47" idx="4"/>
+            </p:cNvCxnSpPr>
+            <p:nvPr/>
+          </p:nvCxnSpPr>
+          <p:spPr>
+            <a:xfrm rot="5400000">
+              <a:off x="3419538" y="5345042"/>
+              <a:ext cx="122225" cy="295077"/>
+            </a:xfrm>
+            <a:prstGeom prst="curvedConnector3">
+              <a:avLst>
+                <a:gd name="adj1" fmla="val 287032"/>
+              </a:avLst>
+            </a:prstGeom>
+            <a:ln>
+              <a:tailEnd type="triangle"/>
+            </a:ln>
+          </p:spPr>
+          <p:style>
+            <a:lnRef idx="1">
+              <a:schemeClr val="accent1"/>
+            </a:lnRef>
+            <a:fillRef idx="0">
+              <a:schemeClr val="accent1"/>
+            </a:fillRef>
+            <a:effectRef idx="0">
+              <a:schemeClr val="accent1"/>
+            </a:effectRef>
+            <a:fontRef idx="minor">
+              <a:schemeClr val="tx1"/>
+            </a:fontRef>
+          </p:style>
+        </p:cxnSp>
+        <p:cxnSp>
+          <p:nvCxnSpPr>
+            <p:cNvPr id="143" name="Curved Connector 142">
+              <a:extLst>
+                <a:ext uri="{FF2B5EF4-FFF2-40B4-BE49-F238E27FC236}">
+                  <a16:creationId xmlns:a16="http://schemas.microsoft.com/office/drawing/2014/main" id="{B0C28569-6CCD-E7FD-940C-6209A65B93BE}"/>
+                </a:ext>
+              </a:extLst>
+            </p:cNvPr>
+            <p:cNvCxnSpPr>
+              <a:cxnSpLocks/>
+              <a:stCxn id="11" idx="1"/>
+              <a:endCxn id="11" idx="0"/>
+            </p:cNvCxnSpPr>
+            <p:nvPr/>
+          </p:nvCxnSpPr>
+          <p:spPr>
+            <a:xfrm rot="5400000" flipH="1" flipV="1">
+              <a:off x="1013457" y="2771384"/>
+              <a:ext cx="122225" cy="295077"/>
+            </a:xfrm>
+            <a:prstGeom prst="curvedConnector3">
+              <a:avLst>
+                <a:gd name="adj1" fmla="val 329379"/>
+              </a:avLst>
+            </a:prstGeom>
+            <a:ln>
+              <a:tailEnd type="triangle"/>
+            </a:ln>
+          </p:spPr>
+          <p:style>
+            <a:lnRef idx="1">
+              <a:schemeClr val="accent1"/>
+            </a:lnRef>
+            <a:fillRef idx="0">
+              <a:schemeClr val="accent1"/>
+            </a:fillRef>
+            <a:effectRef idx="0">
+              <a:schemeClr val="accent1"/>
+            </a:effectRef>
+            <a:fontRef idx="minor">
+              <a:schemeClr val="tx1"/>
+            </a:fontRef>
+          </p:style>
+        </p:cxnSp>
+        <p:cxnSp>
+          <p:nvCxnSpPr>
+            <p:cNvPr id="147" name="Curved Connector 146">
+              <a:extLst>
+                <a:ext uri="{FF2B5EF4-FFF2-40B4-BE49-F238E27FC236}">
+                  <a16:creationId xmlns:a16="http://schemas.microsoft.com/office/drawing/2014/main" id="{D1889833-7063-808E-C816-31A3D2739625}"/>
+                </a:ext>
+              </a:extLst>
+            </p:cNvPr>
+            <p:cNvCxnSpPr>
+              <a:cxnSpLocks/>
+              <a:stCxn id="42" idx="4"/>
+              <a:endCxn id="42" idx="3"/>
+            </p:cNvCxnSpPr>
+            <p:nvPr/>
+          </p:nvCxnSpPr>
+          <p:spPr>
+            <a:xfrm rot="5400000" flipH="1">
+              <a:off x="1013457" y="5345043"/>
+              <a:ext cx="122225" cy="295077"/>
+            </a:xfrm>
+            <a:prstGeom prst="curvedConnector3">
+              <a:avLst>
+                <a:gd name="adj1" fmla="val -187032"/>
+              </a:avLst>
+            </a:prstGeom>
+            <a:ln>
+              <a:tailEnd type="triangle"/>
+            </a:ln>
+          </p:spPr>
+          <p:style>
+            <a:lnRef idx="1">
+              <a:schemeClr val="accent1"/>
+            </a:lnRef>
+            <a:fillRef idx="0">
+              <a:schemeClr val="accent1"/>
+            </a:fillRef>
+            <a:effectRef idx="0">
+              <a:schemeClr val="accent1"/>
+            </a:effectRef>
+            <a:fontRef idx="minor">
+              <a:schemeClr val="tx1"/>
+            </a:fontRef>
+          </p:style>
+        </p:cxnSp>
       </p:grpSp>
+      <p:grpSp>
+        <p:nvGrpSpPr>
+          <p:cNvPr id="87" name="Group 86">
+            <a:extLst>
+              <a:ext uri="{FF2B5EF4-FFF2-40B4-BE49-F238E27FC236}">
+                <a16:creationId xmlns:a16="http://schemas.microsoft.com/office/drawing/2014/main" id="{DAFAD77A-B195-D281-031F-1FDF82F87703}"/>
+              </a:ext>
+            </a:extLst>
+          </p:cNvPr>
+          <p:cNvGrpSpPr/>
+          <p:nvPr/>
+        </p:nvGrpSpPr>
+        <p:grpSpPr>
+          <a:xfrm>
+            <a:off x="5070826" y="3285165"/>
+            <a:ext cx="2945607" cy="2695884"/>
+            <a:chOff x="804806" y="2857809"/>
+            <a:chExt cx="2945607" cy="2695884"/>
+          </a:xfrm>
+        </p:grpSpPr>
+        <p:grpSp>
+          <p:nvGrpSpPr>
+            <p:cNvPr id="88" name="Group 87">
+              <a:extLst>
+                <a:ext uri="{FF2B5EF4-FFF2-40B4-BE49-F238E27FC236}">
+                  <a16:creationId xmlns:a16="http://schemas.microsoft.com/office/drawing/2014/main" id="{268EF4C4-AB67-D627-3A51-E6A313A10613}"/>
+                </a:ext>
+              </a:extLst>
+            </p:cNvPr>
+            <p:cNvGrpSpPr/>
+            <p:nvPr/>
+          </p:nvGrpSpPr>
+          <p:grpSpPr>
+            <a:xfrm>
+              <a:off x="804806" y="2857809"/>
+              <a:ext cx="834604" cy="834604"/>
+              <a:chOff x="5123645" y="775255"/>
+              <a:chExt cx="834604" cy="834604"/>
+            </a:xfrm>
+          </p:grpSpPr>
+          <p:sp>
+            <p:nvSpPr>
+              <p:cNvPr id="108" name="Oval 107">
+                <a:extLst>
+                  <a:ext uri="{FF2B5EF4-FFF2-40B4-BE49-F238E27FC236}">
+                    <a16:creationId xmlns:a16="http://schemas.microsoft.com/office/drawing/2014/main" id="{1278C50C-C9A9-E362-E04C-2752BE0AE675}"/>
+                  </a:ext>
+                </a:extLst>
+              </p:cNvPr>
+              <p:cNvSpPr/>
+              <p:nvPr/>
+            </p:nvSpPr>
+            <p:spPr>
+              <a:xfrm>
+                <a:off x="5123645" y="775255"/>
+                <a:ext cx="834604" cy="834604"/>
+              </a:xfrm>
+              <a:prstGeom prst="ellipse">
+                <a:avLst/>
+              </a:prstGeom>
+              <a:ln w="28575">
+                <a:solidFill>
+                  <a:srgbClr val="7030A0"/>
+                </a:solidFill>
+              </a:ln>
+            </p:spPr>
+            <p:style>
+              <a:lnRef idx="2">
+                <a:schemeClr val="accent3"/>
+              </a:lnRef>
+              <a:fillRef idx="1">
+                <a:schemeClr val="lt1"/>
+              </a:fillRef>
+              <a:effectRef idx="0">
+                <a:schemeClr val="accent3"/>
+              </a:effectRef>
+              <a:fontRef idx="minor">
+                <a:schemeClr val="dk1"/>
+              </a:fontRef>
+            </p:style>
+            <p:txBody>
+              <a:bodyPr rtlCol="0" anchor="ctr"/>
+              <a:lstStyle/>
+              <a:p>
+                <a:pPr algn="ctr"/>
+                <a:endParaRPr lang="en-FR"/>
+              </a:p>
+            </p:txBody>
+          </p:sp>
+          <p:sp>
+            <p:nvSpPr>
+              <p:cNvPr id="109" name="TextBox 108">
+                <a:extLst>
+                  <a:ext uri="{FF2B5EF4-FFF2-40B4-BE49-F238E27FC236}">
+                    <a16:creationId xmlns:a16="http://schemas.microsoft.com/office/drawing/2014/main" id="{CC660375-0845-A4E6-1231-608A391C9D41}"/>
+                  </a:ext>
+                </a:extLst>
+              </p:cNvPr>
+              <p:cNvSpPr txBox="1"/>
+              <p:nvPr/>
+            </p:nvSpPr>
+            <p:spPr>
+              <a:xfrm>
+                <a:off x="5188924" y="1038668"/>
+                <a:ext cx="704045" cy="307777"/>
+              </a:xfrm>
+              <a:prstGeom prst="rect">
+                <a:avLst/>
+              </a:prstGeom>
+              <a:noFill/>
+              <a:ln>
+                <a:noFill/>
+              </a:ln>
+            </p:spPr>
+            <p:style>
+              <a:lnRef idx="2">
+                <a:schemeClr val="dk1"/>
+              </a:lnRef>
+              <a:fillRef idx="1">
+                <a:schemeClr val="lt1"/>
+              </a:fillRef>
+              <a:effectRef idx="0">
+                <a:schemeClr val="dk1"/>
+              </a:effectRef>
+              <a:fontRef idx="minor">
+                <a:schemeClr val="dk1"/>
+              </a:fontRef>
+            </p:style>
+            <p:txBody>
+              <a:bodyPr wrap="square">
+                <a:spAutoFit/>
+              </a:bodyPr>
+              <a:lstStyle/>
+              <a:p>
+                <a:pPr algn="ctr"/>
+                <a:r>
+                  <a:rPr lang="en-GB" sz="1400" dirty="0">
+                    <a:latin typeface="Cambria Math" panose="02040503050406030204" pitchFamily="18" charset="0"/>
+                    <a:ea typeface="Cambria Math" panose="02040503050406030204" pitchFamily="18" charset="0"/>
+                    <a:cs typeface="CMU Serif Roman" panose="02000603000000000000" pitchFamily="2" charset="0"/>
+                  </a:rPr>
+                  <a:t>t1</a:t>
+                </a:r>
+              </a:p>
+            </p:txBody>
+          </p:sp>
+        </p:grpSp>
+        <p:grpSp>
+          <p:nvGrpSpPr>
+            <p:cNvPr id="89" name="Group 88">
+              <a:extLst>
+                <a:ext uri="{FF2B5EF4-FFF2-40B4-BE49-F238E27FC236}">
+                  <a16:creationId xmlns:a16="http://schemas.microsoft.com/office/drawing/2014/main" id="{5809D137-7ACB-3391-6CAE-3697E613522C}"/>
+                </a:ext>
+              </a:extLst>
+            </p:cNvPr>
+            <p:cNvGrpSpPr/>
+            <p:nvPr/>
+          </p:nvGrpSpPr>
+          <p:grpSpPr>
+            <a:xfrm>
+              <a:off x="2915809" y="2857809"/>
+              <a:ext cx="834604" cy="834604"/>
+              <a:chOff x="5123645" y="775255"/>
+              <a:chExt cx="834604" cy="834604"/>
+            </a:xfrm>
+          </p:grpSpPr>
+          <p:sp>
+            <p:nvSpPr>
+              <p:cNvPr id="106" name="Oval 105">
+                <a:extLst>
+                  <a:ext uri="{FF2B5EF4-FFF2-40B4-BE49-F238E27FC236}">
+                    <a16:creationId xmlns:a16="http://schemas.microsoft.com/office/drawing/2014/main" id="{917C9E01-6EE4-A9EF-2C8A-191A5DA3DE10}"/>
+                  </a:ext>
+                </a:extLst>
+              </p:cNvPr>
+              <p:cNvSpPr/>
+              <p:nvPr/>
+            </p:nvSpPr>
+            <p:spPr>
+              <a:xfrm>
+                <a:off x="5123645" y="775255"/>
+                <a:ext cx="834604" cy="834604"/>
+              </a:xfrm>
+              <a:prstGeom prst="ellipse">
+                <a:avLst/>
+              </a:prstGeom>
+              <a:ln w="28575">
+                <a:solidFill>
+                  <a:srgbClr val="7030A0"/>
+                </a:solidFill>
+              </a:ln>
+            </p:spPr>
+            <p:style>
+              <a:lnRef idx="2">
+                <a:schemeClr val="accent3"/>
+              </a:lnRef>
+              <a:fillRef idx="1">
+                <a:schemeClr val="lt1"/>
+              </a:fillRef>
+              <a:effectRef idx="0">
+                <a:schemeClr val="accent3"/>
+              </a:effectRef>
+              <a:fontRef idx="minor">
+                <a:schemeClr val="dk1"/>
+              </a:fontRef>
+            </p:style>
+            <p:txBody>
+              <a:bodyPr rtlCol="0" anchor="ctr"/>
+              <a:lstStyle/>
+              <a:p>
+                <a:pPr algn="ctr"/>
+                <a:endParaRPr lang="en-FR"/>
+              </a:p>
+            </p:txBody>
+          </p:sp>
+          <p:sp>
+            <p:nvSpPr>
+              <p:cNvPr id="107" name="TextBox 106">
+                <a:extLst>
+                  <a:ext uri="{FF2B5EF4-FFF2-40B4-BE49-F238E27FC236}">
+                    <a16:creationId xmlns:a16="http://schemas.microsoft.com/office/drawing/2014/main" id="{38044953-14A1-E6F7-D9D0-6D0AA9140EF6}"/>
+                  </a:ext>
+                </a:extLst>
+              </p:cNvPr>
+              <p:cNvSpPr txBox="1"/>
+              <p:nvPr/>
+            </p:nvSpPr>
+            <p:spPr>
+              <a:xfrm>
+                <a:off x="5188924" y="1038668"/>
+                <a:ext cx="704045" cy="307777"/>
+              </a:xfrm>
+              <a:prstGeom prst="rect">
+                <a:avLst/>
+              </a:prstGeom>
+              <a:noFill/>
+              <a:ln>
+                <a:noFill/>
+              </a:ln>
+            </p:spPr>
+            <p:style>
+              <a:lnRef idx="2">
+                <a:schemeClr val="dk1"/>
+              </a:lnRef>
+              <a:fillRef idx="1">
+                <a:schemeClr val="lt1"/>
+              </a:fillRef>
+              <a:effectRef idx="0">
+                <a:schemeClr val="dk1"/>
+              </a:effectRef>
+              <a:fontRef idx="minor">
+                <a:schemeClr val="dk1"/>
+              </a:fontRef>
+            </p:style>
+            <p:txBody>
+              <a:bodyPr wrap="square">
+                <a:spAutoFit/>
+              </a:bodyPr>
+              <a:lstStyle/>
+              <a:p>
+                <a:pPr algn="ctr"/>
+                <a:r>
+                  <a:rPr lang="en-GB" sz="1400" dirty="0">
+                    <a:latin typeface="Cambria Math" panose="02040503050406030204" pitchFamily="18" charset="0"/>
+                    <a:ea typeface="Cambria Math" panose="02040503050406030204" pitchFamily="18" charset="0"/>
+                    <a:cs typeface="CMU Serif Roman" panose="02000603000000000000" pitchFamily="2" charset="0"/>
+                  </a:rPr>
+                  <a:t>t</a:t>
+                </a:r>
+              </a:p>
+            </p:txBody>
+          </p:sp>
+        </p:grpSp>
+        <p:cxnSp>
+          <p:nvCxnSpPr>
+            <p:cNvPr id="90" name="Curved Connector 89">
+              <a:extLst>
+                <a:ext uri="{FF2B5EF4-FFF2-40B4-BE49-F238E27FC236}">
+                  <a16:creationId xmlns:a16="http://schemas.microsoft.com/office/drawing/2014/main" id="{DA454B32-2E7F-A410-04E4-85593E7F53EF}"/>
+                </a:ext>
+              </a:extLst>
+            </p:cNvPr>
+            <p:cNvCxnSpPr>
+              <a:cxnSpLocks/>
+            </p:cNvCxnSpPr>
+            <p:nvPr/>
+          </p:nvCxnSpPr>
+          <p:spPr>
+            <a:xfrm rot="16200000" flipV="1">
+              <a:off x="2277609" y="2219610"/>
+              <a:ext cx="12700" cy="1520849"/>
+            </a:xfrm>
+            <a:prstGeom prst="curvedConnector3">
+              <a:avLst>
+                <a:gd name="adj1" fmla="val 2762402"/>
+              </a:avLst>
+            </a:prstGeom>
+            <a:ln>
+              <a:tailEnd type="triangle"/>
+            </a:ln>
+          </p:spPr>
+          <p:style>
+            <a:lnRef idx="1">
+              <a:schemeClr val="accent1"/>
+            </a:lnRef>
+            <a:fillRef idx="0">
+              <a:schemeClr val="accent1"/>
+            </a:fillRef>
+            <a:effectRef idx="0">
+              <a:schemeClr val="accent1"/>
+            </a:effectRef>
+            <a:fontRef idx="minor">
+              <a:schemeClr val="tx1"/>
+            </a:fontRef>
+          </p:style>
+        </p:cxnSp>
+        <p:grpSp>
+          <p:nvGrpSpPr>
+            <p:cNvPr id="92" name="Group 91">
+              <a:extLst>
+                <a:ext uri="{FF2B5EF4-FFF2-40B4-BE49-F238E27FC236}">
+                  <a16:creationId xmlns:a16="http://schemas.microsoft.com/office/drawing/2014/main" id="{AB3340DD-6B28-0B14-870B-15DBAB9BC0AC}"/>
+                </a:ext>
+              </a:extLst>
+            </p:cNvPr>
+            <p:cNvGrpSpPr/>
+            <p:nvPr/>
+          </p:nvGrpSpPr>
+          <p:grpSpPr>
+            <a:xfrm>
+              <a:off x="804806" y="4719089"/>
+              <a:ext cx="834604" cy="834604"/>
+              <a:chOff x="5123645" y="775255"/>
+              <a:chExt cx="834604" cy="834604"/>
+            </a:xfrm>
+          </p:grpSpPr>
+          <p:sp>
+            <p:nvSpPr>
+              <p:cNvPr id="104" name="Oval 103">
+                <a:extLst>
+                  <a:ext uri="{FF2B5EF4-FFF2-40B4-BE49-F238E27FC236}">
+                    <a16:creationId xmlns:a16="http://schemas.microsoft.com/office/drawing/2014/main" id="{AF6F82CA-EB58-D107-EC87-5F0F181ECD29}"/>
+                  </a:ext>
+                </a:extLst>
+              </p:cNvPr>
+              <p:cNvSpPr/>
+              <p:nvPr/>
+            </p:nvSpPr>
+            <p:spPr>
+              <a:xfrm>
+                <a:off x="5123645" y="775255"/>
+                <a:ext cx="834604" cy="834604"/>
+              </a:xfrm>
+              <a:prstGeom prst="ellipse">
+                <a:avLst/>
+              </a:prstGeom>
+              <a:ln w="28575">
+                <a:solidFill>
+                  <a:srgbClr val="7030A0"/>
+                </a:solidFill>
+              </a:ln>
+            </p:spPr>
+            <p:style>
+              <a:lnRef idx="2">
+                <a:schemeClr val="accent3"/>
+              </a:lnRef>
+              <a:fillRef idx="1">
+                <a:schemeClr val="lt1"/>
+              </a:fillRef>
+              <a:effectRef idx="0">
+                <a:schemeClr val="accent3"/>
+              </a:effectRef>
+              <a:fontRef idx="minor">
+                <a:schemeClr val="dk1"/>
+              </a:fontRef>
+            </p:style>
+            <p:txBody>
+              <a:bodyPr rtlCol="0" anchor="ctr"/>
+              <a:lstStyle/>
+              <a:p>
+                <a:pPr algn="ctr"/>
+                <a:endParaRPr lang="en-FR"/>
+              </a:p>
+            </p:txBody>
+          </p:sp>
+          <p:sp>
+            <p:nvSpPr>
+              <p:cNvPr id="105" name="TextBox 104">
+                <a:extLst>
+                  <a:ext uri="{FF2B5EF4-FFF2-40B4-BE49-F238E27FC236}">
+                    <a16:creationId xmlns:a16="http://schemas.microsoft.com/office/drawing/2014/main" id="{A50F3969-E7C6-EB29-BDE9-CEB223665B67}"/>
+                  </a:ext>
+                </a:extLst>
+              </p:cNvPr>
+              <p:cNvSpPr txBox="1"/>
+              <p:nvPr/>
+            </p:nvSpPr>
+            <p:spPr>
+              <a:xfrm>
+                <a:off x="5188924" y="1038668"/>
+                <a:ext cx="704045" cy="307777"/>
+              </a:xfrm>
+              <a:prstGeom prst="rect">
+                <a:avLst/>
+              </a:prstGeom>
+              <a:noFill/>
+              <a:ln>
+                <a:noFill/>
+              </a:ln>
+            </p:spPr>
+            <p:style>
+              <a:lnRef idx="2">
+                <a:schemeClr val="dk1"/>
+              </a:lnRef>
+              <a:fillRef idx="1">
+                <a:schemeClr val="lt1"/>
+              </a:fillRef>
+              <a:effectRef idx="0">
+                <a:schemeClr val="dk1"/>
+              </a:effectRef>
+              <a:fontRef idx="minor">
+                <a:schemeClr val="dk1"/>
+              </a:fontRef>
+            </p:style>
+            <p:txBody>
+              <a:bodyPr wrap="square">
+                <a:spAutoFit/>
+              </a:bodyPr>
+              <a:lstStyle/>
+              <a:p>
+                <a:pPr algn="ctr"/>
+                <a:r>
+                  <a:rPr lang="en-GB" sz="1400" dirty="0">
+                    <a:latin typeface="Cambria Math" panose="02040503050406030204" pitchFamily="18" charset="0"/>
+                    <a:ea typeface="Cambria Math" panose="02040503050406030204" pitchFamily="18" charset="0"/>
+                    <a:cs typeface="CMU Serif Roman" panose="02000603000000000000" pitchFamily="2" charset="0"/>
+                  </a:rPr>
+                  <a:t>t2</a:t>
+                </a:r>
+              </a:p>
+            </p:txBody>
+          </p:sp>
+        </p:grpSp>
+        <p:grpSp>
+          <p:nvGrpSpPr>
+            <p:cNvPr id="93" name="Group 92">
+              <a:extLst>
+                <a:ext uri="{FF2B5EF4-FFF2-40B4-BE49-F238E27FC236}">
+                  <a16:creationId xmlns:a16="http://schemas.microsoft.com/office/drawing/2014/main" id="{732162E3-CDFD-4C37-3258-5A4F2DF4EE3A}"/>
+                </a:ext>
+              </a:extLst>
+            </p:cNvPr>
+            <p:cNvGrpSpPr/>
+            <p:nvPr/>
+          </p:nvGrpSpPr>
+          <p:grpSpPr>
+            <a:xfrm>
+              <a:off x="2915809" y="4719089"/>
+              <a:ext cx="834604" cy="834604"/>
+              <a:chOff x="5123645" y="775255"/>
+              <a:chExt cx="834604" cy="834604"/>
+            </a:xfrm>
+          </p:grpSpPr>
+          <p:sp>
+            <p:nvSpPr>
+              <p:cNvPr id="102" name="Oval 101">
+                <a:extLst>
+                  <a:ext uri="{FF2B5EF4-FFF2-40B4-BE49-F238E27FC236}">
+                    <a16:creationId xmlns:a16="http://schemas.microsoft.com/office/drawing/2014/main" id="{3086601A-0846-FAE1-48C2-00EA1102534F}"/>
+                  </a:ext>
+                </a:extLst>
+              </p:cNvPr>
+              <p:cNvSpPr/>
+              <p:nvPr/>
+            </p:nvSpPr>
+            <p:spPr>
+              <a:xfrm>
+                <a:off x="5123645" y="775255"/>
+                <a:ext cx="834604" cy="834604"/>
+              </a:xfrm>
+              <a:prstGeom prst="ellipse">
+                <a:avLst/>
+              </a:prstGeom>
+              <a:ln w="28575">
+                <a:solidFill>
+                  <a:srgbClr val="7030A0"/>
+                </a:solidFill>
+              </a:ln>
+            </p:spPr>
+            <p:style>
+              <a:lnRef idx="2">
+                <a:schemeClr val="accent3"/>
+              </a:lnRef>
+              <a:fillRef idx="1">
+                <a:schemeClr val="lt1"/>
+              </a:fillRef>
+              <a:effectRef idx="0">
+                <a:schemeClr val="accent3"/>
+              </a:effectRef>
+              <a:fontRef idx="minor">
+                <a:schemeClr val="dk1"/>
+              </a:fontRef>
+            </p:style>
+            <p:txBody>
+              <a:bodyPr rtlCol="0" anchor="ctr"/>
+              <a:lstStyle/>
+              <a:p>
+                <a:pPr algn="ctr"/>
+                <a:endParaRPr lang="en-FR"/>
+              </a:p>
+            </p:txBody>
+          </p:sp>
+          <p:sp>
+            <p:nvSpPr>
+              <p:cNvPr id="103" name="TextBox 102">
+                <a:extLst>
+                  <a:ext uri="{FF2B5EF4-FFF2-40B4-BE49-F238E27FC236}">
+                    <a16:creationId xmlns:a16="http://schemas.microsoft.com/office/drawing/2014/main" id="{0C0B7F00-774A-3E58-9D81-520B1B65DE80}"/>
+                  </a:ext>
+                </a:extLst>
+              </p:cNvPr>
+              <p:cNvSpPr txBox="1"/>
+              <p:nvPr/>
+            </p:nvSpPr>
+            <p:spPr>
+              <a:xfrm>
+                <a:off x="5188924" y="1038668"/>
+                <a:ext cx="704045" cy="307777"/>
+              </a:xfrm>
+              <a:prstGeom prst="rect">
+                <a:avLst/>
+              </a:prstGeom>
+              <a:noFill/>
+              <a:ln>
+                <a:noFill/>
+              </a:ln>
+            </p:spPr>
+            <p:style>
+              <a:lnRef idx="2">
+                <a:schemeClr val="dk1"/>
+              </a:lnRef>
+              <a:fillRef idx="1">
+                <a:schemeClr val="lt1"/>
+              </a:fillRef>
+              <a:effectRef idx="0">
+                <a:schemeClr val="dk1"/>
+              </a:effectRef>
+              <a:fontRef idx="minor">
+                <a:schemeClr val="dk1"/>
+              </a:fontRef>
+            </p:style>
+            <p:txBody>
+              <a:bodyPr wrap="square">
+                <a:spAutoFit/>
+              </a:bodyPr>
+              <a:lstStyle/>
+              <a:p>
+                <a:pPr algn="ctr"/>
+                <a:r>
+                  <a:rPr lang="en-GB" sz="1400" dirty="0">
+                    <a:latin typeface="Cambria Math" panose="02040503050406030204" pitchFamily="18" charset="0"/>
+                    <a:ea typeface="Cambria Math" panose="02040503050406030204" pitchFamily="18" charset="0"/>
+                    <a:cs typeface="CMU Serif Roman" panose="02000603000000000000" pitchFamily="2" charset="0"/>
+                  </a:rPr>
+                  <a:t>t4</a:t>
+                </a:r>
+              </a:p>
+            </p:txBody>
+          </p:sp>
+        </p:grpSp>
+        <p:cxnSp>
+          <p:nvCxnSpPr>
+            <p:cNvPr id="94" name="Curved Connector 93">
+              <a:extLst>
+                <a:ext uri="{FF2B5EF4-FFF2-40B4-BE49-F238E27FC236}">
+                  <a16:creationId xmlns:a16="http://schemas.microsoft.com/office/drawing/2014/main" id="{547922F3-8145-9A47-09AB-C3DB91B286B4}"/>
+                </a:ext>
+              </a:extLst>
+            </p:cNvPr>
+            <p:cNvCxnSpPr>
+              <a:cxnSpLocks/>
+              <a:stCxn id="104" idx="7"/>
+              <a:endCxn id="102" idx="1"/>
+            </p:cNvCxnSpPr>
+            <p:nvPr/>
+          </p:nvCxnSpPr>
+          <p:spPr>
+            <a:xfrm rot="5400000" flipH="1" flipV="1">
+              <a:off x="2277609" y="4080890"/>
+              <a:ext cx="12700" cy="1520849"/>
+            </a:xfrm>
+            <a:prstGeom prst="curvedConnector3">
+              <a:avLst>
+                <a:gd name="adj1" fmla="val 2762402"/>
+              </a:avLst>
+            </a:prstGeom>
+            <a:ln>
+              <a:tailEnd type="triangle"/>
+            </a:ln>
+          </p:spPr>
+          <p:style>
+            <a:lnRef idx="1">
+              <a:schemeClr val="accent1"/>
+            </a:lnRef>
+            <a:fillRef idx="0">
+              <a:schemeClr val="accent1"/>
+            </a:fillRef>
+            <a:effectRef idx="0">
+              <a:schemeClr val="accent1"/>
+            </a:effectRef>
+            <a:fontRef idx="minor">
+              <a:schemeClr val="tx1"/>
+            </a:fontRef>
+          </p:style>
+        </p:cxnSp>
+        <p:cxnSp>
+          <p:nvCxnSpPr>
+            <p:cNvPr id="95" name="Curved Connector 94">
+              <a:extLst>
+                <a:ext uri="{FF2B5EF4-FFF2-40B4-BE49-F238E27FC236}">
+                  <a16:creationId xmlns:a16="http://schemas.microsoft.com/office/drawing/2014/main" id="{D4F6E494-00C4-D28D-BB7C-2E06A3159A09}"/>
+                </a:ext>
+              </a:extLst>
+            </p:cNvPr>
+            <p:cNvCxnSpPr>
+              <a:cxnSpLocks/>
+            </p:cNvCxnSpPr>
+            <p:nvPr/>
+          </p:nvCxnSpPr>
+          <p:spPr>
+            <a:xfrm rot="5400000">
+              <a:off x="2277609" y="4671043"/>
+              <a:ext cx="12700" cy="1520849"/>
+            </a:xfrm>
+            <a:prstGeom prst="curvedConnector3">
+              <a:avLst>
+                <a:gd name="adj1" fmla="val 2762402"/>
+              </a:avLst>
+            </a:prstGeom>
+            <a:ln>
+              <a:tailEnd type="triangle"/>
+            </a:ln>
+          </p:spPr>
+          <p:style>
+            <a:lnRef idx="1">
+              <a:schemeClr val="accent1"/>
+            </a:lnRef>
+            <a:fillRef idx="0">
+              <a:schemeClr val="accent1"/>
+            </a:fillRef>
+            <a:effectRef idx="0">
+              <a:schemeClr val="accent1"/>
+            </a:effectRef>
+            <a:fontRef idx="minor">
+              <a:schemeClr val="tx1"/>
+            </a:fontRef>
+          </p:style>
+        </p:cxnSp>
+        <p:cxnSp>
+          <p:nvCxnSpPr>
+            <p:cNvPr id="96" name="Curved Connector 95">
+              <a:extLst>
+                <a:ext uri="{FF2B5EF4-FFF2-40B4-BE49-F238E27FC236}">
+                  <a16:creationId xmlns:a16="http://schemas.microsoft.com/office/drawing/2014/main" id="{B256EDB6-8CD6-30E2-C6E5-65644441C02C}"/>
+                </a:ext>
+              </a:extLst>
+            </p:cNvPr>
+            <p:cNvCxnSpPr>
+              <a:cxnSpLocks/>
+            </p:cNvCxnSpPr>
+            <p:nvPr/>
+          </p:nvCxnSpPr>
+          <p:spPr>
+            <a:xfrm rot="10800000">
+              <a:off x="804806" y="3275111"/>
+              <a:ext cx="12700" cy="1861280"/>
+            </a:xfrm>
+            <a:prstGeom prst="curvedConnector3">
+              <a:avLst>
+                <a:gd name="adj1" fmla="val 1800000"/>
+              </a:avLst>
+            </a:prstGeom>
+            <a:ln>
+              <a:tailEnd type="triangle"/>
+            </a:ln>
+          </p:spPr>
+          <p:style>
+            <a:lnRef idx="1">
+              <a:schemeClr val="accent1"/>
+            </a:lnRef>
+            <a:fillRef idx="0">
+              <a:schemeClr val="accent1"/>
+            </a:fillRef>
+            <a:effectRef idx="0">
+              <a:schemeClr val="accent1"/>
+            </a:effectRef>
+            <a:fontRef idx="minor">
+              <a:schemeClr val="tx1"/>
+            </a:fontRef>
+          </p:style>
+        </p:cxnSp>
+        <p:cxnSp>
+          <p:nvCxnSpPr>
+            <p:cNvPr id="99" name="Curved Connector 98">
+              <a:extLst>
+                <a:ext uri="{FF2B5EF4-FFF2-40B4-BE49-F238E27FC236}">
+                  <a16:creationId xmlns:a16="http://schemas.microsoft.com/office/drawing/2014/main" id="{25360E11-5E96-5CE1-AD51-CB7B1DDFB073}"/>
+                </a:ext>
+              </a:extLst>
+            </p:cNvPr>
+            <p:cNvCxnSpPr>
+              <a:cxnSpLocks/>
+              <a:stCxn id="108" idx="3"/>
+              <a:endCxn id="102" idx="2"/>
+            </p:cNvCxnSpPr>
+            <p:nvPr/>
+          </p:nvCxnSpPr>
+          <p:spPr>
+            <a:xfrm rot="16200000" flipH="1">
+              <a:off x="1138319" y="3358900"/>
+              <a:ext cx="1566203" cy="1988778"/>
+            </a:xfrm>
+            <a:prstGeom prst="curvedConnector2">
+              <a:avLst/>
+            </a:prstGeom>
+            <a:ln>
+              <a:tailEnd type="triangle"/>
+            </a:ln>
+          </p:spPr>
+          <p:style>
+            <a:lnRef idx="1">
+              <a:schemeClr val="accent1"/>
+            </a:lnRef>
+            <a:fillRef idx="0">
+              <a:schemeClr val="accent1"/>
+            </a:fillRef>
+            <a:effectRef idx="0">
+              <a:schemeClr val="accent1"/>
+            </a:effectRef>
+            <a:fontRef idx="minor">
+              <a:schemeClr val="tx1"/>
+            </a:fontRef>
+          </p:style>
+        </p:cxnSp>
+        <p:cxnSp>
+          <p:nvCxnSpPr>
+            <p:cNvPr id="100" name="Curved Connector 99">
+              <a:extLst>
+                <a:ext uri="{FF2B5EF4-FFF2-40B4-BE49-F238E27FC236}">
+                  <a16:creationId xmlns:a16="http://schemas.microsoft.com/office/drawing/2014/main" id="{566E2999-8099-F431-040E-0B61B3D85D6A}"/>
+                </a:ext>
+              </a:extLst>
+            </p:cNvPr>
+            <p:cNvCxnSpPr>
+              <a:cxnSpLocks/>
+              <a:stCxn id="108" idx="6"/>
+              <a:endCxn id="104" idx="6"/>
+            </p:cNvCxnSpPr>
+            <p:nvPr/>
+          </p:nvCxnSpPr>
+          <p:spPr>
+            <a:xfrm>
+              <a:off x="1639410" y="3275111"/>
+              <a:ext cx="12700" cy="1861280"/>
+            </a:xfrm>
+            <a:prstGeom prst="curvedConnector3">
+              <a:avLst>
+                <a:gd name="adj1" fmla="val 1800000"/>
+              </a:avLst>
+            </a:prstGeom>
+            <a:ln>
+              <a:tailEnd type="triangle"/>
+            </a:ln>
+          </p:spPr>
+          <p:style>
+            <a:lnRef idx="1">
+              <a:schemeClr val="accent1"/>
+            </a:lnRef>
+            <a:fillRef idx="0">
+              <a:schemeClr val="accent1"/>
+            </a:fillRef>
+            <a:effectRef idx="0">
+              <a:schemeClr val="accent1"/>
+            </a:effectRef>
+            <a:fontRef idx="minor">
+              <a:schemeClr val="tx1"/>
+            </a:fontRef>
+          </p:style>
+        </p:cxnSp>
+        <p:cxnSp>
+          <p:nvCxnSpPr>
+            <p:cNvPr id="101" name="Curved Connector 100">
+              <a:extLst>
+                <a:ext uri="{FF2B5EF4-FFF2-40B4-BE49-F238E27FC236}">
+                  <a16:creationId xmlns:a16="http://schemas.microsoft.com/office/drawing/2014/main" id="{E876EE2A-C272-1D3A-7FDB-98C8E4A981B6}"/>
+                </a:ext>
+              </a:extLst>
+            </p:cNvPr>
+            <p:cNvCxnSpPr>
+              <a:cxnSpLocks/>
+            </p:cNvCxnSpPr>
+            <p:nvPr/>
+          </p:nvCxnSpPr>
+          <p:spPr>
+            <a:xfrm rot="10800000">
+              <a:off x="2915809" y="3275111"/>
+              <a:ext cx="12700" cy="1861280"/>
+            </a:xfrm>
+            <a:prstGeom prst="curvedConnector3">
+              <a:avLst>
+                <a:gd name="adj1" fmla="val 1800000"/>
+              </a:avLst>
+            </a:prstGeom>
+            <a:ln>
+              <a:tailEnd type="triangle"/>
+            </a:ln>
+          </p:spPr>
+          <p:style>
+            <a:lnRef idx="1">
+              <a:schemeClr val="accent1"/>
+            </a:lnRef>
+            <a:fillRef idx="0">
+              <a:schemeClr val="accent1"/>
+            </a:fillRef>
+            <a:effectRef idx="0">
+              <a:schemeClr val="accent1"/>
+            </a:effectRef>
+            <a:fontRef idx="minor">
+              <a:schemeClr val="tx1"/>
+            </a:fontRef>
+          </p:style>
+        </p:cxnSp>
+      </p:grpSp>
+      <p:cxnSp>
+        <p:nvCxnSpPr>
+          <p:cNvPr id="152" name="Curved Connector 151">
+            <a:extLst>
+              <a:ext uri="{FF2B5EF4-FFF2-40B4-BE49-F238E27FC236}">
+                <a16:creationId xmlns:a16="http://schemas.microsoft.com/office/drawing/2014/main" id="{8DA8F886-032B-EE00-70D5-87C8E3206CD7}"/>
+              </a:ext>
+            </a:extLst>
+          </p:cNvPr>
+          <p:cNvCxnSpPr>
+            <a:cxnSpLocks/>
+            <a:stCxn id="108" idx="1"/>
+            <a:endCxn id="108" idx="0"/>
+          </p:cNvCxnSpPr>
+          <p:nvPr/>
+        </p:nvCxnSpPr>
+        <p:spPr>
+          <a:xfrm rot="5400000" flipH="1" flipV="1">
+            <a:off x="5279477" y="3198740"/>
+            <a:ext cx="122225" cy="295077"/>
+          </a:xfrm>
+          <a:prstGeom prst="curvedConnector3">
+            <a:avLst>
+              <a:gd name="adj1" fmla="val 287032"/>
+            </a:avLst>
+          </a:prstGeom>
+          <a:ln>
+            <a:tailEnd type="triangle"/>
+          </a:ln>
+        </p:spPr>
+        <p:style>
+          <a:lnRef idx="1">
+            <a:schemeClr val="accent1"/>
+          </a:lnRef>
+          <a:fillRef idx="0">
+            <a:schemeClr val="accent1"/>
+          </a:fillRef>
+          <a:effectRef idx="0">
+            <a:schemeClr val="accent1"/>
+          </a:effectRef>
+          <a:fontRef idx="minor">
+            <a:schemeClr val="tx1"/>
+          </a:fontRef>
+        </p:style>
+      </p:cxnSp>
+      <p:cxnSp>
+        <p:nvCxnSpPr>
+          <p:cNvPr id="157" name="Curved Connector 156">
+            <a:extLst>
+              <a:ext uri="{FF2B5EF4-FFF2-40B4-BE49-F238E27FC236}">
+                <a16:creationId xmlns:a16="http://schemas.microsoft.com/office/drawing/2014/main" id="{2CDE3B44-FE22-F402-ABE4-F077630E00AB}"/>
+              </a:ext>
+            </a:extLst>
+          </p:cNvPr>
+          <p:cNvCxnSpPr>
+            <a:cxnSpLocks/>
+            <a:stCxn id="104" idx="4"/>
+            <a:endCxn id="104" idx="3"/>
+          </p:cNvCxnSpPr>
+          <p:nvPr/>
+        </p:nvCxnSpPr>
+        <p:spPr>
+          <a:xfrm rot="5400000" flipH="1">
+            <a:off x="5279477" y="5772399"/>
+            <a:ext cx="122225" cy="295077"/>
+          </a:xfrm>
+          <a:prstGeom prst="curvedConnector3">
+            <a:avLst>
+              <a:gd name="adj1" fmla="val -187032"/>
+            </a:avLst>
+          </a:prstGeom>
+          <a:ln>
+            <a:tailEnd type="triangle"/>
+          </a:ln>
+        </p:spPr>
+        <p:style>
+          <a:lnRef idx="1">
+            <a:schemeClr val="accent1"/>
+          </a:lnRef>
+          <a:fillRef idx="0">
+            <a:schemeClr val="accent1"/>
+          </a:fillRef>
+          <a:effectRef idx="0">
+            <a:schemeClr val="accent1"/>
+          </a:effectRef>
+          <a:fontRef idx="minor">
+            <a:schemeClr val="tx1"/>
+          </a:fontRef>
+        </p:style>
+      </p:cxnSp>
       <p:sp>
         <p:nvSpPr>
-          <p:cNvPr id="86" name="TextBox 85">
-            <a:extLst>
-              <a:ext uri="{FF2B5EF4-FFF2-40B4-BE49-F238E27FC236}">
-                <a16:creationId xmlns:a16="http://schemas.microsoft.com/office/drawing/2014/main" id="{B17A52EA-4CA5-84AE-0DA7-33426FDB7080}"/>
+          <p:cNvPr id="160" name="TextBox 159">
+            <a:extLst>
+              <a:ext uri="{FF2B5EF4-FFF2-40B4-BE49-F238E27FC236}">
+                <a16:creationId xmlns:a16="http://schemas.microsoft.com/office/drawing/2014/main" id="{85BADC35-F735-CB3F-8BF5-EF7B9C0C4C09}"/>
               </a:ext>
             </a:extLst>
           </p:cNvPr>
@@ -11504,8 +10174,8 @@
         </p:nvSpPr>
         <p:spPr>
           <a:xfrm>
-            <a:off x="8189953" y="3285165"/>
-            <a:ext cx="2885061" cy="923330"/>
+            <a:off x="8310865" y="3651829"/>
+            <a:ext cx="3674555" cy="2308324"/>
           </a:xfrm>
           <a:prstGeom prst="rect">
             <a:avLst/>
@@ -11518,9 +10188,45 @@
           </a:bodyPr>
           <a:lstStyle/>
           <a:p>
+            <a:pPr algn="ctr"/>
+            <a:r>
+              <a:rPr lang="en-GB" dirty="0"/>
+              <a:t>T</a:t>
+            </a:r>
             <a:r>
               <a:rPr lang="en-FR" dirty="0"/>
-              <a:t>Where Gt1, Gt2, Gt, Gt4 are states satisfying the guards of t1, t2, t, t4 respectively.</a:t>
+              <a:t>o be read as: </a:t>
+            </a:r>
+          </a:p>
+          <a:p>
+            <a:pPr algn="ctr"/>
+            <a:r>
+              <a:rPr lang="en-GB" dirty="0"/>
+              <a:t>W</a:t>
+            </a:r>
+            <a:r>
+              <a:rPr lang="en-FR" dirty="0"/>
+              <a:t>hen I am in a </a:t>
+            </a:r>
+            <a:r>
+              <a:rPr lang="en-FR" b="1" dirty="0">
+                <a:solidFill>
+                  <a:srgbClr val="7030A0"/>
+                </a:solidFill>
+              </a:rPr>
+              <a:t>state</a:t>
+            </a:r>
+            <a:r>
+              <a:rPr lang="en-FR" dirty="0"/>
+              <a:t> where I have executed t1 (or t,t2,t4), from there I can move via any of the arrows to a state where </a:t>
+            </a:r>
+            <a:r>
+              <a:rPr lang="en-GB" dirty="0"/>
+              <a:t>I</a:t>
+            </a:r>
+            <a:r>
+              <a:rPr lang="en-FR" dirty="0"/>
+              <a:t> have executed another transition. So for example when I have executed transition t, I can only move by executing transition t1</a:t>
             </a:r>
           </a:p>
         </p:txBody>

</xml_diff>

<commit_message>
smart random in progress
</commit_message>
<xml_diff>
--- a/mcmc_method.pptx
+++ b/mcmc_method.pptx
@@ -5,7 +5,7 @@
     <p:sldMasterId id="2147483648" r:id="rId1"/>
   </p:sldMasterIdLst>
   <p:notesMasterIdLst>
-    <p:notesMasterId r:id="rId38"/>
+    <p:notesMasterId r:id="rId41"/>
   </p:notesMasterIdLst>
   <p:sldIdLst>
     <p:sldId id="275" r:id="rId2"/>
@@ -44,6 +44,9 @@
     <p:sldId id="293" r:id="rId35"/>
     <p:sldId id="292" r:id="rId36"/>
     <p:sldId id="288" r:id="rId37"/>
+    <p:sldId id="296" r:id="rId38"/>
+    <p:sldId id="295" r:id="rId39"/>
+    <p:sldId id="297" r:id="rId40"/>
   </p:sldIdLst>
   <p:sldSz cx="12192000" cy="6858000"/>
   <p:notesSz cx="6858000" cy="9144000"/>
@@ -232,7 +235,7 @@
           <a:p>
             <a:fld id="{F665532D-9515-A447-9C89-932ABF0AFE21}" type="datetimeFigureOut">
               <a:rPr lang="en-FR" smtClean="0"/>
-              <a:t>07/03/2023</a:t>
+              <a:t>27/03/2023</a:t>
             </a:fld>
             <a:endParaRPr lang="en-FR"/>
           </a:p>
@@ -649,7 +652,7 @@
           <a:p>
             <a:fld id="{54BA42DA-DA95-8449-8980-09AEC66987CB}" type="datetime1">
               <a:rPr lang="fr-FR" smtClean="0"/>
-              <a:t>07/03/2023</a:t>
+              <a:t>27/03/2023</a:t>
             </a:fld>
             <a:endParaRPr lang="en-FR"/>
           </a:p>
@@ -849,7 +852,7 @@
           <a:p>
             <a:fld id="{7F6A5C21-1A89-DF4A-85E0-A03D4350F203}" type="datetime1">
               <a:rPr lang="fr-FR" smtClean="0"/>
-              <a:t>07/03/2023</a:t>
+              <a:t>27/03/2023</a:t>
             </a:fld>
             <a:endParaRPr lang="en-FR"/>
           </a:p>
@@ -1059,7 +1062,7 @@
           <a:p>
             <a:fld id="{05E93925-926B-1945-B9CA-9A732A875AAF}" type="datetime1">
               <a:rPr lang="fr-FR" smtClean="0"/>
-              <a:t>07/03/2023</a:t>
+              <a:t>27/03/2023</a:t>
             </a:fld>
             <a:endParaRPr lang="en-FR"/>
           </a:p>
@@ -1259,7 +1262,7 @@
           <a:p>
             <a:fld id="{E0247FCB-74AB-A24C-8A1B-D0FC7EA3D9F4}" type="datetime1">
               <a:rPr lang="fr-FR" smtClean="0"/>
-              <a:t>07/03/2023</a:t>
+              <a:t>27/03/2023</a:t>
             </a:fld>
             <a:endParaRPr lang="en-FR"/>
           </a:p>
@@ -1535,7 +1538,7 @@
           <a:p>
             <a:fld id="{787E801A-18C3-5149-B32A-A508AB557630}" type="datetime1">
               <a:rPr lang="fr-FR" smtClean="0"/>
-              <a:t>07/03/2023</a:t>
+              <a:t>27/03/2023</a:t>
             </a:fld>
             <a:endParaRPr lang="en-FR"/>
           </a:p>
@@ -1803,7 +1806,7 @@
           <a:p>
             <a:fld id="{8076E26A-A8C1-3A42-9438-6E19217B065D}" type="datetime1">
               <a:rPr lang="fr-FR" smtClean="0"/>
-              <a:t>07/03/2023</a:t>
+              <a:t>27/03/2023</a:t>
             </a:fld>
             <a:endParaRPr lang="en-FR"/>
           </a:p>
@@ -2218,7 +2221,7 @@
           <a:p>
             <a:fld id="{C9FEDFF1-3F10-3A46-ADC1-D537CC37F390}" type="datetime1">
               <a:rPr lang="fr-FR" smtClean="0"/>
-              <a:t>07/03/2023</a:t>
+              <a:t>27/03/2023</a:t>
             </a:fld>
             <a:endParaRPr lang="en-FR"/>
           </a:p>
@@ -2360,7 +2363,7 @@
           <a:p>
             <a:fld id="{A08AB4D7-44FD-2F47-8062-C2F06B42AC02}" type="datetime1">
               <a:rPr lang="fr-FR" smtClean="0"/>
-              <a:t>07/03/2023</a:t>
+              <a:t>27/03/2023</a:t>
             </a:fld>
             <a:endParaRPr lang="en-FR"/>
           </a:p>
@@ -2473,7 +2476,7 @@
           <a:p>
             <a:fld id="{12822FAA-36F4-0244-815D-515775E17909}" type="datetime1">
               <a:rPr lang="fr-FR" smtClean="0"/>
-              <a:t>07/03/2023</a:t>
+              <a:t>27/03/2023</a:t>
             </a:fld>
             <a:endParaRPr lang="en-FR"/>
           </a:p>
@@ -2786,7 +2789,7 @@
           <a:p>
             <a:fld id="{85DAED84-3442-4046-8F8E-AED3CA9DA38B}" type="datetime1">
               <a:rPr lang="fr-FR" smtClean="0"/>
-              <a:t>07/03/2023</a:t>
+              <a:t>27/03/2023</a:t>
             </a:fld>
             <a:endParaRPr lang="en-FR"/>
           </a:p>
@@ -3075,7 +3078,7 @@
           <a:p>
             <a:fld id="{3A186636-9FEC-8342-B6AE-6B0D584EC47A}" type="datetime1">
               <a:rPr lang="fr-FR" smtClean="0"/>
-              <a:t>07/03/2023</a:t>
+              <a:t>27/03/2023</a:t>
             </a:fld>
             <a:endParaRPr lang="en-FR"/>
           </a:p>
@@ -3318,7 +3321,7 @@
           <a:p>
             <a:fld id="{5F64E3B2-8E5B-BB40-B91D-3C3C9E0DD3C8}" type="datetime1">
               <a:rPr lang="fr-FR" smtClean="0"/>
-              <a:t>07/03/2023</a:t>
+              <a:t>27/03/2023</a:t>
             </a:fld>
             <a:endParaRPr lang="en-FR"/>
           </a:p>
@@ -4510,10 +4513,6 @@
               </a:rPr>
               <a:t>Steps 1-3</a:t>
             </a:r>
-            <a:endParaRPr lang="en-US" sz="2400" dirty="0">
-              <a:latin typeface="Helvetica Neue Thin" panose="020B0403020202020204" pitchFamily="34" charset="0"/>
-              <a:ea typeface="Helvetica Neue Thin" panose="020B0403020202020204" pitchFamily="34" charset="0"/>
-            </a:endParaRPr>
           </a:p>
         </p:txBody>
       </p:sp>
@@ -4582,14 +4581,7 @@
                 <a:latin typeface="Helvetica Neue Thin" panose="020B0403020202020204" pitchFamily="34" charset="0"/>
                 <a:ea typeface="Helvetica Neue Thin" panose="020B0403020202020204" pitchFamily="34" charset="0"/>
               </a:rPr>
-              <a:t>This </a:t>
-            </a:r>
-            <a:r>
-              <a:rPr lang="en-US" dirty="0">
-                <a:latin typeface="Helvetica Neue Thin" panose="020B0403020202020204" pitchFamily="34" charset="0"/>
-                <a:ea typeface="Helvetica Neue Thin" panose="020B0403020202020204" pitchFamily="34" charset="0"/>
-              </a:rPr>
-              <a:t>step is a test run of the model to give the user an idea of how it behaves.</a:t>
+              <a:t>This step is a test run of the model to give the user an idea of how it behaves.</a:t>
             </a:r>
             <a:r>
               <a:rPr lang="en-FR" dirty="0">
@@ -4608,7 +4600,23 @@
                 <a:latin typeface="Helvetica Neue Thin" panose="020B0403020202020204" pitchFamily="34" charset="0"/>
                 <a:ea typeface="Helvetica Neue Thin" panose="020B0403020202020204" pitchFamily="34" charset="0"/>
               </a:rPr>
-              <a:t>Maximizing </a:t>
+              <a:t>Maximizing entropy</a:t>
+            </a:r>
+            <a:r>
+              <a:rPr lang="en-FR" dirty="0">
+                <a:latin typeface="Helvetica Neue Thin" panose="020B0403020202020204" pitchFamily="34" charset="0"/>
+                <a:ea typeface="Helvetica Neue Thin" panose="020B0403020202020204" pitchFamily="34" charset="0"/>
+              </a:rPr>
+              <a:t> is better than randomly picking transitions because it:</a:t>
+            </a:r>
+          </a:p>
+          <a:p>
+            <a:r>
+              <a:rPr lang="en-FR" dirty="0">
+                <a:latin typeface="Helvetica Neue Thin" panose="020B0403020202020204" pitchFamily="34" charset="0"/>
+                <a:ea typeface="Helvetica Neue Thin" panose="020B0403020202020204" pitchFamily="34" charset="0"/>
+              </a:rPr>
+              <a:t>	- guarantees a </a:t>
             </a:r>
             <a:r>
               <a:rPr lang="en-FR" dirty="0">
@@ -4618,14 +4626,14 @@
                 <a:latin typeface="Helvetica Neue Thin" panose="020B0403020202020204" pitchFamily="34" charset="0"/>
                 <a:ea typeface="Helvetica Neue Thin" panose="020B0403020202020204" pitchFamily="34" charset="0"/>
               </a:rPr>
-              <a:t>entropy</a:t>
+              <a:t>better exploration </a:t>
             </a:r>
             <a:r>
               <a:rPr lang="en-FR" dirty="0">
                 <a:latin typeface="Helvetica Neue Thin" panose="020B0403020202020204" pitchFamily="34" charset="0"/>
                 <a:ea typeface="Helvetica Neue Thin" panose="020B0403020202020204" pitchFamily="34" charset="0"/>
               </a:rPr>
-              <a:t> is better than randomly picking transitions because it:</a:t>
+              <a:t>of the system by forcing the system to explore different state spaces instead of 	  getting stuck in one place and running around in circles</a:t>
             </a:r>
           </a:p>
           <a:p>
@@ -4634,7 +4642,7 @@
                 <a:latin typeface="Helvetica Neue Thin" panose="020B0403020202020204" pitchFamily="34" charset="0"/>
                 <a:ea typeface="Helvetica Neue Thin" panose="020B0403020202020204" pitchFamily="34" charset="0"/>
               </a:rPr>
-              <a:t>	- guarantees a </a:t>
+              <a:t>	- </a:t>
             </a:r>
             <a:r>
               <a:rPr lang="en-FR" dirty="0">
@@ -4644,39 +4652,6 @@
                 <a:latin typeface="Helvetica Neue Thin" panose="020B0403020202020204" pitchFamily="34" charset="0"/>
                 <a:ea typeface="Helvetica Neue Thin" panose="020B0403020202020204" pitchFamily="34" charset="0"/>
               </a:rPr>
-              <a:t>better exploration </a:t>
-            </a:r>
-            <a:r>
-              <a:rPr lang="en-FR" dirty="0">
-                <a:latin typeface="Helvetica Neue Thin" panose="020B0403020202020204" pitchFamily="34" charset="0"/>
-                <a:ea typeface="Helvetica Neue Thin" panose="020B0403020202020204" pitchFamily="34" charset="0"/>
-              </a:rPr>
-              <a:t>of the system by forcing the system to explore different state spaces instead of 	  getting stuck in one place and running around in circles</a:t>
-            </a:r>
-          </a:p>
-          <a:p>
-            <a:r>
-              <a:rPr lang="en-FR" dirty="0">
-                <a:latin typeface="Helvetica Neue Thin" panose="020B0403020202020204" pitchFamily="34" charset="0"/>
-                <a:ea typeface="Helvetica Neue Thin" panose="020B0403020202020204" pitchFamily="34" charset="0"/>
-              </a:rPr>
-              <a:t>	</a:t>
-            </a:r>
-            <a:r>
-              <a:rPr lang="en-FR" dirty="0">
-                <a:latin typeface="Helvetica Neue Thin" panose="020B0403020202020204" pitchFamily="34" charset="0"/>
-                <a:ea typeface="Helvetica Neue Thin" panose="020B0403020202020204" pitchFamily="34" charset="0"/>
-              </a:rPr>
-              <a:t>- </a:t>
-            </a:r>
-            <a:r>
-              <a:rPr lang="en-FR" dirty="0">
-                <a:solidFill>
-                  <a:srgbClr val="0432FF"/>
-                </a:solidFill>
-                <a:latin typeface="Helvetica Neue Thin" panose="020B0403020202020204" pitchFamily="34" charset="0"/>
-                <a:ea typeface="Helvetica Neue Thin" panose="020B0403020202020204" pitchFamily="34" charset="0"/>
-              </a:rPr>
               <a:t>reduces sampling bias </a:t>
             </a:r>
           </a:p>
@@ -4733,14 +4708,7 @@
                 <a:latin typeface="Helvetica Neue Thin" panose="020B0403020202020204" pitchFamily="34" charset="0"/>
                 <a:ea typeface="Helvetica Neue Thin" panose="020B0403020202020204" pitchFamily="34" charset="0"/>
               </a:rPr>
-              <a:t>The test-run </a:t>
-            </a:r>
-            <a:r>
-              <a:rPr lang="en-US" dirty="0">
-                <a:latin typeface="Helvetica Neue Thin" panose="020B0403020202020204" pitchFamily="34" charset="0"/>
-                <a:ea typeface="Helvetica Neue Thin" panose="020B0403020202020204" pitchFamily="34" charset="0"/>
-              </a:rPr>
-              <a:t>spits out a bunch of information concerning the model, allowing the user to decide what to do next. </a:t>
+              <a:t>The test-run spits out a bunch of information concerning the model, allowing the user to decide what to do next. </a:t>
             </a:r>
           </a:p>
           <a:p>
@@ -4767,21 +4735,7 @@
                 <a:latin typeface="Helvetica Neue Thin" panose="020B0403020202020204" pitchFamily="34" charset="0"/>
                 <a:ea typeface="Helvetica Neue Thin" panose="020B0403020202020204" pitchFamily="34" charset="0"/>
               </a:rPr>
-              <a:t>If we compare the distributions</a:t>
-            </a:r>
-            <a:r>
-              <a:rPr lang="en-US" dirty="0">
-                <a:latin typeface="Helvetica Neue Thin" panose="020B0403020202020204" pitchFamily="34" charset="0"/>
-                <a:ea typeface="Helvetica Neue Thin" panose="020B0403020202020204" pitchFamily="34" charset="0"/>
-              </a:rPr>
-              <a:t> for the running example [cascading if] with a correct </a:t>
-            </a:r>
-            <a:r>
-              <a:rPr lang="en-US" dirty="0">
-                <a:latin typeface="Helvetica Neue Thin" panose="020B0403020202020204" pitchFamily="34" charset="0"/>
-                <a:ea typeface="Helvetica Neue Thin" panose="020B0403020202020204" pitchFamily="34" charset="0"/>
-              </a:rPr>
-              <a:t>Dekker model:</a:t>
+              <a:t>If we compare the distributions for the running example [cascading if] with a correct Dekker model:</a:t>
             </a:r>
           </a:p>
           <a:p>
@@ -4845,14 +4799,7 @@
                 <a:latin typeface="Helvetica Neue Thin" panose="020B0403020202020204" pitchFamily="34" charset="0"/>
                 <a:ea typeface="Helvetica Neue Thin" panose="020B0403020202020204" pitchFamily="34" charset="0"/>
               </a:rPr>
-              <a:t>: 0.333] </a:t>
-            </a:r>
-            <a:r>
-              <a:rPr lang="en-GB" dirty="0">
-                <a:latin typeface="Helvetica Neue Thin" panose="020B0403020202020204" pitchFamily="34" charset="0"/>
-                <a:ea typeface="Helvetica Neue Thin" panose="020B0403020202020204" pitchFamily="34" charset="0"/>
-              </a:rPr>
-              <a:t>-&gt; each transition is triggered equally </a:t>
+              <a:t>: 0.333] -&gt; each transition is triggered equally </a:t>
             </a:r>
             <a:r>
               <a:rPr lang="en-GB" b="1" dirty="0">
@@ -4874,21 +4821,7 @@
                 <a:latin typeface="Helvetica Neue Thin" panose="020B0403020202020204" pitchFamily="34" charset="0"/>
                 <a:ea typeface="Helvetica Neue Thin" panose="020B0403020202020204" pitchFamily="34" charset="0"/>
               </a:rPr>
-              <a:t>Cascading</a:t>
-            </a:r>
-            <a:r>
-              <a:rPr lang="en-GB" dirty="0">
-                <a:latin typeface="Helvetica Neue Thin" panose="020B0403020202020204" pitchFamily="34" charset="0"/>
-                <a:ea typeface="Helvetica Neue Thin" panose="020B0403020202020204" pitchFamily="34" charset="0"/>
-              </a:rPr>
-              <a:t> if: </a:t>
-            </a:r>
-            <a:r>
-              <a:rPr lang="en-GB" dirty="0">
-                <a:latin typeface="Helvetica Neue Thin" panose="020B0403020202020204" pitchFamily="34" charset="0"/>
-                <a:ea typeface="Helvetica Neue Thin" panose="020B0403020202020204" pitchFamily="34" charset="0"/>
-              </a:rPr>
-              <a:t>[</a:t>
+              <a:t>Cascading if: [</a:t>
             </a:r>
             <a:r>
               <a:rPr lang="en-GB" b="1" dirty="0">
@@ -5049,14 +4982,7 @@
                 <a:latin typeface="Helvetica Neue Thin" panose="020B0403020202020204" pitchFamily="34" charset="0"/>
                 <a:ea typeface="Helvetica Neue Thin" panose="020B0403020202020204" pitchFamily="34" charset="0"/>
               </a:rPr>
-              <a:t>[1] Uniform Sampling for Timed Automata with Application to Language </a:t>
-            </a:r>
-            <a:r>
-              <a:rPr lang="en-US" sz="1400" dirty="0">
-                <a:latin typeface="Helvetica Neue Thin" panose="020B0403020202020204" pitchFamily="34" charset="0"/>
-                <a:ea typeface="Helvetica Neue Thin" panose="020B0403020202020204" pitchFamily="34" charset="0"/>
-              </a:rPr>
-              <a:t>Inclusion </a:t>
+              <a:t>[1] Uniform Sampling for Timed Automata with Application to Language Inclusion </a:t>
             </a:r>
             <a:r>
               <a:rPr lang="en-US" sz="1400" dirty="0" err="1">
@@ -5221,14 +5147,7 @@
                 <a:latin typeface="Helvetica Neue Thin" panose="020B0403020202020204" pitchFamily="34" charset="0"/>
                 <a:ea typeface="Helvetica Neue Thin" panose="020B0403020202020204" pitchFamily="34" charset="0"/>
               </a:rPr>
-              <a:t>Steps </a:t>
-            </a:r>
-            <a:r>
-              <a:rPr lang="en-US" sz="2400" dirty="0">
-                <a:latin typeface="Helvetica Neue Thin" panose="020B0403020202020204" pitchFamily="34" charset="0"/>
-                <a:ea typeface="Helvetica Neue Thin" panose="020B0403020202020204" pitchFamily="34" charset="0"/>
-              </a:rPr>
-              <a:t>4 &amp; 5</a:t>
+              <a:t>Steps 4 &amp; 5</a:t>
             </a:r>
           </a:p>
         </p:txBody>
@@ -5339,14 +5258,7 @@
                 <a:latin typeface="Helvetica Neue Thin" panose="020B0403020202020204" pitchFamily="34" charset="0"/>
                 <a:ea typeface="Helvetica Neue Thin" panose="020B0403020202020204" pitchFamily="34" charset="0"/>
               </a:rPr>
-              <a:t>If the data </a:t>
-            </a:r>
-            <a:r>
-              <a:rPr lang="en-US" dirty="0">
-                <a:latin typeface="Helvetica Neue Thin" panose="020B0403020202020204" pitchFamily="34" charset="0"/>
-                <a:ea typeface="Helvetica Neue Thin" panose="020B0403020202020204" pitchFamily="34" charset="0"/>
-              </a:rPr>
-              <a:t>indicates that the system is explored in a way that isn’t satisfactory, you can rerun the model changing the exploration tactics. </a:t>
+              <a:t>If the data indicates that the system is explored in a way that isn’t satisfactory, you can rerun the model changing the exploration tactics. </a:t>
             </a:r>
           </a:p>
           <a:p>
@@ -5370,21 +5282,7 @@
                 <a:latin typeface="Helvetica Neue Thin" panose="020B0403020202020204" pitchFamily="34" charset="0"/>
                 <a:ea typeface="Helvetica Neue Thin" panose="020B0403020202020204" pitchFamily="34" charset="0"/>
               </a:rPr>
-              <a:t>	</a:t>
-            </a:r>
-            <a:r>
-              <a:rPr lang="en-US" dirty="0">
-                <a:latin typeface="Helvetica Neue Thin" panose="020B0403020202020204" pitchFamily="34" charset="0"/>
-                <a:ea typeface="Helvetica Neue Thin" panose="020B0403020202020204" pitchFamily="34" charset="0"/>
-              </a:rPr>
-              <a:t>When the system </a:t>
-            </a:r>
-            <a:r>
-              <a:rPr lang="en-US" dirty="0">
-                <a:latin typeface="Helvetica Neue Thin" panose="020B0403020202020204" pitchFamily="34" charset="0"/>
-                <a:ea typeface="Helvetica Neue Thin" panose="020B0403020202020204" pitchFamily="34" charset="0"/>
-              </a:rPr>
-              <a:t>decides which transition to </a:t>
+              <a:t>	When the system decides which transition to </a:t>
             </a:r>
             <a:r>
               <a:rPr lang="en-US" dirty="0">
@@ -5481,10 +5379,6 @@
               </a:rPr>
               <a:t>	Biasing entropy tells the system that certain transitions are more interesting to explore.</a:t>
             </a:r>
-            <a:endParaRPr lang="en-US" dirty="0">
-              <a:latin typeface="Helvetica Neue Thin" panose="020B0403020202020204" pitchFamily="34" charset="0"/>
-              <a:ea typeface="Helvetica Neue Thin" panose="020B0403020202020204" pitchFamily="34" charset="0"/>
-            </a:endParaRPr>
           </a:p>
           <a:p>
             <a:r>
@@ -5501,14 +5395,7 @@
                 <a:latin typeface="Helvetica Neue Thin" panose="020B0403020202020204" pitchFamily="34" charset="0"/>
                 <a:ea typeface="Helvetica Neue Thin" panose="020B0403020202020204" pitchFamily="34" charset="0"/>
               </a:rPr>
-              <a:t>	This</a:t>
-            </a:r>
-            <a:r>
-              <a:rPr lang="en-US" dirty="0">
-                <a:latin typeface="Helvetica Neue Thin" panose="020B0403020202020204" pitchFamily="34" charset="0"/>
-                <a:ea typeface="Helvetica Neue Thin" panose="020B0403020202020204" pitchFamily="34" charset="0"/>
-              </a:rPr>
-              <a:t> mixes tactics 1 and 2, forcing the system to </a:t>
+              <a:t>	This mixes tactics 1 and 2, forcing the system to </a:t>
             </a:r>
             <a:r>
               <a:rPr lang="en-US" dirty="0">
@@ -5661,14 +5548,7 @@
                 <a:latin typeface="Helvetica Neue Thin" panose="020B0403020202020204" pitchFamily="34" charset="0"/>
                 <a:ea typeface="Helvetica Neue Thin" panose="020B0403020202020204" pitchFamily="34" charset="0"/>
               </a:rPr>
-              <a:t>Steps </a:t>
-            </a:r>
-            <a:r>
-              <a:rPr lang="en-US" sz="2400" dirty="0">
-                <a:latin typeface="Helvetica Neue Thin" panose="020B0403020202020204" pitchFamily="34" charset="0"/>
-                <a:ea typeface="Helvetica Neue Thin" panose="020B0403020202020204" pitchFamily="34" charset="0"/>
-              </a:rPr>
-              <a:t>6 &amp; 7</a:t>
+              <a:t>Steps 6 &amp; 7</a:t>
             </a:r>
           </a:p>
         </p:txBody>
@@ -5839,30 +5719,16 @@
                 <a:latin typeface="Helvetica Neue Thin" panose="020B0403020202020204" pitchFamily="34" charset="0"/>
                 <a:ea typeface="Helvetica Neue Thin" panose="020B0403020202020204" pitchFamily="34" charset="0"/>
               </a:rPr>
-              <a:t>: 0.1], which says “propos</a:t>
-            </a:r>
+              <a:t>: 0.1], which says “propose t 10% of the time, t1 40% of the time,…”</a:t>
+            </a:r>
+          </a:p>
+          <a:p>
             <a:r>
               <a:rPr lang="en-GB" dirty="0">
                 <a:latin typeface="Helvetica Neue Thin" panose="020B0403020202020204" pitchFamily="34" charset="0"/>
                 <a:ea typeface="Helvetica Neue Thin" panose="020B0403020202020204" pitchFamily="34" charset="0"/>
               </a:rPr>
-              <a:t>e t 10% of the time, t1 40% of the time,…”</a:t>
-            </a:r>
-          </a:p>
-          <a:p>
-            <a:r>
-              <a:rPr lang="en-GB" dirty="0">
-                <a:latin typeface="Helvetica Neue Thin" panose="020B0403020202020204" pitchFamily="34" charset="0"/>
-                <a:ea typeface="Helvetica Neue Thin" panose="020B0403020202020204" pitchFamily="34" charset="0"/>
-              </a:rPr>
-              <a:t>Running</a:t>
-            </a:r>
-            <a:r>
-              <a:rPr lang="en-GB" dirty="0">
-                <a:latin typeface="Helvetica Neue Thin" panose="020B0403020202020204" pitchFamily="34" charset="0"/>
-                <a:ea typeface="Helvetica Neue Thin" panose="020B0403020202020204" pitchFamily="34" charset="0"/>
-              </a:rPr>
-              <a:t> the model now gives the result:</a:t>
+              <a:t>Running the model now gives the result:</a:t>
             </a:r>
           </a:p>
           <a:p>
@@ -5929,12 +5795,143 @@
               </a:rPr>
               <a:t>:0.05]</a:t>
             </a:r>
+          </a:p>
+          <a:p>
             <a:endParaRPr lang="en-FR" dirty="0">
               <a:latin typeface="Helvetica Neue Thin" panose="020B0403020202020204" pitchFamily="34" charset="0"/>
               <a:ea typeface="Helvetica Neue Thin" panose="020B0403020202020204" pitchFamily="34" charset="0"/>
             </a:endParaRPr>
           </a:p>
           <a:p>
+            <a:r>
+              <a:rPr lang="en-FR" b="1" dirty="0">
+                <a:latin typeface="HELVETICA NEUE THIN" panose="020B0403020202020204" pitchFamily="34" charset="0"/>
+                <a:ea typeface="HELVETICA NEUE THIN" panose="020B0403020202020204" pitchFamily="34" charset="0"/>
+              </a:rPr>
+              <a:t>Step 7: analyze the new data and go back to Step 5 if unsatisfied</a:t>
+            </a:r>
+          </a:p>
+          <a:p>
+            <a:endParaRPr lang="en-FR" b="1" dirty="0">
+              <a:latin typeface="HELVETICA NEUE THIN" panose="020B0403020202020204" pitchFamily="34" charset="0"/>
+              <a:ea typeface="HELVETICA NEUE THIN" panose="020B0403020202020204" pitchFamily="34" charset="0"/>
+            </a:endParaRPr>
+          </a:p>
+          <a:p>
+            <a:r>
+              <a:rPr lang="en-FR" b="1" dirty="0">
+                <a:latin typeface="Helvetica Neue Thin" panose="020B0403020202020204" pitchFamily="34" charset="0"/>
+                <a:ea typeface="Helvetica Neue Thin" panose="020B0403020202020204" pitchFamily="34" charset="0"/>
+              </a:rPr>
+              <a:t>t</a:t>
+            </a:r>
+            <a:r>
+              <a:rPr lang="en-FR" dirty="0">
+                <a:latin typeface="Helvetica Neue Thin" panose="020B0403020202020204" pitchFamily="34" charset="0"/>
+                <a:ea typeface="Helvetica Neue Thin" panose="020B0403020202020204" pitchFamily="34" charset="0"/>
+              </a:rPr>
+              <a:t> went from </a:t>
+            </a:r>
+            <a:r>
+              <a:rPr lang="en-FR" b="1" dirty="0">
+                <a:latin typeface="HELVETICA NEUE THIN" panose="020B0403020202020204" pitchFamily="34" charset="0"/>
+                <a:ea typeface="HELVETICA NEUE THIN" panose="020B0403020202020204" pitchFamily="34" charset="0"/>
+              </a:rPr>
+              <a:t>2%</a:t>
+            </a:r>
+            <a:r>
+              <a:rPr lang="en-FR" dirty="0">
+                <a:latin typeface="Helvetica Neue Thin" panose="020B0403020202020204" pitchFamily="34" charset="0"/>
+                <a:ea typeface="Helvetica Neue Thin" panose="020B0403020202020204" pitchFamily="34" charset="0"/>
+              </a:rPr>
+              <a:t> to </a:t>
+            </a:r>
+            <a:r>
+              <a:rPr lang="en-FR" b="1" dirty="0">
+                <a:latin typeface="HELVETICA NEUE THIN" panose="020B0403020202020204" pitchFamily="34" charset="0"/>
+                <a:ea typeface="HELVETICA NEUE THIN" panose="020B0403020202020204" pitchFamily="34" charset="0"/>
+              </a:rPr>
+              <a:t>12%</a:t>
+            </a:r>
+            <a:r>
+              <a:rPr lang="en-FR" dirty="0">
+                <a:latin typeface="Helvetica Neue Thin" panose="020B0403020202020204" pitchFamily="34" charset="0"/>
+                <a:ea typeface="Helvetica Neue Thin" panose="020B0403020202020204" pitchFamily="34" charset="0"/>
+              </a:rPr>
+              <a:t>, and </a:t>
+            </a:r>
+            <a:r>
+              <a:rPr lang="en-FR" b="1" dirty="0">
+                <a:latin typeface="HELVETICA NEUE THIN" panose="020B0403020202020204" pitchFamily="34" charset="0"/>
+                <a:ea typeface="HELVETICA NEUE THIN" panose="020B0403020202020204" pitchFamily="34" charset="0"/>
+              </a:rPr>
+              <a:t>t4</a:t>
+            </a:r>
+            <a:r>
+              <a:rPr lang="en-FR" dirty="0">
+                <a:latin typeface="Helvetica Neue Thin" panose="020B0403020202020204" pitchFamily="34" charset="0"/>
+                <a:ea typeface="Helvetica Neue Thin" panose="020B0403020202020204" pitchFamily="34" charset="0"/>
+              </a:rPr>
+              <a:t> went from </a:t>
+            </a:r>
+            <a:r>
+              <a:rPr lang="en-FR" b="1" dirty="0">
+                <a:latin typeface="HELVETICA NEUE THIN" panose="020B0403020202020204" pitchFamily="34" charset="0"/>
+                <a:ea typeface="HELVETICA NEUE THIN" panose="020B0403020202020204" pitchFamily="34" charset="0"/>
+              </a:rPr>
+              <a:t>28%</a:t>
+            </a:r>
+            <a:r>
+              <a:rPr lang="en-FR" dirty="0">
+                <a:latin typeface="Helvetica Neue Thin" panose="020B0403020202020204" pitchFamily="34" charset="0"/>
+                <a:ea typeface="Helvetica Neue Thin" panose="020B0403020202020204" pitchFamily="34" charset="0"/>
+              </a:rPr>
+              <a:t> to </a:t>
+            </a:r>
+            <a:r>
+              <a:rPr lang="en-FR" b="1" dirty="0">
+                <a:latin typeface="HELVETICA NEUE THIN" panose="020B0403020202020204" pitchFamily="34" charset="0"/>
+                <a:ea typeface="HELVETICA NEUE THIN" panose="020B0403020202020204" pitchFamily="34" charset="0"/>
+              </a:rPr>
+              <a:t>5%</a:t>
+            </a:r>
+            <a:r>
+              <a:rPr lang="en-FR" dirty="0">
+                <a:latin typeface="Helvetica Neue Thin" panose="020B0403020202020204" pitchFamily="34" charset="0"/>
+                <a:ea typeface="Helvetica Neue Thin" panose="020B0403020202020204" pitchFamily="34" charset="0"/>
+              </a:rPr>
+              <a:t>. If the goal is to force the system to explore </a:t>
+            </a:r>
+            <a:r>
+              <a:rPr lang="en-FR" b="1" dirty="0">
+                <a:latin typeface="Helvetica Neue Thin" panose="020B0403020202020204" pitchFamily="34" charset="0"/>
+                <a:ea typeface="Helvetica Neue Thin" panose="020B0403020202020204" pitchFamily="34" charset="0"/>
+              </a:rPr>
+              <a:t>t</a:t>
+            </a:r>
+            <a:r>
+              <a:rPr lang="en-FR" dirty="0">
+                <a:latin typeface="Helvetica Neue Thin" panose="020B0403020202020204" pitchFamily="34" charset="0"/>
+                <a:ea typeface="Helvetica Neue Thin" panose="020B0403020202020204" pitchFamily="34" charset="0"/>
+              </a:rPr>
+              <a:t> more often, you can stop here. If the goal is to try to get the system to explore them equally, then you can go back </a:t>
+            </a:r>
+            <a:r>
+              <a:rPr lang="en-FR" b="1" dirty="0">
+                <a:latin typeface="Helvetica Neue Thin" panose="020B0403020202020204" pitchFamily="34" charset="0"/>
+                <a:ea typeface="Helvetica Neue Thin" panose="020B0403020202020204" pitchFamily="34" charset="0"/>
+              </a:rPr>
+              <a:t>to Step 5 </a:t>
+            </a:r>
+            <a:r>
+              <a:rPr lang="en-FR" dirty="0">
+                <a:latin typeface="Helvetica Neue Thin" panose="020B0403020202020204" pitchFamily="34" charset="0"/>
+                <a:ea typeface="Helvetica Neue Thin" panose="020B0403020202020204" pitchFamily="34" charset="0"/>
+              </a:rPr>
+              <a:t>and try again.</a:t>
+            </a:r>
+          </a:p>
+          <a:p>
             <a:endParaRPr lang="en-FR" dirty="0">
               <a:latin typeface="Helvetica Neue Thin" panose="020B0403020202020204" pitchFamily="34" charset="0"/>
               <a:ea typeface="Helvetica Neue Thin" panose="020B0403020202020204" pitchFamily="34" charset="0"/>
@@ -5942,25 +5939,106 @@
           </a:p>
           <a:p>
             <a:r>
+              <a:rPr lang="en-FR" dirty="0">
+                <a:latin typeface="Helvetica Neue Thin" panose="020B0403020202020204" pitchFamily="34" charset="0"/>
+                <a:ea typeface="Helvetica Neue Thin" panose="020B0403020202020204" pitchFamily="34" charset="0"/>
+              </a:rPr>
+              <a:t>For example if I now try a different proposal distribution:</a:t>
+            </a:r>
+          </a:p>
+          <a:p>
+            <a:r>
+              <a:rPr lang="en-GB" dirty="0">
+                <a:latin typeface="Helvetica Neue Thin" panose="020B0403020202020204" pitchFamily="34" charset="0"/>
+                <a:ea typeface="Helvetica Neue Thin" panose="020B0403020202020204" pitchFamily="34" charset="0"/>
+              </a:rPr>
+              <a:t>[</a:t>
+            </a:r>
+            <a:r>
+              <a:rPr lang="en-GB" b="1" dirty="0">
+                <a:latin typeface="Helvetica Neue Thin" panose="020B0403020202020204" pitchFamily="34" charset="0"/>
+                <a:ea typeface="Helvetica Neue Thin" panose="020B0403020202020204" pitchFamily="34" charset="0"/>
+              </a:rPr>
+              <a:t>t</a:t>
+            </a:r>
+            <a:r>
+              <a:rPr lang="en-GB" dirty="0">
+                <a:latin typeface="Helvetica Neue Thin" panose="020B0403020202020204" pitchFamily="34" charset="0"/>
+                <a:ea typeface="Helvetica Neue Thin" panose="020B0403020202020204" pitchFamily="34" charset="0"/>
+              </a:rPr>
+              <a:t>: 0.135, </a:t>
+            </a:r>
+            <a:r>
+              <a:rPr lang="en-GB" b="1" dirty="0">
+                <a:latin typeface="Helvetica Neue Thin" panose="020B0403020202020204" pitchFamily="34" charset="0"/>
+                <a:ea typeface="Helvetica Neue Thin" panose="020B0403020202020204" pitchFamily="34" charset="0"/>
+              </a:rPr>
+              <a:t>t1</a:t>
+            </a:r>
+            <a:r>
+              <a:rPr lang="en-GB" dirty="0">
+                <a:latin typeface="Helvetica Neue Thin" panose="020B0403020202020204" pitchFamily="34" charset="0"/>
+                <a:ea typeface="Helvetica Neue Thin" panose="020B0403020202020204" pitchFamily="34" charset="0"/>
+              </a:rPr>
+              <a:t>: 0.35; </a:t>
+            </a:r>
+            <a:r>
+              <a:rPr lang="en-GB" b="1" dirty="0">
+                <a:latin typeface="Helvetica Neue Thin" panose="020B0403020202020204" pitchFamily="34" charset="0"/>
+                <a:ea typeface="Helvetica Neue Thin" panose="020B0403020202020204" pitchFamily="34" charset="0"/>
+              </a:rPr>
+              <a:t>t2</a:t>
+            </a:r>
+            <a:r>
+              <a:rPr lang="en-GB" dirty="0">
+                <a:latin typeface="Helvetica Neue Thin" panose="020B0403020202020204" pitchFamily="34" charset="0"/>
+                <a:ea typeface="Helvetica Neue Thin" panose="020B0403020202020204" pitchFamily="34" charset="0"/>
+              </a:rPr>
+              <a:t>: 0.35; </a:t>
+            </a:r>
+            <a:r>
+              <a:rPr lang="en-GB" b="1" dirty="0">
+                <a:latin typeface="Helvetica Neue Thin" panose="020B0403020202020204" pitchFamily="34" charset="0"/>
+                <a:ea typeface="Helvetica Neue Thin" panose="020B0403020202020204" pitchFamily="34" charset="0"/>
+              </a:rPr>
+              <a:t>t4</a:t>
+            </a:r>
+            <a:r>
+              <a:rPr lang="en-GB" dirty="0">
+                <a:latin typeface="Helvetica Neue Thin" panose="020B0403020202020204" pitchFamily="34" charset="0"/>
+                <a:ea typeface="Helvetica Neue Thin" panose="020B0403020202020204" pitchFamily="34" charset="0"/>
+              </a:rPr>
+              <a:t>: 0.165]</a:t>
+            </a:r>
+          </a:p>
+          <a:p>
+            <a:endParaRPr lang="en-GB" dirty="0">
+              <a:latin typeface="Helvetica Neue Thin" panose="020B0403020202020204" pitchFamily="34" charset="0"/>
+              <a:ea typeface="Helvetica Neue Thin" panose="020B0403020202020204" pitchFamily="34" charset="0"/>
+            </a:endParaRPr>
+          </a:p>
+          <a:p>
+            <a:r>
+              <a:rPr lang="en-GB" dirty="0">
+                <a:latin typeface="Helvetica Neue Thin" panose="020B0403020202020204" pitchFamily="34" charset="0"/>
+                <a:ea typeface="Helvetica Neue Thin" panose="020B0403020202020204" pitchFamily="34" charset="0"/>
+              </a:rPr>
+              <a:t>Running the system gives:</a:t>
+            </a:r>
+          </a:p>
+          <a:p>
+            <a:r>
+              <a:rPr lang="en-FR" dirty="0">
+                <a:latin typeface="Helvetica Neue Thin" panose="020B0403020202020204" pitchFamily="34" charset="0"/>
+                <a:ea typeface="Helvetica Neue Thin" panose="020B0403020202020204" pitchFamily="34" charset="0"/>
+              </a:rPr>
+              <a:t>[</a:t>
+            </a:r>
+            <a:r>
               <a:rPr lang="en-FR" b="1" dirty="0">
                 <a:latin typeface="HELVETICA NEUE THIN" panose="020B0403020202020204" pitchFamily="34" charset="0"/>
                 <a:ea typeface="HELVETICA NEUE THIN" panose="020B0403020202020204" pitchFamily="34" charset="0"/>
               </a:rPr>
-              <a:t>Step 7: analyze the new data and go back to Step 5 if unsatisfied</a:t>
-            </a:r>
-          </a:p>
-          <a:p>
-            <a:endParaRPr lang="en-FR" b="1" dirty="0">
-              <a:latin typeface="HELVETICA NEUE THIN" panose="020B0403020202020204" pitchFamily="34" charset="0"/>
-              <a:ea typeface="HELVETICA NEUE THIN" panose="020B0403020202020204" pitchFamily="34" charset="0"/>
-            </a:endParaRPr>
-          </a:p>
-          <a:p>
-            <a:r>
-              <a:rPr lang="en-FR" b="1" dirty="0">
-                <a:latin typeface="Helvetica Neue Thin" panose="020B0403020202020204" pitchFamily="34" charset="0"/>
-                <a:ea typeface="Helvetica Neue Thin" panose="020B0403020202020204" pitchFamily="34" charset="0"/>
-              </a:rPr>
               <a:t>t</a:t>
             </a:r>
             <a:r>
@@ -5968,35 +6046,35 @@
                 <a:latin typeface="Helvetica Neue Thin" panose="020B0403020202020204" pitchFamily="34" charset="0"/>
                 <a:ea typeface="Helvetica Neue Thin" panose="020B0403020202020204" pitchFamily="34" charset="0"/>
               </a:rPr>
-              <a:t> went from </a:t>
+              <a:t>: 0.100, </a:t>
             </a:r>
             <a:r>
               <a:rPr lang="en-FR" b="1" dirty="0">
                 <a:latin typeface="HELVETICA NEUE THIN" panose="020B0403020202020204" pitchFamily="34" charset="0"/>
                 <a:ea typeface="HELVETICA NEUE THIN" panose="020B0403020202020204" pitchFamily="34" charset="0"/>
               </a:rPr>
-              <a:t>2%</a:t>
+              <a:t>t1</a:t>
             </a:r>
             <a:r>
               <a:rPr lang="en-FR" dirty="0">
                 <a:latin typeface="Helvetica Neue Thin" panose="020B0403020202020204" pitchFamily="34" charset="0"/>
                 <a:ea typeface="Helvetica Neue Thin" panose="020B0403020202020204" pitchFamily="34" charset="0"/>
               </a:rPr>
-              <a:t> to </a:t>
+              <a:t>: 0.400, </a:t>
             </a:r>
             <a:r>
               <a:rPr lang="en-FR" b="1" dirty="0">
                 <a:latin typeface="HELVETICA NEUE THIN" panose="020B0403020202020204" pitchFamily="34" charset="0"/>
                 <a:ea typeface="HELVETICA NEUE THIN" panose="020B0403020202020204" pitchFamily="34" charset="0"/>
               </a:rPr>
-              <a:t>12%</a:t>
+              <a:t>t2</a:t>
             </a:r>
             <a:r>
               <a:rPr lang="en-FR" dirty="0">
                 <a:latin typeface="Helvetica Neue Thin" panose="020B0403020202020204" pitchFamily="34" charset="0"/>
                 <a:ea typeface="Helvetica Neue Thin" panose="020B0403020202020204" pitchFamily="34" charset="0"/>
               </a:rPr>
-              <a:t>, and </a:t>
+              <a:t>: 0.400 , </a:t>
             </a:r>
             <a:r>
               <a:rPr lang="en-FR" b="1" dirty="0">
@@ -6010,63 +6088,7 @@
                 <a:latin typeface="Helvetica Neue Thin" panose="020B0403020202020204" pitchFamily="34" charset="0"/>
                 <a:ea typeface="Helvetica Neue Thin" panose="020B0403020202020204" pitchFamily="34" charset="0"/>
               </a:rPr>
-              <a:t> went from </a:t>
-            </a:r>
-            <a:r>
-              <a:rPr lang="en-FR" b="1" dirty="0">
-                <a:latin typeface="HELVETICA NEUE THIN" panose="020B0403020202020204" pitchFamily="34" charset="0"/>
-                <a:ea typeface="HELVETICA NEUE THIN" panose="020B0403020202020204" pitchFamily="34" charset="0"/>
-              </a:rPr>
-              <a:t>28%</a:t>
-            </a:r>
-            <a:r>
-              <a:rPr lang="en-FR" dirty="0">
-                <a:latin typeface="Helvetica Neue Thin" panose="020B0403020202020204" pitchFamily="34" charset="0"/>
-                <a:ea typeface="Helvetica Neue Thin" panose="020B0403020202020204" pitchFamily="34" charset="0"/>
-              </a:rPr>
-              <a:t> to </a:t>
-            </a:r>
-            <a:r>
-              <a:rPr lang="en-FR" b="1" dirty="0">
-                <a:latin typeface="HELVETICA NEUE THIN" panose="020B0403020202020204" pitchFamily="34" charset="0"/>
-                <a:ea typeface="HELVETICA NEUE THIN" panose="020B0403020202020204" pitchFamily="34" charset="0"/>
-              </a:rPr>
-              <a:t>5%</a:t>
-            </a:r>
-            <a:r>
-              <a:rPr lang="en-FR" dirty="0">
-                <a:latin typeface="Helvetica Neue Thin" panose="020B0403020202020204" pitchFamily="34" charset="0"/>
-                <a:ea typeface="Helvetica Neue Thin" panose="020B0403020202020204" pitchFamily="34" charset="0"/>
-              </a:rPr>
-              <a:t>. If the goal is to force the system to explore </a:t>
-            </a:r>
-            <a:r>
-              <a:rPr lang="en-FR" b="1" dirty="0">
-                <a:latin typeface="Helvetica Neue Thin" panose="020B0403020202020204" pitchFamily="34" charset="0"/>
-                <a:ea typeface="Helvetica Neue Thin" panose="020B0403020202020204" pitchFamily="34" charset="0"/>
-              </a:rPr>
-              <a:t>t</a:t>
-            </a:r>
-            <a:r>
-              <a:rPr lang="en-FR" dirty="0">
-                <a:latin typeface="Helvetica Neue Thin" panose="020B0403020202020204" pitchFamily="34" charset="0"/>
-                <a:ea typeface="Helvetica Neue Thin" panose="020B0403020202020204" pitchFamily="34" charset="0"/>
-              </a:rPr>
-              <a:t> more often, you can stop here. If the goal is to try to get the system to explore them equally, then you can go back </a:t>
-            </a:r>
-            <a:r>
-              <a:rPr lang="en-FR" b="1" dirty="0">
-                <a:latin typeface="Helvetica Neue Thin" panose="020B0403020202020204" pitchFamily="34" charset="0"/>
-                <a:ea typeface="Helvetica Neue Thin" panose="020B0403020202020204" pitchFamily="34" charset="0"/>
-              </a:rPr>
-              <a:t>to Step 5 </a:t>
-            </a:r>
-            <a:r>
-              <a:rPr lang="en-FR" dirty="0">
-                <a:latin typeface="Helvetica Neue Thin" panose="020B0403020202020204" pitchFamily="34" charset="0"/>
-                <a:ea typeface="Helvetica Neue Thin" panose="020B0403020202020204" pitchFamily="34" charset="0"/>
-              </a:rPr>
-              <a:t>and try again.</a:t>
+              <a:t>: 0.099] </a:t>
             </a:r>
           </a:p>
           <a:p>
@@ -6081,225 +6103,36 @@
                 <a:latin typeface="Helvetica Neue Thin" panose="020B0403020202020204" pitchFamily="34" charset="0"/>
                 <a:ea typeface="Helvetica Neue Thin" panose="020B0403020202020204" pitchFamily="34" charset="0"/>
               </a:rPr>
-              <a:t>For example if I now try a different proposal distribution:</a:t>
-            </a:r>
-          </a:p>
-          <a:p>
-            <a:r>
-              <a:rPr lang="en-GB" dirty="0">
-                <a:latin typeface="Helvetica Neue Thin" panose="020B0403020202020204" pitchFamily="34" charset="0"/>
-                <a:ea typeface="Helvetica Neue Thin" panose="020B0403020202020204" pitchFamily="34" charset="0"/>
-              </a:rPr>
-              <a:t>[</a:t>
-            </a:r>
-            <a:r>
-              <a:rPr lang="en-GB" b="1" dirty="0">
+              <a:t>So </a:t>
+            </a:r>
+            <a:r>
+              <a:rPr lang="en-FR" b="1" dirty="0">
                 <a:latin typeface="Helvetica Neue Thin" panose="020B0403020202020204" pitchFamily="34" charset="0"/>
                 <a:ea typeface="Helvetica Neue Thin" panose="020B0403020202020204" pitchFamily="34" charset="0"/>
               </a:rPr>
               <a:t>t</a:t>
             </a:r>
             <a:r>
-              <a:rPr lang="en-GB" dirty="0">
-                <a:latin typeface="Helvetica Neue Thin" panose="020B0403020202020204" pitchFamily="34" charset="0"/>
-                <a:ea typeface="Helvetica Neue Thin" panose="020B0403020202020204" pitchFamily="34" charset="0"/>
-              </a:rPr>
-              <a:t>: 0.135, </a:t>
-            </a:r>
-            <a:r>
-              <a:rPr lang="en-GB" b="1" dirty="0">
-                <a:latin typeface="Helvetica Neue Thin" panose="020B0403020202020204" pitchFamily="34" charset="0"/>
-                <a:ea typeface="Helvetica Neue Thin" panose="020B0403020202020204" pitchFamily="34" charset="0"/>
-              </a:rPr>
-              <a:t>t1</a:t>
-            </a:r>
-            <a:r>
-              <a:rPr lang="en-GB" dirty="0">
-                <a:latin typeface="Helvetica Neue Thin" panose="020B0403020202020204" pitchFamily="34" charset="0"/>
-                <a:ea typeface="Helvetica Neue Thin" panose="020B0403020202020204" pitchFamily="34" charset="0"/>
-              </a:rPr>
-              <a:t>: 0.35; </a:t>
-            </a:r>
-            <a:r>
-              <a:rPr lang="en-GB" b="1" dirty="0">
-                <a:latin typeface="Helvetica Neue Thin" panose="020B0403020202020204" pitchFamily="34" charset="0"/>
-                <a:ea typeface="Helvetica Neue Thin" panose="020B0403020202020204" pitchFamily="34" charset="0"/>
-              </a:rPr>
-              <a:t>t2</a:t>
-            </a:r>
-            <a:r>
-              <a:rPr lang="en-GB" dirty="0">
-                <a:latin typeface="Helvetica Neue Thin" panose="020B0403020202020204" pitchFamily="34" charset="0"/>
-                <a:ea typeface="Helvetica Neue Thin" panose="020B0403020202020204" pitchFamily="34" charset="0"/>
-              </a:rPr>
-              <a:t>: 0.35; </a:t>
-            </a:r>
-            <a:r>
-              <a:rPr lang="en-GB" b="1" dirty="0">
-                <a:latin typeface="Helvetica Neue Thin" panose="020B0403020202020204" pitchFamily="34" charset="0"/>
-                <a:ea typeface="Helvetica Neue Thin" panose="020B0403020202020204" pitchFamily="34" charset="0"/>
-              </a:rPr>
-              <a:t>t4</a:t>
-            </a:r>
-            <a:r>
-              <a:rPr lang="en-GB" dirty="0">
-                <a:latin typeface="Helvetica Neue Thin" panose="020B0403020202020204" pitchFamily="34" charset="0"/>
-                <a:ea typeface="Helvetica Neue Thin" panose="020B0403020202020204" pitchFamily="34" charset="0"/>
-              </a:rPr>
-              <a:t>: 0.165]</a:t>
-            </a:r>
-          </a:p>
-          <a:p>
-            <a:endParaRPr lang="en-GB" dirty="0">
-              <a:latin typeface="Helvetica Neue Thin" panose="020B0403020202020204" pitchFamily="34" charset="0"/>
-              <a:ea typeface="Helvetica Neue Thin" panose="020B0403020202020204" pitchFamily="34" charset="0"/>
-            </a:endParaRPr>
-          </a:p>
-          <a:p>
-            <a:r>
-              <a:rPr lang="en-GB" dirty="0">
-                <a:latin typeface="Helvetica Neue Thin" panose="020B0403020202020204" pitchFamily="34" charset="0"/>
-                <a:ea typeface="Helvetica Neue Thin" panose="020B0403020202020204" pitchFamily="34" charset="0"/>
-              </a:rPr>
-              <a:t>Running the system gives:</a:t>
-            </a:r>
-          </a:p>
-          <a:p>
-            <a:r>
               <a:rPr lang="en-FR" dirty="0">
                 <a:latin typeface="Helvetica Neue Thin" panose="020B0403020202020204" pitchFamily="34" charset="0"/>
                 <a:ea typeface="Helvetica Neue Thin" panose="020B0403020202020204" pitchFamily="34" charset="0"/>
               </a:rPr>
-              <a:t>[</a:t>
+              <a:t> and </a:t>
             </a:r>
             <a:r>
               <a:rPr lang="en-FR" b="1" dirty="0">
                 <a:latin typeface="HELVETICA NEUE THIN" panose="020B0403020202020204" pitchFamily="34" charset="0"/>
                 <a:ea typeface="HELVETICA NEUE THIN" panose="020B0403020202020204" pitchFamily="34" charset="0"/>
               </a:rPr>
-              <a:t>t</a:t>
+              <a:t>t4</a:t>
             </a:r>
             <a:r>
               <a:rPr lang="en-FR" dirty="0">
                 <a:latin typeface="Helvetica Neue Thin" panose="020B0403020202020204" pitchFamily="34" charset="0"/>
                 <a:ea typeface="Helvetica Neue Thin" panose="020B0403020202020204" pitchFamily="34" charset="0"/>
               </a:rPr>
-              <a:t>:</a:t>
-            </a:r>
-            <a:r>
-              <a:rPr lang="en-FR" dirty="0">
-                <a:latin typeface="Helvetica Neue Thin" panose="020B0403020202020204" pitchFamily="34" charset="0"/>
-                <a:ea typeface="Helvetica Neue Thin" panose="020B0403020202020204" pitchFamily="34" charset="0"/>
-              </a:rPr>
-              <a:t> </a:t>
-            </a:r>
-            <a:r>
-              <a:rPr lang="en-FR" dirty="0">
-                <a:latin typeface="Helvetica Neue Thin" panose="020B0403020202020204" pitchFamily="34" charset="0"/>
-                <a:ea typeface="Helvetica Neue Thin" panose="020B0403020202020204" pitchFamily="34" charset="0"/>
-              </a:rPr>
-              <a:t>0.100, </a:t>
-            </a:r>
-            <a:r>
-              <a:rPr lang="en-FR" b="1" dirty="0">
-                <a:latin typeface="HELVETICA NEUE THIN" panose="020B0403020202020204" pitchFamily="34" charset="0"/>
-                <a:ea typeface="HELVETICA NEUE THIN" panose="020B0403020202020204" pitchFamily="34" charset="0"/>
-              </a:rPr>
-              <a:t>t1</a:t>
-            </a:r>
-            <a:r>
-              <a:rPr lang="en-FR" dirty="0">
-                <a:latin typeface="Helvetica Neue Thin" panose="020B0403020202020204" pitchFamily="34" charset="0"/>
-                <a:ea typeface="Helvetica Neue Thin" panose="020B0403020202020204" pitchFamily="34" charset="0"/>
-              </a:rPr>
-              <a:t>: 0.400, </a:t>
-            </a:r>
-            <a:r>
-              <a:rPr lang="en-FR" b="1" dirty="0">
-                <a:latin typeface="HELVETICA NEUE THIN" panose="020B0403020202020204" pitchFamily="34" charset="0"/>
-                <a:ea typeface="HELVETICA NEUE THIN" panose="020B0403020202020204" pitchFamily="34" charset="0"/>
-              </a:rPr>
-              <a:t>t2</a:t>
-            </a:r>
-            <a:r>
-              <a:rPr lang="en-FR" dirty="0">
-                <a:latin typeface="Helvetica Neue Thin" panose="020B0403020202020204" pitchFamily="34" charset="0"/>
-                <a:ea typeface="Helvetica Neue Thin" panose="020B0403020202020204" pitchFamily="34" charset="0"/>
-              </a:rPr>
-              <a:t>: 0.400 </a:t>
-            </a:r>
-            <a:r>
-              <a:rPr lang="en-FR" dirty="0">
-                <a:latin typeface="Helvetica Neue Thin" panose="020B0403020202020204" pitchFamily="34" charset="0"/>
-                <a:ea typeface="Helvetica Neue Thin" panose="020B0403020202020204" pitchFamily="34" charset="0"/>
-              </a:rPr>
-              <a:t>, </a:t>
-            </a:r>
-            <a:r>
-              <a:rPr lang="en-FR" b="1" dirty="0">
-                <a:latin typeface="HELVETICA NEUE THIN" panose="020B0403020202020204" pitchFamily="34" charset="0"/>
-                <a:ea typeface="HELVETICA NEUE THIN" panose="020B0403020202020204" pitchFamily="34" charset="0"/>
-              </a:rPr>
-              <a:t>t4</a:t>
-            </a:r>
-            <a:r>
-              <a:rPr lang="en-FR" dirty="0">
-                <a:latin typeface="Helvetica Neue Thin" panose="020B0403020202020204" pitchFamily="34" charset="0"/>
-                <a:ea typeface="Helvetica Neue Thin" panose="020B0403020202020204" pitchFamily="34" charset="0"/>
-              </a:rPr>
-              <a:t>: 0.099] </a:t>
-            </a:r>
-            <a:endParaRPr lang="en-FR" dirty="0">
-              <a:latin typeface="Helvetica Neue Thin" panose="020B0403020202020204" pitchFamily="34" charset="0"/>
-              <a:ea typeface="Helvetica Neue Thin" panose="020B0403020202020204" pitchFamily="34" charset="0"/>
-            </a:endParaRPr>
-          </a:p>
-          <a:p>
-            <a:endParaRPr lang="en-FR" dirty="0">
-              <a:latin typeface="Helvetica Neue Thin" panose="020B0403020202020204" pitchFamily="34" charset="0"/>
-              <a:ea typeface="Helvetica Neue Thin" panose="020B0403020202020204" pitchFamily="34" charset="0"/>
-            </a:endParaRPr>
-          </a:p>
-          <a:p>
-            <a:r>
-              <a:rPr lang="en-FR" dirty="0">
-                <a:latin typeface="Helvetica Neue Thin" panose="020B0403020202020204" pitchFamily="34" charset="0"/>
-                <a:ea typeface="Helvetica Neue Thin" panose="020B0403020202020204" pitchFamily="34" charset="0"/>
-              </a:rPr>
-              <a:t>So </a:t>
-            </a:r>
-            <a:r>
-              <a:rPr lang="en-FR" b="1" dirty="0">
-                <a:latin typeface="Helvetica Neue Thin" panose="020B0403020202020204" pitchFamily="34" charset="0"/>
-                <a:ea typeface="Helvetica Neue Thin" panose="020B0403020202020204" pitchFamily="34" charset="0"/>
-              </a:rPr>
-              <a:t>t</a:t>
-            </a:r>
-            <a:r>
-              <a:rPr lang="en-FR" dirty="0">
-                <a:latin typeface="Helvetica Neue Thin" panose="020B0403020202020204" pitchFamily="34" charset="0"/>
-                <a:ea typeface="Helvetica Neue Thin" panose="020B0403020202020204" pitchFamily="34" charset="0"/>
-              </a:rPr>
-              <a:t> and </a:t>
-            </a:r>
-            <a:r>
-              <a:rPr lang="en-FR" b="1" dirty="0">
-                <a:latin typeface="HELVETICA NEUE THIN" panose="020B0403020202020204" pitchFamily="34" charset="0"/>
-                <a:ea typeface="HELVETICA NEUE THIN" panose="020B0403020202020204" pitchFamily="34" charset="0"/>
-              </a:rPr>
-              <a:t>t4</a:t>
-            </a:r>
-            <a:r>
-              <a:rPr lang="en-FR" dirty="0">
-                <a:latin typeface="Helvetica Neue Thin" panose="020B0403020202020204" pitchFamily="34" charset="0"/>
-                <a:ea typeface="Helvetica Neue Thin" panose="020B0403020202020204" pitchFamily="34" charset="0"/>
-              </a:rPr>
               <a:t> now appear (more or less) equally. </a:t>
             </a:r>
-            <a:endParaRPr lang="en-FR" dirty="0">
-              <a:latin typeface="Helvetica Neue Thin" panose="020B0403020202020204" pitchFamily="34" charset="0"/>
-              <a:ea typeface="Helvetica Neue Thin" panose="020B0403020202020204" pitchFamily="34" charset="0"/>
-            </a:endParaRPr>
           </a:p>
         </p:txBody>
       </p:sp>
@@ -6623,10 +6456,6 @@
               </a:rPr>
               <a:t>More detailed explanations</a:t>
             </a:r>
-            <a:endParaRPr lang="en-FR" dirty="0">
-              <a:latin typeface="Helvetica Neue Thin" panose="020B0403020202020204" pitchFamily="34" charset="0"/>
-              <a:ea typeface="Helvetica Neue Thin" panose="020B0403020202020204" pitchFamily="34" charset="0"/>
-            </a:endParaRPr>
           </a:p>
         </p:txBody>
       </p:sp>
@@ -6741,26 +6570,8 @@
                 <a:latin typeface="Helvetica Neue Thin" panose="020B0403020202020204" pitchFamily="34" charset="0"/>
                 <a:ea typeface="Helvetica Neue Thin" panose="020B0403020202020204" pitchFamily="34" charset="0"/>
               </a:rPr>
-              <a:t> Markov chain describes a system that transitions between different </a:t>
-            </a:r>
-            <a:r>
-              <a:rPr lang="en-FR" dirty="0">
-                <a:latin typeface="Helvetica Neue Thin" panose="020B0403020202020204" pitchFamily="34" charset="0"/>
-                <a:ea typeface="Helvetica Neue Thin" panose="020B0403020202020204" pitchFamily="34" charset="0"/>
-              </a:rPr>
-              <a:t>states, where transitioning </a:t>
-            </a:r>
-            <a:r>
-              <a:rPr lang="en-FR" dirty="0">
-                <a:latin typeface="Helvetica Neue Thin" panose="020B0403020202020204" pitchFamily="34" charset="0"/>
-                <a:ea typeface="Helvetica Neue Thin" panose="020B0403020202020204" pitchFamily="34" charset="0"/>
-              </a:rPr>
-              <a:t>to the next state depends only on the current state.</a:t>
-            </a:r>
-            <a:endParaRPr lang="en-FR" dirty="0">
-              <a:latin typeface="Helvetica Neue Thin" panose="020B0403020202020204" pitchFamily="34" charset="0"/>
-              <a:ea typeface="Helvetica Neue Thin" panose="020B0403020202020204" pitchFamily="34" charset="0"/>
-            </a:endParaRPr>
+              <a:t> Markov chain describes a system that transitions between different states, where transitioning to the next state depends only on the current state.</a:t>
+            </a:r>
           </a:p>
           <a:p>
             <a:endParaRPr lang="en-FR" dirty="0">
@@ -6975,10 +6786,6 @@
               </a:rPr>
               <a:t>Markov Chain Monte Carlo (MCMC)</a:t>
             </a:r>
-            <a:endParaRPr lang="en-FR" sz="2000" dirty="0">
-              <a:latin typeface="Helvetica Neue Thin" panose="020B0403020202020204" pitchFamily="34" charset="0"/>
-              <a:ea typeface="Helvetica Neue Thin" panose="020B0403020202020204" pitchFamily="34" charset="0"/>
-            </a:endParaRPr>
           </a:p>
         </p:txBody>
       </p:sp>
@@ -7216,21 +7023,7 @@
                 <a:latin typeface="Helvetica Neue Thin" panose="020B0403020202020204" pitchFamily="34" charset="0"/>
                 <a:ea typeface="Helvetica Neue Thin" panose="020B0403020202020204" pitchFamily="34" charset="0"/>
               </a:rPr>
-              <a:t>: a pre-run graph would have each transition following every other transition</a:t>
-            </a:r>
-            <a:r>
-              <a:rPr lang="en-FR" dirty="0">
-                <a:latin typeface="Helvetica Neue Thin" panose="020B0403020202020204" pitchFamily="34" charset="0"/>
-                <a:ea typeface="Helvetica Neue Thin" panose="020B0403020202020204" pitchFamily="34" charset="0"/>
-              </a:rPr>
-              <a:t>, since you could expect this to be true </a:t>
-            </a:r>
-            <a:r>
-              <a:rPr lang="en-FR" dirty="0">
-                <a:latin typeface="Helvetica Neue Thin" panose="020B0403020202020204" pitchFamily="34" charset="0"/>
-                <a:ea typeface="Helvetica Neue Thin" panose="020B0403020202020204" pitchFamily="34" charset="0"/>
-              </a:rPr>
-              <a:t>[could probably run a static analysis to see if some transitions openly contradict some guards to filter out edges without having to run Cubicle]</a:t>
+              <a:t>: a pre-run graph would have each transition following every other transition, since you could expect this to be true [could probably run a static analysis to see if some transitions openly contradict some guards to filter out edges without having to run Cubicle]</a:t>
             </a:r>
           </a:p>
           <a:p>
@@ -7438,14 +7231,7 @@
                 <a:latin typeface="Helvetica Neue Thin" panose="020B0403020202020204" pitchFamily="34" charset="0"/>
                 <a:ea typeface="Helvetica Neue Thin" panose="020B0403020202020204" pitchFamily="34" charset="0"/>
               </a:rPr>
-              <a:t>Expectation:                                                        Reality</a:t>
-            </a:r>
-            <a:r>
-              <a:rPr lang="en-FR" dirty="0">
-                <a:latin typeface="Helvetica Neue Thin" panose="020B0403020202020204" pitchFamily="34" charset="0"/>
-                <a:ea typeface="Helvetica Neue Thin" panose="020B0403020202020204" pitchFamily="34" charset="0"/>
-              </a:rPr>
-              <a:t>:</a:t>
+              <a:t>Expectation:                                                        Reality:</a:t>
             </a:r>
           </a:p>
         </p:txBody>
@@ -9873,14 +9659,7 @@
                 <a:latin typeface="Helvetica Neue Thin" panose="020B0403020202020204" pitchFamily="34" charset="0"/>
                 <a:ea typeface="Helvetica Neue Thin" panose="020B0403020202020204" pitchFamily="34" charset="0"/>
               </a:rPr>
-              <a:t>In reality</a:t>
-            </a:r>
-            <a:r>
-              <a:rPr lang="en-GB" dirty="0">
-                <a:latin typeface="Helvetica Neue Thin" panose="020B0403020202020204" pitchFamily="34" charset="0"/>
-                <a:ea typeface="Helvetica Neue Thin" panose="020B0403020202020204" pitchFamily="34" charset="0"/>
-              </a:rPr>
-              <a:t>, there is a </a:t>
+              <a:t>In reality, there is a </a:t>
             </a:r>
             <a:r>
               <a:rPr lang="en-GB" b="1" dirty="0">
@@ -10310,7 +10089,16 @@
                 <a:ea typeface="Helvetica Neue Thin" panose="020B0403020202020204" pitchFamily="34" charset="0"/>
                 <a:cs typeface="Times New Roman" panose="02020603050405020304" pitchFamily="18" charset="0"/>
               </a:rPr>
-              <a:t>Run Cubicle forward to explore </a:t>
+              <a:t>Run Cubicle forward to explore the model </a:t>
+            </a:r>
+            <a:r>
+              <a:rPr lang="en-US" sz="1800" strike="sngStrike" dirty="0">
+                <a:effectLst/>
+                <a:latin typeface="Helvetica Neue Thin" panose="020B0403020202020204" pitchFamily="34" charset="0"/>
+                <a:ea typeface="Helvetica Neue Thin" panose="020B0403020202020204" pitchFamily="34" charset="0"/>
+                <a:cs typeface="Times New Roman" panose="02020603050405020304" pitchFamily="18" charset="0"/>
+              </a:rPr>
+              <a:t>evenly</a:t>
             </a:r>
             <a:r>
               <a:rPr lang="en-US" sz="1800" dirty="0">
@@ -10319,32 +10107,8 @@
                 <a:ea typeface="Helvetica Neue Thin" panose="020B0403020202020204" pitchFamily="34" charset="0"/>
                 <a:cs typeface="Times New Roman" panose="02020603050405020304" pitchFamily="18" charset="0"/>
               </a:rPr>
-              <a:t>the model </a:t>
-            </a:r>
-            <a:r>
-              <a:rPr lang="en-US" sz="1800" strike="sngStrike" dirty="0">
-                <a:effectLst/>
-                <a:latin typeface="Helvetica Neue Thin" panose="020B0403020202020204" pitchFamily="34" charset="0"/>
-                <a:ea typeface="Helvetica Neue Thin" panose="020B0403020202020204" pitchFamily="34" charset="0"/>
-                <a:cs typeface="Times New Roman" panose="02020603050405020304" pitchFamily="18" charset="0"/>
-              </a:rPr>
-              <a:t>evenly</a:t>
-            </a:r>
-            <a:r>
-              <a:rPr lang="en-US" sz="1800" dirty="0">
-                <a:effectLst/>
-                <a:latin typeface="Helvetica Neue Thin" panose="020B0403020202020204" pitchFamily="34" charset="0"/>
-                <a:ea typeface="Helvetica Neue Thin" panose="020B0403020202020204" pitchFamily="34" charset="0"/>
-                <a:cs typeface="Times New Roman" panose="02020603050405020304" pitchFamily="18" charset="0"/>
-              </a:rPr>
               <a:t>.</a:t>
             </a:r>
-            <a:endParaRPr lang="en-US" sz="1800" dirty="0">
-              <a:effectLst/>
-              <a:latin typeface="Helvetica Neue Thin" panose="020B0403020202020204" pitchFamily="34" charset="0"/>
-              <a:ea typeface="Helvetica Neue Thin" panose="020B0403020202020204" pitchFamily="34" charset="0"/>
-              <a:cs typeface="Times New Roman" panose="02020603050405020304" pitchFamily="18" charset="0"/>
-            </a:endParaRPr>
           </a:p>
           <a:p>
             <a:endParaRPr lang="en-US" sz="800" dirty="0">
@@ -10370,16 +10134,7 @@
                 <a:ea typeface="Helvetica Neue Thin" panose="020B0403020202020204" pitchFamily="34" charset="0"/>
                 <a:cs typeface="Times New Roman" panose="02020603050405020304" pitchFamily="18" charset="0"/>
               </a:rPr>
-              <a:t>f a behavior that leads to a transition is rare then a simple random generation might not go that way enough times. The exploration </a:t>
-            </a:r>
-            <a:r>
-              <a:rPr lang="en-US" sz="1800" dirty="0">
-                <a:effectLst/>
-                <a:latin typeface="Helvetica Neue Thin" panose="020B0403020202020204" pitchFamily="34" charset="0"/>
-                <a:ea typeface="Helvetica Neue Thin" panose="020B0403020202020204" pitchFamily="34" charset="0"/>
-                <a:cs typeface="Times New Roman" panose="02020603050405020304" pitchFamily="18" charset="0"/>
-              </a:rPr>
-              <a:t>is uneven. </a:t>
+              <a:t>f a behavior that leads to a transition is rare then a simple random generation might not go that way enough times. The exploration is uneven. </a:t>
             </a:r>
             <a:endParaRPr lang="en-FR" sz="1800" dirty="0">
               <a:effectLst/>
@@ -10432,14 +10187,6 @@
               </a:rPr>
               <a:t>Running example: cascading if </a:t>
             </a:r>
-            <a:endParaRPr lang="en-FR" dirty="0">
-              <a:solidFill>
-                <a:srgbClr val="00B050"/>
-              </a:solidFill>
-              <a:latin typeface="Helvetica Neue Thin" panose="020B0403020202020204" pitchFamily="34" charset="0"/>
-              <a:ea typeface="Helvetica Neue Thin" panose="020B0403020202020204" pitchFamily="34" charset="0"/>
-              <a:cs typeface="Helvetica Neue" panose="02000503000000020004" pitchFamily="2" charset="0"/>
-            </a:endParaRPr>
           </a:p>
         </p:txBody>
       </p:sp>
@@ -11207,10 +10954,6 @@
               </a:rPr>
               <a:t>diversly</a:t>
             </a:r>
-            <a:endParaRPr lang="en-FR" dirty="0">
-              <a:latin typeface="Helvetica Neue Thin" panose="020B0403020202020204" pitchFamily="34" charset="0"/>
-              <a:ea typeface="Helvetica Neue Thin" panose="020B0403020202020204" pitchFamily="34" charset="0"/>
-            </a:endParaRPr>
           </a:p>
         </p:txBody>
       </p:sp>
@@ -12177,14 +11920,7 @@
                 <a:latin typeface="Helvetica Neue Thin" panose="020B0403020202020204" pitchFamily="34" charset="0"/>
                 <a:ea typeface="Helvetica Neue Thin" panose="020B0403020202020204" pitchFamily="34" charset="0"/>
               </a:rPr>
-              <a:t>in the running example, after a test-run (1 000 </a:t>
-            </a:r>
-            <a:r>
-              <a:rPr lang="en-FR" dirty="0">
-                <a:latin typeface="Helvetica Neue Thin" panose="020B0403020202020204" pitchFamily="34" charset="0"/>
-                <a:ea typeface="Helvetica Neue Thin" panose="020B0403020202020204" pitchFamily="34" charset="0"/>
-              </a:rPr>
-              <a:t>000 Monte Carlo steps)</a:t>
+              <a:t>in the running example, after a test-run (1 000 000 Monte Carlo steps)</a:t>
             </a:r>
           </a:p>
           <a:p>
@@ -12417,30 +12153,16 @@
                 <a:latin typeface="Helvetica Neue Thin" panose="020B0403020202020204" pitchFamily="34" charset="0"/>
                 <a:ea typeface="Helvetica Neue Thin" panose="020B0403020202020204" pitchFamily="34" charset="0"/>
               </a:rPr>
-              <a:t>(highlighted in red</a:t>
-            </a:r>
+              <a:t>(highlighted in red) </a:t>
+            </a:r>
+          </a:p>
+          <a:p>
             <a:r>
               <a:rPr lang="en-FR" dirty="0">
                 <a:latin typeface="Helvetica Neue Thin" panose="020B0403020202020204" pitchFamily="34" charset="0"/>
                 <a:ea typeface="Helvetica Neue Thin" panose="020B0403020202020204" pitchFamily="34" charset="0"/>
               </a:rPr>
-              <a:t>) </a:t>
-            </a:r>
-          </a:p>
-          <a:p>
-            <a:r>
-              <a:rPr lang="en-FR" dirty="0">
-                <a:latin typeface="Helvetica Neue Thin" panose="020B0403020202020204" pitchFamily="34" charset="0"/>
-                <a:ea typeface="Helvetica Neue Thin" panose="020B0403020202020204" pitchFamily="34" charset="0"/>
-              </a:rPr>
-              <a:t>The </a:t>
-            </a:r>
-            <a:r>
-              <a:rPr lang="en-FR" dirty="0">
-                <a:latin typeface="Helvetica Neue Thin" panose="020B0403020202020204" pitchFamily="34" charset="0"/>
-                <a:ea typeface="Helvetica Neue Thin" panose="020B0403020202020204" pitchFamily="34" charset="0"/>
-              </a:rPr>
-              <a:t>probability of a sequence </a:t>
+              <a:t>The probability of a sequence </a:t>
             </a:r>
             <a:r>
               <a:rPr lang="en-FR" dirty="0">
@@ -12996,8 +12718,8 @@
           <a:chExt cx="0" cy="0"/>
         </a:xfrm>
       </p:grpSpPr>
-      <mc:AlternateContent xmlns:mc="http://schemas.openxmlformats.org/markup-compatibility/2006">
-        <mc:Choice xmlns:a14="http://schemas.microsoft.com/office/drawing/2010/main" Requires="a14">
+      <mc:AlternateContent xmlns:mc="http://schemas.openxmlformats.org/markup-compatibility/2006" xmlns:a14="http://schemas.microsoft.com/office/drawing/2010/main">
+        <mc:Choice Requires="a14">
           <p:sp>
             <p:nvSpPr>
               <p:cNvPr id="2" name="TextBox 1">
@@ -13130,7 +12852,7 @@
                       <m:naryPr>
                         <m:chr m:val="∑"/>
                         <m:ctrlPr>
-                          <a:rPr lang="en-GB" smtClean="0">
+                          <a:rPr lang="en-GB" i="1" smtClean="0">
                             <a:solidFill>
                               <a:srgbClr val="0070C0"/>
                             </a:solidFill>
@@ -13180,7 +12902,7 @@
                         <m:sSub>
                           <m:sSubPr>
                             <m:ctrlPr>
-                              <a:rPr lang="en-GB" smtClean="0">
+                              <a:rPr lang="en-GB" i="1" smtClean="0">
                                 <a:solidFill>
                                   <a:srgbClr val="0070C0"/>
                                 </a:solidFill>
@@ -13229,7 +12951,7 @@
                         <m:func>
                           <m:funcPr>
                             <m:ctrlPr>
-                              <a:rPr lang="en-US" smtClean="0">
+                              <a:rPr lang="en-US" i="1" smtClean="0">
                                 <a:solidFill>
                                   <a:srgbClr val="0070C0"/>
                                 </a:solidFill>
@@ -13241,7 +12963,7 @@
                             <m:sSub>
                               <m:sSubPr>
                                 <m:ctrlPr>
-                                  <a:rPr lang="en-US" smtClean="0">
+                                  <a:rPr lang="en-US" i="1" smtClean="0">
                                     <a:solidFill>
                                       <a:srgbClr val="0070C0"/>
                                     </a:solidFill>
@@ -13280,7 +13002,7 @@
                             <m:sSub>
                               <m:sSubPr>
                                 <m:ctrlPr>
-                                  <a:rPr lang="en-US" smtClean="0">
+                                  <a:rPr lang="en-US" i="1" smtClean="0">
                                     <a:solidFill>
                                       <a:srgbClr val="0070C0"/>
                                     </a:solidFill>
@@ -13348,7 +13070,7 @@
             </p:txBody>
           </p:sp>
         </mc:Choice>
-        <mc:Fallback>
+        <mc:Fallback xmlns="">
           <p:sp>
             <p:nvSpPr>
               <p:cNvPr id="2" name="TextBox 1">
@@ -13925,8 +13647,8 @@
           </a:fontRef>
         </p:style>
       </p:cxnSp>
-      <mc:AlternateContent xmlns:mc="http://schemas.openxmlformats.org/markup-compatibility/2006">
-        <mc:Choice xmlns:a14="http://schemas.microsoft.com/office/drawing/2010/main" Requires="a14">
+      <mc:AlternateContent xmlns:mc="http://schemas.openxmlformats.org/markup-compatibility/2006" xmlns:a14="http://schemas.microsoft.com/office/drawing/2010/main">
+        <mc:Choice Requires="a14">
           <p:sp>
             <p:nvSpPr>
               <p:cNvPr id="44" name="TextBox 43">
@@ -13983,7 +13705,7 @@
                       <m:func>
                         <m:funcPr>
                           <m:ctrlPr>
-                            <a:rPr lang="en-GB" sz="1400" smtClean="0">
+                            <a:rPr lang="en-GB" sz="1400" i="1" smtClean="0">
                               <a:latin typeface="Cambria Math" panose="02040503050406030204" pitchFamily="18" charset="0"/>
                             </a:rPr>
                           </m:ctrlPr>
@@ -14000,7 +13722,7 @@
                           <m:d>
                             <m:dPr>
                               <m:ctrlPr>
-                                <a:rPr lang="en-US" sz="1400" smtClean="0">
+                                <a:rPr lang="en-US" sz="1400" i="1" smtClean="0">
                                   <a:latin typeface="Cambria Math" panose="02040503050406030204" pitchFamily="18" charset="0"/>
                                 </a:rPr>
                               </m:ctrlPr>
@@ -14009,7 +13731,7 @@
                               <m:f>
                                 <m:fPr>
                                   <m:ctrlPr>
-                                    <a:rPr lang="en-US" sz="1400" smtClean="0">
+                                    <a:rPr lang="en-US" sz="1400" i="1" smtClean="0">
                                       <a:latin typeface="Cambria Math" panose="02040503050406030204" pitchFamily="18" charset="0"/>
                                     </a:rPr>
                                   </m:ctrlPr>
@@ -14034,7 +13756,7 @@
                               <m:func>
                                 <m:funcPr>
                                   <m:ctrlPr>
-                                    <a:rPr lang="en-US" sz="1400" smtClean="0">
+                                    <a:rPr lang="en-US" sz="1400" i="1" smtClean="0">
                                       <a:latin typeface="Cambria Math" panose="02040503050406030204" pitchFamily="18" charset="0"/>
                                     </a:rPr>
                                   </m:ctrlPr>
@@ -14043,7 +13765,7 @@
                                   <m:sSub>
                                     <m:sSubPr>
                                       <m:ctrlPr>
-                                        <a:rPr lang="en-US" sz="1400" smtClean="0">
+                                        <a:rPr lang="en-US" sz="1400" i="1" smtClean="0">
                                           <a:latin typeface="Cambria Math" panose="02040503050406030204" pitchFamily="18" charset="0"/>
                                         </a:rPr>
                                       </m:ctrlPr>
@@ -14073,7 +13795,7 @@
                                   <m:f>
                                     <m:fPr>
                                       <m:ctrlPr>
-                                        <a:rPr lang="en-US" sz="1400" smtClean="0">
+                                        <a:rPr lang="en-US" sz="1400" i="1" smtClean="0">
                                           <a:latin typeface="Cambria Math" panose="02040503050406030204" pitchFamily="18" charset="0"/>
                                         </a:rPr>
                                       </m:ctrlPr>
@@ -14114,7 +13836,7 @@
                           <m:func>
                             <m:funcPr>
                               <m:ctrlPr>
-                                <a:rPr lang="en-US" sz="1400" smtClean="0">
+                                <a:rPr lang="en-US" sz="1400" i="1" smtClean="0">
                                   <a:latin typeface="Cambria Math" panose="02040503050406030204" pitchFamily="18" charset="0"/>
                                 </a:rPr>
                               </m:ctrlPr>
@@ -14123,7 +13845,7 @@
                               <m:sSub>
                                 <m:sSubPr>
                                   <m:ctrlPr>
-                                    <a:rPr lang="en-US" sz="1400" smtClean="0">
+                                    <a:rPr lang="en-US" sz="1400" i="1" smtClean="0">
                                       <a:latin typeface="Cambria Math" panose="02040503050406030204" pitchFamily="18" charset="0"/>
                                     </a:rPr>
                                   </m:ctrlPr>
@@ -14178,7 +13900,7 @@
             </p:txBody>
           </p:sp>
         </mc:Choice>
-        <mc:Fallback>
+        <mc:Fallback xmlns="">
           <p:sp>
             <p:nvSpPr>
               <p:cNvPr id="44" name="TextBox 43">
@@ -14223,8 +13945,8 @@
           </p:sp>
         </mc:Fallback>
       </mc:AlternateContent>
-      <mc:AlternateContent xmlns:mc="http://schemas.openxmlformats.org/markup-compatibility/2006">
-        <mc:Choice xmlns:a14="http://schemas.microsoft.com/office/drawing/2010/main" Requires="a14">
+      <mc:AlternateContent xmlns:mc="http://schemas.openxmlformats.org/markup-compatibility/2006" xmlns:a14="http://schemas.microsoft.com/office/drawing/2010/main">
+        <mc:Choice Requires="a14">
           <p:sp>
             <p:nvSpPr>
               <p:cNvPr id="45" name="TextBox 44">
@@ -14281,7 +14003,7 @@
                       <m:func>
                         <m:funcPr>
                           <m:ctrlPr>
-                            <a:rPr lang="en-GB" sz="1400" smtClean="0">
+                            <a:rPr lang="en-GB" sz="1400" i="1" smtClean="0">
                               <a:latin typeface="Cambria Math" panose="02040503050406030204" pitchFamily="18" charset="0"/>
                             </a:rPr>
                           </m:ctrlPr>
@@ -14298,7 +14020,7 @@
                           <m:d>
                             <m:dPr>
                               <m:ctrlPr>
-                                <a:rPr lang="en-US" sz="1400" smtClean="0">
+                                <a:rPr lang="en-US" sz="1400" i="1" smtClean="0">
                                   <a:latin typeface="Cambria Math" panose="02040503050406030204" pitchFamily="18" charset="0"/>
                                 </a:rPr>
                               </m:ctrlPr>
@@ -14307,7 +14029,7 @@
                               <m:f>
                                 <m:fPr>
                                   <m:ctrlPr>
-                                    <a:rPr lang="en-US" sz="1400" smtClean="0">
+                                    <a:rPr lang="en-US" sz="1400" i="1" smtClean="0">
                                       <a:latin typeface="Cambria Math" panose="02040503050406030204" pitchFamily="18" charset="0"/>
                                     </a:rPr>
                                   </m:ctrlPr>
@@ -14332,7 +14054,7 @@
                               <m:func>
                                 <m:funcPr>
                                   <m:ctrlPr>
-                                    <a:rPr lang="en-US" sz="1400" smtClean="0">
+                                    <a:rPr lang="en-US" sz="1400" i="1" smtClean="0">
                                       <a:latin typeface="Cambria Math" panose="02040503050406030204" pitchFamily="18" charset="0"/>
                                     </a:rPr>
                                   </m:ctrlPr>
@@ -14341,7 +14063,7 @@
                                   <m:sSub>
                                     <m:sSubPr>
                                       <m:ctrlPr>
-                                        <a:rPr lang="en-US" sz="1400" smtClean="0">
+                                        <a:rPr lang="en-US" sz="1400" i="1" smtClean="0">
                                           <a:latin typeface="Cambria Math" panose="02040503050406030204" pitchFamily="18" charset="0"/>
                                         </a:rPr>
                                       </m:ctrlPr>
@@ -14371,7 +14093,7 @@
                                   <m:f>
                                     <m:fPr>
                                       <m:ctrlPr>
-                                        <a:rPr lang="en-US" sz="1400" smtClean="0">
+                                        <a:rPr lang="en-US" sz="1400" i="1" smtClean="0">
                                           <a:latin typeface="Cambria Math" panose="02040503050406030204" pitchFamily="18" charset="0"/>
                                         </a:rPr>
                                       </m:ctrlPr>
@@ -14412,7 +14134,7 @@
                           <m:func>
                             <m:funcPr>
                               <m:ctrlPr>
-                                <a:rPr lang="en-US" sz="1400" smtClean="0">
+                                <a:rPr lang="en-US" sz="1400" i="1" smtClean="0">
                                   <a:latin typeface="Cambria Math" panose="02040503050406030204" pitchFamily="18" charset="0"/>
                                 </a:rPr>
                               </m:ctrlPr>
@@ -14421,7 +14143,7 @@
                               <m:sSub>
                                 <m:sSubPr>
                                   <m:ctrlPr>
-                                    <a:rPr lang="en-US" sz="1400" smtClean="0">
+                                    <a:rPr lang="en-US" sz="1400" i="1" smtClean="0">
                                       <a:latin typeface="Cambria Math" panose="02040503050406030204" pitchFamily="18" charset="0"/>
                                     </a:rPr>
                                   </m:ctrlPr>
@@ -14476,7 +14198,7 @@
             </p:txBody>
           </p:sp>
         </mc:Choice>
-        <mc:Fallback>
+        <mc:Fallback xmlns="">
           <p:sp>
             <p:nvSpPr>
               <p:cNvPr id="45" name="TextBox 44">
@@ -15003,8 +14725,8 @@
           </a:fontRef>
         </p:style>
       </p:cxnSp>
-      <mc:AlternateContent xmlns:mc="http://schemas.openxmlformats.org/markup-compatibility/2006">
-        <mc:Choice xmlns:a14="http://schemas.microsoft.com/office/drawing/2010/main" Requires="a14">
+      <mc:AlternateContent xmlns:mc="http://schemas.openxmlformats.org/markup-compatibility/2006" xmlns:a14="http://schemas.microsoft.com/office/drawing/2010/main">
+        <mc:Choice Requires="a14">
           <p:sp>
             <p:nvSpPr>
               <p:cNvPr id="64" name="TextBox 63">
@@ -15053,7 +14775,7 @@
                       <m:func>
                         <m:funcPr>
                           <m:ctrlPr>
-                            <a:rPr lang="en-GB" sz="1400" smtClean="0">
+                            <a:rPr lang="en-GB" sz="1400" i="1" smtClean="0">
                               <a:latin typeface="Cambria Math" panose="02040503050406030204" pitchFamily="18" charset="0"/>
                             </a:rPr>
                           </m:ctrlPr>
@@ -15070,7 +14792,7 @@
                           <m:d>
                             <m:dPr>
                               <m:ctrlPr>
-                                <a:rPr lang="en-US" sz="1400" smtClean="0">
+                                <a:rPr lang="en-US" sz="1400" i="1" smtClean="0">
                                   <a:latin typeface="Cambria Math" panose="02040503050406030204" pitchFamily="18" charset="0"/>
                                 </a:rPr>
                               </m:ctrlPr>
@@ -15079,7 +14801,7 @@
                               <m:f>
                                 <m:fPr>
                                   <m:ctrlPr>
-                                    <a:rPr lang="en-US" sz="1400" smtClean="0">
+                                    <a:rPr lang="en-US" sz="1400" i="1" smtClean="0">
                                       <a:latin typeface="Cambria Math" panose="02040503050406030204" pitchFamily="18" charset="0"/>
                                     </a:rPr>
                                   </m:ctrlPr>
@@ -15104,7 +14826,7 @@
                               <m:func>
                                 <m:funcPr>
                                   <m:ctrlPr>
-                                    <a:rPr lang="en-US" sz="1400" smtClean="0">
+                                    <a:rPr lang="en-US" sz="1400" i="1" smtClean="0">
                                       <a:latin typeface="Cambria Math" panose="02040503050406030204" pitchFamily="18" charset="0"/>
                                     </a:rPr>
                                   </m:ctrlPr>
@@ -15113,7 +14835,7 @@
                                   <m:sSub>
                                     <m:sSubPr>
                                       <m:ctrlPr>
-                                        <a:rPr lang="en-US" sz="1400" smtClean="0">
+                                        <a:rPr lang="en-US" sz="1400" i="1" smtClean="0">
                                           <a:latin typeface="Cambria Math" panose="02040503050406030204" pitchFamily="18" charset="0"/>
                                         </a:rPr>
                                       </m:ctrlPr>
@@ -15143,7 +14865,7 @@
                                   <m:f>
                                     <m:fPr>
                                       <m:ctrlPr>
-                                        <a:rPr lang="en-US" sz="1400" smtClean="0">
+                                        <a:rPr lang="en-US" sz="1400" i="1" smtClean="0">
                                           <a:latin typeface="Cambria Math" panose="02040503050406030204" pitchFamily="18" charset="0"/>
                                         </a:rPr>
                                       </m:ctrlPr>
@@ -15184,7 +14906,7 @@
                           <m:func>
                             <m:funcPr>
                               <m:ctrlPr>
-                                <a:rPr lang="en-US" sz="1400" smtClean="0">
+                                <a:rPr lang="en-US" sz="1400" i="1" smtClean="0">
                                   <a:latin typeface="Cambria Math" panose="02040503050406030204" pitchFamily="18" charset="0"/>
                                 </a:rPr>
                               </m:ctrlPr>
@@ -15193,7 +14915,7 @@
                               <m:sSub>
                                 <m:sSubPr>
                                   <m:ctrlPr>
-                                    <a:rPr lang="en-US" sz="1400" smtClean="0">
+                                    <a:rPr lang="en-US" sz="1400" i="1" smtClean="0">
                                       <a:latin typeface="Cambria Math" panose="02040503050406030204" pitchFamily="18" charset="0"/>
                                     </a:rPr>
                                   </m:ctrlPr>
@@ -15248,7 +14970,7 @@
             </p:txBody>
           </p:sp>
         </mc:Choice>
-        <mc:Fallback>
+        <mc:Fallback xmlns="">
           <p:sp>
             <p:nvSpPr>
               <p:cNvPr id="64" name="TextBox 63">
@@ -15293,8 +15015,8 @@
           </p:sp>
         </mc:Fallback>
       </mc:AlternateContent>
-      <mc:AlternateContent xmlns:mc="http://schemas.openxmlformats.org/markup-compatibility/2006">
-        <mc:Choice xmlns:a14="http://schemas.microsoft.com/office/drawing/2010/main" Requires="a14">
+      <mc:AlternateContent xmlns:mc="http://schemas.openxmlformats.org/markup-compatibility/2006" xmlns:a14="http://schemas.microsoft.com/office/drawing/2010/main">
+        <mc:Choice Requires="a14">
           <p:sp>
             <p:nvSpPr>
               <p:cNvPr id="65" name="TextBox 64">
@@ -15343,7 +15065,7 @@
                       <m:func>
                         <m:funcPr>
                           <m:ctrlPr>
-                            <a:rPr lang="en-GB" sz="1400" smtClean="0">
+                            <a:rPr lang="en-GB" sz="1400" i="1" smtClean="0">
                               <a:latin typeface="Cambria Math" panose="02040503050406030204" pitchFamily="18" charset="0"/>
                             </a:rPr>
                           </m:ctrlPr>
@@ -15360,7 +15082,7 @@
                           <m:d>
                             <m:dPr>
                               <m:ctrlPr>
-                                <a:rPr lang="en-US" sz="1400" smtClean="0">
+                                <a:rPr lang="en-US" sz="1400" i="1" smtClean="0">
                                   <a:latin typeface="Cambria Math" panose="02040503050406030204" pitchFamily="18" charset="0"/>
                                 </a:rPr>
                               </m:ctrlPr>
@@ -15375,7 +15097,7 @@
                               <m:func>
                                 <m:funcPr>
                                   <m:ctrlPr>
-                                    <a:rPr lang="en-US" sz="1400" smtClean="0">
+                                    <a:rPr lang="en-US" sz="1400" i="1" smtClean="0">
                                       <a:latin typeface="Cambria Math" panose="02040503050406030204" pitchFamily="18" charset="0"/>
                                     </a:rPr>
                                   </m:ctrlPr>
@@ -15384,7 +15106,7 @@
                                   <m:sSub>
                                     <m:sSubPr>
                                       <m:ctrlPr>
-                                        <a:rPr lang="en-US" sz="1400" smtClean="0">
+                                        <a:rPr lang="en-US" sz="1400" i="1" smtClean="0">
                                           <a:latin typeface="Cambria Math" panose="02040503050406030204" pitchFamily="18" charset="0"/>
                                         </a:rPr>
                                       </m:ctrlPr>
@@ -15420,7 +15142,7 @@
                                   <m:func>
                                     <m:funcPr>
                                       <m:ctrlPr>
-                                        <a:rPr lang="en-US" sz="1400" smtClean="0">
+                                        <a:rPr lang="en-US" sz="1400" i="1" smtClean="0">
                                           <a:latin typeface="Cambria Math" panose="02040503050406030204" pitchFamily="18" charset="0"/>
                                         </a:rPr>
                                       </m:ctrlPr>
@@ -15429,7 +15151,7 @@
                                       <m:sSub>
                                         <m:sSubPr>
                                           <m:ctrlPr>
-                                            <a:rPr lang="en-US" sz="1400" smtClean="0">
+                                            <a:rPr lang="en-US" sz="1400" i="1" smtClean="0">
                                               <a:latin typeface="Cambria Math" panose="02040503050406030204" pitchFamily="18" charset="0"/>
                                             </a:rPr>
                                           </m:ctrlPr>
@@ -15494,7 +15216,7 @@
             </p:txBody>
           </p:sp>
         </mc:Choice>
-        <mc:Fallback>
+        <mc:Fallback xmlns="">
           <p:sp>
             <p:nvSpPr>
               <p:cNvPr id="65" name="TextBox 64">
@@ -16459,10 +16181,6 @@
               </a:rPr>
               <a:t>The method with various Cubicle models</a:t>
             </a:r>
-            <a:endParaRPr lang="en-FR" dirty="0">
-              <a:latin typeface="Helvetica Neue Thin" panose="020B0403020202020204" pitchFamily="34" charset="0"/>
-              <a:ea typeface="Helvetica Neue Thin" panose="020B0403020202020204" pitchFamily="34" charset="0"/>
-            </a:endParaRPr>
           </a:p>
         </p:txBody>
       </p:sp>
@@ -16579,21 +16297,7 @@
                 <a:latin typeface="Helvetica Neue Thin" panose="020B0403020202020204" pitchFamily="34" charset="0"/>
                 <a:ea typeface="Helvetica Neue Thin" panose="020B0403020202020204" pitchFamily="34" charset="0"/>
               </a:rPr>
-              <a:t> </a:t>
-            </a:r>
-            <a:r>
-              <a:rPr lang="en-US" sz="2400" dirty="0">
-                <a:latin typeface="Helvetica Neue Thin" panose="020B0403020202020204" pitchFamily="34" charset="0"/>
-                <a:ea typeface="Helvetica Neue Thin" panose="020B0403020202020204" pitchFamily="34" charset="0"/>
-              </a:rPr>
-              <a:t>entropy] [grouped </a:t>
-            </a:r>
-            <a:r>
-              <a:rPr lang="en-US" sz="2400" dirty="0">
-                <a:latin typeface="Helvetica Neue Thin" panose="020B0403020202020204" pitchFamily="34" charset="0"/>
-                <a:ea typeface="Helvetica Neue Thin" panose="020B0403020202020204" pitchFamily="34" charset="0"/>
-              </a:rPr>
-              <a:t>transitions]</a:t>
+              <a:t> entropy] [grouped transitions]</a:t>
             </a:r>
             <a:endParaRPr lang="en-FR" sz="2000" dirty="0">
               <a:latin typeface="Helvetica Neue Thin" panose="020B0403020202020204" pitchFamily="34" charset="0"/>
@@ -16756,10 +16460,6 @@
               </a:rPr>
               <a:t>Studying this matrix, it might seem weird that the transition exit -&gt; enter is possible directly. We can generate a detailed matrix to the system in more detail [next slide]</a:t>
             </a:r>
-            <a:endParaRPr lang="en-GB" dirty="0">
-              <a:latin typeface="Helvetica Neue Thin" panose="020B0403020202020204" pitchFamily="34" charset="0"/>
-              <a:ea typeface="Helvetica Neue Thin" panose="020B0403020202020204" pitchFamily="34" charset="0"/>
-            </a:endParaRPr>
           </a:p>
         </p:txBody>
       </p:sp>
@@ -16909,14 +16609,7 @@
                 <a:latin typeface="Helvetica Neue Thin" panose="020B0403020202020204" pitchFamily="34" charset="0"/>
                 <a:ea typeface="Helvetica Neue Thin" panose="020B0403020202020204" pitchFamily="34" charset="0"/>
               </a:rPr>
-              <a:t> [test-run maximizing </a:t>
-            </a:r>
-            <a:r>
-              <a:rPr lang="en-US" sz="2400" dirty="0">
-                <a:latin typeface="Helvetica Neue Thin" panose="020B0403020202020204" pitchFamily="34" charset="0"/>
-                <a:ea typeface="Helvetica Neue Thin" panose="020B0403020202020204" pitchFamily="34" charset="0"/>
-              </a:rPr>
-              <a:t>entropy] [detailed transitions]</a:t>
+              <a:t> [test-run maximizing entropy] [detailed transitions]</a:t>
             </a:r>
             <a:endParaRPr lang="en-FR" sz="2000" dirty="0">
               <a:latin typeface="Helvetica Neue Thin" panose="020B0403020202020204" pitchFamily="34" charset="0"/>
@@ -17590,10 +17283,6 @@
               </a:rPr>
               <a:t>Quick overview of proposed solution</a:t>
             </a:r>
-            <a:endParaRPr lang="en-FR" dirty="0">
-              <a:latin typeface="Helvetica Neue Thin" panose="020B0403020202020204" pitchFamily="34" charset="0"/>
-              <a:ea typeface="Helvetica Neue Thin" panose="020B0403020202020204" pitchFamily="34" charset="0"/>
-            </a:endParaRPr>
           </a:p>
         </p:txBody>
       </p:sp>
@@ -19500,6 +19189,2123 @@
 </p:sld>
 </file>
 
+<file path=ppt/slides/slide37.xml><?xml version="1.0" encoding="utf-8"?>
+<p:sld xmlns:a="http://schemas.openxmlformats.org/drawingml/2006/main" xmlns:r="http://schemas.openxmlformats.org/officeDocument/2006/relationships" xmlns:p="http://schemas.openxmlformats.org/presentationml/2006/main">
+  <p:cSld>
+    <p:spTree>
+      <p:nvGrpSpPr>
+        <p:cNvPr id="1" name=""/>
+        <p:cNvGrpSpPr/>
+        <p:nvPr/>
+      </p:nvGrpSpPr>
+      <p:grpSpPr>
+        <a:xfrm>
+          <a:off x="0" y="0"/>
+          <a:ext cx="0" cy="0"/>
+          <a:chOff x="0" y="0"/>
+          <a:chExt cx="0" cy="0"/>
+        </a:xfrm>
+      </p:grpSpPr>
+      <p:sp>
+        <p:nvSpPr>
+          <p:cNvPr id="2" name="Title 1">
+            <a:extLst>
+              <a:ext uri="{FF2B5EF4-FFF2-40B4-BE49-F238E27FC236}">
+                <a16:creationId xmlns:a16="http://schemas.microsoft.com/office/drawing/2014/main" id="{4C1D33F3-E651-2D7E-61AE-1FAC8B490A65}"/>
+              </a:ext>
+            </a:extLst>
+          </p:cNvPr>
+          <p:cNvSpPr>
+            <a:spLocks noGrp="1"/>
+          </p:cNvSpPr>
+          <p:nvPr>
+            <p:ph type="title"/>
+          </p:nvPr>
+        </p:nvSpPr>
+        <p:spPr>
+          <a:xfrm>
+            <a:off x="838200" y="2766218"/>
+            <a:ext cx="10515600" cy="1325563"/>
+          </a:xfrm>
+        </p:spPr>
+        <p:txBody>
+          <a:bodyPr/>
+          <a:lstStyle/>
+          <a:p>
+            <a:pPr algn="ctr"/>
+            <a:r>
+              <a:rPr lang="en-FR" dirty="0">
+                <a:latin typeface="Helvetica Neue Thin" panose="020B0403020202020204" pitchFamily="34" charset="0"/>
+                <a:ea typeface="Helvetica Neue Thin" panose="020B0403020202020204" pitchFamily="34" charset="0"/>
+              </a:rPr>
+              <a:t>Methods</a:t>
+            </a:r>
+          </a:p>
+        </p:txBody>
+      </p:sp>
+      <p:sp>
+        <p:nvSpPr>
+          <p:cNvPr id="4" name="Slide Number Placeholder 3">
+            <a:extLst>
+              <a:ext uri="{FF2B5EF4-FFF2-40B4-BE49-F238E27FC236}">
+                <a16:creationId xmlns:a16="http://schemas.microsoft.com/office/drawing/2014/main" id="{3B580CC0-0468-F7FE-9FE6-E0CFD5A3EAD7}"/>
+              </a:ext>
+            </a:extLst>
+          </p:cNvPr>
+          <p:cNvSpPr>
+            <a:spLocks noGrp="1"/>
+          </p:cNvSpPr>
+          <p:nvPr>
+            <p:ph type="sldNum" sz="quarter" idx="12"/>
+          </p:nvPr>
+        </p:nvSpPr>
+        <p:spPr/>
+        <p:txBody>
+          <a:bodyPr/>
+          <a:lstStyle/>
+          <a:p>
+            <a:fld id="{4A936E34-E911-F947-B710-F12161D09F63}" type="slidenum">
+              <a:rPr lang="en-FR" smtClean="0"/>
+              <a:t>37</a:t>
+            </a:fld>
+            <a:endParaRPr lang="en-FR"/>
+          </a:p>
+        </p:txBody>
+      </p:sp>
+    </p:spTree>
+    <p:extLst>
+      <p:ext uri="{BB962C8B-B14F-4D97-AF65-F5344CB8AC3E}">
+        <p14:creationId xmlns:p14="http://schemas.microsoft.com/office/powerpoint/2010/main" val="2845728732"/>
+      </p:ext>
+    </p:extLst>
+  </p:cSld>
+  <p:clrMapOvr>
+    <a:masterClrMapping/>
+  </p:clrMapOvr>
+</p:sld>
+</file>
+
+<file path=ppt/slides/slide38.xml><?xml version="1.0" encoding="utf-8"?>
+<p:sld xmlns:a="http://schemas.openxmlformats.org/drawingml/2006/main" xmlns:r="http://schemas.openxmlformats.org/officeDocument/2006/relationships" xmlns:p="http://schemas.openxmlformats.org/presentationml/2006/main">
+  <p:cSld>
+    <p:spTree>
+      <p:nvGrpSpPr>
+        <p:cNvPr id="1" name=""/>
+        <p:cNvGrpSpPr/>
+        <p:nvPr/>
+      </p:nvGrpSpPr>
+      <p:grpSpPr>
+        <a:xfrm>
+          <a:off x="0" y="0"/>
+          <a:ext cx="0" cy="0"/>
+          <a:chOff x="0" y="0"/>
+          <a:chExt cx="0" cy="0"/>
+        </a:xfrm>
+      </p:grpSpPr>
+      <p:sp>
+        <p:nvSpPr>
+          <p:cNvPr id="4" name="TextBox 3">
+            <a:extLst>
+              <a:ext uri="{FF2B5EF4-FFF2-40B4-BE49-F238E27FC236}">
+                <a16:creationId xmlns:a16="http://schemas.microsoft.com/office/drawing/2014/main" id="{10DEA0E4-DA7F-E905-D91F-6C01DD4C8C81}"/>
+              </a:ext>
+            </a:extLst>
+          </p:cNvPr>
+          <p:cNvSpPr txBox="1"/>
+          <p:nvPr/>
+        </p:nvSpPr>
+        <p:spPr>
+          <a:xfrm>
+            <a:off x="94445" y="123726"/>
+            <a:ext cx="7456093" cy="461665"/>
+          </a:xfrm>
+          <a:prstGeom prst="rect">
+            <a:avLst/>
+          </a:prstGeom>
+          <a:noFill/>
+        </p:spPr>
+        <p:txBody>
+          <a:bodyPr wrap="square" rtlCol="0">
+            <a:spAutoFit/>
+          </a:bodyPr>
+          <a:lstStyle/>
+          <a:p>
+            <a:r>
+              <a:rPr lang="en-US" sz="2400" dirty="0">
+                <a:latin typeface="Helvetica Neue Thin" panose="020B0403020202020204" pitchFamily="34" charset="0"/>
+                <a:ea typeface="Helvetica Neue Thin" panose="020B0403020202020204" pitchFamily="34" charset="0"/>
+              </a:rPr>
+              <a:t>Initial Exploration</a:t>
+            </a:r>
+            <a:endParaRPr lang="en-FR" sz="2000" dirty="0">
+              <a:latin typeface="Helvetica Neue Thin" panose="020B0403020202020204" pitchFamily="34" charset="0"/>
+              <a:ea typeface="Helvetica Neue Thin" panose="020B0403020202020204" pitchFamily="34" charset="0"/>
+            </a:endParaRPr>
+          </a:p>
+        </p:txBody>
+      </p:sp>
+      <p:sp>
+        <p:nvSpPr>
+          <p:cNvPr id="5" name="TextBox 4">
+            <a:extLst>
+              <a:ext uri="{FF2B5EF4-FFF2-40B4-BE49-F238E27FC236}">
+                <a16:creationId xmlns:a16="http://schemas.microsoft.com/office/drawing/2014/main" id="{D51E0414-BA4B-94E1-C01E-E0863EDB6501}"/>
+              </a:ext>
+            </a:extLst>
+          </p:cNvPr>
+          <p:cNvSpPr txBox="1"/>
+          <p:nvPr/>
+        </p:nvSpPr>
+        <p:spPr>
+          <a:xfrm>
+            <a:off x="94445" y="586610"/>
+            <a:ext cx="12003110" cy="2800767"/>
+          </a:xfrm>
+          <a:prstGeom prst="rect">
+            <a:avLst/>
+          </a:prstGeom>
+          <a:noFill/>
+        </p:spPr>
+        <p:txBody>
+          <a:bodyPr wrap="square" rtlCol="0">
+            <a:spAutoFit/>
+          </a:bodyPr>
+          <a:lstStyle/>
+          <a:p>
+            <a:pPr marL="342900" indent="-342900">
+              <a:buAutoNum type="arabicParenR"/>
+            </a:pPr>
+            <a:r>
+              <a:rPr lang="en-GB" sz="1600" dirty="0">
+                <a:latin typeface="Helvetica Neue Thin" panose="020B0403020202020204" pitchFamily="34" charset="0"/>
+                <a:ea typeface="Helvetica Neue Thin" panose="020B0403020202020204" pitchFamily="34" charset="0"/>
+              </a:rPr>
+              <a:t>Calculate how many possible initial steps there are from Init, lets call this N</a:t>
+            </a:r>
+          </a:p>
+          <a:p>
+            <a:pPr marL="342900" indent="-342900">
+              <a:buAutoNum type="arabicParenR"/>
+            </a:pPr>
+            <a:r>
+              <a:rPr lang="en-GB" sz="1600" dirty="0">
+                <a:latin typeface="Helvetica Neue Thin" panose="020B0403020202020204" pitchFamily="34" charset="0"/>
+                <a:ea typeface="Helvetica Neue Thin" panose="020B0403020202020204" pitchFamily="34" charset="0"/>
+              </a:rPr>
+              <a:t>For each step in N, run entropy-guided exploration for a depth of </a:t>
+            </a:r>
+            <a:r>
+              <a:rPr lang="en-GB" sz="1600" dirty="0" err="1">
+                <a:latin typeface="Helvetica Neue Thin" panose="020B0403020202020204" pitchFamily="34" charset="0"/>
+                <a:ea typeface="Helvetica Neue Thin" panose="020B0403020202020204" pitchFamily="34" charset="0"/>
+              </a:rPr>
+              <a:t>transition_depth</a:t>
+            </a:r>
+            <a:r>
+              <a:rPr lang="en-GB" sz="1600" dirty="0">
+                <a:latin typeface="Helvetica Neue Thin" panose="020B0403020202020204" pitchFamily="34" charset="0"/>
+                <a:ea typeface="Helvetica Neue Thin" panose="020B0403020202020204" pitchFamily="34" charset="0"/>
+              </a:rPr>
+              <a:t> * </a:t>
+            </a:r>
+            <a:r>
+              <a:rPr lang="en-GB" sz="1600" dirty="0" err="1">
+                <a:latin typeface="Helvetica Neue Thin" panose="020B0403020202020204" pitchFamily="34" charset="0"/>
+                <a:ea typeface="Helvetica Neue Thin" panose="020B0403020202020204" pitchFamily="34" charset="0"/>
+              </a:rPr>
+              <a:t>system_procs</a:t>
+            </a:r>
+            <a:r>
+              <a:rPr lang="en-GB" sz="1600" dirty="0">
+                <a:latin typeface="Helvetica Neue Thin" panose="020B0403020202020204" pitchFamily="34" charset="0"/>
+                <a:ea typeface="Helvetica Neue Thin" panose="020B0403020202020204" pitchFamily="34" charset="0"/>
+              </a:rPr>
+              <a:t> *</a:t>
+            </a:r>
+            <a:r>
+              <a:rPr lang="en-GB" sz="1600" dirty="0" err="1">
+                <a:latin typeface="Helvetica Neue Thin" panose="020B0403020202020204" pitchFamily="34" charset="0"/>
+                <a:ea typeface="Helvetica Neue Thin" panose="020B0403020202020204" pitchFamily="34" charset="0"/>
+              </a:rPr>
+              <a:t>system_procs</a:t>
+            </a:r>
+            <a:r>
+              <a:rPr lang="en-GB" sz="1600" dirty="0">
+                <a:latin typeface="Helvetica Neue Thin" panose="020B0403020202020204" pitchFamily="34" charset="0"/>
+                <a:ea typeface="Helvetica Neue Thin" panose="020B0403020202020204" pitchFamily="34" charset="0"/>
+              </a:rPr>
+              <a:t> (=how many transitions + proc number squared – might need to rethink this part)</a:t>
+            </a:r>
+          </a:p>
+          <a:p>
+            <a:pPr marL="800100" lvl="1" indent="-342900">
+              <a:buFont typeface="Arial" panose="020B0604020202020204" pitchFamily="34" charset="0"/>
+              <a:buChar char="•"/>
+            </a:pPr>
+            <a:r>
+              <a:rPr lang="en-GB" sz="1600" dirty="0">
+                <a:latin typeface="Helvetica Neue Thin" panose="020B0403020202020204" pitchFamily="34" charset="0"/>
+                <a:ea typeface="Helvetica Neue Thin" panose="020B0403020202020204" pitchFamily="34" charset="0"/>
+              </a:rPr>
+              <a:t>Also do this multiple times? </a:t>
+            </a:r>
+          </a:p>
+          <a:p>
+            <a:pPr marL="342900" indent="-342900">
+              <a:buAutoNum type="arabicParenR"/>
+            </a:pPr>
+            <a:r>
+              <a:rPr lang="en-GB" sz="1600" dirty="0">
+                <a:latin typeface="Helvetica Neue Thin" panose="020B0403020202020204" pitchFamily="34" charset="0"/>
+                <a:ea typeface="Helvetica Neue Thin" panose="020B0403020202020204" pitchFamily="34" charset="0"/>
+              </a:rPr>
+              <a:t>Collect data from these runs </a:t>
+            </a:r>
+          </a:p>
+          <a:p>
+            <a:pPr marL="342900" indent="-342900">
+              <a:buAutoNum type="arabicParenR"/>
+            </a:pPr>
+            <a:r>
+              <a:rPr lang="en-GB" sz="1600" dirty="0">
+                <a:latin typeface="Helvetica Neue Thin" panose="020B0403020202020204" pitchFamily="34" charset="0"/>
+                <a:ea typeface="Helvetica Neue Thin" panose="020B0403020202020204" pitchFamily="34" charset="0"/>
+              </a:rPr>
+              <a:t>Analyse data – maybe there’s no point in continuing</a:t>
+            </a:r>
+          </a:p>
+          <a:p>
+            <a:pPr marL="342900" indent="-342900">
+              <a:buAutoNum type="arabicParenR"/>
+            </a:pPr>
+            <a:r>
+              <a:rPr lang="en-GB" sz="1600" dirty="0">
+                <a:latin typeface="Helvetica Neue Thin" panose="020B0403020202020204" pitchFamily="34" charset="0"/>
+                <a:ea typeface="Helvetica Neue Thin" panose="020B0403020202020204" pitchFamily="34" charset="0"/>
+              </a:rPr>
+              <a:t>Calculate number of procs system initialized with, lets call this P</a:t>
+            </a:r>
+          </a:p>
+          <a:p>
+            <a:pPr marL="342900" indent="-342900">
+              <a:buAutoNum type="arabicParenR"/>
+            </a:pPr>
+            <a:r>
+              <a:rPr lang="en-GB" sz="1600" dirty="0">
+                <a:latin typeface="Helvetica Neue Thin" panose="020B0403020202020204" pitchFamily="34" charset="0"/>
+                <a:ea typeface="Helvetica Neue Thin" panose="020B0403020202020204" pitchFamily="34" charset="0"/>
+              </a:rPr>
+              <a:t>Run same depth for each proc p in P, where each step is governed by the following rule: “if a transition with p is possible, pick that transition, else pick any transition” </a:t>
+            </a:r>
+          </a:p>
+          <a:p>
+            <a:pPr marL="342900" indent="-342900">
+              <a:buAutoNum type="arabicParenR"/>
+            </a:pPr>
+            <a:r>
+              <a:rPr lang="en-GB" sz="1600" dirty="0">
+                <a:latin typeface="Helvetica Neue Thin" panose="020B0403020202020204" pitchFamily="34" charset="0"/>
+                <a:ea typeface="Helvetica Neue Thin" panose="020B0403020202020204" pitchFamily="34" charset="0"/>
+              </a:rPr>
+              <a:t>Collect data from that too and analyse it, again – maybe there’s no point in continuing exploration</a:t>
+            </a:r>
+          </a:p>
+          <a:p>
+            <a:endParaRPr lang="en-GB" sz="1600" dirty="0">
+              <a:latin typeface="Helvetica Neue Thin" panose="020B0403020202020204" pitchFamily="34" charset="0"/>
+              <a:ea typeface="Helvetica Neue Thin" panose="020B0403020202020204" pitchFamily="34" charset="0"/>
+            </a:endParaRPr>
+          </a:p>
+        </p:txBody>
+      </p:sp>
+      <p:sp>
+        <p:nvSpPr>
+          <p:cNvPr id="6" name="Slide Number Placeholder 5">
+            <a:extLst>
+              <a:ext uri="{FF2B5EF4-FFF2-40B4-BE49-F238E27FC236}">
+                <a16:creationId xmlns:a16="http://schemas.microsoft.com/office/drawing/2014/main" id="{959BDB26-40E4-9CF6-297E-539B90F4FB2E}"/>
+              </a:ext>
+            </a:extLst>
+          </p:cNvPr>
+          <p:cNvSpPr>
+            <a:spLocks noGrp="1"/>
+          </p:cNvSpPr>
+          <p:nvPr>
+            <p:ph type="sldNum" sz="quarter" idx="12"/>
+          </p:nvPr>
+        </p:nvSpPr>
+        <p:spPr/>
+        <p:txBody>
+          <a:bodyPr/>
+          <a:lstStyle/>
+          <a:p>
+            <a:fld id="{4A936E34-E911-F947-B710-F12161D09F63}" type="slidenum">
+              <a:rPr lang="en-FR" smtClean="0"/>
+              <a:t>38</a:t>
+            </a:fld>
+            <a:endParaRPr lang="en-FR"/>
+          </a:p>
+        </p:txBody>
+      </p:sp>
+      <p:sp>
+        <p:nvSpPr>
+          <p:cNvPr id="2" name="TextBox 1">
+            <a:extLst>
+              <a:ext uri="{FF2B5EF4-FFF2-40B4-BE49-F238E27FC236}">
+                <a16:creationId xmlns:a16="http://schemas.microsoft.com/office/drawing/2014/main" id="{C72B5C9A-E858-893B-D126-D9FF43A02F88}"/>
+              </a:ext>
+            </a:extLst>
+          </p:cNvPr>
+          <p:cNvSpPr txBox="1"/>
+          <p:nvPr/>
+        </p:nvSpPr>
+        <p:spPr>
+          <a:xfrm>
+            <a:off x="94444" y="3187529"/>
+            <a:ext cx="7456093" cy="461665"/>
+          </a:xfrm>
+          <a:prstGeom prst="rect">
+            <a:avLst/>
+          </a:prstGeom>
+          <a:noFill/>
+        </p:spPr>
+        <p:txBody>
+          <a:bodyPr wrap="square" rtlCol="0">
+            <a:spAutoFit/>
+          </a:bodyPr>
+          <a:lstStyle/>
+          <a:p>
+            <a:r>
+              <a:rPr lang="en-US" sz="2400" dirty="0">
+                <a:latin typeface="Helvetica Neue Thin" panose="020B0403020202020204" pitchFamily="34" charset="0"/>
+                <a:ea typeface="Helvetica Neue Thin" panose="020B0403020202020204" pitchFamily="34" charset="0"/>
+              </a:rPr>
+              <a:t>Collected data</a:t>
+            </a:r>
+            <a:endParaRPr lang="en-FR" sz="2000" dirty="0">
+              <a:latin typeface="Helvetica Neue Thin" panose="020B0403020202020204" pitchFamily="34" charset="0"/>
+              <a:ea typeface="Helvetica Neue Thin" panose="020B0403020202020204" pitchFamily="34" charset="0"/>
+            </a:endParaRPr>
+          </a:p>
+        </p:txBody>
+      </p:sp>
+      <p:sp>
+        <p:nvSpPr>
+          <p:cNvPr id="3" name="TextBox 2">
+            <a:extLst>
+              <a:ext uri="{FF2B5EF4-FFF2-40B4-BE49-F238E27FC236}">
+                <a16:creationId xmlns:a16="http://schemas.microsoft.com/office/drawing/2014/main" id="{E881558B-8F70-7A96-2FE6-0EBFCCA0F154}"/>
+              </a:ext>
+            </a:extLst>
+          </p:cNvPr>
+          <p:cNvSpPr txBox="1"/>
+          <p:nvPr/>
+        </p:nvSpPr>
+        <p:spPr>
+          <a:xfrm>
+            <a:off x="94445" y="3667158"/>
+            <a:ext cx="3801694" cy="1569660"/>
+          </a:xfrm>
+          <a:prstGeom prst="rect">
+            <a:avLst/>
+          </a:prstGeom>
+          <a:noFill/>
+        </p:spPr>
+        <p:txBody>
+          <a:bodyPr wrap="square" rtlCol="0">
+            <a:spAutoFit/>
+          </a:bodyPr>
+          <a:lstStyle/>
+          <a:p>
+            <a:r>
+              <a:rPr lang="en-GB" sz="1600" dirty="0">
+                <a:latin typeface="Helvetica Neue Thin" panose="020B0403020202020204" pitchFamily="34" charset="0"/>
+                <a:ea typeface="Helvetica Neue Thin" panose="020B0403020202020204" pitchFamily="34" charset="0"/>
+              </a:rPr>
+              <a:t>STATES</a:t>
+            </a:r>
+          </a:p>
+          <a:p>
+            <a:r>
+              <a:rPr lang="en-GB" sz="1600" dirty="0">
+                <a:latin typeface="Helvetica Neue Thin" panose="020B0403020202020204" pitchFamily="34" charset="0"/>
+                <a:ea typeface="Helvetica Neue Thin" panose="020B0403020202020204" pitchFamily="34" charset="0"/>
+              </a:rPr>
+              <a:t>State : explicit state</a:t>
+            </a:r>
+          </a:p>
+          <a:p>
+            <a:r>
+              <a:rPr lang="en-GB" sz="1600" dirty="0">
+                <a:latin typeface="Helvetica Neue Thin" panose="020B0403020202020204" pitchFamily="34" charset="0"/>
+                <a:ea typeface="Helvetica Neue Thin" panose="020B0403020202020204" pitchFamily="34" charset="0"/>
+              </a:rPr>
+              <a:t>Seen : how many times it was visited</a:t>
+            </a:r>
+          </a:p>
+          <a:p>
+            <a:r>
+              <a:rPr lang="en-GB" sz="1600" dirty="0" err="1">
+                <a:latin typeface="Helvetica Neue Thin" panose="020B0403020202020204" pitchFamily="34" charset="0"/>
+                <a:ea typeface="Helvetica Neue Thin" panose="020B0403020202020204" pitchFamily="34" charset="0"/>
+              </a:rPr>
+              <a:t>Exit_number</a:t>
+            </a:r>
+            <a:r>
+              <a:rPr lang="en-GB" sz="1600" dirty="0">
+                <a:latin typeface="Helvetica Neue Thin" panose="020B0403020202020204" pitchFamily="34" charset="0"/>
+                <a:ea typeface="Helvetica Neue Thin" panose="020B0403020202020204" pitchFamily="34" charset="0"/>
+              </a:rPr>
+              <a:t> : how many exits at this state</a:t>
+            </a:r>
+          </a:p>
+          <a:p>
+            <a:r>
+              <a:rPr lang="en-GB" sz="1600" dirty="0" err="1">
+                <a:latin typeface="Helvetica Neue Thin" panose="020B0403020202020204" pitchFamily="34" charset="0"/>
+                <a:ea typeface="Helvetica Neue Thin" panose="020B0403020202020204" pitchFamily="34" charset="0"/>
+              </a:rPr>
+              <a:t>Exit_transitions</a:t>
+            </a:r>
+            <a:r>
+              <a:rPr lang="en-GB" sz="1600" dirty="0">
+                <a:latin typeface="Helvetica Neue Thin" panose="020B0403020202020204" pitchFamily="34" charset="0"/>
+                <a:ea typeface="Helvetica Neue Thin" panose="020B0403020202020204" pitchFamily="34" charset="0"/>
+              </a:rPr>
+              <a:t> : which exits possible</a:t>
+            </a:r>
+          </a:p>
+          <a:p>
+            <a:r>
+              <a:rPr lang="en-GB" sz="1600" dirty="0" err="1">
+                <a:latin typeface="Helvetica Neue Thin" panose="020B0403020202020204" pitchFamily="34" charset="0"/>
+                <a:ea typeface="Helvetica Neue Thin" panose="020B0403020202020204" pitchFamily="34" charset="0"/>
+              </a:rPr>
+              <a:t>Taken_transitions</a:t>
+            </a:r>
+            <a:r>
+              <a:rPr lang="en-GB" sz="1600" dirty="0">
+                <a:latin typeface="Helvetica Neue Thin" panose="020B0403020202020204" pitchFamily="34" charset="0"/>
+                <a:ea typeface="Helvetica Neue Thin" panose="020B0403020202020204" pitchFamily="34" charset="0"/>
+              </a:rPr>
+              <a:t> : which exits were taken</a:t>
+            </a:r>
+          </a:p>
+        </p:txBody>
+      </p:sp>
+      <p:sp>
+        <p:nvSpPr>
+          <p:cNvPr id="7" name="TextBox 6">
+            <a:extLst>
+              <a:ext uri="{FF2B5EF4-FFF2-40B4-BE49-F238E27FC236}">
+                <a16:creationId xmlns:a16="http://schemas.microsoft.com/office/drawing/2014/main" id="{4F9A6AA4-D4AA-9507-A1B1-5C712FE98205}"/>
+              </a:ext>
+            </a:extLst>
+          </p:cNvPr>
+          <p:cNvSpPr txBox="1"/>
+          <p:nvPr/>
+        </p:nvSpPr>
+        <p:spPr>
+          <a:xfrm>
+            <a:off x="4050218" y="3667157"/>
+            <a:ext cx="4245645" cy="1323439"/>
+          </a:xfrm>
+          <a:prstGeom prst="rect">
+            <a:avLst/>
+          </a:prstGeom>
+          <a:noFill/>
+        </p:spPr>
+        <p:txBody>
+          <a:bodyPr wrap="square" rtlCol="0">
+            <a:spAutoFit/>
+          </a:bodyPr>
+          <a:lstStyle/>
+          <a:p>
+            <a:r>
+              <a:rPr lang="en-GB" sz="1600" dirty="0">
+                <a:latin typeface="Helvetica Neue Thin" panose="020B0403020202020204" pitchFamily="34" charset="0"/>
+                <a:ea typeface="Helvetica Neue Thin" panose="020B0403020202020204" pitchFamily="34" charset="0"/>
+              </a:rPr>
+              <a:t>DEADLOCKS</a:t>
+            </a:r>
+          </a:p>
+          <a:p>
+            <a:r>
+              <a:rPr lang="en-GB" sz="1600" dirty="0">
+                <a:latin typeface="Helvetica Neue Thin" panose="020B0403020202020204" pitchFamily="34" charset="0"/>
+                <a:ea typeface="Helvetica Neue Thin" panose="020B0403020202020204" pitchFamily="34" charset="0"/>
+              </a:rPr>
+              <a:t>Deadlock State : explicit state</a:t>
+            </a:r>
+          </a:p>
+          <a:p>
+            <a:r>
+              <a:rPr lang="en-GB" sz="1600" dirty="0" err="1">
+                <a:latin typeface="Helvetica Neue Thin" panose="020B0403020202020204" pitchFamily="34" charset="0"/>
+                <a:ea typeface="Helvetica Neue Thin" panose="020B0403020202020204" pitchFamily="34" charset="0"/>
+              </a:rPr>
+              <a:t>Dead_predecessor</a:t>
+            </a:r>
+            <a:r>
+              <a:rPr lang="en-GB" sz="1600" dirty="0">
+                <a:latin typeface="Helvetica Neue Thin" panose="020B0403020202020204" pitchFamily="34" charset="0"/>
+                <a:ea typeface="Helvetica Neue Thin" panose="020B0403020202020204" pitchFamily="34" charset="0"/>
+              </a:rPr>
+              <a:t> : who led to deadlock</a:t>
+            </a:r>
+          </a:p>
+          <a:p>
+            <a:r>
+              <a:rPr lang="en-GB" sz="1600" dirty="0" err="1">
+                <a:latin typeface="Helvetica Neue Thin" panose="020B0403020202020204" pitchFamily="34" charset="0"/>
+                <a:ea typeface="Helvetica Neue Thin" panose="020B0403020202020204" pitchFamily="34" charset="0"/>
+              </a:rPr>
+              <a:t>Dead_path</a:t>
+            </a:r>
+            <a:r>
+              <a:rPr lang="en-GB" sz="1600" dirty="0">
+                <a:latin typeface="Helvetica Neue Thin" panose="020B0403020202020204" pitchFamily="34" charset="0"/>
+                <a:ea typeface="Helvetica Neue Thin" panose="020B0403020202020204" pitchFamily="34" charset="0"/>
+              </a:rPr>
+              <a:t> : path that led to deadlock</a:t>
+            </a:r>
+          </a:p>
+          <a:p>
+            <a:r>
+              <a:rPr lang="en-GB" sz="1600" dirty="0" err="1">
+                <a:latin typeface="Helvetica Neue Thin" panose="020B0403020202020204" pitchFamily="34" charset="0"/>
+                <a:ea typeface="Helvetica Neue Thin" panose="020B0403020202020204" pitchFamily="34" charset="0"/>
+              </a:rPr>
+              <a:t>Dead_steps</a:t>
+            </a:r>
+            <a:r>
+              <a:rPr lang="en-GB" sz="1600" dirty="0">
+                <a:latin typeface="Helvetica Neue Thin" panose="020B0403020202020204" pitchFamily="34" charset="0"/>
+                <a:ea typeface="Helvetica Neue Thin" panose="020B0403020202020204" pitchFamily="34" charset="0"/>
+              </a:rPr>
+              <a:t> : how many steps it took</a:t>
+            </a:r>
+          </a:p>
+        </p:txBody>
+      </p:sp>
+      <p:sp>
+        <p:nvSpPr>
+          <p:cNvPr id="8" name="TextBox 7">
+            <a:extLst>
+              <a:ext uri="{FF2B5EF4-FFF2-40B4-BE49-F238E27FC236}">
+                <a16:creationId xmlns:a16="http://schemas.microsoft.com/office/drawing/2014/main" id="{31356D39-FEC5-CCEB-6C06-865352FEEFDE}"/>
+              </a:ext>
+            </a:extLst>
+          </p:cNvPr>
+          <p:cNvSpPr txBox="1"/>
+          <p:nvPr/>
+        </p:nvSpPr>
+        <p:spPr>
+          <a:xfrm>
+            <a:off x="94444" y="5398036"/>
+            <a:ext cx="6637660" cy="1077218"/>
+          </a:xfrm>
+          <a:prstGeom prst="rect">
+            <a:avLst/>
+          </a:prstGeom>
+          <a:noFill/>
+        </p:spPr>
+        <p:txBody>
+          <a:bodyPr wrap="square" rtlCol="0">
+            <a:spAutoFit/>
+          </a:bodyPr>
+          <a:lstStyle/>
+          <a:p>
+            <a:r>
+              <a:rPr lang="en-GB" sz="1600" dirty="0">
+                <a:latin typeface="Helvetica Neue Thin" panose="020B0403020202020204" pitchFamily="34" charset="0"/>
+                <a:ea typeface="Helvetica Neue Thin" panose="020B0403020202020204" pitchFamily="34" charset="0"/>
+              </a:rPr>
+              <a:t>DEAD_PREDS: state -&gt; state [states that had a deadlock follow them]</a:t>
+            </a:r>
+          </a:p>
+          <a:p>
+            <a:r>
+              <a:rPr lang="en-GB" sz="1600" dirty="0">
+                <a:latin typeface="Helvetica Neue Thin" panose="020B0403020202020204" pitchFamily="34" charset="0"/>
+                <a:ea typeface="Helvetica Neue Thin" panose="020B0403020202020204" pitchFamily="34" charset="0"/>
+              </a:rPr>
+              <a:t>TR_COUNT: transitions that appeared [and how many times]</a:t>
+            </a:r>
+          </a:p>
+          <a:p>
+            <a:r>
+              <a:rPr lang="en-GB" sz="1600" dirty="0">
+                <a:latin typeface="Helvetica Neue Thin" panose="020B0403020202020204" pitchFamily="34" charset="0"/>
+                <a:ea typeface="Helvetica Neue Thin" panose="020B0403020202020204" pitchFamily="34" charset="0"/>
+              </a:rPr>
+              <a:t>TR_COUPLES : how often </a:t>
+            </a:r>
+            <a:r>
+              <a:rPr lang="en-GB" sz="1600" dirty="0" err="1">
+                <a:latin typeface="Helvetica Neue Thin" panose="020B0403020202020204" pitchFamily="34" charset="0"/>
+                <a:ea typeface="Helvetica Neue Thin" panose="020B0403020202020204" pitchFamily="34" charset="0"/>
+              </a:rPr>
+              <a:t>ti</a:t>
+            </a:r>
+            <a:r>
+              <a:rPr lang="en-GB" sz="1600" dirty="0">
+                <a:latin typeface="Helvetica Neue Thin" panose="020B0403020202020204" pitchFamily="34" charset="0"/>
+                <a:ea typeface="Helvetica Neue Thin" panose="020B0403020202020204" pitchFamily="34" charset="0"/>
+              </a:rPr>
+              <a:t> -&gt; </a:t>
+            </a:r>
+            <a:r>
+              <a:rPr lang="en-GB" sz="1600" dirty="0" err="1">
+                <a:latin typeface="Helvetica Neue Thin" panose="020B0403020202020204" pitchFamily="34" charset="0"/>
+                <a:ea typeface="Helvetica Neue Thin" panose="020B0403020202020204" pitchFamily="34" charset="0"/>
+              </a:rPr>
+              <a:t>tj</a:t>
+            </a:r>
+            <a:r>
+              <a:rPr lang="en-GB" sz="1600" dirty="0">
+                <a:latin typeface="Helvetica Neue Thin" panose="020B0403020202020204" pitchFamily="34" charset="0"/>
+                <a:ea typeface="Helvetica Neue Thin" panose="020B0403020202020204" pitchFamily="34" charset="0"/>
+              </a:rPr>
+              <a:t> appears =&gt; % of each transition overall </a:t>
+            </a:r>
+          </a:p>
+          <a:p>
+            <a:endParaRPr lang="en-GB" sz="1600" dirty="0">
+              <a:latin typeface="Helvetica Neue Thin" panose="020B0403020202020204" pitchFamily="34" charset="0"/>
+              <a:ea typeface="Helvetica Neue Thin" panose="020B0403020202020204" pitchFamily="34" charset="0"/>
+            </a:endParaRPr>
+          </a:p>
+        </p:txBody>
+      </p:sp>
+    </p:spTree>
+    <p:extLst>
+      <p:ext uri="{BB962C8B-B14F-4D97-AF65-F5344CB8AC3E}">
+        <p14:creationId xmlns:p14="http://schemas.microsoft.com/office/powerpoint/2010/main" val="526470211"/>
+      </p:ext>
+    </p:extLst>
+  </p:cSld>
+  <p:clrMapOvr>
+    <a:masterClrMapping/>
+  </p:clrMapOvr>
+</p:sld>
+</file>
+
+<file path=ppt/slides/slide39.xml><?xml version="1.0" encoding="utf-8"?>
+<p:sld xmlns:a="http://schemas.openxmlformats.org/drawingml/2006/main" xmlns:r="http://schemas.openxmlformats.org/officeDocument/2006/relationships" xmlns:p="http://schemas.openxmlformats.org/presentationml/2006/main">
+  <p:cSld>
+    <p:spTree>
+      <p:nvGrpSpPr>
+        <p:cNvPr id="1" name=""/>
+        <p:cNvGrpSpPr/>
+        <p:nvPr/>
+      </p:nvGrpSpPr>
+      <p:grpSpPr>
+        <a:xfrm>
+          <a:off x="0" y="0"/>
+          <a:ext cx="0" cy="0"/>
+          <a:chOff x="0" y="0"/>
+          <a:chExt cx="0" cy="0"/>
+        </a:xfrm>
+      </p:grpSpPr>
+      <p:sp>
+        <p:nvSpPr>
+          <p:cNvPr id="5" name="TextBox 4">
+            <a:extLst>
+              <a:ext uri="{FF2B5EF4-FFF2-40B4-BE49-F238E27FC236}">
+                <a16:creationId xmlns:a16="http://schemas.microsoft.com/office/drawing/2014/main" id="{D51E0414-BA4B-94E1-C01E-E0863EDB6501}"/>
+              </a:ext>
+            </a:extLst>
+          </p:cNvPr>
+          <p:cNvSpPr txBox="1"/>
+          <p:nvPr/>
+        </p:nvSpPr>
+        <p:spPr>
+          <a:xfrm>
+            <a:off x="122697" y="1087851"/>
+            <a:ext cx="12003110" cy="584775"/>
+          </a:xfrm>
+          <a:prstGeom prst="rect">
+            <a:avLst/>
+          </a:prstGeom>
+          <a:noFill/>
+        </p:spPr>
+        <p:txBody>
+          <a:bodyPr wrap="square" rtlCol="0">
+            <a:spAutoFit/>
+          </a:bodyPr>
+          <a:lstStyle/>
+          <a:p>
+            <a:r>
+              <a:rPr lang="en-GB" sz="1600" dirty="0">
+                <a:latin typeface="Helvetica Neue Thin" panose="020B0403020202020204" pitchFamily="34" charset="0"/>
+                <a:ea typeface="Helvetica Neue Thin" panose="020B0403020202020204" pitchFamily="34" charset="0"/>
+              </a:rPr>
+              <a:t>Set up a ”reward”-type function that helps the system decide where to go. </a:t>
+            </a:r>
+          </a:p>
+          <a:p>
+            <a:pPr lvl="1"/>
+            <a:r>
+              <a:rPr lang="en-GB" sz="1600" dirty="0">
+                <a:latin typeface="Helvetica Neue Thin" panose="020B0403020202020204" pitchFamily="34" charset="0"/>
+                <a:ea typeface="Helvetica Neue Thin" panose="020B0403020202020204" pitchFamily="34" charset="0"/>
+              </a:rPr>
+              <a:t>The reward will decide which states are optimal to visit</a:t>
+            </a:r>
+          </a:p>
+        </p:txBody>
+      </p:sp>
+      <p:sp>
+        <p:nvSpPr>
+          <p:cNvPr id="6" name="Slide Number Placeholder 5">
+            <a:extLst>
+              <a:ext uri="{FF2B5EF4-FFF2-40B4-BE49-F238E27FC236}">
+                <a16:creationId xmlns:a16="http://schemas.microsoft.com/office/drawing/2014/main" id="{959BDB26-40E4-9CF6-297E-539B90F4FB2E}"/>
+              </a:ext>
+            </a:extLst>
+          </p:cNvPr>
+          <p:cNvSpPr>
+            <a:spLocks noGrp="1"/>
+          </p:cNvSpPr>
+          <p:nvPr>
+            <p:ph type="sldNum" sz="quarter" idx="12"/>
+          </p:nvPr>
+        </p:nvSpPr>
+        <p:spPr/>
+        <p:txBody>
+          <a:bodyPr/>
+          <a:lstStyle/>
+          <a:p>
+            <a:fld id="{4A936E34-E911-F947-B710-F12161D09F63}" type="slidenum">
+              <a:rPr lang="en-FR" smtClean="0"/>
+              <a:t>39</a:t>
+            </a:fld>
+            <a:endParaRPr lang="en-FR"/>
+          </a:p>
+        </p:txBody>
+      </p:sp>
+      <p:grpSp>
+        <p:nvGrpSpPr>
+          <p:cNvPr id="60" name="Group 59">
+            <a:extLst>
+              <a:ext uri="{FF2B5EF4-FFF2-40B4-BE49-F238E27FC236}">
+                <a16:creationId xmlns:a16="http://schemas.microsoft.com/office/drawing/2014/main" id="{A507A347-DF89-B8F0-26EB-9E3A153424CC}"/>
+              </a:ext>
+            </a:extLst>
+          </p:cNvPr>
+          <p:cNvGrpSpPr/>
+          <p:nvPr/>
+        </p:nvGrpSpPr>
+        <p:grpSpPr>
+          <a:xfrm>
+            <a:off x="122697" y="1808222"/>
+            <a:ext cx="3314792" cy="2442986"/>
+            <a:chOff x="24756" y="2397551"/>
+            <a:chExt cx="3314792" cy="2442986"/>
+          </a:xfrm>
+        </p:grpSpPr>
+        <p:grpSp>
+          <p:nvGrpSpPr>
+            <p:cNvPr id="9" name="Group 8">
+              <a:extLst>
+                <a:ext uri="{FF2B5EF4-FFF2-40B4-BE49-F238E27FC236}">
+                  <a16:creationId xmlns:a16="http://schemas.microsoft.com/office/drawing/2014/main" id="{B557757C-1738-EB48-70B0-F3593368B27F}"/>
+                </a:ext>
+              </a:extLst>
+            </p:cNvPr>
+            <p:cNvGrpSpPr/>
+            <p:nvPr/>
+          </p:nvGrpSpPr>
+          <p:grpSpPr>
+            <a:xfrm rot="16200000">
+              <a:off x="469120" y="3235649"/>
+              <a:ext cx="834604" cy="834604"/>
+              <a:chOff x="5123645" y="775255"/>
+              <a:chExt cx="834604" cy="834604"/>
+            </a:xfrm>
+          </p:grpSpPr>
+          <p:sp>
+            <p:nvSpPr>
+              <p:cNvPr id="10" name="Oval 9">
+                <a:extLst>
+                  <a:ext uri="{FF2B5EF4-FFF2-40B4-BE49-F238E27FC236}">
+                    <a16:creationId xmlns:a16="http://schemas.microsoft.com/office/drawing/2014/main" id="{90AD1D47-5B6C-217C-2B9C-48F56C5A2F04}"/>
+                  </a:ext>
+                </a:extLst>
+              </p:cNvPr>
+              <p:cNvSpPr/>
+              <p:nvPr/>
+            </p:nvSpPr>
+            <p:spPr>
+              <a:xfrm>
+                <a:off x="5123645" y="775255"/>
+                <a:ext cx="834604" cy="834604"/>
+              </a:xfrm>
+              <a:prstGeom prst="ellipse">
+                <a:avLst/>
+              </a:prstGeom>
+              <a:ln>
+                <a:solidFill>
+                  <a:schemeClr val="tx1">
+                    <a:lumMod val="95000"/>
+                    <a:lumOff val="5000"/>
+                  </a:schemeClr>
+                </a:solidFill>
+              </a:ln>
+            </p:spPr>
+            <p:style>
+              <a:lnRef idx="2">
+                <a:schemeClr val="accent3"/>
+              </a:lnRef>
+              <a:fillRef idx="1">
+                <a:schemeClr val="lt1"/>
+              </a:fillRef>
+              <a:effectRef idx="0">
+                <a:schemeClr val="accent3"/>
+              </a:effectRef>
+              <a:fontRef idx="minor">
+                <a:schemeClr val="dk1"/>
+              </a:fontRef>
+            </p:style>
+            <p:txBody>
+              <a:bodyPr rtlCol="0" anchor="ctr"/>
+              <a:lstStyle/>
+              <a:p>
+                <a:pPr algn="ctr"/>
+                <a:endParaRPr lang="en-FR">
+                  <a:latin typeface="Helvetica Neue Thin" panose="020B0403020202020204" pitchFamily="34" charset="0"/>
+                  <a:ea typeface="Helvetica Neue Thin" panose="020B0403020202020204" pitchFamily="34" charset="0"/>
+                </a:endParaRPr>
+              </a:p>
+            </p:txBody>
+          </p:sp>
+          <p:sp>
+            <p:nvSpPr>
+              <p:cNvPr id="11" name="TextBox 10">
+                <a:extLst>
+                  <a:ext uri="{FF2B5EF4-FFF2-40B4-BE49-F238E27FC236}">
+                    <a16:creationId xmlns:a16="http://schemas.microsoft.com/office/drawing/2014/main" id="{99D46293-1A62-4BE5-D8E0-671F0758A9E0}"/>
+                  </a:ext>
+                </a:extLst>
+              </p:cNvPr>
+              <p:cNvSpPr txBox="1"/>
+              <p:nvPr/>
+            </p:nvSpPr>
+            <p:spPr>
+              <a:xfrm rot="5400000">
+                <a:off x="5188924" y="1038668"/>
+                <a:ext cx="704045" cy="307777"/>
+              </a:xfrm>
+              <a:prstGeom prst="rect">
+                <a:avLst/>
+              </a:prstGeom>
+              <a:noFill/>
+              <a:ln>
+                <a:noFill/>
+              </a:ln>
+            </p:spPr>
+            <p:style>
+              <a:lnRef idx="2">
+                <a:schemeClr val="dk1"/>
+              </a:lnRef>
+              <a:fillRef idx="1">
+                <a:schemeClr val="lt1"/>
+              </a:fillRef>
+              <a:effectRef idx="0">
+                <a:schemeClr val="dk1"/>
+              </a:effectRef>
+              <a:fontRef idx="minor">
+                <a:schemeClr val="dk1"/>
+              </a:fontRef>
+            </p:style>
+            <p:txBody>
+              <a:bodyPr wrap="square">
+                <a:spAutoFit/>
+              </a:bodyPr>
+              <a:lstStyle/>
+              <a:p>
+                <a:pPr algn="ctr"/>
+                <a:r>
+                  <a:rPr lang="en-GB" sz="1400" dirty="0">
+                    <a:latin typeface="Helvetica Neue Thin" panose="020B0403020202020204" pitchFamily="34" charset="0"/>
+                    <a:ea typeface="Helvetica Neue Thin" panose="020B0403020202020204" pitchFamily="34" charset="0"/>
+                    <a:cs typeface="CMU Serif Roman" panose="02000603000000000000" pitchFamily="2" charset="0"/>
+                  </a:rPr>
+                  <a:t>S0</a:t>
+                </a:r>
+              </a:p>
+            </p:txBody>
+          </p:sp>
+        </p:grpSp>
+        <p:sp>
+          <p:nvSpPr>
+            <p:cNvPr id="16" name="Oval 15">
+              <a:extLst>
+                <a:ext uri="{FF2B5EF4-FFF2-40B4-BE49-F238E27FC236}">
+                  <a16:creationId xmlns:a16="http://schemas.microsoft.com/office/drawing/2014/main" id="{FA3D9FD7-3F46-A52A-949C-4130CE1A7DAF}"/>
+                </a:ext>
+              </a:extLst>
+            </p:cNvPr>
+            <p:cNvSpPr/>
+            <p:nvPr/>
+          </p:nvSpPr>
+          <p:spPr>
+            <a:xfrm rot="16200000">
+              <a:off x="2532202" y="4312503"/>
+              <a:ext cx="528034" cy="528034"/>
+            </a:xfrm>
+            <a:prstGeom prst="ellipse">
+              <a:avLst/>
+            </a:prstGeom>
+          </p:spPr>
+          <p:style>
+            <a:lnRef idx="2">
+              <a:schemeClr val="accent3"/>
+            </a:lnRef>
+            <a:fillRef idx="1">
+              <a:schemeClr val="lt1"/>
+            </a:fillRef>
+            <a:effectRef idx="0">
+              <a:schemeClr val="accent3"/>
+            </a:effectRef>
+            <a:fontRef idx="minor">
+              <a:schemeClr val="dk1"/>
+            </a:fontRef>
+          </p:style>
+          <p:txBody>
+            <a:bodyPr rtlCol="0" anchor="ctr"/>
+            <a:lstStyle/>
+            <a:p>
+              <a:pPr algn="ctr"/>
+              <a:endParaRPr lang="en-FR">
+                <a:latin typeface="Helvetica Neue Thin" panose="020B0403020202020204" pitchFamily="34" charset="0"/>
+                <a:ea typeface="Helvetica Neue Thin" panose="020B0403020202020204" pitchFamily="34" charset="0"/>
+              </a:endParaRPr>
+            </a:p>
+          </p:txBody>
+        </p:sp>
+        <p:sp>
+          <p:nvSpPr>
+            <p:cNvPr id="19" name="Oval 18">
+              <a:extLst>
+                <a:ext uri="{FF2B5EF4-FFF2-40B4-BE49-F238E27FC236}">
+                  <a16:creationId xmlns:a16="http://schemas.microsoft.com/office/drawing/2014/main" id="{32862ACD-1928-7790-1927-75ECCB1FAF7D}"/>
+                </a:ext>
+              </a:extLst>
+            </p:cNvPr>
+            <p:cNvSpPr/>
+            <p:nvPr/>
+          </p:nvSpPr>
+          <p:spPr>
+            <a:xfrm rot="16200000">
+              <a:off x="2532202" y="3365048"/>
+              <a:ext cx="528034" cy="528034"/>
+            </a:xfrm>
+            <a:prstGeom prst="ellipse">
+              <a:avLst/>
+            </a:prstGeom>
+          </p:spPr>
+          <p:style>
+            <a:lnRef idx="2">
+              <a:schemeClr val="accent3"/>
+            </a:lnRef>
+            <a:fillRef idx="1">
+              <a:schemeClr val="lt1"/>
+            </a:fillRef>
+            <a:effectRef idx="0">
+              <a:schemeClr val="accent3"/>
+            </a:effectRef>
+            <a:fontRef idx="minor">
+              <a:schemeClr val="dk1"/>
+            </a:fontRef>
+          </p:style>
+          <p:txBody>
+            <a:bodyPr rtlCol="0" anchor="ctr"/>
+            <a:lstStyle/>
+            <a:p>
+              <a:pPr algn="ctr"/>
+              <a:endParaRPr lang="en-FR">
+                <a:latin typeface="Helvetica Neue Thin" panose="020B0403020202020204" pitchFamily="34" charset="0"/>
+                <a:ea typeface="Helvetica Neue Thin" panose="020B0403020202020204" pitchFamily="34" charset="0"/>
+              </a:endParaRPr>
+            </a:p>
+          </p:txBody>
+        </p:sp>
+        <p:grpSp>
+          <p:nvGrpSpPr>
+            <p:cNvPr id="21" name="Group 20">
+              <a:extLst>
+                <a:ext uri="{FF2B5EF4-FFF2-40B4-BE49-F238E27FC236}">
+                  <a16:creationId xmlns:a16="http://schemas.microsoft.com/office/drawing/2014/main" id="{AB7ECAF4-EDB9-C0CD-41F1-A3EEE2784A29}"/>
+                </a:ext>
+              </a:extLst>
+            </p:cNvPr>
+            <p:cNvGrpSpPr/>
+            <p:nvPr/>
+          </p:nvGrpSpPr>
+          <p:grpSpPr>
+            <a:xfrm rot="16200000">
+              <a:off x="418311" y="2075786"/>
+              <a:ext cx="2248369" cy="3035479"/>
+              <a:chOff x="978148" y="-3000752"/>
+              <a:chExt cx="3553745" cy="4797847"/>
+            </a:xfrm>
+          </p:grpSpPr>
+          <p:sp>
+            <p:nvSpPr>
+              <p:cNvPr id="22" name="Oval 21">
+                <a:extLst>
+                  <a:ext uri="{FF2B5EF4-FFF2-40B4-BE49-F238E27FC236}">
+                    <a16:creationId xmlns:a16="http://schemas.microsoft.com/office/drawing/2014/main" id="{FC21C559-2A83-E2E0-0692-623B4DED5DA4}"/>
+                  </a:ext>
+                </a:extLst>
+              </p:cNvPr>
+              <p:cNvSpPr/>
+              <p:nvPr/>
+            </p:nvSpPr>
+            <p:spPr>
+              <a:xfrm>
+                <a:off x="3697289" y="962489"/>
+                <a:ext cx="834604" cy="834602"/>
+              </a:xfrm>
+              <a:prstGeom prst="ellipse">
+                <a:avLst/>
+              </a:prstGeom>
+            </p:spPr>
+            <p:style>
+              <a:lnRef idx="2">
+                <a:schemeClr val="accent3"/>
+              </a:lnRef>
+              <a:fillRef idx="1">
+                <a:schemeClr val="lt1"/>
+              </a:fillRef>
+              <a:effectRef idx="0">
+                <a:schemeClr val="accent3"/>
+              </a:effectRef>
+              <a:fontRef idx="minor">
+                <a:schemeClr val="dk1"/>
+              </a:fontRef>
+            </p:style>
+            <p:txBody>
+              <a:bodyPr rtlCol="0" anchor="ctr"/>
+              <a:lstStyle/>
+              <a:p>
+                <a:pPr algn="ctr"/>
+                <a:endParaRPr lang="en-FR">
+                  <a:latin typeface="Helvetica Neue Thin" panose="020B0403020202020204" pitchFamily="34" charset="0"/>
+                  <a:ea typeface="Helvetica Neue Thin" panose="020B0403020202020204" pitchFamily="34" charset="0"/>
+                </a:endParaRPr>
+              </a:p>
+            </p:txBody>
+          </p:sp>
+          <p:sp>
+            <p:nvSpPr>
+              <p:cNvPr id="23" name="TextBox 22">
+                <a:extLst>
+                  <a:ext uri="{FF2B5EF4-FFF2-40B4-BE49-F238E27FC236}">
+                    <a16:creationId xmlns:a16="http://schemas.microsoft.com/office/drawing/2014/main" id="{721062FB-0CE7-9E03-8473-ECAB2872DAD2}"/>
+                  </a:ext>
+                </a:extLst>
+              </p:cNvPr>
+              <p:cNvSpPr txBox="1"/>
+              <p:nvPr/>
+            </p:nvSpPr>
+            <p:spPr>
+              <a:xfrm rot="5400000">
+                <a:off x="3683717" y="1185202"/>
+                <a:ext cx="834601" cy="389174"/>
+              </a:xfrm>
+              <a:prstGeom prst="rect">
+                <a:avLst/>
+              </a:prstGeom>
+              <a:noFill/>
+              <a:ln>
+                <a:noFill/>
+              </a:ln>
+            </p:spPr>
+            <p:style>
+              <a:lnRef idx="2">
+                <a:schemeClr val="dk1"/>
+              </a:lnRef>
+              <a:fillRef idx="1">
+                <a:schemeClr val="lt1"/>
+              </a:fillRef>
+              <a:effectRef idx="0">
+                <a:schemeClr val="dk1"/>
+              </a:effectRef>
+              <a:fontRef idx="minor">
+                <a:schemeClr val="dk1"/>
+              </a:fontRef>
+            </p:style>
+            <p:txBody>
+              <a:bodyPr wrap="square">
+                <a:spAutoFit/>
+              </a:bodyPr>
+              <a:lstStyle/>
+              <a:p>
+                <a:pPr algn="ctr"/>
+                <a:r>
+                  <a:rPr lang="en-GB" sz="1000" dirty="0">
+                    <a:latin typeface="Helvetica Neue Thin" panose="020B0403020202020204" pitchFamily="34" charset="0"/>
+                    <a:ea typeface="Helvetica Neue Thin" panose="020B0403020202020204" pitchFamily="34" charset="0"/>
+                    <a:cs typeface="CMU Serif Roman" panose="02000603000000000000" pitchFamily="2" charset="0"/>
+                  </a:rPr>
+                  <a:t>S1</a:t>
+                </a:r>
+                <a:endParaRPr lang="en-GB" sz="1400" dirty="0">
+                  <a:latin typeface="Helvetica Neue Thin" panose="020B0403020202020204" pitchFamily="34" charset="0"/>
+                  <a:ea typeface="Helvetica Neue Thin" panose="020B0403020202020204" pitchFamily="34" charset="0"/>
+                  <a:cs typeface="CMU Serif Roman" panose="02000603000000000000" pitchFamily="2" charset="0"/>
+                </a:endParaRPr>
+              </a:p>
+            </p:txBody>
+          </p:sp>
+          <p:sp>
+            <p:nvSpPr>
+              <p:cNvPr id="47" name="TextBox 46">
+                <a:extLst>
+                  <a:ext uri="{FF2B5EF4-FFF2-40B4-BE49-F238E27FC236}">
+                    <a16:creationId xmlns:a16="http://schemas.microsoft.com/office/drawing/2014/main" id="{21CD2BC5-C0C9-7B47-F7B9-72A5E0E78F18}"/>
+                  </a:ext>
+                </a:extLst>
+              </p:cNvPr>
+              <p:cNvSpPr txBox="1"/>
+              <p:nvPr/>
+            </p:nvSpPr>
+            <p:spPr>
+              <a:xfrm rot="5400000">
+                <a:off x="2263066" y="1185202"/>
+                <a:ext cx="834599" cy="389174"/>
+              </a:xfrm>
+              <a:prstGeom prst="rect">
+                <a:avLst/>
+              </a:prstGeom>
+              <a:noFill/>
+              <a:ln>
+                <a:noFill/>
+              </a:ln>
+            </p:spPr>
+            <p:style>
+              <a:lnRef idx="2">
+                <a:schemeClr val="dk1"/>
+              </a:lnRef>
+              <a:fillRef idx="1">
+                <a:schemeClr val="lt1"/>
+              </a:fillRef>
+              <a:effectRef idx="0">
+                <a:schemeClr val="dk1"/>
+              </a:effectRef>
+              <a:fontRef idx="minor">
+                <a:schemeClr val="dk1"/>
+              </a:fontRef>
+            </p:style>
+            <p:txBody>
+              <a:bodyPr wrap="square">
+                <a:spAutoFit/>
+              </a:bodyPr>
+              <a:lstStyle/>
+              <a:p>
+                <a:pPr algn="ctr"/>
+                <a:r>
+                  <a:rPr lang="en-GB" sz="1000" dirty="0">
+                    <a:latin typeface="Helvetica Neue Thin" panose="020B0403020202020204" pitchFamily="34" charset="0"/>
+                    <a:ea typeface="Helvetica Neue Thin" panose="020B0403020202020204" pitchFamily="34" charset="0"/>
+                    <a:cs typeface="CMU Serif Roman" panose="02000603000000000000" pitchFamily="2" charset="0"/>
+                  </a:rPr>
+                  <a:t>S2</a:t>
+                </a:r>
+                <a:endParaRPr lang="en-GB" sz="1400" dirty="0">
+                  <a:latin typeface="Helvetica Neue Thin" panose="020B0403020202020204" pitchFamily="34" charset="0"/>
+                  <a:ea typeface="Helvetica Neue Thin" panose="020B0403020202020204" pitchFamily="34" charset="0"/>
+                  <a:cs typeface="CMU Serif Roman" panose="02000603000000000000" pitchFamily="2" charset="0"/>
+                </a:endParaRPr>
+              </a:p>
+            </p:txBody>
+          </p:sp>
+          <p:sp>
+            <p:nvSpPr>
+              <p:cNvPr id="48" name="TextBox 47">
+                <a:extLst>
+                  <a:ext uri="{FF2B5EF4-FFF2-40B4-BE49-F238E27FC236}">
+                    <a16:creationId xmlns:a16="http://schemas.microsoft.com/office/drawing/2014/main" id="{4CAB1608-92C2-2202-85FB-DD03C49B2B6D}"/>
+                  </a:ext>
+                </a:extLst>
+              </p:cNvPr>
+              <p:cNvSpPr txBox="1"/>
+              <p:nvPr/>
+            </p:nvSpPr>
+            <p:spPr>
+              <a:xfrm rot="5400000">
+                <a:off x="755435" y="1185209"/>
+                <a:ext cx="834599" cy="389174"/>
+              </a:xfrm>
+              <a:prstGeom prst="rect">
+                <a:avLst/>
+              </a:prstGeom>
+              <a:noFill/>
+              <a:ln>
+                <a:noFill/>
+              </a:ln>
+            </p:spPr>
+            <p:style>
+              <a:lnRef idx="2">
+                <a:schemeClr val="dk1"/>
+              </a:lnRef>
+              <a:fillRef idx="1">
+                <a:schemeClr val="lt1"/>
+              </a:fillRef>
+              <a:effectRef idx="0">
+                <a:schemeClr val="dk1"/>
+              </a:effectRef>
+              <a:fontRef idx="minor">
+                <a:schemeClr val="dk1"/>
+              </a:fontRef>
+            </p:style>
+            <p:txBody>
+              <a:bodyPr wrap="square">
+                <a:spAutoFit/>
+              </a:bodyPr>
+              <a:lstStyle/>
+              <a:p>
+                <a:pPr algn="ctr"/>
+                <a:r>
+                  <a:rPr lang="en-GB" sz="1000" dirty="0">
+                    <a:latin typeface="Helvetica Neue Thin" panose="020B0403020202020204" pitchFamily="34" charset="0"/>
+                    <a:ea typeface="Helvetica Neue Thin" panose="020B0403020202020204" pitchFamily="34" charset="0"/>
+                    <a:cs typeface="CMU Serif Roman" panose="02000603000000000000" pitchFamily="2" charset="0"/>
+                  </a:rPr>
+                  <a:t>S3</a:t>
+                </a:r>
+                <a:endParaRPr lang="en-GB" sz="1400" dirty="0">
+                  <a:latin typeface="Helvetica Neue Thin" panose="020B0403020202020204" pitchFamily="34" charset="0"/>
+                  <a:ea typeface="Helvetica Neue Thin" panose="020B0403020202020204" pitchFamily="34" charset="0"/>
+                  <a:cs typeface="CMU Serif Roman" panose="02000603000000000000" pitchFamily="2" charset="0"/>
+                </a:endParaRPr>
+              </a:p>
+            </p:txBody>
+          </p:sp>
+          <p:sp>
+            <p:nvSpPr>
+              <p:cNvPr id="62" name="TextBox 61">
+                <a:extLst>
+                  <a:ext uri="{FF2B5EF4-FFF2-40B4-BE49-F238E27FC236}">
+                    <a16:creationId xmlns:a16="http://schemas.microsoft.com/office/drawing/2014/main" id="{2DA1E6F6-A7A5-FFB5-1EAE-2CB222CCCF5A}"/>
+                  </a:ext>
+                </a:extLst>
+              </p:cNvPr>
+              <p:cNvSpPr txBox="1"/>
+              <p:nvPr/>
+            </p:nvSpPr>
+            <p:spPr>
+              <a:xfrm rot="5400000">
+                <a:off x="3332134" y="-527506"/>
+                <a:ext cx="834602" cy="389174"/>
+              </a:xfrm>
+              <a:prstGeom prst="rect">
+                <a:avLst/>
+              </a:prstGeom>
+              <a:noFill/>
+              <a:ln>
+                <a:noFill/>
+              </a:ln>
+            </p:spPr>
+            <p:style>
+              <a:lnRef idx="2">
+                <a:schemeClr val="dk1"/>
+              </a:lnRef>
+              <a:fillRef idx="1">
+                <a:schemeClr val="lt1"/>
+              </a:fillRef>
+              <a:effectRef idx="0">
+                <a:schemeClr val="dk1"/>
+              </a:effectRef>
+              <a:fontRef idx="minor">
+                <a:schemeClr val="dk1"/>
+              </a:fontRef>
+            </p:style>
+            <p:txBody>
+              <a:bodyPr wrap="square">
+                <a:spAutoFit/>
+              </a:bodyPr>
+              <a:lstStyle/>
+              <a:p>
+                <a:pPr algn="ctr"/>
+                <a:r>
+                  <a:rPr lang="en-GB" sz="1000" dirty="0">
+                    <a:latin typeface="Helvetica Neue Thin" panose="020B0403020202020204" pitchFamily="34" charset="0"/>
+                    <a:ea typeface="Helvetica Neue Thin" panose="020B0403020202020204" pitchFamily="34" charset="0"/>
+                    <a:cs typeface="CMU Serif Roman" panose="02000603000000000000" pitchFamily="2" charset="0"/>
+                  </a:rPr>
+                  <a:t>t1(p)</a:t>
+                </a:r>
+                <a:endParaRPr lang="en-GB" sz="1400" dirty="0">
+                  <a:latin typeface="Helvetica Neue Thin" panose="020B0403020202020204" pitchFamily="34" charset="0"/>
+                  <a:ea typeface="Helvetica Neue Thin" panose="020B0403020202020204" pitchFamily="34" charset="0"/>
+                  <a:cs typeface="CMU Serif Roman" panose="02000603000000000000" pitchFamily="2" charset="0"/>
+                </a:endParaRPr>
+              </a:p>
+            </p:txBody>
+          </p:sp>
+          <p:sp>
+            <p:nvSpPr>
+              <p:cNvPr id="63" name="TextBox 62">
+                <a:extLst>
+                  <a:ext uri="{FF2B5EF4-FFF2-40B4-BE49-F238E27FC236}">
+                    <a16:creationId xmlns:a16="http://schemas.microsoft.com/office/drawing/2014/main" id="{7936E82F-CEA3-04E4-836C-0975B33B43B6}"/>
+                  </a:ext>
+                </a:extLst>
+              </p:cNvPr>
+              <p:cNvSpPr txBox="1"/>
+              <p:nvPr/>
+            </p:nvSpPr>
+            <p:spPr>
+              <a:xfrm rot="5400000">
+                <a:off x="2457653" y="-188202"/>
+                <a:ext cx="834602" cy="389174"/>
+              </a:xfrm>
+              <a:prstGeom prst="rect">
+                <a:avLst/>
+              </a:prstGeom>
+              <a:noFill/>
+              <a:ln>
+                <a:noFill/>
+              </a:ln>
+            </p:spPr>
+            <p:style>
+              <a:lnRef idx="2">
+                <a:schemeClr val="dk1"/>
+              </a:lnRef>
+              <a:fillRef idx="1">
+                <a:schemeClr val="lt1"/>
+              </a:fillRef>
+              <a:effectRef idx="0">
+                <a:schemeClr val="dk1"/>
+              </a:effectRef>
+              <a:fontRef idx="minor">
+                <a:schemeClr val="dk1"/>
+              </a:fontRef>
+            </p:style>
+            <p:txBody>
+              <a:bodyPr wrap="square">
+                <a:spAutoFit/>
+              </a:bodyPr>
+              <a:lstStyle/>
+              <a:p>
+                <a:pPr algn="ctr"/>
+                <a:r>
+                  <a:rPr lang="en-GB" sz="1000" dirty="0">
+                    <a:latin typeface="Helvetica Neue Thin" panose="020B0403020202020204" pitchFamily="34" charset="0"/>
+                    <a:ea typeface="Helvetica Neue Thin" panose="020B0403020202020204" pitchFamily="34" charset="0"/>
+                    <a:cs typeface="CMU Serif Roman" panose="02000603000000000000" pitchFamily="2" charset="0"/>
+                  </a:rPr>
+                  <a:t>t2</a:t>
+                </a:r>
+                <a:endParaRPr lang="en-GB" sz="1400" dirty="0">
+                  <a:latin typeface="Helvetica Neue Thin" panose="020B0403020202020204" pitchFamily="34" charset="0"/>
+                  <a:ea typeface="Helvetica Neue Thin" panose="020B0403020202020204" pitchFamily="34" charset="0"/>
+                  <a:cs typeface="CMU Serif Roman" panose="02000603000000000000" pitchFamily="2" charset="0"/>
+                </a:endParaRPr>
+              </a:p>
+            </p:txBody>
+          </p:sp>
+          <p:sp>
+            <p:nvSpPr>
+              <p:cNvPr id="64" name="TextBox 63">
+                <a:extLst>
+                  <a:ext uri="{FF2B5EF4-FFF2-40B4-BE49-F238E27FC236}">
+                    <a16:creationId xmlns:a16="http://schemas.microsoft.com/office/drawing/2014/main" id="{AB1FB6D8-F4F6-0366-61DE-CEA4D76E723F}"/>
+                  </a:ext>
+                </a:extLst>
+              </p:cNvPr>
+              <p:cNvSpPr txBox="1"/>
+              <p:nvPr/>
+            </p:nvSpPr>
+            <p:spPr>
+              <a:xfrm rot="5400000">
+                <a:off x="1390215" y="-188203"/>
+                <a:ext cx="834602" cy="389174"/>
+              </a:xfrm>
+              <a:prstGeom prst="rect">
+                <a:avLst/>
+              </a:prstGeom>
+              <a:noFill/>
+              <a:ln>
+                <a:noFill/>
+              </a:ln>
+            </p:spPr>
+            <p:style>
+              <a:lnRef idx="2">
+                <a:schemeClr val="dk1"/>
+              </a:lnRef>
+              <a:fillRef idx="1">
+                <a:schemeClr val="lt1"/>
+              </a:fillRef>
+              <a:effectRef idx="0">
+                <a:schemeClr val="dk1"/>
+              </a:effectRef>
+              <a:fontRef idx="minor">
+                <a:schemeClr val="dk1"/>
+              </a:fontRef>
+            </p:style>
+            <p:txBody>
+              <a:bodyPr wrap="square">
+                <a:spAutoFit/>
+              </a:bodyPr>
+              <a:lstStyle/>
+              <a:p>
+                <a:pPr algn="ctr"/>
+                <a:r>
+                  <a:rPr lang="en-GB" sz="1000" dirty="0">
+                    <a:latin typeface="Helvetica Neue Thin" panose="020B0403020202020204" pitchFamily="34" charset="0"/>
+                    <a:ea typeface="Helvetica Neue Thin" panose="020B0403020202020204" pitchFamily="34" charset="0"/>
+                    <a:cs typeface="CMU Serif Roman" panose="02000603000000000000" pitchFamily="2" charset="0"/>
+                  </a:rPr>
+                  <a:t>t3</a:t>
+                </a:r>
+                <a:endParaRPr lang="en-GB" sz="1400" dirty="0">
+                  <a:latin typeface="Helvetica Neue Thin" panose="020B0403020202020204" pitchFamily="34" charset="0"/>
+                  <a:ea typeface="Helvetica Neue Thin" panose="020B0403020202020204" pitchFamily="34" charset="0"/>
+                  <a:cs typeface="CMU Serif Roman" panose="02000603000000000000" pitchFamily="2" charset="0"/>
+                </a:endParaRPr>
+              </a:p>
+            </p:txBody>
+          </p:sp>
+          <p:sp>
+            <p:nvSpPr>
+              <p:cNvPr id="80" name="TextBox 79">
+                <a:extLst>
+                  <a:ext uri="{FF2B5EF4-FFF2-40B4-BE49-F238E27FC236}">
+                    <a16:creationId xmlns:a16="http://schemas.microsoft.com/office/drawing/2014/main" id="{EC287D62-61E8-BF13-F4A3-4B8CBE2F5F5A}"/>
+                  </a:ext>
+                </a:extLst>
+              </p:cNvPr>
+              <p:cNvSpPr txBox="1"/>
+              <p:nvPr/>
+            </p:nvSpPr>
+            <p:spPr>
+              <a:xfrm rot="5400000">
+                <a:off x="2438379" y="-2778038"/>
+                <a:ext cx="834602" cy="389174"/>
+              </a:xfrm>
+              <a:prstGeom prst="rect">
+                <a:avLst/>
+              </a:prstGeom>
+              <a:noFill/>
+              <a:ln>
+                <a:noFill/>
+              </a:ln>
+            </p:spPr>
+            <p:style>
+              <a:lnRef idx="2">
+                <a:schemeClr val="dk1"/>
+              </a:lnRef>
+              <a:fillRef idx="1">
+                <a:schemeClr val="lt1"/>
+              </a:fillRef>
+              <a:effectRef idx="0">
+                <a:schemeClr val="dk1"/>
+              </a:effectRef>
+              <a:fontRef idx="minor">
+                <a:schemeClr val="dk1"/>
+              </a:fontRef>
+            </p:style>
+            <p:txBody>
+              <a:bodyPr wrap="square">
+                <a:spAutoFit/>
+              </a:bodyPr>
+              <a:lstStyle/>
+              <a:p>
+                <a:pPr algn="ctr"/>
+                <a:r>
+                  <a:rPr lang="en-GB" sz="1000" dirty="0">
+                    <a:latin typeface="Helvetica Neue Thin" panose="020B0403020202020204" pitchFamily="34" charset="0"/>
+                    <a:ea typeface="Helvetica Neue Thin" panose="020B0403020202020204" pitchFamily="34" charset="0"/>
+                    <a:cs typeface="CMU Serif Roman" panose="02000603000000000000" pitchFamily="2" charset="0"/>
+                  </a:rPr>
+                  <a:t>t0</a:t>
+                </a:r>
+                <a:endParaRPr lang="en-GB" sz="1400" dirty="0">
+                  <a:latin typeface="Helvetica Neue Thin" panose="020B0403020202020204" pitchFamily="34" charset="0"/>
+                  <a:ea typeface="Helvetica Neue Thin" panose="020B0403020202020204" pitchFamily="34" charset="0"/>
+                  <a:cs typeface="CMU Serif Roman" panose="02000603000000000000" pitchFamily="2" charset="0"/>
+                </a:endParaRPr>
+              </a:p>
+            </p:txBody>
+          </p:sp>
+        </p:grpSp>
+        <p:cxnSp>
+          <p:nvCxnSpPr>
+            <p:cNvPr id="28" name="Straight Arrow Connector 27">
+              <a:extLst>
+                <a:ext uri="{FF2B5EF4-FFF2-40B4-BE49-F238E27FC236}">
+                  <a16:creationId xmlns:a16="http://schemas.microsoft.com/office/drawing/2014/main" id="{D2AC846E-DAA6-93CB-80B3-AD1989C78FD3}"/>
+                </a:ext>
+              </a:extLst>
+            </p:cNvPr>
+            <p:cNvCxnSpPr>
+              <a:cxnSpLocks/>
+              <a:stCxn id="10" idx="5"/>
+              <a:endCxn id="22" idx="0"/>
+            </p:cNvCxnSpPr>
+            <p:nvPr/>
+          </p:nvCxnSpPr>
+          <p:spPr>
+            <a:xfrm flipV="1">
+              <a:off x="1181499" y="2733356"/>
+              <a:ext cx="1350702" cy="624518"/>
+            </a:xfrm>
+            <a:prstGeom prst="straightConnector1">
+              <a:avLst/>
+            </a:prstGeom>
+            <a:ln>
+              <a:solidFill>
+                <a:schemeClr val="tx1">
+                  <a:lumMod val="75000"/>
+                  <a:lumOff val="25000"/>
+                </a:schemeClr>
+              </a:solidFill>
+              <a:prstDash val="dash"/>
+              <a:tailEnd type="triangle"/>
+            </a:ln>
+          </p:spPr>
+          <p:style>
+            <a:lnRef idx="1">
+              <a:schemeClr val="accent1"/>
+            </a:lnRef>
+            <a:fillRef idx="0">
+              <a:schemeClr val="accent1"/>
+            </a:fillRef>
+            <a:effectRef idx="0">
+              <a:schemeClr val="accent1"/>
+            </a:effectRef>
+            <a:fontRef idx="minor">
+              <a:schemeClr val="tx1"/>
+            </a:fontRef>
+          </p:style>
+        </p:cxnSp>
+        <p:cxnSp>
+          <p:nvCxnSpPr>
+            <p:cNvPr id="29" name="Straight Arrow Connector 28">
+              <a:extLst>
+                <a:ext uri="{FF2B5EF4-FFF2-40B4-BE49-F238E27FC236}">
+                  <a16:creationId xmlns:a16="http://schemas.microsoft.com/office/drawing/2014/main" id="{07FB1B4E-4A89-EEA9-4ADA-655ECF238118}"/>
+                </a:ext>
+              </a:extLst>
+            </p:cNvPr>
+            <p:cNvCxnSpPr>
+              <a:cxnSpLocks/>
+              <a:stCxn id="10" idx="4"/>
+              <a:endCxn id="19" idx="0"/>
+            </p:cNvCxnSpPr>
+            <p:nvPr/>
+          </p:nvCxnSpPr>
+          <p:spPr>
+            <a:xfrm flipV="1">
+              <a:off x="1303724" y="3629065"/>
+              <a:ext cx="1228478" cy="23886"/>
+            </a:xfrm>
+            <a:prstGeom prst="straightConnector1">
+              <a:avLst/>
+            </a:prstGeom>
+            <a:ln>
+              <a:solidFill>
+                <a:schemeClr val="tx1">
+                  <a:lumMod val="75000"/>
+                  <a:lumOff val="25000"/>
+                </a:schemeClr>
+              </a:solidFill>
+              <a:prstDash val="dash"/>
+              <a:tailEnd type="triangle"/>
+            </a:ln>
+          </p:spPr>
+          <p:style>
+            <a:lnRef idx="1">
+              <a:schemeClr val="accent1"/>
+            </a:lnRef>
+            <a:fillRef idx="0">
+              <a:schemeClr val="accent1"/>
+            </a:fillRef>
+            <a:effectRef idx="0">
+              <a:schemeClr val="accent1"/>
+            </a:effectRef>
+            <a:fontRef idx="minor">
+              <a:schemeClr val="tx1"/>
+            </a:fontRef>
+          </p:style>
+        </p:cxnSp>
+        <p:cxnSp>
+          <p:nvCxnSpPr>
+            <p:cNvPr id="30" name="Straight Arrow Connector 29">
+              <a:extLst>
+                <a:ext uri="{FF2B5EF4-FFF2-40B4-BE49-F238E27FC236}">
+                  <a16:creationId xmlns:a16="http://schemas.microsoft.com/office/drawing/2014/main" id="{76DD4665-26A9-38A8-8281-2F1997A91D06}"/>
+                </a:ext>
+              </a:extLst>
+            </p:cNvPr>
+            <p:cNvCxnSpPr>
+              <a:cxnSpLocks/>
+              <a:stCxn id="10" idx="3"/>
+              <a:endCxn id="16" idx="0"/>
+            </p:cNvCxnSpPr>
+            <p:nvPr/>
+          </p:nvCxnSpPr>
+          <p:spPr>
+            <a:xfrm>
+              <a:off x="1181500" y="3948028"/>
+              <a:ext cx="1350703" cy="628492"/>
+            </a:xfrm>
+            <a:prstGeom prst="straightConnector1">
+              <a:avLst/>
+            </a:prstGeom>
+            <a:ln>
+              <a:solidFill>
+                <a:schemeClr val="tx1">
+                  <a:lumMod val="75000"/>
+                  <a:lumOff val="25000"/>
+                </a:schemeClr>
+              </a:solidFill>
+              <a:prstDash val="dash"/>
+              <a:tailEnd type="triangle"/>
+            </a:ln>
+          </p:spPr>
+          <p:style>
+            <a:lnRef idx="1">
+              <a:schemeClr val="accent1"/>
+            </a:lnRef>
+            <a:fillRef idx="0">
+              <a:schemeClr val="accent1"/>
+            </a:fillRef>
+            <a:effectRef idx="0">
+              <a:schemeClr val="accent1"/>
+            </a:effectRef>
+            <a:fontRef idx="minor">
+              <a:schemeClr val="tx1"/>
+            </a:fontRef>
+          </p:style>
+        </p:cxnSp>
+        <p:cxnSp>
+          <p:nvCxnSpPr>
+            <p:cNvPr id="65" name="Straight Arrow Connector 64">
+              <a:extLst>
+                <a:ext uri="{FF2B5EF4-FFF2-40B4-BE49-F238E27FC236}">
+                  <a16:creationId xmlns:a16="http://schemas.microsoft.com/office/drawing/2014/main" id="{FB7F4ED6-AD33-956E-00C5-09B0F1AF4BC0}"/>
+                </a:ext>
+              </a:extLst>
+            </p:cNvPr>
+            <p:cNvCxnSpPr>
+              <a:cxnSpLocks/>
+              <a:stCxn id="22" idx="5"/>
+            </p:cNvCxnSpPr>
+            <p:nvPr/>
+          </p:nvCxnSpPr>
+          <p:spPr>
+            <a:xfrm flipV="1">
+              <a:off x="2982905" y="2397551"/>
+              <a:ext cx="184364" cy="149118"/>
+            </a:xfrm>
+            <a:prstGeom prst="straightConnector1">
+              <a:avLst/>
+            </a:prstGeom>
+            <a:ln>
+              <a:solidFill>
+                <a:schemeClr val="tx1">
+                  <a:lumMod val="75000"/>
+                  <a:lumOff val="25000"/>
+                </a:schemeClr>
+              </a:solidFill>
+              <a:prstDash val="dash"/>
+              <a:tailEnd type="triangle"/>
+            </a:ln>
+          </p:spPr>
+          <p:style>
+            <a:lnRef idx="1">
+              <a:schemeClr val="accent1"/>
+            </a:lnRef>
+            <a:fillRef idx="0">
+              <a:schemeClr val="accent1"/>
+            </a:fillRef>
+            <a:effectRef idx="0">
+              <a:schemeClr val="accent1"/>
+            </a:effectRef>
+            <a:fontRef idx="minor">
+              <a:schemeClr val="tx1"/>
+            </a:fontRef>
+          </p:style>
+        </p:cxnSp>
+        <p:cxnSp>
+          <p:nvCxnSpPr>
+            <p:cNvPr id="69" name="Straight Arrow Connector 68">
+              <a:extLst>
+                <a:ext uri="{FF2B5EF4-FFF2-40B4-BE49-F238E27FC236}">
+                  <a16:creationId xmlns:a16="http://schemas.microsoft.com/office/drawing/2014/main" id="{00B28419-B34E-235F-191F-C16FD44296F0}"/>
+                </a:ext>
+              </a:extLst>
+            </p:cNvPr>
+            <p:cNvCxnSpPr>
+              <a:cxnSpLocks/>
+              <a:stCxn id="22" idx="4"/>
+            </p:cNvCxnSpPr>
+            <p:nvPr/>
+          </p:nvCxnSpPr>
+          <p:spPr>
+            <a:xfrm>
+              <a:off x="3060233" y="2733357"/>
+              <a:ext cx="279315" cy="34971"/>
+            </a:xfrm>
+            <a:prstGeom prst="straightConnector1">
+              <a:avLst/>
+            </a:prstGeom>
+            <a:ln>
+              <a:solidFill>
+                <a:schemeClr val="tx1">
+                  <a:lumMod val="75000"/>
+                  <a:lumOff val="25000"/>
+                </a:schemeClr>
+              </a:solidFill>
+              <a:prstDash val="dash"/>
+              <a:tailEnd type="triangle"/>
+            </a:ln>
+          </p:spPr>
+          <p:style>
+            <a:lnRef idx="1">
+              <a:schemeClr val="accent1"/>
+            </a:lnRef>
+            <a:fillRef idx="0">
+              <a:schemeClr val="accent1"/>
+            </a:fillRef>
+            <a:effectRef idx="0">
+              <a:schemeClr val="accent1"/>
+            </a:effectRef>
+            <a:fontRef idx="minor">
+              <a:schemeClr val="tx1"/>
+            </a:fontRef>
+          </p:style>
+        </p:cxnSp>
+        <p:cxnSp>
+          <p:nvCxnSpPr>
+            <p:cNvPr id="72" name="Straight Arrow Connector 71">
+              <a:extLst>
+                <a:ext uri="{FF2B5EF4-FFF2-40B4-BE49-F238E27FC236}">
+                  <a16:creationId xmlns:a16="http://schemas.microsoft.com/office/drawing/2014/main" id="{A103FBDA-9FB4-EF06-8CCD-50480907E8F7}"/>
+                </a:ext>
+              </a:extLst>
+            </p:cNvPr>
+            <p:cNvCxnSpPr>
+              <a:cxnSpLocks/>
+              <a:stCxn id="22" idx="3"/>
+            </p:cNvCxnSpPr>
+            <p:nvPr/>
+          </p:nvCxnSpPr>
+          <p:spPr>
+            <a:xfrm>
+              <a:off x="2982905" y="2920045"/>
+              <a:ext cx="216985" cy="143248"/>
+            </a:xfrm>
+            <a:prstGeom prst="straightConnector1">
+              <a:avLst/>
+            </a:prstGeom>
+            <a:ln>
+              <a:solidFill>
+                <a:schemeClr val="tx1">
+                  <a:lumMod val="75000"/>
+                  <a:lumOff val="25000"/>
+                </a:schemeClr>
+              </a:solidFill>
+              <a:prstDash val="dash"/>
+              <a:tailEnd type="triangle"/>
+            </a:ln>
+          </p:spPr>
+          <p:style>
+            <a:lnRef idx="1">
+              <a:schemeClr val="accent1"/>
+            </a:lnRef>
+            <a:fillRef idx="0">
+              <a:schemeClr val="accent1"/>
+            </a:fillRef>
+            <a:effectRef idx="0">
+              <a:schemeClr val="accent1"/>
+            </a:effectRef>
+            <a:fontRef idx="minor">
+              <a:schemeClr val="tx1"/>
+            </a:fontRef>
+          </p:style>
+        </p:cxnSp>
+        <p:cxnSp>
+          <p:nvCxnSpPr>
+            <p:cNvPr id="75" name="Straight Arrow Connector 74">
+              <a:extLst>
+                <a:ext uri="{FF2B5EF4-FFF2-40B4-BE49-F238E27FC236}">
+                  <a16:creationId xmlns:a16="http://schemas.microsoft.com/office/drawing/2014/main" id="{B7443E76-B300-F371-F0AA-388BF82009D9}"/>
+                </a:ext>
+              </a:extLst>
+            </p:cNvPr>
+            <p:cNvCxnSpPr>
+              <a:cxnSpLocks/>
+              <a:endCxn id="10" idx="0"/>
+            </p:cNvCxnSpPr>
+            <p:nvPr/>
+          </p:nvCxnSpPr>
+          <p:spPr>
+            <a:xfrm>
+              <a:off x="147453" y="3652951"/>
+              <a:ext cx="321667" cy="0"/>
+            </a:xfrm>
+            <a:prstGeom prst="straightConnector1">
+              <a:avLst/>
+            </a:prstGeom>
+            <a:ln>
+              <a:solidFill>
+                <a:schemeClr val="tx1">
+                  <a:lumMod val="75000"/>
+                  <a:lumOff val="25000"/>
+                </a:schemeClr>
+              </a:solidFill>
+              <a:prstDash val="dash"/>
+              <a:tailEnd type="triangle"/>
+            </a:ln>
+          </p:spPr>
+          <p:style>
+            <a:lnRef idx="1">
+              <a:schemeClr val="accent1"/>
+            </a:lnRef>
+            <a:fillRef idx="0">
+              <a:schemeClr val="accent1"/>
+            </a:fillRef>
+            <a:effectRef idx="0">
+              <a:schemeClr val="accent1"/>
+            </a:effectRef>
+            <a:fontRef idx="minor">
+              <a:schemeClr val="tx1"/>
+            </a:fontRef>
+          </p:style>
+        </p:cxnSp>
+      </p:grpSp>
+      <p:sp>
+        <p:nvSpPr>
+          <p:cNvPr id="61" name="TextBox 60">
+            <a:extLst>
+              <a:ext uri="{FF2B5EF4-FFF2-40B4-BE49-F238E27FC236}">
+                <a16:creationId xmlns:a16="http://schemas.microsoft.com/office/drawing/2014/main" id="{B55F7355-F4D5-3742-7632-6518FF1AC7C9}"/>
+              </a:ext>
+            </a:extLst>
+          </p:cNvPr>
+          <p:cNvSpPr txBox="1"/>
+          <p:nvPr/>
+        </p:nvSpPr>
+        <p:spPr>
+          <a:xfrm>
+            <a:off x="3705212" y="1943167"/>
+            <a:ext cx="8543292" cy="2062103"/>
+          </a:xfrm>
+          <a:prstGeom prst="rect">
+            <a:avLst/>
+          </a:prstGeom>
+          <a:noFill/>
+        </p:spPr>
+        <p:txBody>
+          <a:bodyPr wrap="square" rtlCol="0">
+            <a:spAutoFit/>
+          </a:bodyPr>
+          <a:lstStyle/>
+          <a:p>
+            <a:r>
+              <a:rPr lang="en-GB" sz="1600" dirty="0">
+                <a:latin typeface="Helvetica Neue Thin" panose="020B0403020202020204" pitchFamily="34" charset="0"/>
+                <a:ea typeface="Helvetica Neue Thin" panose="020B0403020202020204" pitchFamily="34" charset="0"/>
+              </a:rPr>
+              <a:t>What reward for S1 should taken into account:</a:t>
+            </a:r>
+          </a:p>
+          <a:p>
+            <a:pPr marL="342900" indent="-342900">
+              <a:buAutoNum type="arabicParenBoth"/>
+            </a:pPr>
+            <a:r>
+              <a:rPr lang="en-GB" sz="1600" dirty="0">
+                <a:latin typeface="Helvetica Neue Thin" panose="020B0403020202020204" pitchFamily="34" charset="0"/>
+                <a:ea typeface="Helvetica Neue Thin" panose="020B0403020202020204" pitchFamily="34" charset="0"/>
+              </a:rPr>
+              <a:t>Has S1 appeared before [++]</a:t>
+            </a:r>
+          </a:p>
+          <a:p>
+            <a:pPr marL="342900" indent="-342900">
+              <a:buAutoNum type="arabicParenBoth"/>
+            </a:pPr>
+            <a:r>
+              <a:rPr lang="en-GB" sz="1600" dirty="0">
+                <a:latin typeface="Helvetica Neue Thin" panose="020B0403020202020204" pitchFamily="34" charset="0"/>
+                <a:ea typeface="Helvetica Neue Thin" panose="020B0403020202020204" pitchFamily="34" charset="0"/>
+              </a:rPr>
+              <a:t>Has t1 appeared? What % of the time did it appear initially </a:t>
+            </a:r>
+          </a:p>
+          <a:p>
+            <a:pPr marL="342900" indent="-342900">
+              <a:buAutoNum type="arabicParenBoth"/>
+            </a:pPr>
+            <a:r>
+              <a:rPr lang="en-GB" sz="1600" dirty="0">
+                <a:latin typeface="Helvetica Neue Thin" panose="020B0403020202020204" pitchFamily="34" charset="0"/>
+                <a:ea typeface="Helvetica Neue Thin" panose="020B0403020202020204" pitchFamily="34" charset="0"/>
+              </a:rPr>
+              <a:t>How often did the couple (t0, t1) appear compared to other t0 couples (only w/ </a:t>
+            </a:r>
+            <a:r>
+              <a:rPr lang="en-GB" sz="1600" dirty="0" err="1">
+                <a:latin typeface="Helvetica Neue Thin" panose="020B0403020202020204" pitchFamily="34" charset="0"/>
+                <a:ea typeface="Helvetica Neue Thin" panose="020B0403020202020204" pitchFamily="34" charset="0"/>
+              </a:rPr>
+              <a:t>poss</a:t>
+            </a:r>
+            <a:r>
+              <a:rPr lang="en-GB" sz="1600" dirty="0">
+                <a:latin typeface="Helvetica Neue Thin" panose="020B0403020202020204" pitchFamily="34" charset="0"/>
+                <a:ea typeface="Helvetica Neue Thin" panose="020B0403020202020204" pitchFamily="34" charset="0"/>
+              </a:rPr>
+              <a:t> exits)</a:t>
+            </a:r>
+          </a:p>
+          <a:p>
+            <a:pPr marL="342900" indent="-342900">
+              <a:buAutoNum type="arabicParenBoth"/>
+            </a:pPr>
+            <a:r>
+              <a:rPr lang="en-GB" sz="1600" dirty="0">
+                <a:latin typeface="Helvetica Neue Thin" panose="020B0403020202020204" pitchFamily="34" charset="0"/>
+                <a:ea typeface="Helvetica Neue Thin" panose="020B0403020202020204" pitchFamily="34" charset="0"/>
+              </a:rPr>
+              <a:t>Has t1 been taken from S0 before [++]</a:t>
+            </a:r>
+          </a:p>
+          <a:p>
+            <a:pPr marL="342900" indent="-342900">
+              <a:buAutoNum type="arabicParenBoth"/>
+            </a:pPr>
+            <a:r>
+              <a:rPr lang="en-GB" sz="1600" dirty="0">
+                <a:latin typeface="Helvetica Neue Thin" panose="020B0403020202020204" pitchFamily="34" charset="0"/>
+                <a:ea typeface="Helvetica Neue Thin" panose="020B0403020202020204" pitchFamily="34" charset="0"/>
+              </a:rPr>
+              <a:t>How many exits does S1 have</a:t>
+            </a:r>
+          </a:p>
+          <a:p>
+            <a:pPr marL="342900" indent="-342900">
+              <a:buAutoNum type="arabicParenBoth"/>
+            </a:pPr>
+            <a:r>
+              <a:rPr lang="en-GB" sz="1600" dirty="0">
+                <a:latin typeface="Helvetica Neue Thin" panose="020B0403020202020204" pitchFamily="34" charset="0"/>
+                <a:ea typeface="Helvetica Neue Thin" panose="020B0403020202020204" pitchFamily="34" charset="0"/>
+              </a:rPr>
+              <a:t>Does S1 appear in DEAD_PRED? (only if (3) doesn’t reply deadlock)</a:t>
+            </a:r>
+          </a:p>
+          <a:p>
+            <a:pPr marL="342900" indent="-342900">
+              <a:buAutoNum type="arabicParenBoth"/>
+            </a:pPr>
+            <a:r>
+              <a:rPr lang="en-GB" sz="1600" dirty="0">
+                <a:latin typeface="Helvetica Neue Thin" panose="020B0403020202020204" pitchFamily="34" charset="0"/>
+                <a:ea typeface="Helvetica Neue Thin" panose="020B0403020202020204" pitchFamily="34" charset="0"/>
+              </a:rPr>
+              <a:t>If t1 has a proc, how did that proc behave before [maybe?]</a:t>
+            </a:r>
+          </a:p>
+        </p:txBody>
+      </p:sp>
+      <p:sp>
+        <p:nvSpPr>
+          <p:cNvPr id="81" name="TextBox 80">
+            <a:extLst>
+              <a:ext uri="{FF2B5EF4-FFF2-40B4-BE49-F238E27FC236}">
+                <a16:creationId xmlns:a16="http://schemas.microsoft.com/office/drawing/2014/main" id="{097F6EA0-4724-5C4F-94D1-DCF6E93B34F2}"/>
+              </a:ext>
+            </a:extLst>
+          </p:cNvPr>
+          <p:cNvSpPr txBox="1"/>
+          <p:nvPr/>
+        </p:nvSpPr>
+        <p:spPr>
+          <a:xfrm>
+            <a:off x="20498" y="141760"/>
+            <a:ext cx="7456093" cy="400110"/>
+          </a:xfrm>
+          <a:prstGeom prst="rect">
+            <a:avLst/>
+          </a:prstGeom>
+          <a:noFill/>
+        </p:spPr>
+        <p:txBody>
+          <a:bodyPr wrap="square" rtlCol="0">
+            <a:spAutoFit/>
+          </a:bodyPr>
+          <a:lstStyle/>
+          <a:p>
+            <a:r>
+              <a:rPr lang="en-FR" sz="2000" dirty="0">
+                <a:latin typeface="Helvetica Neue Thin" panose="020B0403020202020204" pitchFamily="34" charset="0"/>
+                <a:ea typeface="Helvetica Neue Thin" panose="020B0403020202020204" pitchFamily="34" charset="0"/>
+              </a:rPr>
+              <a:t>Following explorations</a:t>
+            </a:r>
+          </a:p>
+        </p:txBody>
+      </p:sp>
+      <p:sp>
+        <p:nvSpPr>
+          <p:cNvPr id="85" name="TextBox 84">
+            <a:extLst>
+              <a:ext uri="{FF2B5EF4-FFF2-40B4-BE49-F238E27FC236}">
+                <a16:creationId xmlns:a16="http://schemas.microsoft.com/office/drawing/2014/main" id="{F1D1B8CF-6DD6-030E-48B7-69B3C65674F4}"/>
+              </a:ext>
+            </a:extLst>
+          </p:cNvPr>
+          <p:cNvSpPr txBox="1"/>
+          <p:nvPr/>
+        </p:nvSpPr>
+        <p:spPr>
+          <a:xfrm>
+            <a:off x="122697" y="726030"/>
+            <a:ext cx="12003110" cy="338554"/>
+          </a:xfrm>
+          <a:prstGeom prst="rect">
+            <a:avLst/>
+          </a:prstGeom>
+          <a:noFill/>
+        </p:spPr>
+        <p:txBody>
+          <a:bodyPr wrap="square" rtlCol="0">
+            <a:spAutoFit/>
+          </a:bodyPr>
+          <a:lstStyle/>
+          <a:p>
+            <a:r>
+              <a:rPr lang="en-GB" sz="1600" dirty="0">
+                <a:latin typeface="Helvetica Neue Thin" panose="020B0403020202020204" pitchFamily="34" charset="0"/>
+                <a:ea typeface="Helvetica Neue Thin" panose="020B0403020202020204" pitchFamily="34" charset="0"/>
+              </a:rPr>
+              <a:t>Analyse the runs, and get the set of sets that didn’t get all of their exits visited and use those as starting states instead of going from Init</a:t>
+            </a:r>
+          </a:p>
+        </p:txBody>
+      </p:sp>
+    </p:spTree>
+    <p:extLst>
+      <p:ext uri="{BB962C8B-B14F-4D97-AF65-F5344CB8AC3E}">
+        <p14:creationId xmlns:p14="http://schemas.microsoft.com/office/powerpoint/2010/main" val="1949332942"/>
+      </p:ext>
+    </p:extLst>
+  </p:cSld>
+  <p:clrMapOvr>
+    <a:masterClrMapping/>
+  </p:clrMapOvr>
+</p:sld>
+</file>
+
 <file path=ppt/slides/slide4.xml><?xml version="1.0" encoding="utf-8"?>
 <p:sld xmlns:a="http://schemas.openxmlformats.org/drawingml/2006/main" xmlns:r="http://schemas.openxmlformats.org/officeDocument/2006/relationships" xmlns:p="http://schemas.openxmlformats.org/presentationml/2006/main">
   <p:cSld>
@@ -19612,14 +21418,7 @@
                 <a:latin typeface="Helvetica Neue Thin" panose="020B0403020202020204" pitchFamily="34" charset="0"/>
                 <a:ea typeface="Helvetica Neue Thin" panose="020B0403020202020204" pitchFamily="34" charset="0"/>
               </a:rPr>
-              <a:t>Step</a:t>
-            </a:r>
-            <a:r>
-              <a:rPr lang="en-US" dirty="0">
-                <a:latin typeface="Helvetica Neue Thin" panose="020B0403020202020204" pitchFamily="34" charset="0"/>
-                <a:ea typeface="Helvetica Neue Thin" panose="020B0403020202020204" pitchFamily="34" charset="0"/>
-              </a:rPr>
-              <a:t> 2: Gather </a:t>
+              <a:t>Step 2: Gather </a:t>
             </a:r>
             <a:r>
               <a:rPr lang="en-US" dirty="0">
@@ -19743,36 +21542,45 @@
                 <a:latin typeface="Helvetica Neue Thin" panose="020B0403020202020204" pitchFamily="34" charset="0"/>
                 <a:ea typeface="Helvetica Neue Thin" panose="020B0403020202020204" pitchFamily="34" charset="0"/>
               </a:rPr>
-              <a:t>Step</a:t>
+              <a:t>Step 5: Rerun model exploration modifying how the system is explored using one of the proposed methods [</a:t>
             </a:r>
             <a:r>
               <a:rPr lang="en-US" dirty="0">
                 <a:latin typeface="Helvetica Neue Thin" panose="020B0403020202020204" pitchFamily="34" charset="0"/>
                 <a:ea typeface="Helvetica Neue Thin" panose="020B0403020202020204" pitchFamily="34" charset="0"/>
-              </a:rPr>
-              <a:t> 5: </a:t>
+                <a:hlinkClick r:id="rId3" action="ppaction://hlinksldjump"/>
+              </a:rPr>
+              <a:t>Slide 13</a:t>
             </a:r>
             <a:r>
               <a:rPr lang="en-US" dirty="0">
                 <a:latin typeface="Helvetica Neue Thin" panose="020B0403020202020204" pitchFamily="34" charset="0"/>
                 <a:ea typeface="Helvetica Neue Thin" panose="020B0403020202020204" pitchFamily="34" charset="0"/>
               </a:rPr>
-              <a:t>Rerun model exploration modifying how the system is explored using one of the proposed methods [</a:t>
-            </a:r>
+              <a:t>]</a:t>
+            </a:r>
+          </a:p>
+          <a:p>
             <a:r>
               <a:rPr lang="en-US" dirty="0">
                 <a:latin typeface="Helvetica Neue Thin" panose="020B0403020202020204" pitchFamily="34" charset="0"/>
                 <a:ea typeface="Helvetica Neue Thin" panose="020B0403020202020204" pitchFamily="34" charset="0"/>
-                <a:hlinkClick r:id="rId3" action="ppaction://hlinksldjump"/>
-              </a:rPr>
-              <a:t>Slide 13</a:t>
+              </a:rPr>
+              <a:t>	(</a:t>
+            </a:r>
+            <a:r>
+              <a:rPr lang="en-US" dirty="0" err="1">
+                <a:latin typeface="Helvetica Neue Thin" panose="020B0403020202020204" pitchFamily="34" charset="0"/>
+                <a:ea typeface="Helvetica Neue Thin" panose="020B0403020202020204" pitchFamily="34" charset="0"/>
+              </a:rPr>
+              <a:t>i</a:t>
             </a:r>
             <a:r>
               <a:rPr lang="en-US" dirty="0">
                 <a:latin typeface="Helvetica Neue Thin" panose="020B0403020202020204" pitchFamily="34" charset="0"/>
                 <a:ea typeface="Helvetica Neue Thin" panose="020B0403020202020204" pitchFamily="34" charset="0"/>
               </a:rPr>
-              <a:t>]</a:t>
+              <a:t>) Bias the Proposal Distribution </a:t>
             </a:r>
           </a:p>
           <a:p>
@@ -19781,31 +21589,19 @@
                 <a:latin typeface="Helvetica Neue Thin" panose="020B0403020202020204" pitchFamily="34" charset="0"/>
                 <a:ea typeface="Helvetica Neue Thin" panose="020B0403020202020204" pitchFamily="34" charset="0"/>
               </a:rPr>
-              <a:t>	(</a:t>
-            </a:r>
-            <a:r>
-              <a:rPr lang="en-US" dirty="0" err="1">
-                <a:latin typeface="Helvetica Neue Thin" panose="020B0403020202020204" pitchFamily="34" charset="0"/>
-                <a:ea typeface="Helvetica Neue Thin" panose="020B0403020202020204" pitchFamily="34" charset="0"/>
-              </a:rPr>
-              <a:t>i</a:t>
-            </a:r>
+              <a:t>	(ii) Bias the Entropy </a:t>
+            </a:r>
+          </a:p>
+          <a:p>
             <a:r>
               <a:rPr lang="en-US" dirty="0">
                 <a:latin typeface="Helvetica Neue Thin" panose="020B0403020202020204" pitchFamily="34" charset="0"/>
                 <a:ea typeface="Helvetica Neue Thin" panose="020B0403020202020204" pitchFamily="34" charset="0"/>
               </a:rPr>
-              <a:t>) Bias the Proposal Distribution </a:t>
-            </a:r>
-          </a:p>
-          <a:p>
-            <a:r>
-              <a:rPr lang="en-US" dirty="0">
-                <a:latin typeface="Helvetica Neue Thin" panose="020B0403020202020204" pitchFamily="34" charset="0"/>
-                <a:ea typeface="Helvetica Neue Thin" panose="020B0403020202020204" pitchFamily="34" charset="0"/>
-              </a:rPr>
-              <a:t>	(ii) Bias the Entropy </a:t>
-            </a:r>
+              <a:t>	(iii) Bias both </a:t>
+            </a:r>
+          </a:p>
+          <a:p>
             <a:endParaRPr lang="en-US" dirty="0">
               <a:latin typeface="Helvetica Neue Thin" panose="020B0403020202020204" pitchFamily="34" charset="0"/>
               <a:ea typeface="Helvetica Neue Thin" panose="020B0403020202020204" pitchFamily="34" charset="0"/>
@@ -19817,7 +21613,39 @@
                 <a:latin typeface="Helvetica Neue Thin" panose="020B0403020202020204" pitchFamily="34" charset="0"/>
                 <a:ea typeface="Helvetica Neue Thin" panose="020B0403020202020204" pitchFamily="34" charset="0"/>
               </a:rPr>
-              <a:t>	(iii) Bias both </a:t>
+              <a:t>Step 6: Gather </a:t>
+            </a:r>
+            <a:r>
+              <a:rPr lang="en-US" dirty="0">
+                <a:solidFill>
+                  <a:srgbClr val="0432FF"/>
+                </a:solidFill>
+                <a:latin typeface="Helvetica Neue Thin" panose="020B0403020202020204" pitchFamily="34" charset="0"/>
+                <a:ea typeface="Helvetica Neue Thin" panose="020B0403020202020204" pitchFamily="34" charset="0"/>
+              </a:rPr>
+              <a:t>new data </a:t>
+            </a:r>
+            <a:r>
+              <a:rPr lang="en-US" dirty="0">
+                <a:latin typeface="Helvetica Neue Thin" panose="020B0403020202020204" pitchFamily="34" charset="0"/>
+                <a:ea typeface="Helvetica Neue Thin" panose="020B0403020202020204" pitchFamily="34" charset="0"/>
+              </a:rPr>
+              <a:t>and analyze it [</a:t>
+            </a:r>
+            <a:r>
+              <a:rPr lang="en-US" dirty="0">
+                <a:latin typeface="Helvetica Neue Thin" panose="020B0403020202020204" pitchFamily="34" charset="0"/>
+                <a:ea typeface="Helvetica Neue Thin" panose="020B0403020202020204" pitchFamily="34" charset="0"/>
+                <a:hlinkClick r:id="rId4" action="ppaction://hlinksldjump"/>
+              </a:rPr>
+              <a:t>Slide 14</a:t>
+            </a:r>
+            <a:r>
+              <a:rPr lang="en-US" dirty="0">
+                <a:latin typeface="Helvetica Neue Thin" panose="020B0403020202020204" pitchFamily="34" charset="0"/>
+                <a:ea typeface="Helvetica Neue Thin" panose="020B0403020202020204" pitchFamily="34" charset="0"/>
+              </a:rPr>
+              <a:t>]</a:t>
             </a:r>
           </a:p>
           <a:p>
@@ -19832,68 +21660,7 @@
                 <a:latin typeface="Helvetica Neue Thin" panose="020B0403020202020204" pitchFamily="34" charset="0"/>
                 <a:ea typeface="Helvetica Neue Thin" panose="020B0403020202020204" pitchFamily="34" charset="0"/>
               </a:rPr>
-              <a:t>Step </a:t>
-            </a:r>
-            <a:r>
-              <a:rPr lang="en-US" dirty="0">
-                <a:latin typeface="Helvetica Neue Thin" panose="020B0403020202020204" pitchFamily="34" charset="0"/>
-                <a:ea typeface="Helvetica Neue Thin" panose="020B0403020202020204" pitchFamily="34" charset="0"/>
-              </a:rPr>
-              <a:t>6: Gather </a:t>
-            </a:r>
-            <a:r>
-              <a:rPr lang="en-US" dirty="0">
-                <a:solidFill>
-                  <a:srgbClr val="0432FF"/>
-                </a:solidFill>
-                <a:latin typeface="Helvetica Neue Thin" panose="020B0403020202020204" pitchFamily="34" charset="0"/>
-                <a:ea typeface="Helvetica Neue Thin" panose="020B0403020202020204" pitchFamily="34" charset="0"/>
-              </a:rPr>
-              <a:t>new data </a:t>
-            </a:r>
-            <a:r>
-              <a:rPr lang="en-US" dirty="0">
-                <a:latin typeface="Helvetica Neue Thin" panose="020B0403020202020204" pitchFamily="34" charset="0"/>
-                <a:ea typeface="Helvetica Neue Thin" panose="020B0403020202020204" pitchFamily="34" charset="0"/>
-              </a:rPr>
-              <a:t>and analyze it [</a:t>
-            </a:r>
-            <a:r>
-              <a:rPr lang="en-US" dirty="0">
-                <a:latin typeface="Helvetica Neue Thin" panose="020B0403020202020204" pitchFamily="34" charset="0"/>
-                <a:ea typeface="Helvetica Neue Thin" panose="020B0403020202020204" pitchFamily="34" charset="0"/>
-                <a:hlinkClick r:id="rId4" action="ppaction://hlinksldjump"/>
-              </a:rPr>
-              <a:t>Slide 14</a:t>
-            </a:r>
-            <a:r>
-              <a:rPr lang="en-US" dirty="0">
-                <a:latin typeface="Helvetica Neue Thin" panose="020B0403020202020204" pitchFamily="34" charset="0"/>
-                <a:ea typeface="Helvetica Neue Thin" panose="020B0403020202020204" pitchFamily="34" charset="0"/>
-              </a:rPr>
-              <a:t>]</a:t>
-            </a:r>
-          </a:p>
-          <a:p>
-            <a:endParaRPr lang="en-US" dirty="0">
-              <a:latin typeface="Helvetica Neue Thin" panose="020B0403020202020204" pitchFamily="34" charset="0"/>
-              <a:ea typeface="Helvetica Neue Thin" panose="020B0403020202020204" pitchFamily="34" charset="0"/>
-            </a:endParaRPr>
-          </a:p>
-          <a:p>
-            <a:r>
-              <a:rPr lang="en-US" dirty="0">
-                <a:latin typeface="Helvetica Neue Thin" panose="020B0403020202020204" pitchFamily="34" charset="0"/>
-                <a:ea typeface="Helvetica Neue Thin" panose="020B0403020202020204" pitchFamily="34" charset="0"/>
-              </a:rPr>
-              <a:t>Step 7: If new analytics </a:t>
-            </a:r>
-            <a:r>
-              <a:rPr lang="en-US" dirty="0">
-                <a:latin typeface="Helvetica Neue Thin" panose="020B0403020202020204" pitchFamily="34" charset="0"/>
-                <a:ea typeface="Helvetica Neue Thin" panose="020B0403020202020204" pitchFamily="34" charset="0"/>
-              </a:rPr>
-              <a:t>satisfactory, stop. Else go back to Step 5, modifying bias parameters [</a:t>
+              <a:t>Step 7: If new analytics satisfactory, stop. Else go back to Step 5, modifying bias parameters [</a:t>
             </a:r>
             <a:r>
               <a:rPr lang="en-US" dirty="0">
@@ -20047,10 +21814,6 @@
               </a:rPr>
               <a:t>First idea [before generalized solution]</a:t>
             </a:r>
-            <a:endParaRPr lang="en-FR" dirty="0">
-              <a:latin typeface="Helvetica Neue Thin" panose="020B0403020202020204" pitchFamily="34" charset="0"/>
-              <a:ea typeface="Helvetica Neue Thin" panose="020B0403020202020204" pitchFamily="34" charset="0"/>
-            </a:endParaRPr>
           </a:p>
         </p:txBody>
       </p:sp>
@@ -20176,14 +21939,7 @@
                 <a:latin typeface="Helvetica Neue Thin" panose="020B0403020202020204" pitchFamily="34" charset="0"/>
                 <a:ea typeface="Helvetica Neue Thin" panose="020B0403020202020204" pitchFamily="34" charset="0"/>
               </a:rPr>
-              <a:t>, you </a:t>
-            </a:r>
-            <a:r>
-              <a:rPr lang="en-US" dirty="0">
-                <a:latin typeface="Helvetica Neue Thin" panose="020B0403020202020204" pitchFamily="34" charset="0"/>
-                <a:ea typeface="Helvetica Neue Thin" panose="020B0403020202020204" pitchFamily="34" charset="0"/>
-              </a:rPr>
-              <a:t>can force the system to always pick steps that bring you closer to </a:t>
+              <a:t>, you can force the system to always pick steps that bring you closer to </a:t>
             </a:r>
             <a:r>
               <a:rPr lang="en-US" b="1" dirty="0">
@@ -20217,21 +21973,7 @@
                 <a:latin typeface="Helvetica Neue Thin" panose="020B0403020202020204" pitchFamily="34" charset="0"/>
                 <a:ea typeface="Helvetica Neue Thin" panose="020B0403020202020204" pitchFamily="34" charset="0"/>
               </a:rPr>
-              <a:t>, because you still want the system t</a:t>
-            </a:r>
-            <a:r>
-              <a:rPr lang="en-US" dirty="0">
-                <a:latin typeface="Helvetica Neue Thin" panose="020B0403020202020204" pitchFamily="34" charset="0"/>
-                <a:ea typeface="Helvetica Neue Thin" panose="020B0403020202020204" pitchFamily="34" charset="0"/>
-              </a:rPr>
-              <a:t>o </a:t>
-            </a:r>
-            <a:r>
-              <a:rPr lang="en-US" dirty="0">
-                <a:latin typeface="Helvetica Neue Thin" panose="020B0403020202020204" pitchFamily="34" charset="0"/>
-                <a:ea typeface="Helvetica Neue Thin" panose="020B0403020202020204" pitchFamily="34" charset="0"/>
-              </a:rPr>
-              <a:t>have a certain degree of freedom to move. You only want to get closer to </a:t>
+              <a:t>, because you still want the system to have a certain degree of freedom to move. You only want to get closer to </a:t>
             </a:r>
             <a:r>
               <a:rPr lang="en-US" b="1" dirty="0">
@@ -20487,14 +22229,7 @@
                 <a:latin typeface="Helvetica Neue Thin" panose="020B0403020202020204" pitchFamily="34" charset="0"/>
                 <a:ea typeface="Helvetica Neue Thin" panose="020B0403020202020204" pitchFamily="34" charset="0"/>
               </a:rPr>
-              <a:t>. 35</a:t>
-            </a:r>
-            <a:r>
-              <a:rPr lang="en-US" dirty="0">
-                <a:latin typeface="Helvetica Neue Thin" panose="020B0403020202020204" pitchFamily="34" charset="0"/>
-                <a:ea typeface="Helvetica Neue Thin" panose="020B0403020202020204" pitchFamily="34" charset="0"/>
-              </a:rPr>
-              <a:t>% of the time the system will do whatever it wants. </a:t>
+              <a:t>. 35% of the time the system will do whatever it wants. </a:t>
             </a:r>
           </a:p>
           <a:p>
@@ -22414,14 +24149,7 @@
                 <a:latin typeface="Helvetica Neue Thin" panose="020B0403020202020204" pitchFamily="34" charset="0"/>
                 <a:ea typeface="Helvetica Neue Thin" panose="020B0403020202020204" pitchFamily="34" charset="0"/>
               </a:rPr>
-              <a:t>The </a:t>
-            </a:r>
-            <a:r>
-              <a:rPr lang="en-FR" sz="2000" dirty="0">
-                <a:latin typeface="Helvetica Neue Thin" panose="020B0403020202020204" pitchFamily="34" charset="0"/>
-                <a:ea typeface="Helvetica Neue Thin" panose="020B0403020202020204" pitchFamily="34" charset="0"/>
-              </a:rPr>
-              <a:t>system weighs each state resulting from a possible transition. It picks the transition leading to the state with the biggest weight, i.e. the closest to chosen transition </a:t>
+              <a:t>The system weighs each state resulting from a possible transition. It picks the transition leading to the state with the biggest weight, i.e. the closest to chosen transition </a:t>
             </a:r>
             <a:r>
               <a:rPr lang="en-FR" sz="2000" b="1" dirty="0">
@@ -22913,14 +24641,7 @@
                 <a:latin typeface="Helvetica Neue Thin" panose="020B0403020202020204" pitchFamily="34" charset="0"/>
                 <a:ea typeface="Helvetica Neue Thin" panose="020B0403020202020204" pitchFamily="34" charset="0"/>
               </a:rPr>
-              <a:t>The </a:t>
-            </a:r>
-            <a:r>
-              <a:rPr lang="en-FR" sz="2000" dirty="0">
-                <a:latin typeface="Helvetica Neue Thin" panose="020B0403020202020204" pitchFamily="34" charset="0"/>
-                <a:ea typeface="Helvetica Neue Thin" panose="020B0403020202020204" pitchFamily="34" charset="0"/>
-              </a:rPr>
-              <a:t>system randomly picks from all of the possible transitions without considering what happens after taking that transition</a:t>
+              <a:t>The system randomly picks from all of the possible transitions without considering what happens after taking that transition</a:t>
             </a:r>
           </a:p>
         </p:txBody>
@@ -23119,13 +24840,6 @@
               </a:rPr>
               <a:t>Examples </a:t>
             </a:r>
-            <a:endParaRPr lang="en-FR" dirty="0">
-              <a:solidFill>
-                <a:srgbClr val="00B050"/>
-              </a:solidFill>
-              <a:latin typeface="Helvetica Neue Thin" panose="020B0403020202020204" pitchFamily="34" charset="0"/>
-              <a:ea typeface="Helvetica Neue Thin" panose="020B0403020202020204" pitchFamily="34" charset="0"/>
-            </a:endParaRPr>
           </a:p>
         </p:txBody>
       </p:sp>
@@ -23469,14 +25183,7 @@
                 <a:latin typeface="Helvetica Neue Thin" panose="020B0403020202020204" pitchFamily="34" charset="0"/>
                 <a:ea typeface="Helvetica Neue Thin" panose="020B0403020202020204" pitchFamily="34" charset="0"/>
               </a:rPr>
-              <a:t>W</a:t>
-            </a:r>
-            <a:r>
-              <a:rPr lang="en-FR" dirty="0">
-                <a:latin typeface="Helvetica Neue Thin" panose="020B0403020202020204" pitchFamily="34" charset="0"/>
-                <a:ea typeface="Helvetica Neue Thin" panose="020B0403020202020204" pitchFamily="34" charset="0"/>
-              </a:rPr>
-              <a:t>eighing states in this way means you always need the </a:t>
+              <a:t>Weighing states in this way means you always need the </a:t>
             </a:r>
             <a:r>
               <a:rPr lang="en-FR" dirty="0">
@@ -23693,10 +25400,6 @@
               </a:rPr>
               <a:t>Generalizing the idea</a:t>
             </a:r>
-            <a:endParaRPr lang="en-FR" dirty="0">
-              <a:latin typeface="Helvetica Neue Thin" panose="020B0403020202020204" pitchFamily="34" charset="0"/>
-              <a:ea typeface="Helvetica Neue Thin" panose="020B0403020202020204" pitchFamily="34" charset="0"/>
-            </a:endParaRPr>
           </a:p>
         </p:txBody>
       </p:sp>

</xml_diff>

<commit_message>
progress + rules start
</commit_message>
<xml_diff>
--- a/mcmc_method.pptx
+++ b/mcmc_method.pptx
@@ -5,7 +5,7 @@
     <p:sldMasterId id="2147483648" r:id="rId1"/>
   </p:sldMasterIdLst>
   <p:notesMasterIdLst>
-    <p:notesMasterId r:id="rId41"/>
+    <p:notesMasterId r:id="rId42"/>
   </p:notesMasterIdLst>
   <p:sldIdLst>
     <p:sldId id="275" r:id="rId2"/>
@@ -47,6 +47,7 @@
     <p:sldId id="296" r:id="rId38"/>
     <p:sldId id="295" r:id="rId39"/>
     <p:sldId id="297" r:id="rId40"/>
+    <p:sldId id="298" r:id="rId41"/>
   </p:sldIdLst>
   <p:sldSz cx="12192000" cy="6858000"/>
   <p:notesSz cx="6858000" cy="9144000"/>
@@ -235,7 +236,7 @@
           <a:p>
             <a:fld id="{F665532D-9515-A447-9C89-932ABF0AFE21}" type="datetimeFigureOut">
               <a:rPr lang="en-FR" smtClean="0"/>
-              <a:t>27/03/2023</a:t>
+              <a:t>28/03/2023</a:t>
             </a:fld>
             <a:endParaRPr lang="en-FR"/>
           </a:p>
@@ -652,7 +653,7 @@
           <a:p>
             <a:fld id="{54BA42DA-DA95-8449-8980-09AEC66987CB}" type="datetime1">
               <a:rPr lang="fr-FR" smtClean="0"/>
-              <a:t>27/03/2023</a:t>
+              <a:t>28/03/2023</a:t>
             </a:fld>
             <a:endParaRPr lang="en-FR"/>
           </a:p>
@@ -852,7 +853,7 @@
           <a:p>
             <a:fld id="{7F6A5C21-1A89-DF4A-85E0-A03D4350F203}" type="datetime1">
               <a:rPr lang="fr-FR" smtClean="0"/>
-              <a:t>27/03/2023</a:t>
+              <a:t>28/03/2023</a:t>
             </a:fld>
             <a:endParaRPr lang="en-FR"/>
           </a:p>
@@ -1062,7 +1063,7 @@
           <a:p>
             <a:fld id="{05E93925-926B-1945-B9CA-9A732A875AAF}" type="datetime1">
               <a:rPr lang="fr-FR" smtClean="0"/>
-              <a:t>27/03/2023</a:t>
+              <a:t>28/03/2023</a:t>
             </a:fld>
             <a:endParaRPr lang="en-FR"/>
           </a:p>
@@ -1262,7 +1263,7 @@
           <a:p>
             <a:fld id="{E0247FCB-74AB-A24C-8A1B-D0FC7EA3D9F4}" type="datetime1">
               <a:rPr lang="fr-FR" smtClean="0"/>
-              <a:t>27/03/2023</a:t>
+              <a:t>28/03/2023</a:t>
             </a:fld>
             <a:endParaRPr lang="en-FR"/>
           </a:p>
@@ -1538,7 +1539,7 @@
           <a:p>
             <a:fld id="{787E801A-18C3-5149-B32A-A508AB557630}" type="datetime1">
               <a:rPr lang="fr-FR" smtClean="0"/>
-              <a:t>27/03/2023</a:t>
+              <a:t>28/03/2023</a:t>
             </a:fld>
             <a:endParaRPr lang="en-FR"/>
           </a:p>
@@ -1806,7 +1807,7 @@
           <a:p>
             <a:fld id="{8076E26A-A8C1-3A42-9438-6E19217B065D}" type="datetime1">
               <a:rPr lang="fr-FR" smtClean="0"/>
-              <a:t>27/03/2023</a:t>
+              <a:t>28/03/2023</a:t>
             </a:fld>
             <a:endParaRPr lang="en-FR"/>
           </a:p>
@@ -2221,7 +2222,7 @@
           <a:p>
             <a:fld id="{C9FEDFF1-3F10-3A46-ADC1-D537CC37F390}" type="datetime1">
               <a:rPr lang="fr-FR" smtClean="0"/>
-              <a:t>27/03/2023</a:t>
+              <a:t>28/03/2023</a:t>
             </a:fld>
             <a:endParaRPr lang="en-FR"/>
           </a:p>
@@ -2363,7 +2364,7 @@
           <a:p>
             <a:fld id="{A08AB4D7-44FD-2F47-8062-C2F06B42AC02}" type="datetime1">
               <a:rPr lang="fr-FR" smtClean="0"/>
-              <a:t>27/03/2023</a:t>
+              <a:t>28/03/2023</a:t>
             </a:fld>
             <a:endParaRPr lang="en-FR"/>
           </a:p>
@@ -2476,7 +2477,7 @@
           <a:p>
             <a:fld id="{12822FAA-36F4-0244-815D-515775E17909}" type="datetime1">
               <a:rPr lang="fr-FR" smtClean="0"/>
-              <a:t>27/03/2023</a:t>
+              <a:t>28/03/2023</a:t>
             </a:fld>
             <a:endParaRPr lang="en-FR"/>
           </a:p>
@@ -2789,7 +2790,7 @@
           <a:p>
             <a:fld id="{85DAED84-3442-4046-8F8E-AED3CA9DA38B}" type="datetime1">
               <a:rPr lang="fr-FR" smtClean="0"/>
-              <a:t>27/03/2023</a:t>
+              <a:t>28/03/2023</a:t>
             </a:fld>
             <a:endParaRPr lang="en-FR"/>
           </a:p>
@@ -3078,7 +3079,7 @@
           <a:p>
             <a:fld id="{3A186636-9FEC-8342-B6AE-6B0D584EC47A}" type="datetime1">
               <a:rPr lang="fr-FR" smtClean="0"/>
-              <a:t>27/03/2023</a:t>
+              <a:t>28/03/2023</a:t>
             </a:fld>
             <a:endParaRPr lang="en-FR"/>
           </a:p>
@@ -3321,7 +3322,7 @@
           <a:p>
             <a:fld id="{5F64E3B2-8E5B-BB40-B91D-3C3C9E0DD3C8}" type="datetime1">
               <a:rPr lang="fr-FR" smtClean="0"/>
-              <a:t>27/03/2023</a:t>
+              <a:t>28/03/2023</a:t>
             </a:fld>
             <a:endParaRPr lang="en-FR"/>
           </a:p>
@@ -19910,6 +19911,820 @@
       </p:grpSpPr>
       <p:sp>
         <p:nvSpPr>
+          <p:cNvPr id="6" name="Slide Number Placeholder 5">
+            <a:extLst>
+              <a:ext uri="{FF2B5EF4-FFF2-40B4-BE49-F238E27FC236}">
+                <a16:creationId xmlns:a16="http://schemas.microsoft.com/office/drawing/2014/main" id="{959BDB26-40E4-9CF6-297E-539B90F4FB2E}"/>
+              </a:ext>
+            </a:extLst>
+          </p:cNvPr>
+          <p:cNvSpPr>
+            <a:spLocks noGrp="1"/>
+          </p:cNvSpPr>
+          <p:nvPr>
+            <p:ph type="sldNum" sz="quarter" idx="12"/>
+          </p:nvPr>
+        </p:nvSpPr>
+        <p:spPr/>
+        <p:txBody>
+          <a:bodyPr/>
+          <a:lstStyle/>
+          <a:p>
+            <a:fld id="{4A936E34-E911-F947-B710-F12161D09F63}" type="slidenum">
+              <a:rPr lang="en-FR" smtClean="0"/>
+              <a:t>39</a:t>
+            </a:fld>
+            <a:endParaRPr lang="en-FR"/>
+          </a:p>
+        </p:txBody>
+      </p:sp>
+      <p:sp>
+        <p:nvSpPr>
+          <p:cNvPr id="2" name="TextBox 1">
+            <a:extLst>
+              <a:ext uri="{FF2B5EF4-FFF2-40B4-BE49-F238E27FC236}">
+                <a16:creationId xmlns:a16="http://schemas.microsoft.com/office/drawing/2014/main" id="{494BD36C-8837-AF56-5E58-817A43AA4697}"/>
+              </a:ext>
+            </a:extLst>
+          </p:cNvPr>
+          <p:cNvSpPr txBox="1"/>
+          <p:nvPr/>
+        </p:nvSpPr>
+        <p:spPr>
+          <a:xfrm>
+            <a:off x="94445" y="49696"/>
+            <a:ext cx="12003110" cy="830997"/>
+          </a:xfrm>
+          <a:prstGeom prst="rect">
+            <a:avLst/>
+          </a:prstGeom>
+          <a:noFill/>
+        </p:spPr>
+        <p:txBody>
+          <a:bodyPr wrap="square" rtlCol="0">
+            <a:spAutoFit/>
+          </a:bodyPr>
+          <a:lstStyle/>
+          <a:p>
+            <a:r>
+              <a:rPr lang="en-GB" sz="1600" dirty="0" err="1">
+                <a:latin typeface="Helvetica Neue Thin" panose="020B0403020202020204" pitchFamily="34" charset="0"/>
+                <a:ea typeface="Helvetica Neue Thin" panose="020B0403020202020204" pitchFamily="34" charset="0"/>
+              </a:rPr>
+              <a:t>S</a:t>
+            </a:r>
+            <a:r>
+              <a:rPr lang="en-GB" sz="1600" baseline="-25000" dirty="0" err="1">
+                <a:latin typeface="Helvetica Neue Thin" panose="020B0403020202020204" pitchFamily="34" charset="0"/>
+                <a:ea typeface="Helvetica Neue Thin" panose="020B0403020202020204" pitchFamily="34" charset="0"/>
+              </a:rPr>
+              <a:t>current</a:t>
+            </a:r>
+            <a:r>
+              <a:rPr lang="en-GB" sz="1600" dirty="0">
+                <a:latin typeface="Helvetica Neue Thin" panose="020B0403020202020204" pitchFamily="34" charset="0"/>
+                <a:ea typeface="Helvetica Neue Thin" panose="020B0403020202020204" pitchFamily="34" charset="0"/>
+              </a:rPr>
+              <a:t> : current state</a:t>
+            </a:r>
+          </a:p>
+          <a:p>
+            <a:r>
+              <a:rPr lang="en-GB" sz="1600" dirty="0" err="1">
+                <a:latin typeface="Helvetica Neue Thin" panose="020B0403020202020204" pitchFamily="34" charset="0"/>
+                <a:ea typeface="Helvetica Neue Thin" panose="020B0403020202020204" pitchFamily="34" charset="0"/>
+              </a:rPr>
+              <a:t>S</a:t>
+            </a:r>
+            <a:r>
+              <a:rPr lang="en-GB" sz="1600" baseline="-25000" dirty="0" err="1">
+                <a:latin typeface="Helvetica Neue Thin" panose="020B0403020202020204" pitchFamily="34" charset="0"/>
+                <a:ea typeface="Helvetica Neue Thin" panose="020B0403020202020204" pitchFamily="34" charset="0"/>
+              </a:rPr>
+              <a:t>new</a:t>
+            </a:r>
+            <a:r>
+              <a:rPr lang="en-GB" sz="1600" dirty="0">
+                <a:latin typeface="Helvetica Neue Thin" panose="020B0403020202020204" pitchFamily="34" charset="0"/>
+                <a:ea typeface="Helvetica Neue Thin" panose="020B0403020202020204" pitchFamily="34" charset="0"/>
+              </a:rPr>
+              <a:t> : potential new state </a:t>
+            </a:r>
+          </a:p>
+          <a:p>
+            <a:r>
+              <a:rPr lang="en-GB" sz="1600" dirty="0" err="1">
+                <a:latin typeface="Helvetica Neue Thin" panose="020B0403020202020204" pitchFamily="34" charset="0"/>
+                <a:ea typeface="Helvetica Neue Thin" panose="020B0403020202020204" pitchFamily="34" charset="0"/>
+              </a:rPr>
+              <a:t>t</a:t>
+            </a:r>
+            <a:r>
+              <a:rPr lang="en-GB" sz="1600" baseline="-25000" dirty="0" err="1">
+                <a:latin typeface="Helvetica Neue Thin" panose="020B0403020202020204" pitchFamily="34" charset="0"/>
+                <a:ea typeface="Helvetica Neue Thin" panose="020B0403020202020204" pitchFamily="34" charset="0"/>
+              </a:rPr>
+              <a:t>current</a:t>
+            </a:r>
+            <a:r>
+              <a:rPr lang="en-GB" sz="1600" baseline="-25000" dirty="0">
+                <a:latin typeface="Helvetica Neue Thin" panose="020B0403020202020204" pitchFamily="34" charset="0"/>
+                <a:ea typeface="Helvetica Neue Thin" panose="020B0403020202020204" pitchFamily="34" charset="0"/>
+              </a:rPr>
+              <a:t> </a:t>
+            </a:r>
+            <a:r>
+              <a:rPr lang="en-GB" sz="1600" baseline="-25000" dirty="0">
+                <a:latin typeface="Helvetica Neue Thin" panose="020B0403020202020204" pitchFamily="34" charset="0"/>
+                <a:ea typeface="Helvetica Neue Thin" panose="020B0403020202020204" pitchFamily="34" charset="0"/>
+                <a:sym typeface="Wingdings" pitchFamily="2" charset="2"/>
+              </a:rPr>
+              <a:t>--&gt; new </a:t>
+            </a:r>
+            <a:r>
+              <a:rPr lang="en-GB" sz="1600" dirty="0">
+                <a:latin typeface="Helvetica Neue Thin" panose="020B0403020202020204" pitchFamily="34" charset="0"/>
+                <a:ea typeface="Helvetica Neue Thin" panose="020B0403020202020204" pitchFamily="34" charset="0"/>
+                <a:sym typeface="Wingdings" pitchFamily="2" charset="2"/>
+              </a:rPr>
+              <a:t>: transition from current state to potential new state</a:t>
+            </a:r>
+            <a:r>
+              <a:rPr lang="en-GB" sz="1600" baseline="-25000" dirty="0">
+                <a:latin typeface="Helvetica Neue Thin" panose="020B0403020202020204" pitchFamily="34" charset="0"/>
+                <a:ea typeface="Helvetica Neue Thin" panose="020B0403020202020204" pitchFamily="34" charset="0"/>
+                <a:sym typeface="Wingdings" pitchFamily="2" charset="2"/>
+              </a:rPr>
+              <a:t> </a:t>
+            </a:r>
+            <a:endParaRPr lang="en-GB" sz="1600" dirty="0">
+              <a:latin typeface="Helvetica Neue Thin" panose="020B0403020202020204" pitchFamily="34" charset="0"/>
+              <a:ea typeface="Helvetica Neue Thin" panose="020B0403020202020204" pitchFamily="34" charset="0"/>
+            </a:endParaRPr>
+          </a:p>
+        </p:txBody>
+      </p:sp>
+      <p:sp>
+        <p:nvSpPr>
+          <p:cNvPr id="3" name="TextBox 2">
+            <a:extLst>
+              <a:ext uri="{FF2B5EF4-FFF2-40B4-BE49-F238E27FC236}">
+                <a16:creationId xmlns:a16="http://schemas.microsoft.com/office/drawing/2014/main" id="{D06C624D-C1E6-8A22-9396-8E5CDCC2829A}"/>
+              </a:ext>
+            </a:extLst>
+          </p:cNvPr>
+          <p:cNvSpPr txBox="1"/>
+          <p:nvPr/>
+        </p:nvSpPr>
+        <p:spPr>
+          <a:xfrm>
+            <a:off x="94445" y="1023731"/>
+            <a:ext cx="12003110" cy="1323439"/>
+          </a:xfrm>
+          <a:prstGeom prst="rect">
+            <a:avLst/>
+          </a:prstGeom>
+          <a:noFill/>
+        </p:spPr>
+        <p:txBody>
+          <a:bodyPr wrap="square" rtlCol="0">
+            <a:spAutoFit/>
+          </a:bodyPr>
+          <a:lstStyle/>
+          <a:p>
+            <a:r>
+              <a:rPr lang="en-GB" sz="1600" dirty="0">
+                <a:latin typeface="Helvetica Neue Thin" panose="020B0403020202020204" pitchFamily="34" charset="0"/>
+                <a:ea typeface="Helvetica Neue Thin" panose="020B0403020202020204" pitchFamily="34" charset="0"/>
+              </a:rPr>
+              <a:t>INIT_VISITED : visited states </a:t>
+            </a:r>
+          </a:p>
+          <a:p>
+            <a:r>
+              <a:rPr lang="en-GB" sz="1600" dirty="0">
+                <a:latin typeface="Helvetica Neue Thin" panose="020B0403020202020204" pitchFamily="34" charset="0"/>
+                <a:ea typeface="Helvetica Neue Thin" panose="020B0403020202020204" pitchFamily="34" charset="0"/>
+              </a:rPr>
+              <a:t>DEAD_PREDS : states that can lead to a deadlock</a:t>
+            </a:r>
+          </a:p>
+          <a:p>
+            <a:r>
+              <a:rPr lang="en-GB" sz="1600" dirty="0">
+                <a:latin typeface="Helvetica Neue Thin" panose="020B0403020202020204" pitchFamily="34" charset="0"/>
+                <a:ea typeface="Helvetica Neue Thin" panose="020B0403020202020204" pitchFamily="34" charset="0"/>
+              </a:rPr>
+              <a:t>DEADLOCK : deadlocking states </a:t>
+            </a:r>
+          </a:p>
+          <a:p>
+            <a:r>
+              <a:rPr lang="en-GB" sz="1600" dirty="0">
+                <a:latin typeface="Helvetica Neue Thin" panose="020B0403020202020204" pitchFamily="34" charset="0"/>
+                <a:ea typeface="Helvetica Neue Thin" panose="020B0403020202020204" pitchFamily="34" charset="0"/>
+              </a:rPr>
+              <a:t>MATRIX : transition pairs and how often they appear </a:t>
+            </a:r>
+          </a:p>
+          <a:p>
+            <a:r>
+              <a:rPr lang="en-GB" sz="1600" dirty="0">
+                <a:latin typeface="Helvetica Neue Thin" panose="020B0403020202020204" pitchFamily="34" charset="0"/>
+                <a:ea typeface="Helvetica Neue Thin" panose="020B0403020202020204" pitchFamily="34" charset="0"/>
+              </a:rPr>
+              <a:t>TR_COUNT : transitions and how often they appear </a:t>
+            </a:r>
+          </a:p>
+        </p:txBody>
+      </p:sp>
+      <p:sp>
+        <p:nvSpPr>
+          <p:cNvPr id="4" name="TextBox 3">
+            <a:extLst>
+              <a:ext uri="{FF2B5EF4-FFF2-40B4-BE49-F238E27FC236}">
+                <a16:creationId xmlns:a16="http://schemas.microsoft.com/office/drawing/2014/main" id="{F37FD10E-CA34-2A7E-83D3-0FB500D8604F}"/>
+              </a:ext>
+            </a:extLst>
+          </p:cNvPr>
+          <p:cNvSpPr txBox="1"/>
+          <p:nvPr/>
+        </p:nvSpPr>
+        <p:spPr>
+          <a:xfrm>
+            <a:off x="94445" y="2490208"/>
+            <a:ext cx="12003110" cy="338554"/>
+          </a:xfrm>
+          <a:prstGeom prst="rect">
+            <a:avLst/>
+          </a:prstGeom>
+          <a:noFill/>
+        </p:spPr>
+        <p:txBody>
+          <a:bodyPr wrap="square" rtlCol="0">
+            <a:spAutoFit/>
+          </a:bodyPr>
+          <a:lstStyle/>
+          <a:p>
+            <a:r>
+              <a:rPr lang="en-GB" sz="1600" dirty="0">
+                <a:latin typeface="Helvetica Neue Thin" panose="020B0403020202020204" pitchFamily="34" charset="0"/>
+                <a:ea typeface="Helvetica Neue Thin" panose="020B0403020202020204" pitchFamily="34" charset="0"/>
+              </a:rPr>
+              <a:t>Rules [version 1.0]</a:t>
+            </a:r>
+          </a:p>
+        </p:txBody>
+      </p:sp>
+      <p:pic>
+        <p:nvPicPr>
+          <p:cNvPr id="12" name="Picture 11">
+            <a:extLst>
+              <a:ext uri="{FF2B5EF4-FFF2-40B4-BE49-F238E27FC236}">
+                <a16:creationId xmlns:a16="http://schemas.microsoft.com/office/drawing/2014/main" id="{AB620B9A-6D5D-74FE-5E38-C9983BD95DE7}"/>
+              </a:ext>
+            </a:extLst>
+          </p:cNvPr>
+          <p:cNvPicPr>
+            <a:picLocks noChangeAspect="1"/>
+          </p:cNvPicPr>
+          <p:nvPr/>
+        </p:nvPicPr>
+        <p:blipFill>
+          <a:blip r:embed="rId2"/>
+          <a:stretch>
+            <a:fillRect/>
+          </a:stretch>
+        </p:blipFill>
+        <p:spPr>
+          <a:xfrm>
+            <a:off x="341243" y="2899802"/>
+            <a:ext cx="7772400" cy="330740"/>
+          </a:xfrm>
+          <a:prstGeom prst="rect">
+            <a:avLst/>
+          </a:prstGeom>
+        </p:spPr>
+      </p:pic>
+      <p:pic>
+        <p:nvPicPr>
+          <p:cNvPr id="13" name="Picture 12">
+            <a:extLst>
+              <a:ext uri="{FF2B5EF4-FFF2-40B4-BE49-F238E27FC236}">
+                <a16:creationId xmlns:a16="http://schemas.microsoft.com/office/drawing/2014/main" id="{624F7E13-52F5-AA40-2D24-A08EB5A95F23}"/>
+              </a:ext>
+            </a:extLst>
+          </p:cNvPr>
+          <p:cNvPicPr>
+            <a:picLocks noChangeAspect="1"/>
+          </p:cNvPicPr>
+          <p:nvPr/>
+        </p:nvPicPr>
+        <p:blipFill>
+          <a:blip r:embed="rId3"/>
+          <a:stretch>
+            <a:fillRect/>
+          </a:stretch>
+        </p:blipFill>
+        <p:spPr>
+          <a:xfrm>
+            <a:off x="341243" y="3230542"/>
+            <a:ext cx="7772400" cy="330740"/>
+          </a:xfrm>
+          <a:prstGeom prst="rect">
+            <a:avLst/>
+          </a:prstGeom>
+        </p:spPr>
+      </p:pic>
+    </p:spTree>
+    <p:extLst>
+      <p:ext uri="{BB962C8B-B14F-4D97-AF65-F5344CB8AC3E}">
+        <p14:creationId xmlns:p14="http://schemas.microsoft.com/office/powerpoint/2010/main" val="1949332942"/>
+      </p:ext>
+    </p:extLst>
+  </p:cSld>
+  <p:clrMapOvr>
+    <a:masterClrMapping/>
+  </p:clrMapOvr>
+</p:sld>
+</file>
+
+<file path=ppt/slides/slide4.xml><?xml version="1.0" encoding="utf-8"?>
+<p:sld xmlns:a="http://schemas.openxmlformats.org/drawingml/2006/main" xmlns:r="http://schemas.openxmlformats.org/officeDocument/2006/relationships" xmlns:p="http://schemas.openxmlformats.org/presentationml/2006/main">
+  <p:cSld>
+    <p:spTree>
+      <p:nvGrpSpPr>
+        <p:cNvPr id="1" name=""/>
+        <p:cNvGrpSpPr/>
+        <p:nvPr/>
+      </p:nvGrpSpPr>
+      <p:grpSpPr>
+        <a:xfrm>
+          <a:off x="0" y="0"/>
+          <a:ext cx="0" cy="0"/>
+          <a:chOff x="0" y="0"/>
+          <a:chExt cx="0" cy="0"/>
+        </a:xfrm>
+      </p:grpSpPr>
+      <p:sp>
+        <p:nvSpPr>
+          <p:cNvPr id="5" name="TextBox 4">
+            <a:extLst>
+              <a:ext uri="{FF2B5EF4-FFF2-40B4-BE49-F238E27FC236}">
+                <a16:creationId xmlns:a16="http://schemas.microsoft.com/office/drawing/2014/main" id="{B44A2E66-C3BE-A392-CDA2-A8D2F1C92B9B}"/>
+              </a:ext>
+            </a:extLst>
+          </p:cNvPr>
+          <p:cNvSpPr txBox="1"/>
+          <p:nvPr/>
+        </p:nvSpPr>
+        <p:spPr>
+          <a:xfrm>
+            <a:off x="314792" y="546746"/>
+            <a:ext cx="11688317" cy="5078313"/>
+          </a:xfrm>
+          <a:prstGeom prst="rect">
+            <a:avLst/>
+          </a:prstGeom>
+          <a:noFill/>
+        </p:spPr>
+        <p:txBody>
+          <a:bodyPr wrap="square" rtlCol="0">
+            <a:spAutoFit/>
+          </a:bodyPr>
+          <a:lstStyle/>
+          <a:p>
+            <a:r>
+              <a:rPr lang="en-US" dirty="0">
+                <a:latin typeface="Helvetica Neue Thin" panose="020B0403020202020204" pitchFamily="34" charset="0"/>
+                <a:ea typeface="Helvetica Neue Thin" panose="020B0403020202020204" pitchFamily="34" charset="0"/>
+              </a:rPr>
+              <a:t>Method step-by-step:</a:t>
+            </a:r>
+          </a:p>
+          <a:p>
+            <a:endParaRPr lang="en-US" dirty="0">
+              <a:latin typeface="Helvetica Neue Thin" panose="020B0403020202020204" pitchFamily="34" charset="0"/>
+              <a:ea typeface="Helvetica Neue Thin" panose="020B0403020202020204" pitchFamily="34" charset="0"/>
+            </a:endParaRPr>
+          </a:p>
+          <a:p>
+            <a:r>
+              <a:rPr lang="en-US" dirty="0">
+                <a:latin typeface="Helvetica Neue Thin" panose="020B0403020202020204" pitchFamily="34" charset="0"/>
+                <a:ea typeface="Helvetica Neue Thin" panose="020B0403020202020204" pitchFamily="34" charset="0"/>
+              </a:rPr>
+              <a:t>Step 1: Run model exploration while </a:t>
+            </a:r>
+            <a:r>
+              <a:rPr lang="en-US" dirty="0">
+                <a:solidFill>
+                  <a:srgbClr val="0432FF"/>
+                </a:solidFill>
+                <a:latin typeface="Helvetica Neue Thin" panose="020B0403020202020204" pitchFamily="34" charset="0"/>
+                <a:ea typeface="Helvetica Neue Thin" panose="020B0403020202020204" pitchFamily="34" charset="0"/>
+              </a:rPr>
+              <a:t>maximizing entropy </a:t>
+            </a:r>
+            <a:r>
+              <a:rPr lang="en-US" dirty="0">
+                <a:latin typeface="Helvetica Neue Thin" panose="020B0403020202020204" pitchFamily="34" charset="0"/>
+                <a:ea typeface="Helvetica Neue Thin" panose="020B0403020202020204" pitchFamily="34" charset="0"/>
+              </a:rPr>
+              <a:t>[</a:t>
+            </a:r>
+            <a:r>
+              <a:rPr lang="en-US" dirty="0">
+                <a:latin typeface="Helvetica Neue Thin" panose="020B0403020202020204" pitchFamily="34" charset="0"/>
+                <a:ea typeface="Helvetica Neue Thin" panose="020B0403020202020204" pitchFamily="34" charset="0"/>
+                <a:hlinkClick r:id="rId2" action="ppaction://hlinksldjump"/>
+              </a:rPr>
+              <a:t>Slide 12</a:t>
+            </a:r>
+            <a:r>
+              <a:rPr lang="en-US" dirty="0">
+                <a:latin typeface="Helvetica Neue Thin" panose="020B0403020202020204" pitchFamily="34" charset="0"/>
+                <a:ea typeface="Helvetica Neue Thin" panose="020B0403020202020204" pitchFamily="34" charset="0"/>
+              </a:rPr>
+              <a:t>]</a:t>
+            </a:r>
+          </a:p>
+          <a:p>
+            <a:endParaRPr lang="en-US" dirty="0">
+              <a:latin typeface="Helvetica Neue Thin" panose="020B0403020202020204" pitchFamily="34" charset="0"/>
+              <a:ea typeface="Helvetica Neue Thin" panose="020B0403020202020204" pitchFamily="34" charset="0"/>
+            </a:endParaRPr>
+          </a:p>
+          <a:p>
+            <a:r>
+              <a:rPr lang="en-US" dirty="0">
+                <a:latin typeface="Helvetica Neue Thin" panose="020B0403020202020204" pitchFamily="34" charset="0"/>
+                <a:ea typeface="Helvetica Neue Thin" panose="020B0403020202020204" pitchFamily="34" charset="0"/>
+              </a:rPr>
+              <a:t>Step 2: Gather </a:t>
+            </a:r>
+            <a:r>
+              <a:rPr lang="en-US" dirty="0">
+                <a:solidFill>
+                  <a:srgbClr val="0432FF"/>
+                </a:solidFill>
+                <a:latin typeface="Helvetica Neue Thin" panose="020B0403020202020204" pitchFamily="34" charset="0"/>
+                <a:ea typeface="Helvetica Neue Thin" panose="020B0403020202020204" pitchFamily="34" charset="0"/>
+              </a:rPr>
+              <a:t>data</a:t>
+            </a:r>
+            <a:r>
+              <a:rPr lang="en-US" dirty="0">
+                <a:latin typeface="Helvetica Neue Thin" panose="020B0403020202020204" pitchFamily="34" charset="0"/>
+                <a:ea typeface="Helvetica Neue Thin" panose="020B0403020202020204" pitchFamily="34" charset="0"/>
+              </a:rPr>
+              <a:t> from run [</a:t>
+            </a:r>
+            <a:r>
+              <a:rPr lang="en-US" dirty="0">
+                <a:latin typeface="Helvetica Neue Thin" panose="020B0403020202020204" pitchFamily="34" charset="0"/>
+                <a:ea typeface="Helvetica Neue Thin" panose="020B0403020202020204" pitchFamily="34" charset="0"/>
+                <a:hlinkClick r:id="rId2" action="ppaction://hlinksldjump"/>
+              </a:rPr>
+              <a:t>Slide 12</a:t>
+            </a:r>
+            <a:r>
+              <a:rPr lang="en-US" dirty="0">
+                <a:latin typeface="Helvetica Neue Thin" panose="020B0403020202020204" pitchFamily="34" charset="0"/>
+                <a:ea typeface="Helvetica Neue Thin" panose="020B0403020202020204" pitchFamily="34" charset="0"/>
+              </a:rPr>
+              <a:t>]</a:t>
+            </a:r>
+          </a:p>
+          <a:p>
+            <a:endParaRPr lang="en-US" dirty="0">
+              <a:latin typeface="Helvetica Neue Thin" panose="020B0403020202020204" pitchFamily="34" charset="0"/>
+              <a:ea typeface="Helvetica Neue Thin" panose="020B0403020202020204" pitchFamily="34" charset="0"/>
+            </a:endParaRPr>
+          </a:p>
+          <a:p>
+            <a:r>
+              <a:rPr lang="en-US" dirty="0">
+                <a:latin typeface="Helvetica Neue Thin" panose="020B0403020202020204" pitchFamily="34" charset="0"/>
+                <a:ea typeface="Helvetica Neue Thin" panose="020B0403020202020204" pitchFamily="34" charset="0"/>
+              </a:rPr>
+              <a:t>Step 3: Run </a:t>
+            </a:r>
+            <a:r>
+              <a:rPr lang="en-US" dirty="0">
+                <a:solidFill>
+                  <a:srgbClr val="0432FF"/>
+                </a:solidFill>
+                <a:latin typeface="Helvetica Neue Thin" panose="020B0403020202020204" pitchFamily="34" charset="0"/>
+                <a:ea typeface="Helvetica Neue Thin" panose="020B0403020202020204" pitchFamily="34" charset="0"/>
+              </a:rPr>
+              <a:t>analytics</a:t>
+            </a:r>
+            <a:r>
+              <a:rPr lang="en-US" dirty="0">
+                <a:latin typeface="Helvetica Neue Thin" panose="020B0403020202020204" pitchFamily="34" charset="0"/>
+                <a:ea typeface="Helvetica Neue Thin" panose="020B0403020202020204" pitchFamily="34" charset="0"/>
+              </a:rPr>
+              <a:t> on data [</a:t>
+            </a:r>
+            <a:r>
+              <a:rPr lang="en-US" dirty="0">
+                <a:latin typeface="Helvetica Neue Thin" panose="020B0403020202020204" pitchFamily="34" charset="0"/>
+                <a:ea typeface="Helvetica Neue Thin" panose="020B0403020202020204" pitchFamily="34" charset="0"/>
+                <a:hlinkClick r:id="rId2" action="ppaction://hlinksldjump"/>
+              </a:rPr>
+              <a:t>Slide 12</a:t>
+            </a:r>
+            <a:r>
+              <a:rPr lang="en-US" dirty="0">
+                <a:latin typeface="Helvetica Neue Thin" panose="020B0403020202020204" pitchFamily="34" charset="0"/>
+                <a:ea typeface="Helvetica Neue Thin" panose="020B0403020202020204" pitchFamily="34" charset="0"/>
+              </a:rPr>
+              <a:t>]</a:t>
+            </a:r>
+          </a:p>
+          <a:p>
+            <a:br>
+              <a:rPr lang="en-US" dirty="0">
+                <a:latin typeface="Helvetica Neue Thin" panose="020B0403020202020204" pitchFamily="34" charset="0"/>
+                <a:ea typeface="Helvetica Neue Thin" panose="020B0403020202020204" pitchFamily="34" charset="0"/>
+              </a:rPr>
+            </a:br>
+            <a:r>
+              <a:rPr lang="en-US" dirty="0">
+                <a:latin typeface="Helvetica Neue Thin" panose="020B0403020202020204" pitchFamily="34" charset="0"/>
+                <a:ea typeface="Helvetica Neue Thin" panose="020B0403020202020204" pitchFamily="34" charset="0"/>
+              </a:rPr>
+              <a:t>Step 4: If analytics satisfactory then stop, else continue to Step 5 [</a:t>
+            </a:r>
+            <a:r>
+              <a:rPr lang="en-US" dirty="0">
+                <a:latin typeface="Helvetica Neue Thin" panose="020B0403020202020204" pitchFamily="34" charset="0"/>
+                <a:ea typeface="Helvetica Neue Thin" panose="020B0403020202020204" pitchFamily="34" charset="0"/>
+                <a:hlinkClick r:id="rId3" action="ppaction://hlinksldjump"/>
+              </a:rPr>
+              <a:t>Slide 13</a:t>
+            </a:r>
+            <a:r>
+              <a:rPr lang="en-US" dirty="0">
+                <a:latin typeface="Helvetica Neue Thin" panose="020B0403020202020204" pitchFamily="34" charset="0"/>
+                <a:ea typeface="Helvetica Neue Thin" panose="020B0403020202020204" pitchFamily="34" charset="0"/>
+              </a:rPr>
+              <a:t>]</a:t>
+            </a:r>
+          </a:p>
+          <a:p>
+            <a:endParaRPr lang="en-US" dirty="0">
+              <a:latin typeface="Helvetica Neue Thin" panose="020B0403020202020204" pitchFamily="34" charset="0"/>
+              <a:ea typeface="Helvetica Neue Thin" panose="020B0403020202020204" pitchFamily="34" charset="0"/>
+            </a:endParaRPr>
+          </a:p>
+          <a:p>
+            <a:r>
+              <a:rPr lang="en-US" dirty="0">
+                <a:latin typeface="Helvetica Neue Thin" panose="020B0403020202020204" pitchFamily="34" charset="0"/>
+                <a:ea typeface="Helvetica Neue Thin" panose="020B0403020202020204" pitchFamily="34" charset="0"/>
+              </a:rPr>
+              <a:t>Step 5: Rerun model exploration modifying how the system is explored using one of the proposed methods [</a:t>
+            </a:r>
+            <a:r>
+              <a:rPr lang="en-US" dirty="0">
+                <a:latin typeface="Helvetica Neue Thin" panose="020B0403020202020204" pitchFamily="34" charset="0"/>
+                <a:ea typeface="Helvetica Neue Thin" panose="020B0403020202020204" pitchFamily="34" charset="0"/>
+                <a:hlinkClick r:id="rId3" action="ppaction://hlinksldjump"/>
+              </a:rPr>
+              <a:t>Slide 13</a:t>
+            </a:r>
+            <a:r>
+              <a:rPr lang="en-US" dirty="0">
+                <a:latin typeface="Helvetica Neue Thin" panose="020B0403020202020204" pitchFamily="34" charset="0"/>
+                <a:ea typeface="Helvetica Neue Thin" panose="020B0403020202020204" pitchFamily="34" charset="0"/>
+              </a:rPr>
+              <a:t>]</a:t>
+            </a:r>
+          </a:p>
+          <a:p>
+            <a:r>
+              <a:rPr lang="en-US" dirty="0">
+                <a:latin typeface="Helvetica Neue Thin" panose="020B0403020202020204" pitchFamily="34" charset="0"/>
+                <a:ea typeface="Helvetica Neue Thin" panose="020B0403020202020204" pitchFamily="34" charset="0"/>
+              </a:rPr>
+              <a:t>	(</a:t>
+            </a:r>
+            <a:r>
+              <a:rPr lang="en-US" dirty="0" err="1">
+                <a:latin typeface="Helvetica Neue Thin" panose="020B0403020202020204" pitchFamily="34" charset="0"/>
+                <a:ea typeface="Helvetica Neue Thin" panose="020B0403020202020204" pitchFamily="34" charset="0"/>
+              </a:rPr>
+              <a:t>i</a:t>
+            </a:r>
+            <a:r>
+              <a:rPr lang="en-US" dirty="0">
+                <a:latin typeface="Helvetica Neue Thin" panose="020B0403020202020204" pitchFamily="34" charset="0"/>
+                <a:ea typeface="Helvetica Neue Thin" panose="020B0403020202020204" pitchFamily="34" charset="0"/>
+              </a:rPr>
+              <a:t>) Bias the Proposal Distribution </a:t>
+            </a:r>
+          </a:p>
+          <a:p>
+            <a:r>
+              <a:rPr lang="en-US" dirty="0">
+                <a:latin typeface="Helvetica Neue Thin" panose="020B0403020202020204" pitchFamily="34" charset="0"/>
+                <a:ea typeface="Helvetica Neue Thin" panose="020B0403020202020204" pitchFamily="34" charset="0"/>
+              </a:rPr>
+              <a:t>	(ii) Bias the Entropy </a:t>
+            </a:r>
+          </a:p>
+          <a:p>
+            <a:r>
+              <a:rPr lang="en-US" dirty="0">
+                <a:latin typeface="Helvetica Neue Thin" panose="020B0403020202020204" pitchFamily="34" charset="0"/>
+                <a:ea typeface="Helvetica Neue Thin" panose="020B0403020202020204" pitchFamily="34" charset="0"/>
+              </a:rPr>
+              <a:t>	(iii) Bias both </a:t>
+            </a:r>
+          </a:p>
+          <a:p>
+            <a:endParaRPr lang="en-US" dirty="0">
+              <a:latin typeface="Helvetica Neue Thin" panose="020B0403020202020204" pitchFamily="34" charset="0"/>
+              <a:ea typeface="Helvetica Neue Thin" panose="020B0403020202020204" pitchFamily="34" charset="0"/>
+            </a:endParaRPr>
+          </a:p>
+          <a:p>
+            <a:r>
+              <a:rPr lang="en-US" dirty="0">
+                <a:latin typeface="Helvetica Neue Thin" panose="020B0403020202020204" pitchFamily="34" charset="0"/>
+                <a:ea typeface="Helvetica Neue Thin" panose="020B0403020202020204" pitchFamily="34" charset="0"/>
+              </a:rPr>
+              <a:t>Step 6: Gather </a:t>
+            </a:r>
+            <a:r>
+              <a:rPr lang="en-US" dirty="0">
+                <a:solidFill>
+                  <a:srgbClr val="0432FF"/>
+                </a:solidFill>
+                <a:latin typeface="Helvetica Neue Thin" panose="020B0403020202020204" pitchFamily="34" charset="0"/>
+                <a:ea typeface="Helvetica Neue Thin" panose="020B0403020202020204" pitchFamily="34" charset="0"/>
+              </a:rPr>
+              <a:t>new data </a:t>
+            </a:r>
+            <a:r>
+              <a:rPr lang="en-US" dirty="0">
+                <a:latin typeface="Helvetica Neue Thin" panose="020B0403020202020204" pitchFamily="34" charset="0"/>
+                <a:ea typeface="Helvetica Neue Thin" panose="020B0403020202020204" pitchFamily="34" charset="0"/>
+              </a:rPr>
+              <a:t>and analyze it [</a:t>
+            </a:r>
+            <a:r>
+              <a:rPr lang="en-US" dirty="0">
+                <a:latin typeface="Helvetica Neue Thin" panose="020B0403020202020204" pitchFamily="34" charset="0"/>
+                <a:ea typeface="Helvetica Neue Thin" panose="020B0403020202020204" pitchFamily="34" charset="0"/>
+                <a:hlinkClick r:id="rId4" action="ppaction://hlinksldjump"/>
+              </a:rPr>
+              <a:t>Slide 14</a:t>
+            </a:r>
+            <a:r>
+              <a:rPr lang="en-US" dirty="0">
+                <a:latin typeface="Helvetica Neue Thin" panose="020B0403020202020204" pitchFamily="34" charset="0"/>
+                <a:ea typeface="Helvetica Neue Thin" panose="020B0403020202020204" pitchFamily="34" charset="0"/>
+              </a:rPr>
+              <a:t>]</a:t>
+            </a:r>
+          </a:p>
+          <a:p>
+            <a:endParaRPr lang="en-US" dirty="0">
+              <a:latin typeface="Helvetica Neue Thin" panose="020B0403020202020204" pitchFamily="34" charset="0"/>
+              <a:ea typeface="Helvetica Neue Thin" panose="020B0403020202020204" pitchFamily="34" charset="0"/>
+            </a:endParaRPr>
+          </a:p>
+          <a:p>
+            <a:r>
+              <a:rPr lang="en-US" dirty="0">
+                <a:latin typeface="Helvetica Neue Thin" panose="020B0403020202020204" pitchFamily="34" charset="0"/>
+                <a:ea typeface="Helvetica Neue Thin" panose="020B0403020202020204" pitchFamily="34" charset="0"/>
+              </a:rPr>
+              <a:t>Step 7: If new analytics satisfactory, stop. Else go back to Step 5, modifying bias parameters [</a:t>
+            </a:r>
+            <a:r>
+              <a:rPr lang="en-US" dirty="0">
+                <a:latin typeface="Helvetica Neue Thin" panose="020B0403020202020204" pitchFamily="34" charset="0"/>
+                <a:ea typeface="Helvetica Neue Thin" panose="020B0403020202020204" pitchFamily="34" charset="0"/>
+                <a:hlinkClick r:id="rId4" action="ppaction://hlinksldjump"/>
+              </a:rPr>
+              <a:t>Slide 14</a:t>
+            </a:r>
+            <a:r>
+              <a:rPr lang="en-US" dirty="0">
+                <a:latin typeface="Helvetica Neue Thin" panose="020B0403020202020204" pitchFamily="34" charset="0"/>
+                <a:ea typeface="Helvetica Neue Thin" panose="020B0403020202020204" pitchFamily="34" charset="0"/>
+              </a:rPr>
+              <a:t>]</a:t>
+            </a:r>
+          </a:p>
+        </p:txBody>
+      </p:sp>
+      <p:sp>
+        <p:nvSpPr>
+          <p:cNvPr id="6" name="TextBox 5">
+            <a:extLst>
+              <a:ext uri="{FF2B5EF4-FFF2-40B4-BE49-F238E27FC236}">
+                <a16:creationId xmlns:a16="http://schemas.microsoft.com/office/drawing/2014/main" id="{341FFF12-9DE5-D7B1-6F34-2E0E8514EEB6}"/>
+              </a:ext>
+            </a:extLst>
+          </p:cNvPr>
+          <p:cNvSpPr txBox="1"/>
+          <p:nvPr/>
+        </p:nvSpPr>
+        <p:spPr>
+          <a:xfrm>
+            <a:off x="314791" y="6311254"/>
+            <a:ext cx="11688317" cy="369332"/>
+          </a:xfrm>
+          <a:prstGeom prst="rect">
+            <a:avLst/>
+          </a:prstGeom>
+          <a:noFill/>
+        </p:spPr>
+        <p:txBody>
+          <a:bodyPr wrap="square" rtlCol="0">
+            <a:spAutoFit/>
+          </a:bodyPr>
+          <a:lstStyle/>
+          <a:p>
+            <a:r>
+              <a:rPr lang="en-US" dirty="0">
+                <a:solidFill>
+                  <a:srgbClr val="FF0000"/>
+                </a:solidFill>
+                <a:latin typeface="Helvetica Neue Thin" panose="020B0403020202020204" pitchFamily="34" charset="0"/>
+                <a:ea typeface="Helvetica Neue Thin" panose="020B0403020202020204" pitchFamily="34" charset="0"/>
+              </a:rPr>
+              <a:t>Detailed description in following slides. </a:t>
+            </a:r>
+          </a:p>
+        </p:txBody>
+      </p:sp>
+      <p:sp>
+        <p:nvSpPr>
+          <p:cNvPr id="7" name="Slide Number Placeholder 6">
+            <a:extLst>
+              <a:ext uri="{FF2B5EF4-FFF2-40B4-BE49-F238E27FC236}">
+                <a16:creationId xmlns:a16="http://schemas.microsoft.com/office/drawing/2014/main" id="{51F1C4DF-4E43-A865-A2A8-6BCE841C3BA4}"/>
+              </a:ext>
+            </a:extLst>
+          </p:cNvPr>
+          <p:cNvSpPr>
+            <a:spLocks noGrp="1"/>
+          </p:cNvSpPr>
+          <p:nvPr>
+            <p:ph type="sldNum" sz="quarter" idx="12"/>
+          </p:nvPr>
+        </p:nvSpPr>
+        <p:spPr/>
+        <p:txBody>
+          <a:bodyPr/>
+          <a:lstStyle/>
+          <a:p>
+            <a:fld id="{4A936E34-E911-F947-B710-F12161D09F63}" type="slidenum">
+              <a:rPr lang="en-FR" smtClean="0"/>
+              <a:t>4</a:t>
+            </a:fld>
+            <a:endParaRPr lang="en-FR"/>
+          </a:p>
+        </p:txBody>
+      </p:sp>
+    </p:spTree>
+    <p:extLst>
+      <p:ext uri="{BB962C8B-B14F-4D97-AF65-F5344CB8AC3E}">
+        <p14:creationId xmlns:p14="http://schemas.microsoft.com/office/powerpoint/2010/main" val="4128960825"/>
+      </p:ext>
+    </p:extLst>
+  </p:cSld>
+  <p:clrMapOvr>
+    <a:masterClrMapping/>
+  </p:clrMapOvr>
+</p:sld>
+</file>
+
+<file path=ppt/slides/slide40.xml><?xml version="1.0" encoding="utf-8"?>
+<p:sld xmlns:a="http://schemas.openxmlformats.org/drawingml/2006/main" xmlns:r="http://schemas.openxmlformats.org/officeDocument/2006/relationships" xmlns:p="http://schemas.openxmlformats.org/presentationml/2006/main">
+  <p:cSld>
+    <p:spTree>
+      <p:nvGrpSpPr>
+        <p:cNvPr id="1" name=""/>
+        <p:cNvGrpSpPr/>
+        <p:nvPr/>
+      </p:nvGrpSpPr>
+      <p:grpSpPr>
+        <a:xfrm>
+          <a:off x="0" y="0"/>
+          <a:ext cx="0" cy="0"/>
+          <a:chOff x="0" y="0"/>
+          <a:chExt cx="0" cy="0"/>
+        </a:xfrm>
+      </p:grpSpPr>
+      <p:sp>
+        <p:nvSpPr>
           <p:cNvPr id="5" name="TextBox 4">
             <a:extLst>
               <a:ext uri="{FF2B5EF4-FFF2-40B4-BE49-F238E27FC236}">
@@ -19979,7 +20794,7 @@
           <a:p>
             <a:fld id="{4A936E34-E911-F947-B710-F12161D09F63}" type="slidenum">
               <a:rPr lang="en-FR" smtClean="0"/>
-              <a:t>39</a:t>
+              <a:t>40</a:t>
             </a:fld>
             <a:endParaRPr lang="en-FR"/>
           </a:p>
@@ -21296,464 +22111,7 @@
     </p:spTree>
     <p:extLst>
       <p:ext uri="{BB962C8B-B14F-4D97-AF65-F5344CB8AC3E}">
-        <p14:creationId xmlns:p14="http://schemas.microsoft.com/office/powerpoint/2010/main" val="1949332942"/>
-      </p:ext>
-    </p:extLst>
-  </p:cSld>
-  <p:clrMapOvr>
-    <a:masterClrMapping/>
-  </p:clrMapOvr>
-</p:sld>
-</file>
-
-<file path=ppt/slides/slide4.xml><?xml version="1.0" encoding="utf-8"?>
-<p:sld xmlns:a="http://schemas.openxmlformats.org/drawingml/2006/main" xmlns:r="http://schemas.openxmlformats.org/officeDocument/2006/relationships" xmlns:p="http://schemas.openxmlformats.org/presentationml/2006/main">
-  <p:cSld>
-    <p:spTree>
-      <p:nvGrpSpPr>
-        <p:cNvPr id="1" name=""/>
-        <p:cNvGrpSpPr/>
-        <p:nvPr/>
-      </p:nvGrpSpPr>
-      <p:grpSpPr>
-        <a:xfrm>
-          <a:off x="0" y="0"/>
-          <a:ext cx="0" cy="0"/>
-          <a:chOff x="0" y="0"/>
-          <a:chExt cx="0" cy="0"/>
-        </a:xfrm>
-      </p:grpSpPr>
-      <p:sp>
-        <p:nvSpPr>
-          <p:cNvPr id="5" name="TextBox 4">
-            <a:extLst>
-              <a:ext uri="{FF2B5EF4-FFF2-40B4-BE49-F238E27FC236}">
-                <a16:creationId xmlns:a16="http://schemas.microsoft.com/office/drawing/2014/main" id="{B44A2E66-C3BE-A392-CDA2-A8D2F1C92B9B}"/>
-              </a:ext>
-            </a:extLst>
-          </p:cNvPr>
-          <p:cNvSpPr txBox="1"/>
-          <p:nvPr/>
-        </p:nvSpPr>
-        <p:spPr>
-          <a:xfrm>
-            <a:off x="314792" y="546746"/>
-            <a:ext cx="11688317" cy="5078313"/>
-          </a:xfrm>
-          <a:prstGeom prst="rect">
-            <a:avLst/>
-          </a:prstGeom>
-          <a:noFill/>
-        </p:spPr>
-        <p:txBody>
-          <a:bodyPr wrap="square" rtlCol="0">
-            <a:spAutoFit/>
-          </a:bodyPr>
-          <a:lstStyle/>
-          <a:p>
-            <a:r>
-              <a:rPr lang="en-US" dirty="0">
-                <a:latin typeface="Helvetica Neue Thin" panose="020B0403020202020204" pitchFamily="34" charset="0"/>
-                <a:ea typeface="Helvetica Neue Thin" panose="020B0403020202020204" pitchFamily="34" charset="0"/>
-              </a:rPr>
-              <a:t>Method step-by-step:</a:t>
-            </a:r>
-          </a:p>
-          <a:p>
-            <a:endParaRPr lang="en-US" dirty="0">
-              <a:latin typeface="Helvetica Neue Thin" panose="020B0403020202020204" pitchFamily="34" charset="0"/>
-              <a:ea typeface="Helvetica Neue Thin" panose="020B0403020202020204" pitchFamily="34" charset="0"/>
-            </a:endParaRPr>
-          </a:p>
-          <a:p>
-            <a:r>
-              <a:rPr lang="en-US" dirty="0">
-                <a:latin typeface="Helvetica Neue Thin" panose="020B0403020202020204" pitchFamily="34" charset="0"/>
-                <a:ea typeface="Helvetica Neue Thin" panose="020B0403020202020204" pitchFamily="34" charset="0"/>
-              </a:rPr>
-              <a:t>Step 1: Run model exploration while </a:t>
-            </a:r>
-            <a:r>
-              <a:rPr lang="en-US" dirty="0">
-                <a:solidFill>
-                  <a:srgbClr val="0432FF"/>
-                </a:solidFill>
-                <a:latin typeface="Helvetica Neue Thin" panose="020B0403020202020204" pitchFamily="34" charset="0"/>
-                <a:ea typeface="Helvetica Neue Thin" panose="020B0403020202020204" pitchFamily="34" charset="0"/>
-              </a:rPr>
-              <a:t>maximizing entropy </a:t>
-            </a:r>
-            <a:r>
-              <a:rPr lang="en-US" dirty="0">
-                <a:latin typeface="Helvetica Neue Thin" panose="020B0403020202020204" pitchFamily="34" charset="0"/>
-                <a:ea typeface="Helvetica Neue Thin" panose="020B0403020202020204" pitchFamily="34" charset="0"/>
-              </a:rPr>
-              <a:t>[</a:t>
-            </a:r>
-            <a:r>
-              <a:rPr lang="en-US" dirty="0">
-                <a:latin typeface="Helvetica Neue Thin" panose="020B0403020202020204" pitchFamily="34" charset="0"/>
-                <a:ea typeface="Helvetica Neue Thin" panose="020B0403020202020204" pitchFamily="34" charset="0"/>
-                <a:hlinkClick r:id="rId2" action="ppaction://hlinksldjump"/>
-              </a:rPr>
-              <a:t>Slide 12</a:t>
-            </a:r>
-            <a:r>
-              <a:rPr lang="en-US" dirty="0">
-                <a:latin typeface="Helvetica Neue Thin" panose="020B0403020202020204" pitchFamily="34" charset="0"/>
-                <a:ea typeface="Helvetica Neue Thin" panose="020B0403020202020204" pitchFamily="34" charset="0"/>
-              </a:rPr>
-              <a:t>]</a:t>
-            </a:r>
-          </a:p>
-          <a:p>
-            <a:endParaRPr lang="en-US" dirty="0">
-              <a:latin typeface="Helvetica Neue Thin" panose="020B0403020202020204" pitchFamily="34" charset="0"/>
-              <a:ea typeface="Helvetica Neue Thin" panose="020B0403020202020204" pitchFamily="34" charset="0"/>
-            </a:endParaRPr>
-          </a:p>
-          <a:p>
-            <a:r>
-              <a:rPr lang="en-US" dirty="0">
-                <a:latin typeface="Helvetica Neue Thin" panose="020B0403020202020204" pitchFamily="34" charset="0"/>
-                <a:ea typeface="Helvetica Neue Thin" panose="020B0403020202020204" pitchFamily="34" charset="0"/>
-              </a:rPr>
-              <a:t>Step 2: Gather </a:t>
-            </a:r>
-            <a:r>
-              <a:rPr lang="en-US" dirty="0">
-                <a:solidFill>
-                  <a:srgbClr val="0432FF"/>
-                </a:solidFill>
-                <a:latin typeface="Helvetica Neue Thin" panose="020B0403020202020204" pitchFamily="34" charset="0"/>
-                <a:ea typeface="Helvetica Neue Thin" panose="020B0403020202020204" pitchFamily="34" charset="0"/>
-              </a:rPr>
-              <a:t>data</a:t>
-            </a:r>
-            <a:r>
-              <a:rPr lang="en-US" dirty="0">
-                <a:latin typeface="Helvetica Neue Thin" panose="020B0403020202020204" pitchFamily="34" charset="0"/>
-                <a:ea typeface="Helvetica Neue Thin" panose="020B0403020202020204" pitchFamily="34" charset="0"/>
-              </a:rPr>
-              <a:t> from run [</a:t>
-            </a:r>
-            <a:r>
-              <a:rPr lang="en-US" dirty="0">
-                <a:latin typeface="Helvetica Neue Thin" panose="020B0403020202020204" pitchFamily="34" charset="0"/>
-                <a:ea typeface="Helvetica Neue Thin" panose="020B0403020202020204" pitchFamily="34" charset="0"/>
-                <a:hlinkClick r:id="rId2" action="ppaction://hlinksldjump"/>
-              </a:rPr>
-              <a:t>Slide 12</a:t>
-            </a:r>
-            <a:r>
-              <a:rPr lang="en-US" dirty="0">
-                <a:latin typeface="Helvetica Neue Thin" panose="020B0403020202020204" pitchFamily="34" charset="0"/>
-                <a:ea typeface="Helvetica Neue Thin" panose="020B0403020202020204" pitchFamily="34" charset="0"/>
-              </a:rPr>
-              <a:t>]</a:t>
-            </a:r>
-          </a:p>
-          <a:p>
-            <a:endParaRPr lang="en-US" dirty="0">
-              <a:latin typeface="Helvetica Neue Thin" panose="020B0403020202020204" pitchFamily="34" charset="0"/>
-              <a:ea typeface="Helvetica Neue Thin" panose="020B0403020202020204" pitchFamily="34" charset="0"/>
-            </a:endParaRPr>
-          </a:p>
-          <a:p>
-            <a:r>
-              <a:rPr lang="en-US" dirty="0">
-                <a:latin typeface="Helvetica Neue Thin" panose="020B0403020202020204" pitchFamily="34" charset="0"/>
-                <a:ea typeface="Helvetica Neue Thin" panose="020B0403020202020204" pitchFamily="34" charset="0"/>
-              </a:rPr>
-              <a:t>Step 3: Run </a:t>
-            </a:r>
-            <a:r>
-              <a:rPr lang="en-US" dirty="0">
-                <a:solidFill>
-                  <a:srgbClr val="0432FF"/>
-                </a:solidFill>
-                <a:latin typeface="Helvetica Neue Thin" panose="020B0403020202020204" pitchFamily="34" charset="0"/>
-                <a:ea typeface="Helvetica Neue Thin" panose="020B0403020202020204" pitchFamily="34" charset="0"/>
-              </a:rPr>
-              <a:t>analytics</a:t>
-            </a:r>
-            <a:r>
-              <a:rPr lang="en-US" dirty="0">
-                <a:latin typeface="Helvetica Neue Thin" panose="020B0403020202020204" pitchFamily="34" charset="0"/>
-                <a:ea typeface="Helvetica Neue Thin" panose="020B0403020202020204" pitchFamily="34" charset="0"/>
-              </a:rPr>
-              <a:t> on data [</a:t>
-            </a:r>
-            <a:r>
-              <a:rPr lang="en-US" dirty="0">
-                <a:latin typeface="Helvetica Neue Thin" panose="020B0403020202020204" pitchFamily="34" charset="0"/>
-                <a:ea typeface="Helvetica Neue Thin" panose="020B0403020202020204" pitchFamily="34" charset="0"/>
-                <a:hlinkClick r:id="rId2" action="ppaction://hlinksldjump"/>
-              </a:rPr>
-              <a:t>Slide 12</a:t>
-            </a:r>
-            <a:r>
-              <a:rPr lang="en-US" dirty="0">
-                <a:latin typeface="Helvetica Neue Thin" panose="020B0403020202020204" pitchFamily="34" charset="0"/>
-                <a:ea typeface="Helvetica Neue Thin" panose="020B0403020202020204" pitchFamily="34" charset="0"/>
-              </a:rPr>
-              <a:t>]</a:t>
-            </a:r>
-          </a:p>
-          <a:p>
-            <a:br>
-              <a:rPr lang="en-US" dirty="0">
-                <a:latin typeface="Helvetica Neue Thin" panose="020B0403020202020204" pitchFamily="34" charset="0"/>
-                <a:ea typeface="Helvetica Neue Thin" panose="020B0403020202020204" pitchFamily="34" charset="0"/>
-              </a:rPr>
-            </a:br>
-            <a:r>
-              <a:rPr lang="en-US" dirty="0">
-                <a:latin typeface="Helvetica Neue Thin" panose="020B0403020202020204" pitchFamily="34" charset="0"/>
-                <a:ea typeface="Helvetica Neue Thin" panose="020B0403020202020204" pitchFamily="34" charset="0"/>
-              </a:rPr>
-              <a:t>Step 4: If analytics satisfactory then stop, else continue to Step 5 [</a:t>
-            </a:r>
-            <a:r>
-              <a:rPr lang="en-US" dirty="0">
-                <a:latin typeface="Helvetica Neue Thin" panose="020B0403020202020204" pitchFamily="34" charset="0"/>
-                <a:ea typeface="Helvetica Neue Thin" panose="020B0403020202020204" pitchFamily="34" charset="0"/>
-                <a:hlinkClick r:id="rId3" action="ppaction://hlinksldjump"/>
-              </a:rPr>
-              <a:t>Slide 13</a:t>
-            </a:r>
-            <a:r>
-              <a:rPr lang="en-US" dirty="0">
-                <a:latin typeface="Helvetica Neue Thin" panose="020B0403020202020204" pitchFamily="34" charset="0"/>
-                <a:ea typeface="Helvetica Neue Thin" panose="020B0403020202020204" pitchFamily="34" charset="0"/>
-              </a:rPr>
-              <a:t>]</a:t>
-            </a:r>
-          </a:p>
-          <a:p>
-            <a:endParaRPr lang="en-US" dirty="0">
-              <a:latin typeface="Helvetica Neue Thin" panose="020B0403020202020204" pitchFamily="34" charset="0"/>
-              <a:ea typeface="Helvetica Neue Thin" panose="020B0403020202020204" pitchFamily="34" charset="0"/>
-            </a:endParaRPr>
-          </a:p>
-          <a:p>
-            <a:r>
-              <a:rPr lang="en-US" dirty="0">
-                <a:latin typeface="Helvetica Neue Thin" panose="020B0403020202020204" pitchFamily="34" charset="0"/>
-                <a:ea typeface="Helvetica Neue Thin" panose="020B0403020202020204" pitchFamily="34" charset="0"/>
-              </a:rPr>
-              <a:t>Step 5: Rerun model exploration modifying how the system is explored using one of the proposed methods [</a:t>
-            </a:r>
-            <a:r>
-              <a:rPr lang="en-US" dirty="0">
-                <a:latin typeface="Helvetica Neue Thin" panose="020B0403020202020204" pitchFamily="34" charset="0"/>
-                <a:ea typeface="Helvetica Neue Thin" panose="020B0403020202020204" pitchFamily="34" charset="0"/>
-                <a:hlinkClick r:id="rId3" action="ppaction://hlinksldjump"/>
-              </a:rPr>
-              <a:t>Slide 13</a:t>
-            </a:r>
-            <a:r>
-              <a:rPr lang="en-US" dirty="0">
-                <a:latin typeface="Helvetica Neue Thin" panose="020B0403020202020204" pitchFamily="34" charset="0"/>
-                <a:ea typeface="Helvetica Neue Thin" panose="020B0403020202020204" pitchFamily="34" charset="0"/>
-              </a:rPr>
-              <a:t>]</a:t>
-            </a:r>
-          </a:p>
-          <a:p>
-            <a:r>
-              <a:rPr lang="en-US" dirty="0">
-                <a:latin typeface="Helvetica Neue Thin" panose="020B0403020202020204" pitchFamily="34" charset="0"/>
-                <a:ea typeface="Helvetica Neue Thin" panose="020B0403020202020204" pitchFamily="34" charset="0"/>
-              </a:rPr>
-              <a:t>	(</a:t>
-            </a:r>
-            <a:r>
-              <a:rPr lang="en-US" dirty="0" err="1">
-                <a:latin typeface="Helvetica Neue Thin" panose="020B0403020202020204" pitchFamily="34" charset="0"/>
-                <a:ea typeface="Helvetica Neue Thin" panose="020B0403020202020204" pitchFamily="34" charset="0"/>
-              </a:rPr>
-              <a:t>i</a:t>
-            </a:r>
-            <a:r>
-              <a:rPr lang="en-US" dirty="0">
-                <a:latin typeface="Helvetica Neue Thin" panose="020B0403020202020204" pitchFamily="34" charset="0"/>
-                <a:ea typeface="Helvetica Neue Thin" panose="020B0403020202020204" pitchFamily="34" charset="0"/>
-              </a:rPr>
-              <a:t>) Bias the Proposal Distribution </a:t>
-            </a:r>
-          </a:p>
-          <a:p>
-            <a:r>
-              <a:rPr lang="en-US" dirty="0">
-                <a:latin typeface="Helvetica Neue Thin" panose="020B0403020202020204" pitchFamily="34" charset="0"/>
-                <a:ea typeface="Helvetica Neue Thin" panose="020B0403020202020204" pitchFamily="34" charset="0"/>
-              </a:rPr>
-              <a:t>	(ii) Bias the Entropy </a:t>
-            </a:r>
-          </a:p>
-          <a:p>
-            <a:r>
-              <a:rPr lang="en-US" dirty="0">
-                <a:latin typeface="Helvetica Neue Thin" panose="020B0403020202020204" pitchFamily="34" charset="0"/>
-                <a:ea typeface="Helvetica Neue Thin" panose="020B0403020202020204" pitchFamily="34" charset="0"/>
-              </a:rPr>
-              <a:t>	(iii) Bias both </a:t>
-            </a:r>
-          </a:p>
-          <a:p>
-            <a:endParaRPr lang="en-US" dirty="0">
-              <a:latin typeface="Helvetica Neue Thin" panose="020B0403020202020204" pitchFamily="34" charset="0"/>
-              <a:ea typeface="Helvetica Neue Thin" panose="020B0403020202020204" pitchFamily="34" charset="0"/>
-            </a:endParaRPr>
-          </a:p>
-          <a:p>
-            <a:r>
-              <a:rPr lang="en-US" dirty="0">
-                <a:latin typeface="Helvetica Neue Thin" panose="020B0403020202020204" pitchFamily="34" charset="0"/>
-                <a:ea typeface="Helvetica Neue Thin" panose="020B0403020202020204" pitchFamily="34" charset="0"/>
-              </a:rPr>
-              <a:t>Step 6: Gather </a:t>
-            </a:r>
-            <a:r>
-              <a:rPr lang="en-US" dirty="0">
-                <a:solidFill>
-                  <a:srgbClr val="0432FF"/>
-                </a:solidFill>
-                <a:latin typeface="Helvetica Neue Thin" panose="020B0403020202020204" pitchFamily="34" charset="0"/>
-                <a:ea typeface="Helvetica Neue Thin" panose="020B0403020202020204" pitchFamily="34" charset="0"/>
-              </a:rPr>
-              <a:t>new data </a:t>
-            </a:r>
-            <a:r>
-              <a:rPr lang="en-US" dirty="0">
-                <a:latin typeface="Helvetica Neue Thin" panose="020B0403020202020204" pitchFamily="34" charset="0"/>
-                <a:ea typeface="Helvetica Neue Thin" panose="020B0403020202020204" pitchFamily="34" charset="0"/>
-              </a:rPr>
-              <a:t>and analyze it [</a:t>
-            </a:r>
-            <a:r>
-              <a:rPr lang="en-US" dirty="0">
-                <a:latin typeface="Helvetica Neue Thin" panose="020B0403020202020204" pitchFamily="34" charset="0"/>
-                <a:ea typeface="Helvetica Neue Thin" panose="020B0403020202020204" pitchFamily="34" charset="0"/>
-                <a:hlinkClick r:id="rId4" action="ppaction://hlinksldjump"/>
-              </a:rPr>
-              <a:t>Slide 14</a:t>
-            </a:r>
-            <a:r>
-              <a:rPr lang="en-US" dirty="0">
-                <a:latin typeface="Helvetica Neue Thin" panose="020B0403020202020204" pitchFamily="34" charset="0"/>
-                <a:ea typeface="Helvetica Neue Thin" panose="020B0403020202020204" pitchFamily="34" charset="0"/>
-              </a:rPr>
-              <a:t>]</a:t>
-            </a:r>
-          </a:p>
-          <a:p>
-            <a:endParaRPr lang="en-US" dirty="0">
-              <a:latin typeface="Helvetica Neue Thin" panose="020B0403020202020204" pitchFamily="34" charset="0"/>
-              <a:ea typeface="Helvetica Neue Thin" panose="020B0403020202020204" pitchFamily="34" charset="0"/>
-            </a:endParaRPr>
-          </a:p>
-          <a:p>
-            <a:r>
-              <a:rPr lang="en-US" dirty="0">
-                <a:latin typeface="Helvetica Neue Thin" panose="020B0403020202020204" pitchFamily="34" charset="0"/>
-                <a:ea typeface="Helvetica Neue Thin" panose="020B0403020202020204" pitchFamily="34" charset="0"/>
-              </a:rPr>
-              <a:t>Step 7: If new analytics satisfactory, stop. Else go back to Step 5, modifying bias parameters [</a:t>
-            </a:r>
-            <a:r>
-              <a:rPr lang="en-US" dirty="0">
-                <a:latin typeface="Helvetica Neue Thin" panose="020B0403020202020204" pitchFamily="34" charset="0"/>
-                <a:ea typeface="Helvetica Neue Thin" panose="020B0403020202020204" pitchFamily="34" charset="0"/>
-                <a:hlinkClick r:id="rId4" action="ppaction://hlinksldjump"/>
-              </a:rPr>
-              <a:t>Slide 14</a:t>
-            </a:r>
-            <a:r>
-              <a:rPr lang="en-US" dirty="0">
-                <a:latin typeface="Helvetica Neue Thin" panose="020B0403020202020204" pitchFamily="34" charset="0"/>
-                <a:ea typeface="Helvetica Neue Thin" panose="020B0403020202020204" pitchFamily="34" charset="0"/>
-              </a:rPr>
-              <a:t>]</a:t>
-            </a:r>
-          </a:p>
-        </p:txBody>
-      </p:sp>
-      <p:sp>
-        <p:nvSpPr>
-          <p:cNvPr id="6" name="TextBox 5">
-            <a:extLst>
-              <a:ext uri="{FF2B5EF4-FFF2-40B4-BE49-F238E27FC236}">
-                <a16:creationId xmlns:a16="http://schemas.microsoft.com/office/drawing/2014/main" id="{341FFF12-9DE5-D7B1-6F34-2E0E8514EEB6}"/>
-              </a:ext>
-            </a:extLst>
-          </p:cNvPr>
-          <p:cNvSpPr txBox="1"/>
-          <p:nvPr/>
-        </p:nvSpPr>
-        <p:spPr>
-          <a:xfrm>
-            <a:off x="314791" y="6311254"/>
-            <a:ext cx="11688317" cy="369332"/>
-          </a:xfrm>
-          <a:prstGeom prst="rect">
-            <a:avLst/>
-          </a:prstGeom>
-          <a:noFill/>
-        </p:spPr>
-        <p:txBody>
-          <a:bodyPr wrap="square" rtlCol="0">
-            <a:spAutoFit/>
-          </a:bodyPr>
-          <a:lstStyle/>
-          <a:p>
-            <a:r>
-              <a:rPr lang="en-US" dirty="0">
-                <a:solidFill>
-                  <a:srgbClr val="FF0000"/>
-                </a:solidFill>
-                <a:latin typeface="Helvetica Neue Thin" panose="020B0403020202020204" pitchFamily="34" charset="0"/>
-                <a:ea typeface="Helvetica Neue Thin" panose="020B0403020202020204" pitchFamily="34" charset="0"/>
-              </a:rPr>
-              <a:t>Detailed description in following slides. </a:t>
-            </a:r>
-          </a:p>
-        </p:txBody>
-      </p:sp>
-      <p:sp>
-        <p:nvSpPr>
-          <p:cNvPr id="7" name="Slide Number Placeholder 6">
-            <a:extLst>
-              <a:ext uri="{FF2B5EF4-FFF2-40B4-BE49-F238E27FC236}">
-                <a16:creationId xmlns:a16="http://schemas.microsoft.com/office/drawing/2014/main" id="{51F1C4DF-4E43-A865-A2A8-6BCE841C3BA4}"/>
-              </a:ext>
-            </a:extLst>
-          </p:cNvPr>
-          <p:cNvSpPr>
-            <a:spLocks noGrp="1"/>
-          </p:cNvSpPr>
-          <p:nvPr>
-            <p:ph type="sldNum" sz="quarter" idx="12"/>
-          </p:nvPr>
-        </p:nvSpPr>
-        <p:spPr/>
-        <p:txBody>
-          <a:bodyPr/>
-          <a:lstStyle/>
-          <a:p>
-            <a:fld id="{4A936E34-E911-F947-B710-F12161D09F63}" type="slidenum">
-              <a:rPr lang="en-FR" smtClean="0"/>
-              <a:t>4</a:t>
-            </a:fld>
-            <a:endParaRPr lang="en-FR"/>
-          </a:p>
-        </p:txBody>
-      </p:sp>
-    </p:spTree>
-    <p:extLst>
-      <p:ext uri="{BB962C8B-B14F-4D97-AF65-F5344CB8AC3E}">
-        <p14:creationId xmlns:p14="http://schemas.microsoft.com/office/powerpoint/2010/main" val="4128960825"/>
+        <p14:creationId xmlns:p14="http://schemas.microsoft.com/office/powerpoint/2010/main" val="220736342"/>
       </p:ext>
     </p:extLst>
   </p:cSld>

</xml_diff>

<commit_message>
modifs to smart random
</commit_message>
<xml_diff>
--- a/mcmc_method.pptx
+++ b/mcmc_method.pptx
@@ -19641,7 +19641,7 @@
         <p:spPr>
           <a:xfrm>
             <a:off x="94445" y="3667158"/>
-            <a:ext cx="3801694" cy="1569660"/>
+            <a:ext cx="6318712" cy="1815882"/>
           </a:xfrm>
           <a:prstGeom prst="rect">
             <a:avLst/>
@@ -19718,6 +19718,22 @@
                 <a:latin typeface="Helvetica Neue Thin" panose="020B0403020202020204" pitchFamily="34" charset="0"/>
                 <a:ea typeface="Helvetica Neue Thin" panose="020B0403020202020204" pitchFamily="34" charset="0"/>
               </a:rPr>
+              <a:t>Exit_remaining</a:t>
+            </a:r>
+            <a:r>
+              <a:rPr lang="en-GB" sz="1600" dirty="0">
+                <a:latin typeface="Helvetica Neue Thin" panose="020B0403020202020204" pitchFamily="34" charset="0"/>
+                <a:ea typeface="Helvetica Neue Thin" panose="020B0403020202020204" pitchFamily="34" charset="0"/>
+              </a:rPr>
+              <a:t> : how many left to take</a:t>
+            </a:r>
+          </a:p>
+          <a:p>
+            <a:r>
+              <a:rPr lang="en-GB" sz="1600" dirty="0" err="1">
+                <a:latin typeface="Helvetica Neue Thin" panose="020B0403020202020204" pitchFamily="34" charset="0"/>
+                <a:ea typeface="Helvetica Neue Thin" panose="020B0403020202020204" pitchFamily="34" charset="0"/>
+              </a:rPr>
               <a:t>Taken_transitions</a:t>
             </a:r>
             <a:r>
@@ -19725,7 +19741,7 @@
                 <a:latin typeface="Helvetica Neue Thin" panose="020B0403020202020204" pitchFamily="34" charset="0"/>
                 <a:ea typeface="Helvetica Neue Thin" panose="020B0403020202020204" pitchFamily="34" charset="0"/>
               </a:rPr>
-              <a:t> : which exits were taken</a:t>
+              <a:t> : which exits were taken and how often</a:t>
             </a:r>
           </a:p>
         </p:txBody>
@@ -19744,7 +19760,7 @@
         </p:nvSpPr>
         <p:spPr>
           <a:xfrm>
-            <a:off x="4050218" y="3667157"/>
+            <a:off x="5261180" y="3667158"/>
             <a:ext cx="4245645" cy="1323439"/>
           </a:xfrm>
           <a:prstGeom prst="rect">
@@ -19839,8 +19855,8 @@
         </p:nvSpPr>
         <p:spPr>
           <a:xfrm>
-            <a:off x="94444" y="5398036"/>
-            <a:ext cx="6637660" cy="1077218"/>
+            <a:off x="94443" y="5644257"/>
+            <a:ext cx="8085729" cy="1077218"/>
           </a:xfrm>
           <a:prstGeom prst="rect">
             <a:avLst/>
@@ -19867,7 +19883,7 @@
                 <a:latin typeface="Helvetica Neue Thin" panose="020B0403020202020204" pitchFamily="34" charset="0"/>
                 <a:ea typeface="Helvetica Neue Thin" panose="020B0403020202020204" pitchFamily="34" charset="0"/>
               </a:rPr>
-              <a:t>TR_COUNT: transitions that appeared [and how many times]</a:t>
+              <a:t>TR_COUNT: transitions that appeared [and how many times] =&gt; % of each transition overall </a:t>
             </a:r>
           </a:p>
           <a:p>
@@ -19900,12 +19916,16 @@
               <a:t>tj</a:t>
             </a:r>
             <a:r>
-              <a:rPr lang="en-GB" sz="1600" dirty="0">
-                <a:latin typeface="Helvetica Neue Thin" panose="020B0403020202020204" pitchFamily="34" charset="0"/>
-                <a:ea typeface="Helvetica Neue Thin" panose="020B0403020202020204" pitchFamily="34" charset="0"/>
-              </a:rPr>
-              <a:t> appears =&gt; % of each transition overall </a:t>
-            </a:r>
+              <a:rPr lang="en-GB" sz="1600">
+                <a:latin typeface="Helvetica Neue Thin" panose="020B0403020202020204" pitchFamily="34" charset="0"/>
+                <a:ea typeface="Helvetica Neue Thin" panose="020B0403020202020204" pitchFamily="34" charset="0"/>
+              </a:rPr>
+              <a:t> appears</a:t>
+            </a:r>
+            <a:endParaRPr lang="en-GB" sz="1600" dirty="0">
+              <a:latin typeface="Helvetica Neue Thin" panose="020B0403020202020204" pitchFamily="34" charset="0"/>
+              <a:ea typeface="Helvetica Neue Thin" panose="020B0403020202020204" pitchFamily="34" charset="0"/>
+            </a:endParaRPr>
           </a:p>
           <a:p>
             <a:endParaRPr lang="en-GB" sz="1600" dirty="0">
@@ -23130,7 +23150,7 @@
 </file>
 
 <file path=ppt/slides/slide41.xml><?xml version="1.0" encoding="utf-8"?>
-<p:sld xmlns:a="http://schemas.openxmlformats.org/drawingml/2006/main" xmlns:r="http://schemas.openxmlformats.org/officeDocument/2006/relationships" xmlns:p="http://schemas.openxmlformats.org/presentationml/2006/main">
+<p:sld xmlns:a="http://schemas.openxmlformats.org/drawingml/2006/main" xmlns:r="http://schemas.openxmlformats.org/officeDocument/2006/relationships" xmlns:p="http://schemas.openxmlformats.org/presentationml/2006/main" show="0">
   <p:cSld>
     <p:spTree>
       <p:nvGrpSpPr>

</xml_diff>

<commit_message>
different mutations for fuzz
</commit_message>
<xml_diff>
--- a/mcmc_method.pptx
+++ b/mcmc_method.pptx
@@ -5,7 +5,7 @@
     <p:sldMasterId id="2147483648" r:id="rId1"/>
   </p:sldMasterIdLst>
   <p:notesMasterIdLst>
-    <p:notesMasterId r:id="rId43"/>
+    <p:notesMasterId r:id="rId44"/>
   </p:notesMasterIdLst>
   <p:sldIdLst>
     <p:sldId id="275" r:id="rId2"/>
@@ -48,7 +48,8 @@
     <p:sldId id="295" r:id="rId39"/>
     <p:sldId id="297" r:id="rId40"/>
     <p:sldId id="299" r:id="rId41"/>
-    <p:sldId id="298" r:id="rId42"/>
+    <p:sldId id="300" r:id="rId42"/>
+    <p:sldId id="298" r:id="rId43"/>
   </p:sldIdLst>
   <p:sldSz cx="12192000" cy="6858000"/>
   <p:notesSz cx="6858000" cy="9144000"/>
@@ -19916,16 +19917,12 @@
               <a:t>tj</a:t>
             </a:r>
             <a:r>
-              <a:rPr lang="en-GB" sz="1600">
+              <a:rPr lang="en-GB" sz="1600" dirty="0">
                 <a:latin typeface="Helvetica Neue Thin" panose="020B0403020202020204" pitchFamily="34" charset="0"/>
                 <a:ea typeface="Helvetica Neue Thin" panose="020B0403020202020204" pitchFamily="34" charset="0"/>
               </a:rPr>
               <a:t> appears</a:t>
             </a:r>
-            <a:endParaRPr lang="en-GB" sz="1600" dirty="0">
-              <a:latin typeface="Helvetica Neue Thin" panose="020B0403020202020204" pitchFamily="34" charset="0"/>
-              <a:ea typeface="Helvetica Neue Thin" panose="020B0403020202020204" pitchFamily="34" charset="0"/>
-            </a:endParaRPr>
           </a:p>
           <a:p>
             <a:endParaRPr lang="en-GB" sz="1600" dirty="0">
@@ -23150,6 +23147,172 @@
 </file>
 
 <file path=ppt/slides/slide41.xml><?xml version="1.0" encoding="utf-8"?>
+<p:sld xmlns:a="http://schemas.openxmlformats.org/drawingml/2006/main" xmlns:r="http://schemas.openxmlformats.org/officeDocument/2006/relationships" xmlns:p="http://schemas.openxmlformats.org/presentationml/2006/main">
+  <p:cSld>
+    <p:spTree>
+      <p:nvGrpSpPr>
+        <p:cNvPr id="1" name=""/>
+        <p:cNvGrpSpPr/>
+        <p:nvPr/>
+      </p:nvGrpSpPr>
+      <p:grpSpPr>
+        <a:xfrm>
+          <a:off x="0" y="0"/>
+          <a:ext cx="0" cy="0"/>
+          <a:chOff x="0" y="0"/>
+          <a:chExt cx="0" cy="0"/>
+        </a:xfrm>
+      </p:grpSpPr>
+      <p:sp>
+        <p:nvSpPr>
+          <p:cNvPr id="6" name="Slide Number Placeholder 5">
+            <a:extLst>
+              <a:ext uri="{FF2B5EF4-FFF2-40B4-BE49-F238E27FC236}">
+                <a16:creationId xmlns:a16="http://schemas.microsoft.com/office/drawing/2014/main" id="{959BDB26-40E4-9CF6-297E-539B90F4FB2E}"/>
+              </a:ext>
+            </a:extLst>
+          </p:cNvPr>
+          <p:cNvSpPr>
+            <a:spLocks noGrp="1"/>
+          </p:cNvSpPr>
+          <p:nvPr>
+            <p:ph type="sldNum" sz="quarter" idx="12"/>
+          </p:nvPr>
+        </p:nvSpPr>
+        <p:spPr/>
+        <p:txBody>
+          <a:bodyPr/>
+          <a:lstStyle/>
+          <a:p>
+            <a:fld id="{4A936E34-E911-F947-B710-F12161D09F63}" type="slidenum">
+              <a:rPr lang="en-FR" smtClean="0"/>
+              <a:t>41</a:t>
+            </a:fld>
+            <a:endParaRPr lang="en-FR"/>
+          </a:p>
+        </p:txBody>
+      </p:sp>
+      <p:sp>
+        <p:nvSpPr>
+          <p:cNvPr id="2" name="TextBox 1">
+            <a:extLst>
+              <a:ext uri="{FF2B5EF4-FFF2-40B4-BE49-F238E27FC236}">
+                <a16:creationId xmlns:a16="http://schemas.microsoft.com/office/drawing/2014/main" id="{494BD36C-8837-AF56-5E58-817A43AA4697}"/>
+              </a:ext>
+            </a:extLst>
+          </p:cNvPr>
+          <p:cNvSpPr txBox="1"/>
+          <p:nvPr/>
+        </p:nvSpPr>
+        <p:spPr>
+          <a:xfrm>
+            <a:off x="94445" y="195565"/>
+            <a:ext cx="12003110" cy="1600438"/>
+          </a:xfrm>
+          <a:prstGeom prst="rect">
+            <a:avLst/>
+          </a:prstGeom>
+          <a:noFill/>
+        </p:spPr>
+        <p:txBody>
+          <a:bodyPr wrap="square" rtlCol="0">
+            <a:spAutoFit/>
+          </a:bodyPr>
+          <a:lstStyle/>
+          <a:p>
+            <a:r>
+              <a:rPr lang="en-GB" dirty="0">
+                <a:latin typeface="Helvetica Neue Thin" panose="020B0403020202020204" pitchFamily="34" charset="0"/>
+                <a:ea typeface="Helvetica Neue Thin" panose="020B0403020202020204" pitchFamily="34" charset="0"/>
+              </a:rPr>
+              <a:t>FUZZ</a:t>
+            </a:r>
+          </a:p>
+          <a:p>
+            <a:endParaRPr lang="en-GB" sz="1600" dirty="0">
+              <a:latin typeface="Helvetica Neue Thin" panose="020B0403020202020204" pitchFamily="34" charset="0"/>
+              <a:ea typeface="Helvetica Neue Thin" panose="020B0403020202020204" pitchFamily="34" charset="0"/>
+            </a:endParaRPr>
+          </a:p>
+          <a:p>
+            <a:pPr marL="342900" indent="-342900">
+              <a:buAutoNum type="arabicParenR"/>
+            </a:pPr>
+            <a:r>
+              <a:rPr lang="en-GB" sz="1600" dirty="0">
+                <a:latin typeface="Helvetica Neue Thin" panose="020B0403020202020204" pitchFamily="34" charset="0"/>
+                <a:ea typeface="Helvetica Neue Thin" panose="020B0403020202020204" pitchFamily="34" charset="0"/>
+              </a:rPr>
+              <a:t>Generate X correct seeds (X = number of initial steps) -&gt; length is max 100, shorter if it deadlocks first [100 can be changed]</a:t>
+            </a:r>
+          </a:p>
+          <a:p>
+            <a:pPr marL="342900" indent="-342900">
+              <a:buAutoNum type="arabicParenR"/>
+            </a:pPr>
+            <a:r>
+              <a:rPr lang="en-GB" sz="1600" dirty="0">
+                <a:latin typeface="Helvetica Neue Thin" panose="020B0403020202020204" pitchFamily="34" charset="0"/>
+                <a:ea typeface="Helvetica Neue Thin" panose="020B0403020202020204" pitchFamily="34" charset="0"/>
+              </a:rPr>
+              <a:t>Generate 1 random seed, not </a:t>
+            </a:r>
+            <a:r>
+              <a:rPr lang="en-GB" sz="1600">
+                <a:latin typeface="Helvetica Neue Thin" panose="020B0403020202020204" pitchFamily="34" charset="0"/>
+                <a:ea typeface="Helvetica Neue Thin" panose="020B0403020202020204" pitchFamily="34" charset="0"/>
+              </a:rPr>
+              <a:t>necessarily correct</a:t>
+            </a:r>
+            <a:endParaRPr lang="en-GB" sz="1600" dirty="0">
+              <a:latin typeface="Helvetica Neue Thin" panose="020B0403020202020204" pitchFamily="34" charset="0"/>
+              <a:ea typeface="Helvetica Neue Thin" panose="020B0403020202020204" pitchFamily="34" charset="0"/>
+            </a:endParaRPr>
+          </a:p>
+          <a:p>
+            <a:pPr marL="342900" indent="-342900">
+              <a:buAutoNum type="arabicParenR"/>
+            </a:pPr>
+            <a:r>
+              <a:rPr lang="en-GB" sz="1600" dirty="0">
+                <a:latin typeface="Helvetica Neue Thin" panose="020B0403020202020204" pitchFamily="34" charset="0"/>
+                <a:ea typeface="Helvetica Neue Thin" panose="020B0403020202020204" pitchFamily="34" charset="0"/>
+              </a:rPr>
+              <a:t>Push all seeds to NEWCAND queue</a:t>
+            </a:r>
+          </a:p>
+          <a:p>
+            <a:pPr marL="342900" indent="-342900">
+              <a:buAutoNum type="arabicParenR"/>
+            </a:pPr>
+            <a:r>
+              <a:rPr lang="en-GB" sz="1600" dirty="0">
+                <a:latin typeface="Helvetica Neue Thin" panose="020B0403020202020204" pitchFamily="34" charset="0"/>
+                <a:ea typeface="Helvetica Neue Thin" panose="020B0403020202020204" pitchFamily="34" charset="0"/>
+              </a:rPr>
+              <a:t>Pop from NEW </a:t>
+            </a:r>
+            <a:endParaRPr lang="en-GB" sz="1400" dirty="0">
+              <a:latin typeface="Helvetica Neue Thin" panose="020B0403020202020204" pitchFamily="34" charset="0"/>
+              <a:ea typeface="Helvetica Neue Thin" panose="020B0403020202020204" pitchFamily="34" charset="0"/>
+            </a:endParaRPr>
+          </a:p>
+        </p:txBody>
+      </p:sp>
+    </p:spTree>
+    <p:extLst>
+      <p:ext uri="{BB962C8B-B14F-4D97-AF65-F5344CB8AC3E}">
+        <p14:creationId xmlns:p14="http://schemas.microsoft.com/office/powerpoint/2010/main" val="507250155"/>
+      </p:ext>
+    </p:extLst>
+  </p:cSld>
+  <p:clrMapOvr>
+    <a:masterClrMapping/>
+  </p:clrMapOvr>
+</p:sld>
+</file>
+
+<file path=ppt/slides/slide42.xml><?xml version="1.0" encoding="utf-8"?>
 <p:sld xmlns:a="http://schemas.openxmlformats.org/drawingml/2006/main" xmlns:r="http://schemas.openxmlformats.org/officeDocument/2006/relationships" xmlns:p="http://schemas.openxmlformats.org/presentationml/2006/main" show="0">
   <p:cSld>
     <p:spTree>
@@ -23237,7 +23400,7 @@
           <a:p>
             <a:fld id="{4A936E34-E911-F947-B710-F12161D09F63}" type="slidenum">
               <a:rPr lang="en-FR" smtClean="0"/>
-              <a:t>41</a:t>
+              <a:t>42</a:t>
             </a:fld>
             <a:endParaRPr lang="en-FR"/>
           </a:p>

</xml_diff>